<commit_message>
added pictures to the ppt, modified Aufteilung.docx to the beginning
</commit_message>
<xml_diff>
--- a/Doku/Puzzle.pptx
+++ b/Doku/Puzzle.pptx
@@ -5,17 +5,26 @@
     <p:sldMasterId id="2147483708" r:id="rId1"/>
   </p:sldMasterIdLst>
   <p:notesMasterIdLst>
-    <p:notesMasterId r:id="rId10"/>
+    <p:notesMasterId r:id="rId19"/>
   </p:notesMasterIdLst>
   <p:sldIdLst>
     <p:sldId id="256" r:id="rId2"/>
     <p:sldId id="257" r:id="rId3"/>
     <p:sldId id="258" r:id="rId4"/>
     <p:sldId id="259" r:id="rId5"/>
-    <p:sldId id="260" r:id="rId6"/>
-    <p:sldId id="268" r:id="rId7"/>
-    <p:sldId id="264" r:id="rId8"/>
-    <p:sldId id="266" r:id="rId9"/>
+    <p:sldId id="269" r:id="rId6"/>
+    <p:sldId id="273" r:id="rId7"/>
+    <p:sldId id="270" r:id="rId8"/>
+    <p:sldId id="274" r:id="rId9"/>
+    <p:sldId id="275" r:id="rId10"/>
+    <p:sldId id="271" r:id="rId11"/>
+    <p:sldId id="276" r:id="rId12"/>
+    <p:sldId id="277" r:id="rId13"/>
+    <p:sldId id="278" r:id="rId14"/>
+    <p:sldId id="260" r:id="rId15"/>
+    <p:sldId id="268" r:id="rId16"/>
+    <p:sldId id="264" r:id="rId17"/>
+    <p:sldId id="266" r:id="rId18"/>
   </p:sldIdLst>
   <p:sldSz cx="9144000" cy="6858000" type="screen4x3"/>
   <p:notesSz cx="6858000" cy="9144000"/>
@@ -200,7 +209,7 @@
             <a:fld id="{9CCF7261-FAE9-431D-A535-F0D32AAE8354}" type="datetimeFigureOut">
               <a:rPr lang="de-CH" smtClean="0"/>
               <a:pPr/>
-              <a:t>02.01.2013</a:t>
+              <a:t>04.01.2013</a:t>
             </a:fld>
             <a:endParaRPr lang="de-CH"/>
           </a:p>
@@ -371,7 +380,7 @@
     </p:spTree>
     <p:extLst>
       <p:ext uri="{BB962C8B-B14F-4D97-AF65-F5344CB8AC3E}">
-        <p14:creationId xmlns:p14="http://schemas.microsoft.com/office/powerpoint/2010/main" val="352693751"/>
+        <p14:creationId xmlns="" xmlns:p14="http://schemas.microsoft.com/office/powerpoint/2010/main" val="352693751"/>
       </p:ext>
     </p:extLst>
   </p:cSld>
@@ -668,7 +677,7 @@
             <a:fld id="{485DD82D-527C-48E8-9B47-36C7BFBD461B}" type="slidenum">
               <a:rPr lang="de-CH" smtClean="0"/>
               <a:pPr/>
-              <a:t>6</a:t>
+              <a:t>15</a:t>
             </a:fld>
             <a:endParaRPr lang="de-CH"/>
           </a:p>
@@ -1133,7 +1142,7 @@
             <a:fld id="{485DD82D-527C-48E8-9B47-36C7BFBD461B}" type="slidenum">
               <a:rPr lang="de-CH" smtClean="0"/>
               <a:pPr/>
-              <a:t>7</a:t>
+              <a:t>16</a:t>
             </a:fld>
             <a:endParaRPr lang="de-CH"/>
           </a:p>
@@ -1173,7 +1182,7 @@
           <p:nvPr/>
         </p:nvPicPr>
         <p:blipFill>
-          <a:blip r:embed="rId2" cstate="print"/>
+          <a:blip r:embed="rId2" cstate="screen"/>
           <a:srcRect t="33333"/>
           <a:stretch>
             <a:fillRect/>
@@ -1207,7 +1216,7 @@
             <a:fld id="{0B8AC65F-F2B9-4AE9-880A-F19E8D9538B7}" type="datetimeFigureOut">
               <a:rPr lang="de-CH" smtClean="0"/>
               <a:pPr/>
-              <a:t>02.01.2013</a:t>
+              <a:t>04.01.2013</a:t>
             </a:fld>
             <a:endParaRPr lang="de-CH"/>
           </a:p>
@@ -1525,7 +1534,7 @@
             <a:fld id="{0B8AC65F-F2B9-4AE9-880A-F19E8D9538B7}" type="datetimeFigureOut">
               <a:rPr lang="de-CH" smtClean="0"/>
               <a:pPr/>
-              <a:t>02.01.2013</a:t>
+              <a:t>04.01.2013</a:t>
             </a:fld>
             <a:endParaRPr lang="de-CH"/>
           </a:p>
@@ -1702,7 +1711,7 @@
             <a:fld id="{0B8AC65F-F2B9-4AE9-880A-F19E8D9538B7}" type="datetimeFigureOut">
               <a:rPr lang="de-CH" smtClean="0"/>
               <a:pPr/>
-              <a:t>02.01.2013</a:t>
+              <a:t>04.01.2013</a:t>
             </a:fld>
             <a:endParaRPr lang="de-CH"/>
           </a:p>
@@ -1822,7 +1831,7 @@
             <a:fld id="{0B8AC65F-F2B9-4AE9-880A-F19E8D9538B7}" type="datetimeFigureOut">
               <a:rPr lang="de-CH" smtClean="0"/>
               <a:pPr/>
-              <a:t>02.01.2013</a:t>
+              <a:t>04.01.2013</a:t>
             </a:fld>
             <a:endParaRPr lang="de-CH"/>
           </a:p>
@@ -2122,7 +2131,7 @@
             <a:fld id="{0B8AC65F-F2B9-4AE9-880A-F19E8D9538B7}" type="datetimeFigureOut">
               <a:rPr lang="de-CH" smtClean="0"/>
               <a:pPr/>
-              <a:t>02.01.2013</a:t>
+              <a:t>04.01.2013</a:t>
             </a:fld>
             <a:endParaRPr lang="de-CH"/>
           </a:p>
@@ -2417,7 +2426,7 @@
             <a:fld id="{0B8AC65F-F2B9-4AE9-880A-F19E8D9538B7}" type="datetimeFigureOut">
               <a:rPr lang="de-CH" smtClean="0"/>
               <a:pPr/>
-              <a:t>02.01.2013</a:t>
+              <a:t>04.01.2013</a:t>
             </a:fld>
             <a:endParaRPr lang="de-CH"/>
           </a:p>
@@ -2847,7 +2856,7 @@
             <a:fld id="{0B8AC65F-F2B9-4AE9-880A-F19E8D9538B7}" type="datetimeFigureOut">
               <a:rPr lang="de-CH" smtClean="0"/>
               <a:pPr/>
-              <a:t>02.01.2013</a:t>
+              <a:t>04.01.2013</a:t>
             </a:fld>
             <a:endParaRPr lang="de-CH"/>
           </a:p>
@@ -2967,7 +2976,7 @@
             <a:fld id="{0B8AC65F-F2B9-4AE9-880A-F19E8D9538B7}" type="datetimeFigureOut">
               <a:rPr lang="de-CH" smtClean="0"/>
               <a:pPr/>
-              <a:t>02.01.2013</a:t>
+              <a:t>04.01.2013</a:t>
             </a:fld>
             <a:endParaRPr lang="de-CH"/>
           </a:p>
@@ -3059,7 +3068,7 @@
             <a:fld id="{0B8AC65F-F2B9-4AE9-880A-F19E8D9538B7}" type="datetimeFigureOut">
               <a:rPr lang="de-CH" smtClean="0"/>
               <a:pPr/>
-              <a:t>02.01.2013</a:t>
+              <a:t>04.01.2013</a:t>
             </a:fld>
             <a:endParaRPr lang="de-CH"/>
           </a:p>
@@ -3311,7 +3320,7 @@
             <a:fld id="{0B8AC65F-F2B9-4AE9-880A-F19E8D9538B7}" type="datetimeFigureOut">
               <a:rPr lang="de-CH" smtClean="0"/>
               <a:pPr/>
-              <a:t>02.01.2013</a:t>
+              <a:t>04.01.2013</a:t>
             </a:fld>
             <a:endParaRPr lang="de-CH"/>
           </a:p>
@@ -3394,7 +3403,7 @@
           <p:nvPr/>
         </p:nvPicPr>
         <p:blipFill>
-          <a:blip r:embed="rId2" cstate="print"/>
+          <a:blip r:embed="rId2" cstate="screen"/>
           <a:stretch>
             <a:fillRect/>
           </a:stretch>
@@ -3829,7 +3838,7 @@
             <a:fld id="{0B8AC65F-F2B9-4AE9-880A-F19E8D9538B7}" type="datetimeFigureOut">
               <a:rPr lang="de-CH" smtClean="0"/>
               <a:pPr/>
-              <a:t>02.01.2013</a:t>
+              <a:t>04.01.2013</a:t>
             </a:fld>
             <a:endParaRPr lang="de-CH"/>
           </a:p>
@@ -3917,7 +3926,7 @@
           <p:nvPr/>
         </p:nvPicPr>
         <p:blipFill>
-          <a:blip r:embed="rId13" cstate="print"/>
+          <a:blip r:embed="rId13" cstate="screen"/>
           <a:stretch>
             <a:fillRect/>
           </a:stretch>
@@ -4061,7 +4070,7 @@
             <a:fld id="{0B8AC65F-F2B9-4AE9-880A-F19E8D9538B7}" type="datetimeFigureOut">
               <a:rPr lang="de-CH" smtClean="0"/>
               <a:pPr/>
-              <a:t>02.01.2013</a:t>
+              <a:t>04.01.2013</a:t>
             </a:fld>
             <a:endParaRPr lang="de-CH"/>
           </a:p>
@@ -4589,15 +4598,7 @@
           <a:p>
             <a:r>
               <a:rPr lang="de-CH" dirty="0" smtClean="0"/>
-              <a:t>Maschinelles Sehen und Bildverarbeitung</a:t>
-            </a:r>
-            <a:r>
-              <a:rPr lang="de-CH" dirty="0" smtClean="0"/>
-              <a:t> </a:t>
-            </a:r>
-            <a:r>
-              <a:rPr lang="de-CH" dirty="0" smtClean="0"/>
-              <a:t>– Projektarbeit</a:t>
+              <a:t>Maschinelles Sehen und Bildverarbeitung – Projektarbeit</a:t>
             </a:r>
           </a:p>
         </p:txBody>
@@ -4837,10 +4838,10 @@
           <p:nvPr/>
         </p:nvPicPr>
         <p:blipFill>
-          <a:blip r:embed="rId2" cstate="print">
+          <a:blip r:embed="rId2" cstate="screen">
             <a:extLst>
               <a:ext uri="{BEBA8EAE-BF5A-486C-A8C5-ECC9F3942E4B}">
-                <a14:imgProps xmlns:a14="http://schemas.microsoft.com/office/drawing/2010/main">
+                <a14:imgProps xmlns="" xmlns:a14="http://schemas.microsoft.com/office/drawing/2010/main">
                   <a14:imgLayer r:embed="rId3">
                     <a14:imgEffect>
                       <a14:backgroundRemoval t="350" b="100000" l="0" r="100000">
@@ -4874,7 +4875,7 @@
                 </a14:imgProps>
               </a:ext>
               <a:ext uri="{28A0092B-C50C-407E-A947-70E740481C1C}">
-                <a14:useLocalDpi xmlns:a14="http://schemas.microsoft.com/office/drawing/2010/main" val="0"/>
+                <a14:useLocalDpi xmlns="" xmlns:a14="http://schemas.microsoft.com/office/drawing/2010/main" val="0"/>
               </a:ext>
             </a:extLst>
           </a:blip>
@@ -4894,7 +4895,7 @@
           <a:noFill/>
           <a:extLst>
             <a:ext uri="{909E8E84-426E-40DD-AFC4-6F175D3DCCD1}">
-              <a14:hiddenFill xmlns:a14="http://schemas.microsoft.com/office/drawing/2010/main">
+              <a14:hiddenFill xmlns="" xmlns:a14="http://schemas.microsoft.com/office/drawing/2010/main">
                 <a:solidFill>
                   <a:srgbClr val="FFFFFF"/>
                 </a:solidFill>
@@ -4906,7 +4907,7 @@
     </p:spTree>
     <p:extLst>
       <p:ext uri="{BB962C8B-B14F-4D97-AF65-F5344CB8AC3E}">
-        <p14:creationId xmlns:p14="http://schemas.microsoft.com/office/powerpoint/2010/main" val="1704400666"/>
+        <p14:creationId xmlns="" xmlns:p14="http://schemas.microsoft.com/office/powerpoint/2010/main" val="1704400666"/>
       </p:ext>
     </p:extLst>
   </p:cSld>
@@ -4923,7 +4924,7 @@
 </p:sld>
 </file>
 
-<file path=ppt/slides/slide2.xml><?xml version="1.0" encoding="utf-8"?>
+<file path=ppt/slides/slide10.xml><?xml version="1.0" encoding="utf-8"?>
 <p:sld xmlns:a="http://schemas.openxmlformats.org/drawingml/2006/main" xmlns:r="http://schemas.openxmlformats.org/officeDocument/2006/relationships" xmlns:p="http://schemas.openxmlformats.org/presentationml/2006/main">
   <p:cSld>
     <p:spTree>
@@ -4957,7 +4958,7 @@
           <a:p>
             <a:r>
               <a:rPr lang="de-CH" dirty="0" smtClean="0"/>
-              <a:t>Inhalt</a:t>
+              <a:t>Planung</a:t>
             </a:r>
             <a:endParaRPr lang="de-CH" dirty="0"/>
           </a:p>
@@ -4980,56 +4981,80 @@
           <a:p>
             <a:r>
               <a:rPr lang="de-CH" dirty="0" smtClean="0"/>
-              <a:t>Idee/Ziel</a:t>
-            </a:r>
-            <a:endParaRPr lang="de-CH" dirty="0" smtClean="0"/>
-          </a:p>
-          <a:p>
+              <a:t>Version </a:t>
+            </a:r>
+            <a:r>
+              <a:rPr lang="de-CH" dirty="0" err="1" smtClean="0"/>
+              <a:t>Control</a:t>
+            </a:r>
             <a:r>
               <a:rPr lang="de-CH" dirty="0" smtClean="0"/>
-              <a:t>Planung</a:t>
-            </a:r>
-          </a:p>
-          <a:p>
-            <a:r>
-              <a:rPr lang="de-CH" dirty="0" err="1" smtClean="0"/>
-              <a:t>OpenCV</a:t>
-            </a:r>
-            <a:r>
-              <a:rPr lang="de-CH" dirty="0" smtClean="0"/>
-              <a:t> / </a:t>
-            </a:r>
-            <a:r>
-              <a:rPr lang="de-CH" dirty="0" err="1" smtClean="0"/>
-              <a:t>Qt</a:t>
+              <a:t> System </a:t>
+            </a:r>
+            <a:r>
+              <a:rPr lang="de-CH" b="1" dirty="0" err="1" smtClean="0"/>
+              <a:t>Git</a:t>
             </a:r>
             <a:r>
               <a:rPr lang="de-CH" dirty="0" smtClean="0"/>
               <a:t> </a:t>
             </a:r>
             <a:r>
+              <a:rPr lang="de-CH" dirty="0" smtClean="0"/>
+              <a:t>aufgesetzt: Client Software: „</a:t>
+            </a:r>
+            <a:r>
               <a:rPr lang="de-CH" dirty="0" err="1" smtClean="0"/>
-              <a:t>Creator</a:t>
-            </a:r>
-            <a:endParaRPr lang="de-CH" dirty="0" smtClean="0"/>
-          </a:p>
-          <a:p>
+              <a:t>Git</a:t>
+            </a:r>
             <a:r>
               <a:rPr lang="de-CH" dirty="0" smtClean="0"/>
-              <a:t>Programmablauf</a:t>
-            </a:r>
+              <a:t> </a:t>
+            </a:r>
+            <a:r>
+              <a:rPr lang="de-CH" dirty="0" err="1" smtClean="0"/>
+              <a:t>Bash</a:t>
+            </a:r>
+            <a:r>
+              <a:rPr lang="de-CH" dirty="0" smtClean="0"/>
+              <a:t>“</a:t>
+            </a:r>
+          </a:p>
+          <a:p>
             <a:endParaRPr lang="de-CH" dirty="0"/>
           </a:p>
-          <a:p>
-            <a:pPr lvl="1"/>
-            <a:endParaRPr lang="de-CH" dirty="0"/>
-          </a:p>
-        </p:txBody>
-      </p:sp>
+        </p:txBody>
+      </p:sp>
+      <p:pic>
+        <p:nvPicPr>
+          <p:cNvPr id="6146" name="Picture 2" descr="C:\Users\Cyril\Pictures\Screenpresso\2013-01-04_11h27_17.png"/>
+          <p:cNvPicPr>
+            <a:picLocks noChangeAspect="1" noChangeArrowheads="1"/>
+          </p:cNvPicPr>
+          <p:nvPr/>
+        </p:nvPicPr>
+        <p:blipFill>
+          <a:blip r:embed="rId2" cstate="screen"/>
+          <a:srcRect/>
+          <a:stretch>
+            <a:fillRect/>
+          </a:stretch>
+        </p:blipFill>
+        <p:spPr bwMode="auto">
+          <a:xfrm>
+            <a:off x="1331640" y="2564854"/>
+            <a:ext cx="6450012" cy="3600450"/>
+          </a:xfrm>
+          <a:prstGeom prst="rect">
+            <a:avLst/>
+          </a:prstGeom>
+          <a:noFill/>
+        </p:spPr>
+      </p:pic>
     </p:spTree>
     <p:extLst>
       <p:ext uri="{BB962C8B-B14F-4D97-AF65-F5344CB8AC3E}">
-        <p14:creationId xmlns:p14="http://schemas.microsoft.com/office/powerpoint/2010/main" val="1387166899"/>
+        <p14:creationId xmlns="" xmlns:p14="http://schemas.microsoft.com/office/powerpoint/2010/main" val="2756733679"/>
       </p:ext>
     </p:extLst>
   </p:cSld>
@@ -5093,135 +5118,6 @@
                       </p:childTnLst>
                     </p:cTn>
                   </p:par>
-                  <p:par>
-                    <p:cTn id="7" fill="hold">
-                      <p:stCondLst>
-                        <p:cond delay="indefinite"/>
-                      </p:stCondLst>
-                      <p:childTnLst>
-                        <p:par>
-                          <p:cTn id="8" fill="hold">
-                            <p:stCondLst>
-                              <p:cond delay="0"/>
-                            </p:stCondLst>
-                            <p:childTnLst>
-                              <p:par>
-                                <p:cTn id="9" presetID="1" presetClass="entr" presetSubtype="0" fill="hold" grpId="0" nodeType="clickEffect">
-                                  <p:stCondLst>
-                                    <p:cond delay="0"/>
-                                  </p:stCondLst>
-                                  <p:childTnLst>
-                                    <p:set>
-                                      <p:cBhvr>
-                                        <p:cTn id="10" dur="1" fill="hold">
-                                          <p:stCondLst>
-                                            <p:cond delay="0"/>
-                                          </p:stCondLst>
-                                        </p:cTn>
-                                        <p:tgtEl>
-                                          <p:spTgt spid="3">
-                                            <p:txEl>
-                                              <p:pRg st="1" end="1"/>
-                                            </p:txEl>
-                                          </p:spTgt>
-                                        </p:tgtEl>
-                                        <p:attrNameLst>
-                                          <p:attrName>style.visibility</p:attrName>
-                                        </p:attrNameLst>
-                                      </p:cBhvr>
-                                      <p:to>
-                                        <p:strVal val="visible"/>
-                                      </p:to>
-                                    </p:set>
-                                  </p:childTnLst>
-                                </p:cTn>
-                              </p:par>
-                              <p:par>
-                                <p:cTn id="11" presetID="1" presetClass="entr" presetSubtype="0" fill="hold" grpId="0" nodeType="withEffect">
-                                  <p:stCondLst>
-                                    <p:cond delay="0"/>
-                                  </p:stCondLst>
-                                  <p:childTnLst>
-                                    <p:set>
-                                      <p:cBhvr>
-                                        <p:cTn id="12" dur="1" fill="hold">
-                                          <p:stCondLst>
-                                            <p:cond delay="0"/>
-                                          </p:stCondLst>
-                                        </p:cTn>
-                                        <p:tgtEl>
-                                          <p:spTgt spid="3">
-                                            <p:txEl>
-                                              <p:pRg st="2" end="2"/>
-                                            </p:txEl>
-                                          </p:spTgt>
-                                        </p:tgtEl>
-                                        <p:attrNameLst>
-                                          <p:attrName>style.visibility</p:attrName>
-                                        </p:attrNameLst>
-                                      </p:cBhvr>
-                                      <p:to>
-                                        <p:strVal val="visible"/>
-                                      </p:to>
-                                    </p:set>
-                                  </p:childTnLst>
-                                </p:cTn>
-                              </p:par>
-                            </p:childTnLst>
-                          </p:cTn>
-                        </p:par>
-                      </p:childTnLst>
-                    </p:cTn>
-                  </p:par>
-                  <p:par>
-                    <p:cTn id="13" fill="hold">
-                      <p:stCondLst>
-                        <p:cond delay="indefinite"/>
-                      </p:stCondLst>
-                      <p:childTnLst>
-                        <p:par>
-                          <p:cTn id="14" fill="hold">
-                            <p:stCondLst>
-                              <p:cond delay="0"/>
-                            </p:stCondLst>
-                            <p:childTnLst>
-                              <p:par>
-                                <p:cTn id="15" presetID="1" presetClass="entr" presetSubtype="0" fill="hold" grpId="0" nodeType="clickEffect">
-                                  <p:stCondLst>
-                                    <p:cond delay="0"/>
-                                  </p:stCondLst>
-                                  <p:childTnLst>
-                                    <p:set>
-                                      <p:cBhvr>
-                                        <p:cTn id="16" dur="1" fill="hold">
-                                          <p:stCondLst>
-                                            <p:cond delay="0"/>
-                                          </p:stCondLst>
-                                        </p:cTn>
-                                        <p:tgtEl>
-                                          <p:spTgt spid="3">
-                                            <p:txEl>
-                                              <p:pRg st="3" end="3"/>
-                                            </p:txEl>
-                                          </p:spTgt>
-                                        </p:tgtEl>
-                                        <p:attrNameLst>
-                                          <p:attrName>style.visibility</p:attrName>
-                                        </p:attrNameLst>
-                                      </p:cBhvr>
-                                      <p:to>
-                                        <p:strVal val="visible"/>
-                                      </p:to>
-                                    </p:set>
-                                  </p:childTnLst>
-                                </p:cTn>
-                              </p:par>
-                            </p:childTnLst>
-                          </p:cTn>
-                        </p:par>
-                      </p:childTnLst>
-                    </p:cTn>
-                  </p:par>
                 </p:childTnLst>
               </p:cTn>
               <p:prevCondLst>
@@ -5250,7 +5146,7 @@
 </p:sld>
 </file>
 
-<file path=ppt/slides/slide3.xml><?xml version="1.0" encoding="utf-8"?>
+<file path=ppt/slides/slide11.xml><?xml version="1.0" encoding="utf-8"?>
 <p:sld xmlns:a="http://schemas.openxmlformats.org/drawingml/2006/main" xmlns:r="http://schemas.openxmlformats.org/officeDocument/2006/relationships" xmlns:p="http://schemas.openxmlformats.org/presentationml/2006/main">
   <p:cSld>
     <p:spTree>
@@ -5283,8 +5179,8 @@
           <a:lstStyle/>
           <a:p>
             <a:r>
-              <a:rPr lang="de-CH" dirty="0" err="1" smtClean="0"/>
-              <a:t>idee</a:t>
+              <a:rPr lang="de-CH" dirty="0" smtClean="0"/>
+              <a:t>Planung</a:t>
             </a:r>
             <a:endParaRPr lang="de-CH" dirty="0"/>
           </a:p>
@@ -5307,42 +5203,83 @@
           <a:p>
             <a:r>
               <a:rPr lang="de-CH" dirty="0" smtClean="0"/>
-              <a:t>Puzzle Lösen mit </a:t>
-            </a:r>
-            <a:r>
-              <a:rPr lang="de-CH" dirty="0" err="1" smtClean="0"/>
-              <a:t>Bilverarbeitung</a:t>
+              <a:t>Online Repository </a:t>
+            </a:r>
+            <a:r>
+              <a:rPr lang="de-CH" dirty="0" smtClean="0"/>
+              <a:t>aufgesetzt: Online Source Code </a:t>
+            </a:r>
+            <a:r>
+              <a:rPr lang="de-CH" dirty="0" smtClean="0"/>
+              <a:t>Hosting auf </a:t>
+            </a:r>
+            <a:r>
+              <a:rPr lang="de-CH" b="1" dirty="0" err="1" smtClean="0"/>
+              <a:t>GitHub</a:t>
             </a:r>
             <a:endParaRPr lang="de-CH" dirty="0" smtClean="0"/>
           </a:p>
           <a:p>
-            <a:r>
-              <a:rPr lang="de-CH" dirty="0" smtClean="0"/>
-              <a:t>Bilder einlesen</a:t>
-            </a:r>
-          </a:p>
-          <a:p>
-            <a:r>
-              <a:rPr lang="de-CH" dirty="0" smtClean="0"/>
-              <a:t>Seite anwählen </a:t>
-            </a:r>
-            <a:r>
-              <a:rPr lang="de-CH" dirty="0" smtClean="0">
-                <a:sym typeface="Wingdings" pitchFamily="2" charset="2"/>
-              </a:rPr>
-              <a:t> Passendes Teilchen anzeigen</a:t>
-            </a:r>
-            <a:endParaRPr lang="de-CH" dirty="0" smtClean="0"/>
-          </a:p>
-          <a:p>
             <a:endParaRPr lang="de-CH" dirty="0"/>
           </a:p>
         </p:txBody>
       </p:sp>
+      <p:pic>
+        <p:nvPicPr>
+          <p:cNvPr id="7170" name="Picture 2" descr="C:\Users\Cyril\Pictures\Screenpresso\2013-01-04_11h14_28.png"/>
+          <p:cNvPicPr>
+            <a:picLocks noChangeAspect="1" noChangeArrowheads="1"/>
+          </p:cNvPicPr>
+          <p:nvPr/>
+        </p:nvPicPr>
+        <p:blipFill>
+          <a:blip r:embed="rId2" cstate="screen"/>
+          <a:srcRect/>
+          <a:stretch>
+            <a:fillRect/>
+          </a:stretch>
+        </p:blipFill>
+        <p:spPr bwMode="auto">
+          <a:xfrm>
+            <a:off x="179512" y="4807793"/>
+            <a:ext cx="8831262" cy="1933575"/>
+          </a:xfrm>
+          <a:prstGeom prst="rect">
+            <a:avLst/>
+          </a:prstGeom>
+          <a:noFill/>
+        </p:spPr>
+      </p:pic>
+      <p:pic>
+        <p:nvPicPr>
+          <p:cNvPr id="7171" name="Picture 3" descr="C:\Users\Cyril\Pictures\Screenpresso\2013-01-04_11h19_05.png"/>
+          <p:cNvPicPr>
+            <a:picLocks noChangeAspect="1" noChangeArrowheads="1"/>
+          </p:cNvPicPr>
+          <p:nvPr/>
+        </p:nvPicPr>
+        <p:blipFill>
+          <a:blip r:embed="rId3" cstate="screen"/>
+          <a:srcRect/>
+          <a:stretch>
+            <a:fillRect/>
+          </a:stretch>
+        </p:blipFill>
+        <p:spPr bwMode="auto">
+          <a:xfrm>
+            <a:off x="179512" y="2060848"/>
+            <a:ext cx="8831262" cy="2552700"/>
+          </a:xfrm>
+          <a:prstGeom prst="rect">
+            <a:avLst/>
+          </a:prstGeom>
+          <a:noFill/>
+        </p:spPr>
+      </p:pic>
     </p:spTree>
     <p:extLst>
       <p:ext uri="{BB962C8B-B14F-4D97-AF65-F5344CB8AC3E}">
-        <p14:creationId xmlns:p14="http://schemas.microsoft.com/office/powerpoint/2010/main" val="1599884037"/>
+        <p14:creationId xmlns="" xmlns:p14="http://schemas.microsoft.com/office/powerpoint/2010/main" val="2756733679"/>
       </p:ext>
     </p:extLst>
   </p:cSld>
@@ -5406,104 +5343,6 @@
                       </p:childTnLst>
                     </p:cTn>
                   </p:par>
-                  <p:par>
-                    <p:cTn id="7" fill="hold">
-                      <p:stCondLst>
-                        <p:cond delay="indefinite"/>
-                      </p:stCondLst>
-                      <p:childTnLst>
-                        <p:par>
-                          <p:cTn id="8" fill="hold">
-                            <p:stCondLst>
-                              <p:cond delay="0"/>
-                            </p:stCondLst>
-                            <p:childTnLst>
-                              <p:par>
-                                <p:cTn id="9" presetID="1" presetClass="entr" presetSubtype="0" fill="hold" grpId="0" nodeType="clickEffect">
-                                  <p:stCondLst>
-                                    <p:cond delay="0"/>
-                                  </p:stCondLst>
-                                  <p:childTnLst>
-                                    <p:set>
-                                      <p:cBhvr>
-                                        <p:cTn id="10" dur="1" fill="hold">
-                                          <p:stCondLst>
-                                            <p:cond delay="0"/>
-                                          </p:stCondLst>
-                                        </p:cTn>
-                                        <p:tgtEl>
-                                          <p:spTgt spid="3">
-                                            <p:txEl>
-                                              <p:pRg st="1" end="1"/>
-                                            </p:txEl>
-                                          </p:spTgt>
-                                        </p:tgtEl>
-                                        <p:attrNameLst>
-                                          <p:attrName>style.visibility</p:attrName>
-                                        </p:attrNameLst>
-                                      </p:cBhvr>
-                                      <p:to>
-                                        <p:strVal val="visible"/>
-                                      </p:to>
-                                    </p:set>
-                                  </p:childTnLst>
-                                </p:cTn>
-                              </p:par>
-                            </p:childTnLst>
-                          </p:cTn>
-                        </p:par>
-                      </p:childTnLst>
-                    </p:cTn>
-                  </p:par>
-                  <p:par>
-                    <p:cTn id="11" fill="hold">
-                      <p:stCondLst>
-                        <p:cond delay="indefinite"/>
-                      </p:stCondLst>
-                      <p:childTnLst>
-                        <p:par>
-                          <p:cTn id="12" fill="hold">
-                            <p:stCondLst>
-                              <p:cond delay="0"/>
-                            </p:stCondLst>
-                            <p:childTnLst>
-                              <p:par>
-                                <p:cTn id="13" presetID="1" presetClass="entr" presetSubtype="0" fill="hold" grpId="0" nodeType="clickEffect">
-                                  <p:stCondLst>
-                                    <p:cond delay="0"/>
-                                  </p:stCondLst>
-                                  <p:childTnLst>
-                                    <p:set>
-                                      <p:cBhvr>
-                                        <p:cTn id="14" dur="1" fill="hold">
-                                          <p:stCondLst>
-                                            <p:cond delay="0"/>
-                                          </p:stCondLst>
-                                        </p:cTn>
-                                        <p:tgtEl>
-                                          <p:spTgt spid="3">
-                                            <p:txEl>
-                                              <p:pRg st="2" end="2"/>
-                                            </p:txEl>
-                                          </p:spTgt>
-                                        </p:tgtEl>
-                                        <p:attrNameLst>
-                                          <p:attrName>style.visibility</p:attrName>
-                                        </p:attrNameLst>
-                                      </p:cBhvr>
-                                      <p:to>
-                                        <p:strVal val="visible"/>
-                                      </p:to>
-                                    </p:set>
-                                  </p:childTnLst>
-                                </p:cTn>
-                              </p:par>
-                            </p:childTnLst>
-                          </p:cTn>
-                        </p:par>
-                      </p:childTnLst>
-                    </p:cTn>
-                  </p:par>
                 </p:childTnLst>
               </p:cTn>
               <p:prevCondLst>
@@ -5532,7 +5371,7 @@
 </p:sld>
 </file>
 
-<file path=ppt/slides/slide4.xml><?xml version="1.0" encoding="utf-8"?>
+<file path=ppt/slides/slide12.xml><?xml version="1.0" encoding="utf-8"?>
 <p:sld xmlns:a="http://schemas.openxmlformats.org/drawingml/2006/main" xmlns:r="http://schemas.openxmlformats.org/officeDocument/2006/relationships" xmlns:p="http://schemas.openxmlformats.org/presentationml/2006/main">
   <p:cSld>
     <p:spTree>
@@ -5589,7 +5428,11 @@
           <a:p>
             <a:r>
               <a:rPr lang="de-CH" dirty="0" smtClean="0"/>
-              <a:t>Repository aufgesetzt (</a:t>
+              <a:t>Online Repository </a:t>
+            </a:r>
+            <a:r>
+              <a:rPr lang="de-CH" dirty="0" smtClean="0"/>
+              <a:t>aufgesetzt: </a:t>
             </a:r>
             <a:r>
               <a:rPr lang="de-CH" dirty="0" err="1" smtClean="0"/>
@@ -5597,47 +5440,8 @@
             </a:r>
             <a:r>
               <a:rPr lang="de-CH" dirty="0" smtClean="0"/>
-              <a:t>)</a:t>
-            </a:r>
-          </a:p>
-          <a:p>
-            <a:r>
-              <a:rPr lang="de-CH" dirty="0" smtClean="0"/>
-              <a:t>Pflichtenheft definiert</a:t>
-            </a:r>
-          </a:p>
-          <a:p>
-            <a:r>
-              <a:rPr lang="de-CH" dirty="0" err="1" smtClean="0"/>
-              <a:t>Flowchart</a:t>
-            </a:r>
-            <a:r>
-              <a:rPr lang="de-CH" dirty="0" smtClean="0"/>
-              <a:t> Grobablauf</a:t>
-            </a:r>
-          </a:p>
-          <a:p>
-            <a:r>
-              <a:rPr lang="de-CH" dirty="0" smtClean="0"/>
-              <a:t>Zeitplanung</a:t>
-            </a:r>
-            <a:endParaRPr lang="de-CH" dirty="0" smtClean="0"/>
-          </a:p>
-          <a:p>
-            <a:r>
-              <a:rPr lang="de-CH" dirty="0" smtClean="0"/>
-              <a:t>Implementation</a:t>
-            </a:r>
-          </a:p>
-          <a:p>
-            <a:r>
-              <a:rPr lang="de-CH" dirty="0" smtClean="0"/>
-              <a:t>Dokumentation</a:t>
-            </a:r>
-            <a:endParaRPr lang="de-CH" dirty="0" smtClean="0"/>
-          </a:p>
-          <a:p>
-            <a:endParaRPr lang="de-CH" dirty="0" smtClean="0"/>
+              <a:t> „Punch Card“</a:t>
+            </a:r>
           </a:p>
           <a:p>
             <a:endParaRPr lang="de-CH" dirty="0"/>
@@ -5646,14 +5450,14 @@
       </p:sp>
       <p:pic>
         <p:nvPicPr>
-          <p:cNvPr id="3073" name="Picture 1" descr="D:\Programming\C\LaserChess\docs\punchcard.png"/>
+          <p:cNvPr id="8194" name="Picture 2" descr="C:\Users\Cyril\Pictures\Screenpresso\fakepunchcard.png"/>
           <p:cNvPicPr>
             <a:picLocks noChangeAspect="1" noChangeArrowheads="1"/>
           </p:cNvPicPr>
           <p:nvPr/>
         </p:nvPicPr>
         <p:blipFill>
-          <a:blip r:embed="rId2" cstate="print"/>
+          <a:blip r:embed="rId2" cstate="screen"/>
           <a:srcRect/>
           <a:stretch>
             <a:fillRect/>
@@ -5661,31 +5465,19 @@
         </p:blipFill>
         <p:spPr bwMode="auto">
           <a:xfrm>
-            <a:off x="2195736" y="4221088"/>
-            <a:ext cx="5212532" cy="1415678"/>
+            <a:off x="1724968" y="2060848"/>
+            <a:ext cx="6015384" cy="4589879"/>
           </a:xfrm>
-          <a:prstGeom prst="roundRect">
-            <a:avLst>
-              <a:gd name="adj" fmla="val 4108"/>
-            </a:avLst>
+          <a:prstGeom prst="rect">
+            <a:avLst/>
           </a:prstGeom>
-          <a:solidFill>
-            <a:srgbClr val="FFFFFF">
-              <a:shade val="85000"/>
-            </a:srgbClr>
-          </a:solidFill>
-          <a:ln>
-            <a:noFill/>
-          </a:ln>
-          <a:effectLst>
-            <a:reflection blurRad="12700" stA="38000" endPos="28000" dist="5000" dir="5400000" sy="-100000" algn="bl" rotWithShape="0"/>
-          </a:effectLst>
+          <a:noFill/>
         </p:spPr>
       </p:pic>
     </p:spTree>
     <p:extLst>
       <p:ext uri="{BB962C8B-B14F-4D97-AF65-F5344CB8AC3E}">
-        <p14:creationId xmlns:p14="http://schemas.microsoft.com/office/powerpoint/2010/main" val="2756733679"/>
+        <p14:creationId xmlns="" xmlns:p14="http://schemas.microsoft.com/office/powerpoint/2010/main" val="2756733679"/>
       </p:ext>
     </p:extLst>
   </p:cSld>
@@ -5749,27 +5541,192 @@
                       </p:childTnLst>
                     </p:cTn>
                   </p:par>
+                </p:childTnLst>
+              </p:cTn>
+              <p:prevCondLst>
+                <p:cond evt="onPrev" delay="0">
+                  <p:tgtEl>
+                    <p:sldTgt/>
+                  </p:tgtEl>
+                </p:cond>
+              </p:prevCondLst>
+              <p:nextCondLst>
+                <p:cond evt="onNext" delay="0">
+                  <p:tgtEl>
+                    <p:sldTgt/>
+                  </p:tgtEl>
+                </p:cond>
+              </p:nextCondLst>
+            </p:seq>
+          </p:childTnLst>
+        </p:cTn>
+      </p:par>
+    </p:tnLst>
+    <p:bldLst>
+      <p:bldP spid="3" grpId="0" build="p"/>
+    </p:bldLst>
+  </p:timing>
+</p:sld>
+</file>
+
+<file path=ppt/slides/slide13.xml><?xml version="1.0" encoding="utf-8"?>
+<p:sld xmlns:a="http://schemas.openxmlformats.org/drawingml/2006/main" xmlns:r="http://schemas.openxmlformats.org/officeDocument/2006/relationships" xmlns:p="http://schemas.openxmlformats.org/presentationml/2006/main">
+  <p:cSld>
+    <p:spTree>
+      <p:nvGrpSpPr>
+        <p:cNvPr id="1" name=""/>
+        <p:cNvGrpSpPr/>
+        <p:nvPr/>
+      </p:nvGrpSpPr>
+      <p:grpSpPr>
+        <a:xfrm>
+          <a:off x="0" y="0"/>
+          <a:ext cx="0" cy="0"/>
+          <a:chOff x="0" y="0"/>
+          <a:chExt cx="0" cy="0"/>
+        </a:xfrm>
+      </p:grpSpPr>
+      <p:sp>
+        <p:nvSpPr>
+          <p:cNvPr id="2" name="Titel 1"/>
+          <p:cNvSpPr>
+            <a:spLocks noGrp="1"/>
+          </p:cNvSpPr>
+          <p:nvPr>
+            <p:ph type="title"/>
+          </p:nvPr>
+        </p:nvSpPr>
+        <p:spPr/>
+        <p:txBody>
+          <a:bodyPr/>
+          <a:lstStyle/>
+          <a:p>
+            <a:r>
+              <a:rPr lang="de-CH" dirty="0" smtClean="0"/>
+              <a:t>Planung</a:t>
+            </a:r>
+            <a:endParaRPr lang="de-CH" dirty="0"/>
+          </a:p>
+        </p:txBody>
+      </p:sp>
+      <p:sp>
+        <p:nvSpPr>
+          <p:cNvPr id="3" name="Inhaltsplatzhalter 2"/>
+          <p:cNvSpPr>
+            <a:spLocks noGrp="1"/>
+          </p:cNvSpPr>
+          <p:nvPr>
+            <p:ph sz="quarter" idx="13"/>
+          </p:nvPr>
+        </p:nvSpPr>
+        <p:spPr/>
+        <p:txBody>
+          <a:bodyPr/>
+          <a:lstStyle/>
+          <a:p>
+            <a:r>
+              <a:rPr lang="de-CH" dirty="0" smtClean="0"/>
+              <a:t>Online Repository </a:t>
+            </a:r>
+            <a:r>
+              <a:rPr lang="de-CH" dirty="0" smtClean="0"/>
+              <a:t>aufgesetzt: </a:t>
+            </a:r>
+            <a:r>
+              <a:rPr lang="de-CH" dirty="0" err="1" smtClean="0"/>
+              <a:t>GitHub</a:t>
+            </a:r>
+            <a:r>
+              <a:rPr lang="de-CH" dirty="0" smtClean="0"/>
+              <a:t> </a:t>
+            </a:r>
+            <a:r>
+              <a:rPr lang="de-CH" dirty="0" err="1" smtClean="0"/>
+              <a:t>Issue</a:t>
+            </a:r>
+            <a:r>
+              <a:rPr lang="de-CH" dirty="0" smtClean="0"/>
+              <a:t> </a:t>
+            </a:r>
+            <a:r>
+              <a:rPr lang="de-CH" dirty="0" smtClean="0"/>
+              <a:t>Tracking </a:t>
+            </a:r>
+            <a:r>
+              <a:rPr lang="de-CH" dirty="0" smtClean="0"/>
+              <a:t>System</a:t>
+            </a:r>
+          </a:p>
+          <a:p>
+            <a:endParaRPr lang="de-CH" dirty="0"/>
+          </a:p>
+        </p:txBody>
+      </p:sp>
+      <p:pic>
+        <p:nvPicPr>
+          <p:cNvPr id="9218" name="Picture 2" descr="C:\Users\Cyril\Pictures\Screenpresso\2013-01-04_11h18_08.png"/>
+          <p:cNvPicPr>
+            <a:picLocks noChangeAspect="1" noChangeArrowheads="1"/>
+          </p:cNvPicPr>
+          <p:nvPr/>
+        </p:nvPicPr>
+        <p:blipFill>
+          <a:blip r:embed="rId2" cstate="screen"/>
+          <a:srcRect/>
+          <a:stretch>
+            <a:fillRect/>
+          </a:stretch>
+        </p:blipFill>
+        <p:spPr bwMode="auto">
+          <a:xfrm>
+            <a:off x="1259632" y="1988840"/>
+            <a:ext cx="6696744" cy="4681582"/>
+          </a:xfrm>
+          <a:prstGeom prst="rect">
+            <a:avLst/>
+          </a:prstGeom>
+          <a:noFill/>
+        </p:spPr>
+      </p:pic>
+    </p:spTree>
+    <p:extLst>
+      <p:ext uri="{BB962C8B-B14F-4D97-AF65-F5344CB8AC3E}">
+        <p14:creationId xmlns="" xmlns:p14="http://schemas.microsoft.com/office/powerpoint/2010/main" val="2756733679"/>
+      </p:ext>
+    </p:extLst>
+  </p:cSld>
+  <p:clrMapOvr>
+    <a:masterClrMapping/>
+  </p:clrMapOvr>
+  <p:timing>
+    <p:tnLst>
+      <p:par>
+        <p:cTn id="1" dur="indefinite" restart="never" nodeType="tmRoot">
+          <p:childTnLst>
+            <p:seq concurrent="1" nextAc="seek">
+              <p:cTn id="2" dur="indefinite" nodeType="mainSeq">
+                <p:childTnLst>
                   <p:par>
-                    <p:cTn id="7" fill="hold">
+                    <p:cTn id="3" fill="hold">
                       <p:stCondLst>
                         <p:cond delay="indefinite"/>
                       </p:stCondLst>
                       <p:childTnLst>
                         <p:par>
-                          <p:cTn id="8" fill="hold">
+                          <p:cTn id="4" fill="hold">
                             <p:stCondLst>
                               <p:cond delay="0"/>
                             </p:stCondLst>
                             <p:childTnLst>
                               <p:par>
-                                <p:cTn id="9" presetID="1" presetClass="entr" presetSubtype="0" fill="hold" grpId="0" nodeType="clickEffect">
+                                <p:cTn id="5" presetID="1" presetClass="entr" presetSubtype="0" fill="hold" grpId="0" nodeType="clickEffect">
                                   <p:stCondLst>
                                     <p:cond delay="0"/>
                                   </p:stCondLst>
                                   <p:childTnLst>
                                     <p:set>
                                       <p:cBhvr>
-                                        <p:cTn id="10" dur="1" fill="hold">
+                                        <p:cTn id="6" dur="1" fill="hold">
                                           <p:stCondLst>
                                             <p:cond delay="0"/>
                                           </p:stCondLst>
@@ -5777,239 +5734,7 @@
                                         <p:tgtEl>
                                           <p:spTgt spid="3">
                                             <p:txEl>
-                                              <p:pRg st="1" end="1"/>
-                                            </p:txEl>
-                                          </p:spTgt>
-                                        </p:tgtEl>
-                                        <p:attrNameLst>
-                                          <p:attrName>style.visibility</p:attrName>
-                                        </p:attrNameLst>
-                                      </p:cBhvr>
-                                      <p:to>
-                                        <p:strVal val="visible"/>
-                                      </p:to>
-                                    </p:set>
-                                  </p:childTnLst>
-                                </p:cTn>
-                              </p:par>
-                            </p:childTnLst>
-                          </p:cTn>
-                        </p:par>
-                      </p:childTnLst>
-                    </p:cTn>
-                  </p:par>
-                  <p:par>
-                    <p:cTn id="11" fill="hold">
-                      <p:stCondLst>
-                        <p:cond delay="indefinite"/>
-                      </p:stCondLst>
-                      <p:childTnLst>
-                        <p:par>
-                          <p:cTn id="12" fill="hold">
-                            <p:stCondLst>
-                              <p:cond delay="0"/>
-                            </p:stCondLst>
-                            <p:childTnLst>
-                              <p:par>
-                                <p:cTn id="13" presetID="1" presetClass="entr" presetSubtype="0" fill="hold" grpId="0" nodeType="clickEffect">
-                                  <p:stCondLst>
-                                    <p:cond delay="0"/>
-                                  </p:stCondLst>
-                                  <p:childTnLst>
-                                    <p:set>
-                                      <p:cBhvr>
-                                        <p:cTn id="14" dur="1" fill="hold">
-                                          <p:stCondLst>
-                                            <p:cond delay="0"/>
-                                          </p:stCondLst>
-                                        </p:cTn>
-                                        <p:tgtEl>
-                                          <p:spTgt spid="3">
-                                            <p:txEl>
-                                              <p:pRg st="2" end="2"/>
-                                            </p:txEl>
-                                          </p:spTgt>
-                                        </p:tgtEl>
-                                        <p:attrNameLst>
-                                          <p:attrName>style.visibility</p:attrName>
-                                        </p:attrNameLst>
-                                      </p:cBhvr>
-                                      <p:to>
-                                        <p:strVal val="visible"/>
-                                      </p:to>
-                                    </p:set>
-                                  </p:childTnLst>
-                                </p:cTn>
-                              </p:par>
-                            </p:childTnLst>
-                          </p:cTn>
-                        </p:par>
-                      </p:childTnLst>
-                    </p:cTn>
-                  </p:par>
-                  <p:par>
-                    <p:cTn id="15" fill="hold">
-                      <p:stCondLst>
-                        <p:cond delay="indefinite"/>
-                      </p:stCondLst>
-                      <p:childTnLst>
-                        <p:par>
-                          <p:cTn id="16" fill="hold">
-                            <p:stCondLst>
-                              <p:cond delay="0"/>
-                            </p:stCondLst>
-                            <p:childTnLst>
-                              <p:par>
-                                <p:cTn id="17" presetID="1" presetClass="entr" presetSubtype="0" fill="hold" grpId="0" nodeType="clickEffect">
-                                  <p:stCondLst>
-                                    <p:cond delay="0"/>
-                                  </p:stCondLst>
-                                  <p:childTnLst>
-                                    <p:set>
-                                      <p:cBhvr>
-                                        <p:cTn id="18" dur="1" fill="hold">
-                                          <p:stCondLst>
-                                            <p:cond delay="0"/>
-                                          </p:stCondLst>
-                                        </p:cTn>
-                                        <p:tgtEl>
-                                          <p:spTgt spid="3">
-                                            <p:txEl>
-                                              <p:pRg st="3" end="3"/>
-                                            </p:txEl>
-                                          </p:spTgt>
-                                        </p:tgtEl>
-                                        <p:attrNameLst>
-                                          <p:attrName>style.visibility</p:attrName>
-                                        </p:attrNameLst>
-                                      </p:cBhvr>
-                                      <p:to>
-                                        <p:strVal val="visible"/>
-                                      </p:to>
-                                    </p:set>
-                                  </p:childTnLst>
-                                </p:cTn>
-                              </p:par>
-                            </p:childTnLst>
-                          </p:cTn>
-                        </p:par>
-                        <p:par>
-                          <p:cTn id="19" fill="hold">
-                            <p:stCondLst>
-                              <p:cond delay="0"/>
-                            </p:stCondLst>
-                            <p:childTnLst>
-                              <p:par>
-                                <p:cTn id="20" presetID="1" presetClass="entr" presetSubtype="0" fill="hold" nodeType="afterEffect">
-                                  <p:stCondLst>
-                                    <p:cond delay="0"/>
-                                  </p:stCondLst>
-                                  <p:childTnLst>
-                                    <p:set>
-                                      <p:cBhvr>
-                                        <p:cTn id="21" dur="1" fill="hold">
-                                          <p:stCondLst>
-                                            <p:cond delay="0"/>
-                                          </p:stCondLst>
-                                        </p:cTn>
-                                        <p:tgtEl>
-                                          <p:spTgt spid="3073"/>
-                                        </p:tgtEl>
-                                        <p:attrNameLst>
-                                          <p:attrName>style.visibility</p:attrName>
-                                        </p:attrNameLst>
-                                      </p:cBhvr>
-                                      <p:to>
-                                        <p:strVal val="visible"/>
-                                      </p:to>
-                                    </p:set>
-                                  </p:childTnLst>
-                                </p:cTn>
-                              </p:par>
-                            </p:childTnLst>
-                          </p:cTn>
-                        </p:par>
-                      </p:childTnLst>
-                    </p:cTn>
-                  </p:par>
-                  <p:par>
-                    <p:cTn id="22" fill="hold">
-                      <p:stCondLst>
-                        <p:cond delay="indefinite"/>
-                      </p:stCondLst>
-                      <p:childTnLst>
-                        <p:par>
-                          <p:cTn id="23" fill="hold">
-                            <p:stCondLst>
-                              <p:cond delay="0"/>
-                            </p:stCondLst>
-                            <p:childTnLst>
-                              <p:par>
-                                <p:cTn id="24" presetID="1" presetClass="entr" presetSubtype="0" fill="hold" grpId="0" nodeType="clickEffect">
-                                  <p:stCondLst>
-                                    <p:cond delay="0"/>
-                                  </p:stCondLst>
-                                  <p:childTnLst>
-                                    <p:set>
-                                      <p:cBhvr>
-                                        <p:cTn id="25" dur="1" fill="hold">
-                                          <p:stCondLst>
-                                            <p:cond delay="0"/>
-                                          </p:stCondLst>
-                                        </p:cTn>
-                                        <p:tgtEl>
-                                          <p:spTgt spid="3">
-                                            <p:txEl>
-                                              <p:pRg st="4" end="4"/>
-                                            </p:txEl>
-                                          </p:spTgt>
-                                        </p:tgtEl>
-                                        <p:attrNameLst>
-                                          <p:attrName>style.visibility</p:attrName>
-                                        </p:attrNameLst>
-                                      </p:cBhvr>
-                                      <p:to>
-                                        <p:strVal val="visible"/>
-                                      </p:to>
-                                    </p:set>
-                                  </p:childTnLst>
-                                </p:cTn>
-                              </p:par>
-                            </p:childTnLst>
-                          </p:cTn>
-                        </p:par>
-                      </p:childTnLst>
-                    </p:cTn>
-                  </p:par>
-                  <p:par>
-                    <p:cTn id="26" fill="hold">
-                      <p:stCondLst>
-                        <p:cond delay="indefinite"/>
-                      </p:stCondLst>
-                      <p:childTnLst>
-                        <p:par>
-                          <p:cTn id="27" fill="hold">
-                            <p:stCondLst>
-                              <p:cond delay="0"/>
-                            </p:stCondLst>
-                            <p:childTnLst>
-                              <p:par>
-                                <p:cTn id="28" presetID="1" presetClass="entr" presetSubtype="0" fill="hold" grpId="0" nodeType="clickEffect">
-                                  <p:stCondLst>
-                                    <p:cond delay="0"/>
-                                  </p:stCondLst>
-                                  <p:childTnLst>
-                                    <p:set>
-                                      <p:cBhvr>
-                                        <p:cTn id="29" dur="1" fill="hold">
-                                          <p:stCondLst>
-                                            <p:cond delay="0"/>
-                                          </p:stCondLst>
-                                        </p:cTn>
-                                        <p:tgtEl>
-                                          <p:spTgt spid="3">
-                                            <p:txEl>
-                                              <p:pRg st="5" end="5"/>
+                                              <p:pRg st="0" end="0"/>
                                             </p:txEl>
                                           </p:spTgt>
                                         </p:tgtEl>
@@ -6052,13 +5777,13 @@
       </p:par>
     </p:tnLst>
     <p:bldLst>
-      <p:bldP spid="3" grpId="0" uiExpand="1" build="p"/>
+      <p:bldP spid="3" grpId="0" build="p"/>
     </p:bldLst>
   </p:timing>
 </p:sld>
 </file>
 
-<file path=ppt/slides/slide5.xml><?xml version="1.0" encoding="utf-8"?>
+<file path=ppt/slides/slide14.xml><?xml version="1.0" encoding="utf-8"?>
 <p:sld xmlns:a="http://schemas.openxmlformats.org/drawingml/2006/main" xmlns:r="http://schemas.openxmlformats.org/officeDocument/2006/relationships" xmlns:p="http://schemas.openxmlformats.org/presentationml/2006/main">
   <p:cSld>
     <p:spTree>
@@ -6124,7 +5849,6 @@
               <a:rPr lang="de-CH" dirty="0" smtClean="0"/>
               <a:t>GUI erstellen</a:t>
             </a:r>
-            <a:endParaRPr lang="de-CH" dirty="0" smtClean="0"/>
           </a:p>
           <a:p>
             <a:pPr lvl="1"/>
@@ -6132,7 +5856,6 @@
               <a:rPr lang="de-CH" dirty="0" smtClean="0"/>
               <a:t>Bild laden</a:t>
             </a:r>
-            <a:endParaRPr lang="de-CH" dirty="0" smtClean="0"/>
           </a:p>
           <a:p>
             <a:pPr lvl="1"/>
@@ -6153,7 +5876,7 @@
     </p:spTree>
     <p:extLst>
       <p:ext uri="{BB962C8B-B14F-4D97-AF65-F5344CB8AC3E}">
-        <p14:creationId xmlns:p14="http://schemas.microsoft.com/office/powerpoint/2010/main" val="1334996816"/>
+        <p14:creationId xmlns="" xmlns:p14="http://schemas.microsoft.com/office/powerpoint/2010/main" val="1334996816"/>
       </p:ext>
     </p:extLst>
   </p:cSld>
@@ -6338,7 +6061,7 @@
 </p:sld>
 </file>
 
-<file path=ppt/slides/slide6.xml><?xml version="1.0" encoding="utf-8"?>
+<file path=ppt/slides/slide15.xml><?xml version="1.0" encoding="utf-8"?>
 <p:sld xmlns:a="http://schemas.openxmlformats.org/drawingml/2006/main" xmlns:r="http://schemas.openxmlformats.org/officeDocument/2006/relationships" xmlns:p="http://schemas.openxmlformats.org/presentationml/2006/main">
   <p:cSld>
     <p:spTree>
@@ -6387,7 +6110,7 @@
           <p:nvPr/>
         </p:nvPicPr>
         <p:blipFill>
-          <a:blip r:embed="rId3" cstate="print"/>
+          <a:blip r:embed="rId3" cstate="screen"/>
           <a:srcRect/>
           <a:stretch>
             <a:fillRect/>
@@ -6419,7 +6142,7 @@
     </p:spTree>
     <p:extLst>
       <p:ext uri="{BB962C8B-B14F-4D97-AF65-F5344CB8AC3E}">
-        <p14:creationId xmlns:p14="http://schemas.microsoft.com/office/powerpoint/2010/main" val="3199722868"/>
+        <p14:creationId xmlns="" xmlns:p14="http://schemas.microsoft.com/office/powerpoint/2010/main" val="3199722868"/>
       </p:ext>
     </p:extLst>
   </p:cSld>
@@ -6504,7 +6227,7 @@
 </p:sld>
 </file>
 
-<file path=ppt/slides/slide7.xml><?xml version="1.0" encoding="utf-8"?>
+<file path=ppt/slides/slide16.xml><?xml version="1.0" encoding="utf-8"?>
 <p:sld xmlns:a="http://schemas.openxmlformats.org/drawingml/2006/main" xmlns:r="http://schemas.openxmlformats.org/officeDocument/2006/relationships" xmlns:p="http://schemas.openxmlformats.org/presentationml/2006/main">
   <p:cSld>
     <p:spTree>
@@ -6530,10 +6253,10 @@
           <p:nvPr/>
         </p:nvPicPr>
         <p:blipFill>
-          <a:blip r:embed="rId3">
+          <a:blip r:embed="rId3" cstate="screen">
             <a:extLst>
               <a:ext uri="{28A0092B-C50C-407E-A947-70E740481C1C}">
-                <a14:useLocalDpi xmlns:a14="http://schemas.microsoft.com/office/drawing/2010/main" val="0"/>
+                <a14:useLocalDpi xmlns="" xmlns:a14="http://schemas.microsoft.com/office/drawing/2010/main" val="0"/>
               </a:ext>
             </a:extLst>
           </a:blip>
@@ -6565,7 +6288,7 @@
           </a:effectLst>
           <a:extLst>
             <a:ext uri="{909E8E84-426E-40DD-AFC4-6F175D3DCCD1}">
-              <a14:hiddenFill xmlns:a14="http://schemas.microsoft.com/office/drawing/2010/main">
+              <a14:hiddenFill xmlns="" xmlns:a14="http://schemas.microsoft.com/office/drawing/2010/main">
                 <a:solidFill>
                   <a:srgbClr val="FFFFFF"/>
                 </a:solidFill>
@@ -6583,7 +6306,7 @@
           <p:nvPr/>
         </p:nvPicPr>
         <p:blipFill>
-          <a:blip r:embed="rId4" cstate="print"/>
+          <a:blip r:embed="rId4" cstate="screen"/>
           <a:srcRect/>
           <a:stretch>
             <a:fillRect/>
@@ -6621,7 +6344,7 @@
           <p:nvPr/>
         </p:nvPicPr>
         <p:blipFill>
-          <a:blip r:embed="rId5" cstate="print"/>
+          <a:blip r:embed="rId5" cstate="screen"/>
           <a:stretch>
             <a:fillRect/>
           </a:stretch>
@@ -6658,7 +6381,7 @@
           <p:nvPr/>
         </p:nvPicPr>
         <p:blipFill>
-          <a:blip r:embed="rId6" cstate="print"/>
+          <a:blip r:embed="rId6" cstate="screen"/>
           <a:stretch>
             <a:fillRect/>
           </a:stretch>
@@ -6695,7 +6418,7 @@
           <p:nvPr/>
         </p:nvPicPr>
         <p:blipFill>
-          <a:blip r:embed="rId7" cstate="print"/>
+          <a:blip r:embed="rId7" cstate="screen"/>
           <a:stretch>
             <a:fillRect/>
           </a:stretch>
@@ -6732,7 +6455,7 @@
           <p:nvPr/>
         </p:nvPicPr>
         <p:blipFill>
-          <a:blip r:embed="rId8" cstate="print"/>
+          <a:blip r:embed="rId8" cstate="screen"/>
           <a:stretch>
             <a:fillRect/>
           </a:stretch>
@@ -6769,7 +6492,7 @@
           <p:nvPr/>
         </p:nvPicPr>
         <p:blipFill>
-          <a:blip r:embed="rId9" cstate="print"/>
+          <a:blip r:embed="rId9" cstate="screen"/>
           <a:srcRect/>
           <a:stretch>
             <a:fillRect/>
@@ -6807,7 +6530,7 @@
           <p:nvPr/>
         </p:nvPicPr>
         <p:blipFill>
-          <a:blip r:embed="rId10" cstate="print"/>
+          <a:blip r:embed="rId10" cstate="screen"/>
           <a:srcRect/>
           <a:stretch>
             <a:fillRect/>
@@ -6864,7 +6587,7 @@
     </p:spTree>
     <p:extLst>
       <p:ext uri="{BB962C8B-B14F-4D97-AF65-F5344CB8AC3E}">
-        <p14:creationId xmlns:p14="http://schemas.microsoft.com/office/powerpoint/2010/main" val="3199722868"/>
+        <p14:creationId xmlns="" xmlns:p14="http://schemas.microsoft.com/office/powerpoint/2010/main" val="3199722868"/>
       </p:ext>
     </p:extLst>
   </p:cSld>
@@ -7275,7 +6998,7 @@
 </p:sld>
 </file>
 
-<file path=ppt/slides/slide8.xml><?xml version="1.0" encoding="utf-8"?>
+<file path=ppt/slides/slide17.xml><?xml version="1.0" encoding="utf-8"?>
 <p:sld xmlns:a="http://schemas.openxmlformats.org/drawingml/2006/main" xmlns:r="http://schemas.openxmlformats.org/officeDocument/2006/relationships" xmlns:p="http://schemas.openxmlformats.org/presentationml/2006/main">
   <p:cSld>
     <p:spTree>
@@ -7346,10 +7069,10 @@
           <p:nvPr/>
         </p:nvPicPr>
         <p:blipFill>
-          <a:blip r:embed="rId2">
+          <a:blip r:embed="rId2" cstate="screen">
             <a:extLst>
               <a:ext uri="{28A0092B-C50C-407E-A947-70E740481C1C}">
-                <a14:useLocalDpi xmlns:a14="http://schemas.microsoft.com/office/drawing/2010/main" val="0"/>
+                <a14:useLocalDpi xmlns="" xmlns:a14="http://schemas.microsoft.com/office/drawing/2010/main" val="0"/>
               </a:ext>
             </a:extLst>
           </a:blip>
@@ -7374,7 +7097,7 @@
           </a:effectLst>
           <a:extLst>
             <a:ext uri="{909E8E84-426E-40DD-AFC4-6F175D3DCCD1}">
-              <a14:hiddenFill xmlns:a14="http://schemas.microsoft.com/office/drawing/2010/main">
+              <a14:hiddenFill xmlns="" xmlns:a14="http://schemas.microsoft.com/office/drawing/2010/main">
                 <a:solidFill>
                   <a:srgbClr val="FFFFFF"/>
                 </a:solidFill>
@@ -7386,7 +7109,7 @@
     </p:spTree>
     <p:extLst>
       <p:ext uri="{BB962C8B-B14F-4D97-AF65-F5344CB8AC3E}">
-        <p14:creationId xmlns:p14="http://schemas.microsoft.com/office/powerpoint/2010/main" val="1595990863"/>
+        <p14:creationId xmlns="" xmlns:p14="http://schemas.microsoft.com/office/powerpoint/2010/main" val="1595990863"/>
       </p:ext>
     </p:extLst>
   </p:cSld>
@@ -7399,6 +7122,1945 @@
         <p:cTn id="1" dur="indefinite" restart="never" nodeType="tmRoot"/>
       </p:par>
     </p:tnLst>
+  </p:timing>
+</p:sld>
+</file>
+
+<file path=ppt/slides/slide2.xml><?xml version="1.0" encoding="utf-8"?>
+<p:sld xmlns:a="http://schemas.openxmlformats.org/drawingml/2006/main" xmlns:r="http://schemas.openxmlformats.org/officeDocument/2006/relationships" xmlns:p="http://schemas.openxmlformats.org/presentationml/2006/main">
+  <p:cSld>
+    <p:spTree>
+      <p:nvGrpSpPr>
+        <p:cNvPr id="1" name=""/>
+        <p:cNvGrpSpPr/>
+        <p:nvPr/>
+      </p:nvGrpSpPr>
+      <p:grpSpPr>
+        <a:xfrm>
+          <a:off x="0" y="0"/>
+          <a:ext cx="0" cy="0"/>
+          <a:chOff x="0" y="0"/>
+          <a:chExt cx="0" cy="0"/>
+        </a:xfrm>
+      </p:grpSpPr>
+      <p:sp>
+        <p:nvSpPr>
+          <p:cNvPr id="2" name="Titel 1"/>
+          <p:cNvSpPr>
+            <a:spLocks noGrp="1"/>
+          </p:cNvSpPr>
+          <p:nvPr>
+            <p:ph type="title"/>
+          </p:nvPr>
+        </p:nvSpPr>
+        <p:spPr/>
+        <p:txBody>
+          <a:bodyPr/>
+          <a:lstStyle/>
+          <a:p>
+            <a:r>
+              <a:rPr lang="de-CH" dirty="0" smtClean="0"/>
+              <a:t>Inhalt</a:t>
+            </a:r>
+            <a:endParaRPr lang="de-CH" dirty="0"/>
+          </a:p>
+        </p:txBody>
+      </p:sp>
+      <p:sp>
+        <p:nvSpPr>
+          <p:cNvPr id="3" name="Inhaltsplatzhalter 2"/>
+          <p:cNvSpPr>
+            <a:spLocks noGrp="1"/>
+          </p:cNvSpPr>
+          <p:nvPr>
+            <p:ph sz="quarter" idx="13"/>
+          </p:nvPr>
+        </p:nvSpPr>
+        <p:spPr/>
+        <p:txBody>
+          <a:bodyPr/>
+          <a:lstStyle/>
+          <a:p>
+            <a:r>
+              <a:rPr lang="de-CH" dirty="0" smtClean="0"/>
+              <a:t>Idee/Ziel</a:t>
+            </a:r>
+          </a:p>
+          <a:p>
+            <a:r>
+              <a:rPr lang="de-CH" dirty="0" smtClean="0"/>
+              <a:t>Planung</a:t>
+            </a:r>
+          </a:p>
+          <a:p>
+            <a:r>
+              <a:rPr lang="de-CH" dirty="0" err="1" smtClean="0"/>
+              <a:t>OpenCV</a:t>
+            </a:r>
+            <a:r>
+              <a:rPr lang="de-CH" dirty="0" smtClean="0"/>
+              <a:t> / </a:t>
+            </a:r>
+            <a:r>
+              <a:rPr lang="de-CH" dirty="0" err="1" smtClean="0"/>
+              <a:t>Qt</a:t>
+            </a:r>
+            <a:r>
+              <a:rPr lang="de-CH" dirty="0" smtClean="0"/>
+              <a:t> </a:t>
+            </a:r>
+            <a:r>
+              <a:rPr lang="de-CH" dirty="0" err="1" smtClean="0"/>
+              <a:t>Creator</a:t>
+            </a:r>
+            <a:endParaRPr lang="de-CH" dirty="0" smtClean="0"/>
+          </a:p>
+          <a:p>
+            <a:r>
+              <a:rPr lang="de-CH" dirty="0" smtClean="0"/>
+              <a:t>Programmablauf</a:t>
+            </a:r>
+            <a:endParaRPr lang="de-CH" dirty="0"/>
+          </a:p>
+          <a:p>
+            <a:pPr lvl="1"/>
+            <a:endParaRPr lang="de-CH" dirty="0"/>
+          </a:p>
+        </p:txBody>
+      </p:sp>
+    </p:spTree>
+    <p:extLst>
+      <p:ext uri="{BB962C8B-B14F-4D97-AF65-F5344CB8AC3E}">
+        <p14:creationId xmlns="" xmlns:p14="http://schemas.microsoft.com/office/powerpoint/2010/main" val="1387166899"/>
+      </p:ext>
+    </p:extLst>
+  </p:cSld>
+  <p:clrMapOvr>
+    <a:masterClrMapping/>
+  </p:clrMapOvr>
+  <p:timing>
+    <p:tnLst>
+      <p:par>
+        <p:cTn id="1" dur="indefinite" restart="never" nodeType="tmRoot">
+          <p:childTnLst>
+            <p:seq concurrent="1" nextAc="seek">
+              <p:cTn id="2" dur="indefinite" nodeType="mainSeq">
+                <p:childTnLst>
+                  <p:par>
+                    <p:cTn id="3" fill="hold">
+                      <p:stCondLst>
+                        <p:cond delay="indefinite"/>
+                      </p:stCondLst>
+                      <p:childTnLst>
+                        <p:par>
+                          <p:cTn id="4" fill="hold">
+                            <p:stCondLst>
+                              <p:cond delay="0"/>
+                            </p:stCondLst>
+                            <p:childTnLst>
+                              <p:par>
+                                <p:cTn id="5" presetID="1" presetClass="entr" presetSubtype="0" fill="hold" grpId="0" nodeType="clickEffect">
+                                  <p:stCondLst>
+                                    <p:cond delay="0"/>
+                                  </p:stCondLst>
+                                  <p:childTnLst>
+                                    <p:set>
+                                      <p:cBhvr>
+                                        <p:cTn id="6" dur="1" fill="hold">
+                                          <p:stCondLst>
+                                            <p:cond delay="0"/>
+                                          </p:stCondLst>
+                                        </p:cTn>
+                                        <p:tgtEl>
+                                          <p:spTgt spid="3">
+                                            <p:txEl>
+                                              <p:pRg st="0" end="0"/>
+                                            </p:txEl>
+                                          </p:spTgt>
+                                        </p:tgtEl>
+                                        <p:attrNameLst>
+                                          <p:attrName>style.visibility</p:attrName>
+                                        </p:attrNameLst>
+                                      </p:cBhvr>
+                                      <p:to>
+                                        <p:strVal val="visible"/>
+                                      </p:to>
+                                    </p:set>
+                                  </p:childTnLst>
+                                </p:cTn>
+                              </p:par>
+                            </p:childTnLst>
+                          </p:cTn>
+                        </p:par>
+                      </p:childTnLst>
+                    </p:cTn>
+                  </p:par>
+                  <p:par>
+                    <p:cTn id="7" fill="hold">
+                      <p:stCondLst>
+                        <p:cond delay="indefinite"/>
+                      </p:stCondLst>
+                      <p:childTnLst>
+                        <p:par>
+                          <p:cTn id="8" fill="hold">
+                            <p:stCondLst>
+                              <p:cond delay="0"/>
+                            </p:stCondLst>
+                            <p:childTnLst>
+                              <p:par>
+                                <p:cTn id="9" presetID="1" presetClass="entr" presetSubtype="0" fill="hold" grpId="0" nodeType="clickEffect">
+                                  <p:stCondLst>
+                                    <p:cond delay="0"/>
+                                  </p:stCondLst>
+                                  <p:childTnLst>
+                                    <p:set>
+                                      <p:cBhvr>
+                                        <p:cTn id="10" dur="1" fill="hold">
+                                          <p:stCondLst>
+                                            <p:cond delay="0"/>
+                                          </p:stCondLst>
+                                        </p:cTn>
+                                        <p:tgtEl>
+                                          <p:spTgt spid="3">
+                                            <p:txEl>
+                                              <p:pRg st="1" end="1"/>
+                                            </p:txEl>
+                                          </p:spTgt>
+                                        </p:tgtEl>
+                                        <p:attrNameLst>
+                                          <p:attrName>style.visibility</p:attrName>
+                                        </p:attrNameLst>
+                                      </p:cBhvr>
+                                      <p:to>
+                                        <p:strVal val="visible"/>
+                                      </p:to>
+                                    </p:set>
+                                  </p:childTnLst>
+                                </p:cTn>
+                              </p:par>
+                              <p:par>
+                                <p:cTn id="11" presetID="1" presetClass="entr" presetSubtype="0" fill="hold" grpId="0" nodeType="withEffect">
+                                  <p:stCondLst>
+                                    <p:cond delay="0"/>
+                                  </p:stCondLst>
+                                  <p:childTnLst>
+                                    <p:set>
+                                      <p:cBhvr>
+                                        <p:cTn id="12" dur="1" fill="hold">
+                                          <p:stCondLst>
+                                            <p:cond delay="0"/>
+                                          </p:stCondLst>
+                                        </p:cTn>
+                                        <p:tgtEl>
+                                          <p:spTgt spid="3">
+                                            <p:txEl>
+                                              <p:pRg st="2" end="2"/>
+                                            </p:txEl>
+                                          </p:spTgt>
+                                        </p:tgtEl>
+                                        <p:attrNameLst>
+                                          <p:attrName>style.visibility</p:attrName>
+                                        </p:attrNameLst>
+                                      </p:cBhvr>
+                                      <p:to>
+                                        <p:strVal val="visible"/>
+                                      </p:to>
+                                    </p:set>
+                                  </p:childTnLst>
+                                </p:cTn>
+                              </p:par>
+                            </p:childTnLst>
+                          </p:cTn>
+                        </p:par>
+                      </p:childTnLst>
+                    </p:cTn>
+                  </p:par>
+                  <p:par>
+                    <p:cTn id="13" fill="hold">
+                      <p:stCondLst>
+                        <p:cond delay="indefinite"/>
+                      </p:stCondLst>
+                      <p:childTnLst>
+                        <p:par>
+                          <p:cTn id="14" fill="hold">
+                            <p:stCondLst>
+                              <p:cond delay="0"/>
+                            </p:stCondLst>
+                            <p:childTnLst>
+                              <p:par>
+                                <p:cTn id="15" presetID="1" presetClass="entr" presetSubtype="0" fill="hold" grpId="0" nodeType="clickEffect">
+                                  <p:stCondLst>
+                                    <p:cond delay="0"/>
+                                  </p:stCondLst>
+                                  <p:childTnLst>
+                                    <p:set>
+                                      <p:cBhvr>
+                                        <p:cTn id="16" dur="1" fill="hold">
+                                          <p:stCondLst>
+                                            <p:cond delay="0"/>
+                                          </p:stCondLst>
+                                        </p:cTn>
+                                        <p:tgtEl>
+                                          <p:spTgt spid="3">
+                                            <p:txEl>
+                                              <p:pRg st="3" end="3"/>
+                                            </p:txEl>
+                                          </p:spTgt>
+                                        </p:tgtEl>
+                                        <p:attrNameLst>
+                                          <p:attrName>style.visibility</p:attrName>
+                                        </p:attrNameLst>
+                                      </p:cBhvr>
+                                      <p:to>
+                                        <p:strVal val="visible"/>
+                                      </p:to>
+                                    </p:set>
+                                  </p:childTnLst>
+                                </p:cTn>
+                              </p:par>
+                            </p:childTnLst>
+                          </p:cTn>
+                        </p:par>
+                      </p:childTnLst>
+                    </p:cTn>
+                  </p:par>
+                </p:childTnLst>
+              </p:cTn>
+              <p:prevCondLst>
+                <p:cond evt="onPrev" delay="0">
+                  <p:tgtEl>
+                    <p:sldTgt/>
+                  </p:tgtEl>
+                </p:cond>
+              </p:prevCondLst>
+              <p:nextCondLst>
+                <p:cond evt="onNext" delay="0">
+                  <p:tgtEl>
+                    <p:sldTgt/>
+                  </p:tgtEl>
+                </p:cond>
+              </p:nextCondLst>
+            </p:seq>
+          </p:childTnLst>
+        </p:cTn>
+      </p:par>
+    </p:tnLst>
+    <p:bldLst>
+      <p:bldP spid="3" grpId="0" build="p"/>
+    </p:bldLst>
+  </p:timing>
+</p:sld>
+</file>
+
+<file path=ppt/slides/slide3.xml><?xml version="1.0" encoding="utf-8"?>
+<p:sld xmlns:a="http://schemas.openxmlformats.org/drawingml/2006/main" xmlns:r="http://schemas.openxmlformats.org/officeDocument/2006/relationships" xmlns:p="http://schemas.openxmlformats.org/presentationml/2006/main">
+  <p:cSld>
+    <p:spTree>
+      <p:nvGrpSpPr>
+        <p:cNvPr id="1" name=""/>
+        <p:cNvGrpSpPr/>
+        <p:nvPr/>
+      </p:nvGrpSpPr>
+      <p:grpSpPr>
+        <a:xfrm>
+          <a:off x="0" y="0"/>
+          <a:ext cx="0" cy="0"/>
+          <a:chOff x="0" y="0"/>
+          <a:chExt cx="0" cy="0"/>
+        </a:xfrm>
+      </p:grpSpPr>
+      <p:sp>
+        <p:nvSpPr>
+          <p:cNvPr id="2" name="Titel 1"/>
+          <p:cNvSpPr>
+            <a:spLocks noGrp="1"/>
+          </p:cNvSpPr>
+          <p:nvPr>
+            <p:ph type="title"/>
+          </p:nvPr>
+        </p:nvSpPr>
+        <p:spPr/>
+        <p:txBody>
+          <a:bodyPr/>
+          <a:lstStyle/>
+          <a:p>
+            <a:r>
+              <a:rPr lang="de-CH" dirty="0" err="1" smtClean="0"/>
+              <a:t>idee</a:t>
+            </a:r>
+            <a:endParaRPr lang="de-CH" dirty="0"/>
+          </a:p>
+        </p:txBody>
+      </p:sp>
+      <p:sp>
+        <p:nvSpPr>
+          <p:cNvPr id="3" name="Inhaltsplatzhalter 2"/>
+          <p:cNvSpPr>
+            <a:spLocks noGrp="1"/>
+          </p:cNvSpPr>
+          <p:nvPr>
+            <p:ph sz="quarter" idx="13"/>
+          </p:nvPr>
+        </p:nvSpPr>
+        <p:spPr/>
+        <p:txBody>
+          <a:bodyPr/>
+          <a:lstStyle/>
+          <a:p>
+            <a:r>
+              <a:rPr lang="de-CH" dirty="0" smtClean="0"/>
+              <a:t>Puzzle Lösen mit </a:t>
+            </a:r>
+            <a:r>
+              <a:rPr lang="de-CH" dirty="0" err="1" smtClean="0"/>
+              <a:t>Bilverarbeitung</a:t>
+            </a:r>
+            <a:endParaRPr lang="de-CH" dirty="0" smtClean="0"/>
+          </a:p>
+          <a:p>
+            <a:r>
+              <a:rPr lang="de-CH" dirty="0" smtClean="0"/>
+              <a:t>Bilder einlesen</a:t>
+            </a:r>
+          </a:p>
+          <a:p>
+            <a:r>
+              <a:rPr lang="de-CH" dirty="0" smtClean="0"/>
+              <a:t>Seite anwählen </a:t>
+            </a:r>
+            <a:r>
+              <a:rPr lang="de-CH" dirty="0" smtClean="0">
+                <a:sym typeface="Wingdings" pitchFamily="2" charset="2"/>
+              </a:rPr>
+              <a:t> Passendes Teilchen anzeigen</a:t>
+            </a:r>
+            <a:endParaRPr lang="de-CH" dirty="0" smtClean="0"/>
+          </a:p>
+          <a:p>
+            <a:endParaRPr lang="de-CH" dirty="0"/>
+          </a:p>
+        </p:txBody>
+      </p:sp>
+    </p:spTree>
+    <p:extLst>
+      <p:ext uri="{BB962C8B-B14F-4D97-AF65-F5344CB8AC3E}">
+        <p14:creationId xmlns="" xmlns:p14="http://schemas.microsoft.com/office/powerpoint/2010/main" val="1599884037"/>
+      </p:ext>
+    </p:extLst>
+  </p:cSld>
+  <p:clrMapOvr>
+    <a:masterClrMapping/>
+  </p:clrMapOvr>
+  <p:timing>
+    <p:tnLst>
+      <p:par>
+        <p:cTn id="1" dur="indefinite" restart="never" nodeType="tmRoot">
+          <p:childTnLst>
+            <p:seq concurrent="1" nextAc="seek">
+              <p:cTn id="2" dur="indefinite" nodeType="mainSeq">
+                <p:childTnLst>
+                  <p:par>
+                    <p:cTn id="3" fill="hold">
+                      <p:stCondLst>
+                        <p:cond delay="indefinite"/>
+                      </p:stCondLst>
+                      <p:childTnLst>
+                        <p:par>
+                          <p:cTn id="4" fill="hold">
+                            <p:stCondLst>
+                              <p:cond delay="0"/>
+                            </p:stCondLst>
+                            <p:childTnLst>
+                              <p:par>
+                                <p:cTn id="5" presetID="1" presetClass="entr" presetSubtype="0" fill="hold" grpId="0" nodeType="clickEffect">
+                                  <p:stCondLst>
+                                    <p:cond delay="0"/>
+                                  </p:stCondLst>
+                                  <p:childTnLst>
+                                    <p:set>
+                                      <p:cBhvr>
+                                        <p:cTn id="6" dur="1" fill="hold">
+                                          <p:stCondLst>
+                                            <p:cond delay="0"/>
+                                          </p:stCondLst>
+                                        </p:cTn>
+                                        <p:tgtEl>
+                                          <p:spTgt spid="3">
+                                            <p:txEl>
+                                              <p:pRg st="0" end="0"/>
+                                            </p:txEl>
+                                          </p:spTgt>
+                                        </p:tgtEl>
+                                        <p:attrNameLst>
+                                          <p:attrName>style.visibility</p:attrName>
+                                        </p:attrNameLst>
+                                      </p:cBhvr>
+                                      <p:to>
+                                        <p:strVal val="visible"/>
+                                      </p:to>
+                                    </p:set>
+                                  </p:childTnLst>
+                                </p:cTn>
+                              </p:par>
+                            </p:childTnLst>
+                          </p:cTn>
+                        </p:par>
+                      </p:childTnLst>
+                    </p:cTn>
+                  </p:par>
+                  <p:par>
+                    <p:cTn id="7" fill="hold">
+                      <p:stCondLst>
+                        <p:cond delay="indefinite"/>
+                      </p:stCondLst>
+                      <p:childTnLst>
+                        <p:par>
+                          <p:cTn id="8" fill="hold">
+                            <p:stCondLst>
+                              <p:cond delay="0"/>
+                            </p:stCondLst>
+                            <p:childTnLst>
+                              <p:par>
+                                <p:cTn id="9" presetID="1" presetClass="entr" presetSubtype="0" fill="hold" grpId="0" nodeType="clickEffect">
+                                  <p:stCondLst>
+                                    <p:cond delay="0"/>
+                                  </p:stCondLst>
+                                  <p:childTnLst>
+                                    <p:set>
+                                      <p:cBhvr>
+                                        <p:cTn id="10" dur="1" fill="hold">
+                                          <p:stCondLst>
+                                            <p:cond delay="0"/>
+                                          </p:stCondLst>
+                                        </p:cTn>
+                                        <p:tgtEl>
+                                          <p:spTgt spid="3">
+                                            <p:txEl>
+                                              <p:pRg st="1" end="1"/>
+                                            </p:txEl>
+                                          </p:spTgt>
+                                        </p:tgtEl>
+                                        <p:attrNameLst>
+                                          <p:attrName>style.visibility</p:attrName>
+                                        </p:attrNameLst>
+                                      </p:cBhvr>
+                                      <p:to>
+                                        <p:strVal val="visible"/>
+                                      </p:to>
+                                    </p:set>
+                                  </p:childTnLst>
+                                </p:cTn>
+                              </p:par>
+                            </p:childTnLst>
+                          </p:cTn>
+                        </p:par>
+                      </p:childTnLst>
+                    </p:cTn>
+                  </p:par>
+                  <p:par>
+                    <p:cTn id="11" fill="hold">
+                      <p:stCondLst>
+                        <p:cond delay="indefinite"/>
+                      </p:stCondLst>
+                      <p:childTnLst>
+                        <p:par>
+                          <p:cTn id="12" fill="hold">
+                            <p:stCondLst>
+                              <p:cond delay="0"/>
+                            </p:stCondLst>
+                            <p:childTnLst>
+                              <p:par>
+                                <p:cTn id="13" presetID="1" presetClass="entr" presetSubtype="0" fill="hold" grpId="0" nodeType="clickEffect">
+                                  <p:stCondLst>
+                                    <p:cond delay="0"/>
+                                  </p:stCondLst>
+                                  <p:childTnLst>
+                                    <p:set>
+                                      <p:cBhvr>
+                                        <p:cTn id="14" dur="1" fill="hold">
+                                          <p:stCondLst>
+                                            <p:cond delay="0"/>
+                                          </p:stCondLst>
+                                        </p:cTn>
+                                        <p:tgtEl>
+                                          <p:spTgt spid="3">
+                                            <p:txEl>
+                                              <p:pRg st="2" end="2"/>
+                                            </p:txEl>
+                                          </p:spTgt>
+                                        </p:tgtEl>
+                                        <p:attrNameLst>
+                                          <p:attrName>style.visibility</p:attrName>
+                                        </p:attrNameLst>
+                                      </p:cBhvr>
+                                      <p:to>
+                                        <p:strVal val="visible"/>
+                                      </p:to>
+                                    </p:set>
+                                  </p:childTnLst>
+                                </p:cTn>
+                              </p:par>
+                            </p:childTnLst>
+                          </p:cTn>
+                        </p:par>
+                      </p:childTnLst>
+                    </p:cTn>
+                  </p:par>
+                </p:childTnLst>
+              </p:cTn>
+              <p:prevCondLst>
+                <p:cond evt="onPrev" delay="0">
+                  <p:tgtEl>
+                    <p:sldTgt/>
+                  </p:tgtEl>
+                </p:cond>
+              </p:prevCondLst>
+              <p:nextCondLst>
+                <p:cond evt="onNext" delay="0">
+                  <p:tgtEl>
+                    <p:sldTgt/>
+                  </p:tgtEl>
+                </p:cond>
+              </p:nextCondLst>
+            </p:seq>
+          </p:childTnLst>
+        </p:cTn>
+      </p:par>
+    </p:tnLst>
+    <p:bldLst>
+      <p:bldP spid="3" grpId="0" build="p"/>
+    </p:bldLst>
+  </p:timing>
+</p:sld>
+</file>
+
+<file path=ppt/slides/slide4.xml><?xml version="1.0" encoding="utf-8"?>
+<p:sld xmlns:a="http://schemas.openxmlformats.org/drawingml/2006/main" xmlns:r="http://schemas.openxmlformats.org/officeDocument/2006/relationships" xmlns:p="http://schemas.openxmlformats.org/presentationml/2006/main">
+  <p:cSld>
+    <p:spTree>
+      <p:nvGrpSpPr>
+        <p:cNvPr id="1" name=""/>
+        <p:cNvGrpSpPr/>
+        <p:nvPr/>
+      </p:nvGrpSpPr>
+      <p:grpSpPr>
+        <a:xfrm>
+          <a:off x="0" y="0"/>
+          <a:ext cx="0" cy="0"/>
+          <a:chOff x="0" y="0"/>
+          <a:chExt cx="0" cy="0"/>
+        </a:xfrm>
+      </p:grpSpPr>
+      <p:sp>
+        <p:nvSpPr>
+          <p:cNvPr id="2" name="Titel 1"/>
+          <p:cNvSpPr>
+            <a:spLocks noGrp="1"/>
+          </p:cNvSpPr>
+          <p:nvPr>
+            <p:ph type="title"/>
+          </p:nvPr>
+        </p:nvSpPr>
+        <p:spPr/>
+        <p:txBody>
+          <a:bodyPr/>
+          <a:lstStyle/>
+          <a:p>
+            <a:r>
+              <a:rPr lang="de-CH" dirty="0" smtClean="0"/>
+              <a:t>Planung</a:t>
+            </a:r>
+            <a:endParaRPr lang="de-CH" dirty="0"/>
+          </a:p>
+        </p:txBody>
+      </p:sp>
+      <p:sp>
+        <p:nvSpPr>
+          <p:cNvPr id="3" name="Inhaltsplatzhalter 2"/>
+          <p:cNvSpPr>
+            <a:spLocks noGrp="1"/>
+          </p:cNvSpPr>
+          <p:nvPr>
+            <p:ph sz="quarter" idx="13"/>
+          </p:nvPr>
+        </p:nvSpPr>
+        <p:spPr/>
+        <p:txBody>
+          <a:bodyPr/>
+          <a:lstStyle/>
+          <a:p>
+            <a:r>
+              <a:rPr lang="de-CH" dirty="0" smtClean="0"/>
+              <a:t>Pflichtenheft </a:t>
+            </a:r>
+            <a:r>
+              <a:rPr lang="de-CH" dirty="0" smtClean="0"/>
+              <a:t>definiert</a:t>
+            </a:r>
+          </a:p>
+          <a:p>
+            <a:r>
+              <a:rPr lang="de-CH" dirty="0" smtClean="0"/>
+              <a:t>Erste Zeilen in </a:t>
+            </a:r>
+            <a:r>
+              <a:rPr lang="de-CH" dirty="0" err="1" smtClean="0"/>
+              <a:t>OpenCV</a:t>
+            </a:r>
+            <a:r>
+              <a:rPr lang="de-CH" dirty="0" smtClean="0"/>
+              <a:t> gemeinsam geschrieben</a:t>
+            </a:r>
+            <a:endParaRPr lang="de-CH" dirty="0" smtClean="0"/>
+          </a:p>
+          <a:p>
+            <a:r>
+              <a:rPr lang="de-CH" dirty="0" smtClean="0"/>
+              <a:t>Arbeitsaufteilung</a:t>
+            </a:r>
+          </a:p>
+          <a:p>
+            <a:r>
+              <a:rPr lang="de-CH" b="1" dirty="0" err="1" smtClean="0"/>
+              <a:t>Git</a:t>
+            </a:r>
+            <a:r>
+              <a:rPr lang="de-CH" dirty="0" smtClean="0"/>
+              <a:t> Version </a:t>
+            </a:r>
+            <a:r>
+              <a:rPr lang="de-CH" dirty="0" err="1" smtClean="0"/>
+              <a:t>Control</a:t>
+            </a:r>
+            <a:r>
+              <a:rPr lang="de-CH" dirty="0" smtClean="0"/>
+              <a:t> System</a:t>
+            </a:r>
+            <a:endParaRPr lang="de-CH" dirty="0" smtClean="0"/>
+          </a:p>
+          <a:p>
+            <a:endParaRPr lang="de-CH" dirty="0"/>
+          </a:p>
+        </p:txBody>
+      </p:sp>
+    </p:spTree>
+    <p:extLst>
+      <p:ext uri="{BB962C8B-B14F-4D97-AF65-F5344CB8AC3E}">
+        <p14:creationId xmlns="" xmlns:p14="http://schemas.microsoft.com/office/powerpoint/2010/main" val="2756733679"/>
+      </p:ext>
+    </p:extLst>
+  </p:cSld>
+  <p:clrMapOvr>
+    <a:masterClrMapping/>
+  </p:clrMapOvr>
+  <p:timing>
+    <p:tnLst>
+      <p:par>
+        <p:cTn id="1" dur="indefinite" restart="never" nodeType="tmRoot">
+          <p:childTnLst>
+            <p:seq concurrent="1" nextAc="seek">
+              <p:cTn id="2" dur="indefinite" nodeType="mainSeq">
+                <p:childTnLst>
+                  <p:par>
+                    <p:cTn id="3" fill="hold">
+                      <p:stCondLst>
+                        <p:cond delay="indefinite"/>
+                      </p:stCondLst>
+                      <p:childTnLst>
+                        <p:par>
+                          <p:cTn id="4" fill="hold">
+                            <p:stCondLst>
+                              <p:cond delay="0"/>
+                            </p:stCondLst>
+                            <p:childTnLst>
+                              <p:par>
+                                <p:cTn id="5" presetID="1" presetClass="entr" presetSubtype="0" fill="hold" grpId="0" nodeType="clickEffect">
+                                  <p:stCondLst>
+                                    <p:cond delay="0"/>
+                                  </p:stCondLst>
+                                  <p:childTnLst>
+                                    <p:set>
+                                      <p:cBhvr>
+                                        <p:cTn id="6" dur="1" fill="hold">
+                                          <p:stCondLst>
+                                            <p:cond delay="0"/>
+                                          </p:stCondLst>
+                                        </p:cTn>
+                                        <p:tgtEl>
+                                          <p:spTgt spid="3">
+                                            <p:txEl>
+                                              <p:pRg st="0" end="0"/>
+                                            </p:txEl>
+                                          </p:spTgt>
+                                        </p:tgtEl>
+                                        <p:attrNameLst>
+                                          <p:attrName>style.visibility</p:attrName>
+                                        </p:attrNameLst>
+                                      </p:cBhvr>
+                                      <p:to>
+                                        <p:strVal val="visible"/>
+                                      </p:to>
+                                    </p:set>
+                                  </p:childTnLst>
+                                </p:cTn>
+                              </p:par>
+                            </p:childTnLst>
+                          </p:cTn>
+                        </p:par>
+                      </p:childTnLst>
+                    </p:cTn>
+                  </p:par>
+                  <p:par>
+                    <p:cTn id="7" fill="hold">
+                      <p:stCondLst>
+                        <p:cond delay="indefinite"/>
+                      </p:stCondLst>
+                      <p:childTnLst>
+                        <p:par>
+                          <p:cTn id="8" fill="hold">
+                            <p:stCondLst>
+                              <p:cond delay="0"/>
+                            </p:stCondLst>
+                            <p:childTnLst>
+                              <p:par>
+                                <p:cTn id="9" presetID="1" presetClass="entr" presetSubtype="0" fill="hold" grpId="0" nodeType="clickEffect">
+                                  <p:stCondLst>
+                                    <p:cond delay="0"/>
+                                  </p:stCondLst>
+                                  <p:childTnLst>
+                                    <p:set>
+                                      <p:cBhvr>
+                                        <p:cTn id="10" dur="1" fill="hold">
+                                          <p:stCondLst>
+                                            <p:cond delay="0"/>
+                                          </p:stCondLst>
+                                        </p:cTn>
+                                        <p:tgtEl>
+                                          <p:spTgt spid="3">
+                                            <p:txEl>
+                                              <p:pRg st="1" end="1"/>
+                                            </p:txEl>
+                                          </p:spTgt>
+                                        </p:tgtEl>
+                                        <p:attrNameLst>
+                                          <p:attrName>style.visibility</p:attrName>
+                                        </p:attrNameLst>
+                                      </p:cBhvr>
+                                      <p:to>
+                                        <p:strVal val="visible"/>
+                                      </p:to>
+                                    </p:set>
+                                  </p:childTnLst>
+                                </p:cTn>
+                              </p:par>
+                            </p:childTnLst>
+                          </p:cTn>
+                        </p:par>
+                      </p:childTnLst>
+                    </p:cTn>
+                  </p:par>
+                  <p:par>
+                    <p:cTn id="11" fill="hold">
+                      <p:stCondLst>
+                        <p:cond delay="indefinite"/>
+                      </p:stCondLst>
+                      <p:childTnLst>
+                        <p:par>
+                          <p:cTn id="12" fill="hold">
+                            <p:stCondLst>
+                              <p:cond delay="0"/>
+                            </p:stCondLst>
+                            <p:childTnLst>
+                              <p:par>
+                                <p:cTn id="13" presetID="1" presetClass="entr" presetSubtype="0" fill="hold" grpId="0" nodeType="clickEffect">
+                                  <p:stCondLst>
+                                    <p:cond delay="0"/>
+                                  </p:stCondLst>
+                                  <p:childTnLst>
+                                    <p:set>
+                                      <p:cBhvr>
+                                        <p:cTn id="14" dur="1" fill="hold">
+                                          <p:stCondLst>
+                                            <p:cond delay="0"/>
+                                          </p:stCondLst>
+                                        </p:cTn>
+                                        <p:tgtEl>
+                                          <p:spTgt spid="3">
+                                            <p:txEl>
+                                              <p:pRg st="2" end="2"/>
+                                            </p:txEl>
+                                          </p:spTgt>
+                                        </p:tgtEl>
+                                        <p:attrNameLst>
+                                          <p:attrName>style.visibility</p:attrName>
+                                        </p:attrNameLst>
+                                      </p:cBhvr>
+                                      <p:to>
+                                        <p:strVal val="visible"/>
+                                      </p:to>
+                                    </p:set>
+                                  </p:childTnLst>
+                                </p:cTn>
+                              </p:par>
+                            </p:childTnLst>
+                          </p:cTn>
+                        </p:par>
+                      </p:childTnLst>
+                    </p:cTn>
+                  </p:par>
+                  <p:par>
+                    <p:cTn id="15" fill="hold">
+                      <p:stCondLst>
+                        <p:cond delay="indefinite"/>
+                      </p:stCondLst>
+                      <p:childTnLst>
+                        <p:par>
+                          <p:cTn id="16" fill="hold">
+                            <p:stCondLst>
+                              <p:cond delay="0"/>
+                            </p:stCondLst>
+                            <p:childTnLst>
+                              <p:par>
+                                <p:cTn id="17" presetID="1" presetClass="entr" presetSubtype="0" fill="hold" grpId="0" nodeType="clickEffect">
+                                  <p:stCondLst>
+                                    <p:cond delay="0"/>
+                                  </p:stCondLst>
+                                  <p:childTnLst>
+                                    <p:set>
+                                      <p:cBhvr>
+                                        <p:cTn id="18" dur="1" fill="hold">
+                                          <p:stCondLst>
+                                            <p:cond delay="0"/>
+                                          </p:stCondLst>
+                                        </p:cTn>
+                                        <p:tgtEl>
+                                          <p:spTgt spid="3">
+                                            <p:txEl>
+                                              <p:pRg st="3" end="3"/>
+                                            </p:txEl>
+                                          </p:spTgt>
+                                        </p:tgtEl>
+                                        <p:attrNameLst>
+                                          <p:attrName>style.visibility</p:attrName>
+                                        </p:attrNameLst>
+                                      </p:cBhvr>
+                                      <p:to>
+                                        <p:strVal val="visible"/>
+                                      </p:to>
+                                    </p:set>
+                                  </p:childTnLst>
+                                </p:cTn>
+                              </p:par>
+                            </p:childTnLst>
+                          </p:cTn>
+                        </p:par>
+                      </p:childTnLst>
+                    </p:cTn>
+                  </p:par>
+                </p:childTnLst>
+              </p:cTn>
+              <p:prevCondLst>
+                <p:cond evt="onPrev" delay="0">
+                  <p:tgtEl>
+                    <p:sldTgt/>
+                  </p:tgtEl>
+                </p:cond>
+              </p:prevCondLst>
+              <p:nextCondLst>
+                <p:cond evt="onNext" delay="0">
+                  <p:tgtEl>
+                    <p:sldTgt/>
+                  </p:tgtEl>
+                </p:cond>
+              </p:nextCondLst>
+            </p:seq>
+          </p:childTnLst>
+        </p:cTn>
+      </p:par>
+    </p:tnLst>
+    <p:bldLst>
+      <p:bldP spid="3" grpId="0" uiExpand="1" build="p"/>
+    </p:bldLst>
+  </p:timing>
+</p:sld>
+</file>
+
+<file path=ppt/slides/slide5.xml><?xml version="1.0" encoding="utf-8"?>
+<p:sld xmlns:a="http://schemas.openxmlformats.org/drawingml/2006/main" xmlns:r="http://schemas.openxmlformats.org/officeDocument/2006/relationships" xmlns:p="http://schemas.openxmlformats.org/presentationml/2006/main">
+  <p:cSld>
+    <p:spTree>
+      <p:nvGrpSpPr>
+        <p:cNvPr id="1" name=""/>
+        <p:cNvGrpSpPr/>
+        <p:nvPr/>
+      </p:nvGrpSpPr>
+      <p:grpSpPr>
+        <a:xfrm>
+          <a:off x="0" y="0"/>
+          <a:ext cx="0" cy="0"/>
+          <a:chOff x="0" y="0"/>
+          <a:chExt cx="0" cy="0"/>
+        </a:xfrm>
+      </p:grpSpPr>
+      <p:sp>
+        <p:nvSpPr>
+          <p:cNvPr id="2" name="Titel 1"/>
+          <p:cNvSpPr>
+            <a:spLocks noGrp="1"/>
+          </p:cNvSpPr>
+          <p:nvPr>
+            <p:ph type="title"/>
+          </p:nvPr>
+        </p:nvSpPr>
+        <p:spPr/>
+        <p:txBody>
+          <a:bodyPr/>
+          <a:lstStyle/>
+          <a:p>
+            <a:r>
+              <a:rPr lang="de-CH" dirty="0" smtClean="0"/>
+              <a:t>Planung</a:t>
+            </a:r>
+            <a:endParaRPr lang="de-CH" dirty="0"/>
+          </a:p>
+        </p:txBody>
+      </p:sp>
+      <p:sp>
+        <p:nvSpPr>
+          <p:cNvPr id="3" name="Inhaltsplatzhalter 2"/>
+          <p:cNvSpPr>
+            <a:spLocks noGrp="1"/>
+          </p:cNvSpPr>
+          <p:nvPr>
+            <p:ph sz="quarter" idx="13"/>
+          </p:nvPr>
+        </p:nvSpPr>
+        <p:spPr/>
+        <p:txBody>
+          <a:bodyPr/>
+          <a:lstStyle/>
+          <a:p>
+            <a:r>
+              <a:rPr lang="de-CH" dirty="0" smtClean="0"/>
+              <a:t>Pflichtenheft definiert</a:t>
+            </a:r>
+          </a:p>
+        </p:txBody>
+      </p:sp>
+      <p:pic>
+        <p:nvPicPr>
+          <p:cNvPr id="1026" name="Picture 2" descr="D:\Programming\C\Puzzle\Doku\puzzle_analyse.jpg"/>
+          <p:cNvPicPr>
+            <a:picLocks noChangeAspect="1" noChangeArrowheads="1"/>
+          </p:cNvPicPr>
+          <p:nvPr/>
+        </p:nvPicPr>
+        <p:blipFill>
+          <a:blip r:embed="rId2" cstate="screen"/>
+          <a:srcRect/>
+          <a:stretch>
+            <a:fillRect/>
+          </a:stretch>
+        </p:blipFill>
+        <p:spPr bwMode="auto">
+          <a:xfrm>
+            <a:off x="2051720" y="2132856"/>
+            <a:ext cx="5262123" cy="4320480"/>
+          </a:xfrm>
+          <a:prstGeom prst="rect">
+            <a:avLst/>
+          </a:prstGeom>
+          <a:noFill/>
+        </p:spPr>
+      </p:pic>
+    </p:spTree>
+    <p:extLst>
+      <p:ext uri="{BB962C8B-B14F-4D97-AF65-F5344CB8AC3E}">
+        <p14:creationId xmlns="" xmlns:p14="http://schemas.microsoft.com/office/powerpoint/2010/main" val="2756733679"/>
+      </p:ext>
+    </p:extLst>
+  </p:cSld>
+  <p:clrMapOvr>
+    <a:masterClrMapping/>
+  </p:clrMapOvr>
+  <p:timing>
+    <p:tnLst>
+      <p:par>
+        <p:cTn id="1" dur="indefinite" restart="never" nodeType="tmRoot">
+          <p:childTnLst>
+            <p:seq concurrent="1" nextAc="seek">
+              <p:cTn id="2" dur="indefinite" nodeType="mainSeq">
+                <p:childTnLst>
+                  <p:par>
+                    <p:cTn id="3" fill="hold">
+                      <p:stCondLst>
+                        <p:cond delay="indefinite"/>
+                      </p:stCondLst>
+                      <p:childTnLst>
+                        <p:par>
+                          <p:cTn id="4" fill="hold">
+                            <p:stCondLst>
+                              <p:cond delay="0"/>
+                            </p:stCondLst>
+                            <p:childTnLst>
+                              <p:par>
+                                <p:cTn id="5" presetID="1" presetClass="entr" presetSubtype="0" fill="hold" grpId="0" nodeType="clickEffect">
+                                  <p:stCondLst>
+                                    <p:cond delay="0"/>
+                                  </p:stCondLst>
+                                  <p:childTnLst>
+                                    <p:set>
+                                      <p:cBhvr>
+                                        <p:cTn id="6" dur="1" fill="hold">
+                                          <p:stCondLst>
+                                            <p:cond delay="0"/>
+                                          </p:stCondLst>
+                                        </p:cTn>
+                                        <p:tgtEl>
+                                          <p:spTgt spid="3">
+                                            <p:txEl>
+                                              <p:pRg st="0" end="0"/>
+                                            </p:txEl>
+                                          </p:spTgt>
+                                        </p:tgtEl>
+                                        <p:attrNameLst>
+                                          <p:attrName>style.visibility</p:attrName>
+                                        </p:attrNameLst>
+                                      </p:cBhvr>
+                                      <p:to>
+                                        <p:strVal val="visible"/>
+                                      </p:to>
+                                    </p:set>
+                                  </p:childTnLst>
+                                </p:cTn>
+                              </p:par>
+                            </p:childTnLst>
+                          </p:cTn>
+                        </p:par>
+                      </p:childTnLst>
+                    </p:cTn>
+                  </p:par>
+                </p:childTnLst>
+              </p:cTn>
+              <p:prevCondLst>
+                <p:cond evt="onPrev" delay="0">
+                  <p:tgtEl>
+                    <p:sldTgt/>
+                  </p:tgtEl>
+                </p:cond>
+              </p:prevCondLst>
+              <p:nextCondLst>
+                <p:cond evt="onNext" delay="0">
+                  <p:tgtEl>
+                    <p:sldTgt/>
+                  </p:tgtEl>
+                </p:cond>
+              </p:nextCondLst>
+            </p:seq>
+          </p:childTnLst>
+        </p:cTn>
+      </p:par>
+    </p:tnLst>
+    <p:bldLst>
+      <p:bldP spid="3" grpId="0" build="p"/>
+    </p:bldLst>
+  </p:timing>
+</p:sld>
+</file>
+
+<file path=ppt/slides/slide6.xml><?xml version="1.0" encoding="utf-8"?>
+<p:sld xmlns:a="http://schemas.openxmlformats.org/drawingml/2006/main" xmlns:r="http://schemas.openxmlformats.org/officeDocument/2006/relationships" xmlns:p="http://schemas.openxmlformats.org/presentationml/2006/main">
+  <p:cSld>
+    <p:spTree>
+      <p:nvGrpSpPr>
+        <p:cNvPr id="1" name=""/>
+        <p:cNvGrpSpPr/>
+        <p:nvPr/>
+      </p:nvGrpSpPr>
+      <p:grpSpPr>
+        <a:xfrm>
+          <a:off x="0" y="0"/>
+          <a:ext cx="0" cy="0"/>
+          <a:chOff x="0" y="0"/>
+          <a:chExt cx="0" cy="0"/>
+        </a:xfrm>
+      </p:grpSpPr>
+      <p:sp>
+        <p:nvSpPr>
+          <p:cNvPr id="2" name="Titel 1"/>
+          <p:cNvSpPr>
+            <a:spLocks noGrp="1"/>
+          </p:cNvSpPr>
+          <p:nvPr>
+            <p:ph type="title"/>
+          </p:nvPr>
+        </p:nvSpPr>
+        <p:spPr/>
+        <p:txBody>
+          <a:bodyPr/>
+          <a:lstStyle/>
+          <a:p>
+            <a:r>
+              <a:rPr lang="de-CH" dirty="0" smtClean="0"/>
+              <a:t>Planung</a:t>
+            </a:r>
+            <a:endParaRPr lang="de-CH" dirty="0"/>
+          </a:p>
+        </p:txBody>
+      </p:sp>
+      <p:sp>
+        <p:nvSpPr>
+          <p:cNvPr id="3" name="Inhaltsplatzhalter 2"/>
+          <p:cNvSpPr>
+            <a:spLocks noGrp="1"/>
+          </p:cNvSpPr>
+          <p:nvPr>
+            <p:ph sz="quarter" idx="13"/>
+          </p:nvPr>
+        </p:nvSpPr>
+        <p:spPr/>
+        <p:txBody>
+          <a:bodyPr/>
+          <a:lstStyle/>
+          <a:p>
+            <a:r>
+              <a:rPr lang="de-CH" dirty="0" smtClean="0"/>
+              <a:t>Pflichtenheft definiert</a:t>
+            </a:r>
+          </a:p>
+        </p:txBody>
+      </p:sp>
+      <p:pic>
+        <p:nvPicPr>
+          <p:cNvPr id="2051" name="Picture 3" descr="D:\Programming\C\Puzzle\Doku\puzzle_analyse.jpg"/>
+          <p:cNvPicPr>
+            <a:picLocks noChangeAspect="1" noChangeArrowheads="1"/>
+          </p:cNvPicPr>
+          <p:nvPr/>
+        </p:nvPicPr>
+        <p:blipFill>
+          <a:blip r:embed="rId2" cstate="screen"/>
+          <a:srcRect/>
+          <a:stretch>
+            <a:fillRect/>
+          </a:stretch>
+        </p:blipFill>
+        <p:spPr bwMode="auto">
+          <a:xfrm>
+            <a:off x="4644008" y="188639"/>
+            <a:ext cx="4304340" cy="6484461"/>
+          </a:xfrm>
+          <a:prstGeom prst="rect">
+            <a:avLst/>
+          </a:prstGeom>
+          <a:noFill/>
+        </p:spPr>
+      </p:pic>
+      <p:pic>
+        <p:nvPicPr>
+          <p:cNvPr id="2050" name="Picture 2" descr="D:\Programming\C\Puzzle\Doku\puzzle_analyse.jpg"/>
+          <p:cNvPicPr>
+            <a:picLocks noChangeAspect="1" noChangeArrowheads="1"/>
+          </p:cNvPicPr>
+          <p:nvPr/>
+        </p:nvPicPr>
+        <p:blipFill>
+          <a:blip r:embed="rId3" cstate="screen"/>
+          <a:srcRect/>
+          <a:stretch>
+            <a:fillRect/>
+          </a:stretch>
+        </p:blipFill>
+        <p:spPr bwMode="auto">
+          <a:xfrm>
+            <a:off x="179512" y="2204864"/>
+            <a:ext cx="4283968" cy="1196133"/>
+          </a:xfrm>
+          <a:prstGeom prst="rect">
+            <a:avLst/>
+          </a:prstGeom>
+          <a:noFill/>
+        </p:spPr>
+      </p:pic>
+      <p:pic>
+        <p:nvPicPr>
+          <p:cNvPr id="2052" name="Picture 4" descr="D:\Programming\C\Puzzle\Doku\puzzle_analyse.jpg"/>
+          <p:cNvPicPr>
+            <a:picLocks noChangeAspect="1" noChangeArrowheads="1"/>
+          </p:cNvPicPr>
+          <p:nvPr/>
+        </p:nvPicPr>
+        <p:blipFill>
+          <a:blip r:embed="rId4" cstate="screen"/>
+          <a:srcRect/>
+          <a:stretch>
+            <a:fillRect/>
+          </a:stretch>
+        </p:blipFill>
+        <p:spPr bwMode="auto">
+          <a:xfrm>
+            <a:off x="539552" y="4077072"/>
+            <a:ext cx="3347864" cy="1152128"/>
+          </a:xfrm>
+          <a:prstGeom prst="rect">
+            <a:avLst/>
+          </a:prstGeom>
+          <a:noFill/>
+        </p:spPr>
+      </p:pic>
+    </p:spTree>
+    <p:extLst>
+      <p:ext uri="{BB962C8B-B14F-4D97-AF65-F5344CB8AC3E}">
+        <p14:creationId xmlns="" xmlns:p14="http://schemas.microsoft.com/office/powerpoint/2010/main" val="2756733679"/>
+      </p:ext>
+    </p:extLst>
+  </p:cSld>
+  <p:clrMapOvr>
+    <a:masterClrMapping/>
+  </p:clrMapOvr>
+  <p:timing>
+    <p:tnLst>
+      <p:par>
+        <p:cTn id="1" dur="indefinite" restart="never" nodeType="tmRoot">
+          <p:childTnLst>
+            <p:seq concurrent="1" nextAc="seek">
+              <p:cTn id="2" dur="indefinite" nodeType="mainSeq">
+                <p:childTnLst>
+                  <p:par>
+                    <p:cTn id="3" fill="hold">
+                      <p:stCondLst>
+                        <p:cond delay="indefinite"/>
+                      </p:stCondLst>
+                      <p:childTnLst>
+                        <p:par>
+                          <p:cTn id="4" fill="hold">
+                            <p:stCondLst>
+                              <p:cond delay="0"/>
+                            </p:stCondLst>
+                            <p:childTnLst>
+                              <p:par>
+                                <p:cTn id="5" presetID="1" presetClass="entr" presetSubtype="0" fill="hold" grpId="0" nodeType="clickEffect">
+                                  <p:stCondLst>
+                                    <p:cond delay="0"/>
+                                  </p:stCondLst>
+                                  <p:childTnLst>
+                                    <p:set>
+                                      <p:cBhvr>
+                                        <p:cTn id="6" dur="1" fill="hold">
+                                          <p:stCondLst>
+                                            <p:cond delay="0"/>
+                                          </p:stCondLst>
+                                        </p:cTn>
+                                        <p:tgtEl>
+                                          <p:spTgt spid="3">
+                                            <p:txEl>
+                                              <p:pRg st="0" end="0"/>
+                                            </p:txEl>
+                                          </p:spTgt>
+                                        </p:tgtEl>
+                                        <p:attrNameLst>
+                                          <p:attrName>style.visibility</p:attrName>
+                                        </p:attrNameLst>
+                                      </p:cBhvr>
+                                      <p:to>
+                                        <p:strVal val="visible"/>
+                                      </p:to>
+                                    </p:set>
+                                  </p:childTnLst>
+                                </p:cTn>
+                              </p:par>
+                            </p:childTnLst>
+                          </p:cTn>
+                        </p:par>
+                      </p:childTnLst>
+                    </p:cTn>
+                  </p:par>
+                </p:childTnLst>
+              </p:cTn>
+              <p:prevCondLst>
+                <p:cond evt="onPrev" delay="0">
+                  <p:tgtEl>
+                    <p:sldTgt/>
+                  </p:tgtEl>
+                </p:cond>
+              </p:prevCondLst>
+              <p:nextCondLst>
+                <p:cond evt="onNext" delay="0">
+                  <p:tgtEl>
+                    <p:sldTgt/>
+                  </p:tgtEl>
+                </p:cond>
+              </p:nextCondLst>
+            </p:seq>
+          </p:childTnLst>
+        </p:cTn>
+      </p:par>
+    </p:tnLst>
+    <p:bldLst>
+      <p:bldP spid="3" grpId="0" build="p"/>
+    </p:bldLst>
+  </p:timing>
+</p:sld>
+</file>
+
+<file path=ppt/slides/slide7.xml><?xml version="1.0" encoding="utf-8"?>
+<p:sld xmlns:a="http://schemas.openxmlformats.org/drawingml/2006/main" xmlns:r="http://schemas.openxmlformats.org/officeDocument/2006/relationships" xmlns:p="http://schemas.openxmlformats.org/presentationml/2006/main">
+  <p:cSld>
+    <p:spTree>
+      <p:nvGrpSpPr>
+        <p:cNvPr id="1" name=""/>
+        <p:cNvGrpSpPr/>
+        <p:nvPr/>
+      </p:nvGrpSpPr>
+      <p:grpSpPr>
+        <a:xfrm>
+          <a:off x="0" y="0"/>
+          <a:ext cx="0" cy="0"/>
+          <a:chOff x="0" y="0"/>
+          <a:chExt cx="0" cy="0"/>
+        </a:xfrm>
+      </p:grpSpPr>
+      <p:sp>
+        <p:nvSpPr>
+          <p:cNvPr id="2" name="Titel 1"/>
+          <p:cNvSpPr>
+            <a:spLocks noGrp="1"/>
+          </p:cNvSpPr>
+          <p:nvPr>
+            <p:ph type="title"/>
+          </p:nvPr>
+        </p:nvSpPr>
+        <p:spPr/>
+        <p:txBody>
+          <a:bodyPr/>
+          <a:lstStyle/>
+          <a:p>
+            <a:r>
+              <a:rPr lang="de-CH" dirty="0" smtClean="0"/>
+              <a:t>Planung</a:t>
+            </a:r>
+            <a:endParaRPr lang="de-CH" dirty="0"/>
+          </a:p>
+        </p:txBody>
+      </p:sp>
+      <p:sp>
+        <p:nvSpPr>
+          <p:cNvPr id="3" name="Inhaltsplatzhalter 2"/>
+          <p:cNvSpPr>
+            <a:spLocks noGrp="1"/>
+          </p:cNvSpPr>
+          <p:nvPr>
+            <p:ph sz="quarter" idx="13"/>
+          </p:nvPr>
+        </p:nvSpPr>
+        <p:spPr/>
+        <p:txBody>
+          <a:bodyPr/>
+          <a:lstStyle/>
+          <a:p>
+            <a:r>
+              <a:rPr lang="de-CH" dirty="0" smtClean="0"/>
+              <a:t>Erste Zeilen in </a:t>
+            </a:r>
+            <a:r>
+              <a:rPr lang="de-CH" dirty="0" err="1" smtClean="0"/>
+              <a:t>OpenCV</a:t>
+            </a:r>
+            <a:r>
+              <a:rPr lang="de-CH" dirty="0" smtClean="0"/>
+              <a:t> gemeinsam </a:t>
+            </a:r>
+            <a:r>
+              <a:rPr lang="de-CH" dirty="0" smtClean="0"/>
+              <a:t>geschrieben (hier: Grobübersicht)</a:t>
+            </a:r>
+            <a:endParaRPr lang="de-CH" dirty="0" smtClean="0"/>
+          </a:p>
+        </p:txBody>
+      </p:sp>
+      <p:pic>
+        <p:nvPicPr>
+          <p:cNvPr id="3074" name="Picture 2" descr="C:\Users\Cyril\Pictures\Screenpresso\2013-01-04_11h06_57.png"/>
+          <p:cNvPicPr>
+            <a:picLocks noChangeAspect="1" noChangeArrowheads="1"/>
+          </p:cNvPicPr>
+          <p:nvPr/>
+        </p:nvPicPr>
+        <p:blipFill>
+          <a:blip r:embed="rId2" cstate="screen"/>
+          <a:srcRect/>
+          <a:stretch>
+            <a:fillRect/>
+          </a:stretch>
+        </p:blipFill>
+        <p:spPr bwMode="auto">
+          <a:xfrm>
+            <a:off x="1979712" y="2445221"/>
+            <a:ext cx="5362575" cy="3648075"/>
+          </a:xfrm>
+          <a:prstGeom prst="rect">
+            <a:avLst/>
+          </a:prstGeom>
+          <a:noFill/>
+        </p:spPr>
+      </p:pic>
+    </p:spTree>
+    <p:extLst>
+      <p:ext uri="{BB962C8B-B14F-4D97-AF65-F5344CB8AC3E}">
+        <p14:creationId xmlns="" xmlns:p14="http://schemas.microsoft.com/office/powerpoint/2010/main" val="2756733679"/>
+      </p:ext>
+    </p:extLst>
+  </p:cSld>
+  <p:clrMapOvr>
+    <a:masterClrMapping/>
+  </p:clrMapOvr>
+  <p:timing>
+    <p:tnLst>
+      <p:par>
+        <p:cTn id="1" dur="indefinite" restart="never" nodeType="tmRoot">
+          <p:childTnLst>
+            <p:seq concurrent="1" nextAc="seek">
+              <p:cTn id="2" dur="indefinite" nodeType="mainSeq">
+                <p:childTnLst>
+                  <p:par>
+                    <p:cTn id="3" fill="hold">
+                      <p:stCondLst>
+                        <p:cond delay="indefinite"/>
+                      </p:stCondLst>
+                      <p:childTnLst>
+                        <p:par>
+                          <p:cTn id="4" fill="hold">
+                            <p:stCondLst>
+                              <p:cond delay="0"/>
+                            </p:stCondLst>
+                            <p:childTnLst>
+                              <p:par>
+                                <p:cTn id="5" presetID="1" presetClass="entr" presetSubtype="0" fill="hold" grpId="0" nodeType="clickEffect">
+                                  <p:stCondLst>
+                                    <p:cond delay="0"/>
+                                  </p:stCondLst>
+                                  <p:childTnLst>
+                                    <p:set>
+                                      <p:cBhvr>
+                                        <p:cTn id="6" dur="1" fill="hold">
+                                          <p:stCondLst>
+                                            <p:cond delay="0"/>
+                                          </p:stCondLst>
+                                        </p:cTn>
+                                        <p:tgtEl>
+                                          <p:spTgt spid="3">
+                                            <p:txEl>
+                                              <p:pRg st="0" end="0"/>
+                                            </p:txEl>
+                                          </p:spTgt>
+                                        </p:tgtEl>
+                                        <p:attrNameLst>
+                                          <p:attrName>style.visibility</p:attrName>
+                                        </p:attrNameLst>
+                                      </p:cBhvr>
+                                      <p:to>
+                                        <p:strVal val="visible"/>
+                                      </p:to>
+                                    </p:set>
+                                  </p:childTnLst>
+                                </p:cTn>
+                              </p:par>
+                            </p:childTnLst>
+                          </p:cTn>
+                        </p:par>
+                      </p:childTnLst>
+                    </p:cTn>
+                  </p:par>
+                </p:childTnLst>
+              </p:cTn>
+              <p:prevCondLst>
+                <p:cond evt="onPrev" delay="0">
+                  <p:tgtEl>
+                    <p:sldTgt/>
+                  </p:tgtEl>
+                </p:cond>
+              </p:prevCondLst>
+              <p:nextCondLst>
+                <p:cond evt="onNext" delay="0">
+                  <p:tgtEl>
+                    <p:sldTgt/>
+                  </p:tgtEl>
+                </p:cond>
+              </p:nextCondLst>
+            </p:seq>
+          </p:childTnLst>
+        </p:cTn>
+      </p:par>
+    </p:tnLst>
+    <p:bldLst>
+      <p:bldP spid="3" grpId="0" build="p"/>
+    </p:bldLst>
+  </p:timing>
+</p:sld>
+</file>
+
+<file path=ppt/slides/slide8.xml><?xml version="1.0" encoding="utf-8"?>
+<p:sld xmlns:a="http://schemas.openxmlformats.org/drawingml/2006/main" xmlns:r="http://schemas.openxmlformats.org/officeDocument/2006/relationships" xmlns:p="http://schemas.openxmlformats.org/presentationml/2006/main">
+  <p:cSld>
+    <p:spTree>
+      <p:nvGrpSpPr>
+        <p:cNvPr id="1" name=""/>
+        <p:cNvGrpSpPr/>
+        <p:nvPr/>
+      </p:nvGrpSpPr>
+      <p:grpSpPr>
+        <a:xfrm>
+          <a:off x="0" y="0"/>
+          <a:ext cx="0" cy="0"/>
+          <a:chOff x="0" y="0"/>
+          <a:chExt cx="0" cy="0"/>
+        </a:xfrm>
+      </p:grpSpPr>
+      <p:sp>
+        <p:nvSpPr>
+          <p:cNvPr id="2" name="Titel 1"/>
+          <p:cNvSpPr>
+            <a:spLocks noGrp="1"/>
+          </p:cNvSpPr>
+          <p:nvPr>
+            <p:ph type="title"/>
+          </p:nvPr>
+        </p:nvSpPr>
+        <p:spPr/>
+        <p:txBody>
+          <a:bodyPr/>
+          <a:lstStyle/>
+          <a:p>
+            <a:r>
+              <a:rPr lang="de-CH" dirty="0" smtClean="0"/>
+              <a:t>Planung</a:t>
+            </a:r>
+            <a:endParaRPr lang="de-CH" dirty="0"/>
+          </a:p>
+        </p:txBody>
+      </p:sp>
+      <p:sp>
+        <p:nvSpPr>
+          <p:cNvPr id="3" name="Inhaltsplatzhalter 2"/>
+          <p:cNvSpPr>
+            <a:spLocks noGrp="1"/>
+          </p:cNvSpPr>
+          <p:nvPr>
+            <p:ph sz="quarter" idx="13"/>
+          </p:nvPr>
+        </p:nvSpPr>
+        <p:spPr/>
+        <p:txBody>
+          <a:bodyPr/>
+          <a:lstStyle/>
+          <a:p>
+            <a:r>
+              <a:rPr lang="de-CH" dirty="0" smtClean="0"/>
+              <a:t>Arbeitsaufteilung</a:t>
+            </a:r>
+          </a:p>
+        </p:txBody>
+      </p:sp>
+      <p:pic>
+        <p:nvPicPr>
+          <p:cNvPr id="4098" name="Picture 2" descr="C:\Users\Cyril\Pictures\Screenpresso\2013-01-04_11h08_31.png"/>
+          <p:cNvPicPr>
+            <a:picLocks noChangeAspect="1" noChangeArrowheads="1"/>
+          </p:cNvPicPr>
+          <p:nvPr/>
+        </p:nvPicPr>
+        <p:blipFill>
+          <a:blip r:embed="rId2" cstate="screen"/>
+          <a:srcRect/>
+          <a:stretch>
+            <a:fillRect/>
+          </a:stretch>
+        </p:blipFill>
+        <p:spPr bwMode="auto">
+          <a:xfrm>
+            <a:off x="395536" y="2276872"/>
+            <a:ext cx="8288338" cy="4171950"/>
+          </a:xfrm>
+          <a:prstGeom prst="rect">
+            <a:avLst/>
+          </a:prstGeom>
+          <a:noFill/>
+        </p:spPr>
+      </p:pic>
+    </p:spTree>
+    <p:extLst>
+      <p:ext uri="{BB962C8B-B14F-4D97-AF65-F5344CB8AC3E}">
+        <p14:creationId xmlns="" xmlns:p14="http://schemas.microsoft.com/office/powerpoint/2010/main" val="2756733679"/>
+      </p:ext>
+    </p:extLst>
+  </p:cSld>
+  <p:clrMapOvr>
+    <a:masterClrMapping/>
+  </p:clrMapOvr>
+  <p:timing>
+    <p:tnLst>
+      <p:par>
+        <p:cTn id="1" dur="indefinite" restart="never" nodeType="tmRoot">
+          <p:childTnLst>
+            <p:seq concurrent="1" nextAc="seek">
+              <p:cTn id="2" dur="indefinite" nodeType="mainSeq">
+                <p:childTnLst>
+                  <p:par>
+                    <p:cTn id="3" fill="hold">
+                      <p:stCondLst>
+                        <p:cond delay="indefinite"/>
+                      </p:stCondLst>
+                      <p:childTnLst>
+                        <p:par>
+                          <p:cTn id="4" fill="hold">
+                            <p:stCondLst>
+                              <p:cond delay="0"/>
+                            </p:stCondLst>
+                            <p:childTnLst>
+                              <p:par>
+                                <p:cTn id="5" presetID="1" presetClass="entr" presetSubtype="0" fill="hold" grpId="0" nodeType="clickEffect">
+                                  <p:stCondLst>
+                                    <p:cond delay="0"/>
+                                  </p:stCondLst>
+                                  <p:childTnLst>
+                                    <p:set>
+                                      <p:cBhvr>
+                                        <p:cTn id="6" dur="1" fill="hold">
+                                          <p:stCondLst>
+                                            <p:cond delay="0"/>
+                                          </p:stCondLst>
+                                        </p:cTn>
+                                        <p:tgtEl>
+                                          <p:spTgt spid="3">
+                                            <p:txEl>
+                                              <p:pRg st="0" end="0"/>
+                                            </p:txEl>
+                                          </p:spTgt>
+                                        </p:tgtEl>
+                                        <p:attrNameLst>
+                                          <p:attrName>style.visibility</p:attrName>
+                                        </p:attrNameLst>
+                                      </p:cBhvr>
+                                      <p:to>
+                                        <p:strVal val="visible"/>
+                                      </p:to>
+                                    </p:set>
+                                  </p:childTnLst>
+                                </p:cTn>
+                              </p:par>
+                            </p:childTnLst>
+                          </p:cTn>
+                        </p:par>
+                      </p:childTnLst>
+                    </p:cTn>
+                  </p:par>
+                </p:childTnLst>
+              </p:cTn>
+              <p:prevCondLst>
+                <p:cond evt="onPrev" delay="0">
+                  <p:tgtEl>
+                    <p:sldTgt/>
+                  </p:tgtEl>
+                </p:cond>
+              </p:prevCondLst>
+              <p:nextCondLst>
+                <p:cond evt="onNext" delay="0">
+                  <p:tgtEl>
+                    <p:sldTgt/>
+                  </p:tgtEl>
+                </p:cond>
+              </p:nextCondLst>
+            </p:seq>
+          </p:childTnLst>
+        </p:cTn>
+      </p:par>
+    </p:tnLst>
+    <p:bldLst>
+      <p:bldP spid="3" grpId="0" build="p"/>
+    </p:bldLst>
+  </p:timing>
+</p:sld>
+</file>
+
+<file path=ppt/slides/slide9.xml><?xml version="1.0" encoding="utf-8"?>
+<p:sld xmlns:a="http://schemas.openxmlformats.org/drawingml/2006/main" xmlns:r="http://schemas.openxmlformats.org/officeDocument/2006/relationships" xmlns:p="http://schemas.openxmlformats.org/presentationml/2006/main">
+  <p:cSld>
+    <p:spTree>
+      <p:nvGrpSpPr>
+        <p:cNvPr id="1" name=""/>
+        <p:cNvGrpSpPr/>
+        <p:nvPr/>
+      </p:nvGrpSpPr>
+      <p:grpSpPr>
+        <a:xfrm>
+          <a:off x="0" y="0"/>
+          <a:ext cx="0" cy="0"/>
+          <a:chOff x="0" y="0"/>
+          <a:chExt cx="0" cy="0"/>
+        </a:xfrm>
+      </p:grpSpPr>
+      <p:sp>
+        <p:nvSpPr>
+          <p:cNvPr id="2" name="Titel 1"/>
+          <p:cNvSpPr>
+            <a:spLocks noGrp="1"/>
+          </p:cNvSpPr>
+          <p:nvPr>
+            <p:ph type="title"/>
+          </p:nvPr>
+        </p:nvSpPr>
+        <p:spPr/>
+        <p:txBody>
+          <a:bodyPr/>
+          <a:lstStyle/>
+          <a:p>
+            <a:r>
+              <a:rPr lang="de-CH" dirty="0" smtClean="0"/>
+              <a:t>Planung</a:t>
+            </a:r>
+            <a:endParaRPr lang="de-CH" dirty="0"/>
+          </a:p>
+        </p:txBody>
+      </p:sp>
+      <p:sp>
+        <p:nvSpPr>
+          <p:cNvPr id="3" name="Inhaltsplatzhalter 2"/>
+          <p:cNvSpPr>
+            <a:spLocks noGrp="1"/>
+          </p:cNvSpPr>
+          <p:nvPr>
+            <p:ph sz="quarter" idx="13"/>
+          </p:nvPr>
+        </p:nvSpPr>
+        <p:spPr/>
+        <p:txBody>
+          <a:bodyPr/>
+          <a:lstStyle/>
+          <a:p>
+            <a:r>
+              <a:rPr lang="de-CH" dirty="0" smtClean="0"/>
+              <a:t>Arbeitsaufteilung</a:t>
+            </a:r>
+          </a:p>
+        </p:txBody>
+      </p:sp>
+      <p:pic>
+        <p:nvPicPr>
+          <p:cNvPr id="5122" name="Picture 2" descr="C:\Users\Cyril\Pictures\Screenpresso\2013-01-04_11h13_14.png"/>
+          <p:cNvPicPr>
+            <a:picLocks noChangeAspect="1" noChangeArrowheads="1"/>
+          </p:cNvPicPr>
+          <p:nvPr/>
+        </p:nvPicPr>
+        <p:blipFill>
+          <a:blip r:embed="rId2" cstate="screen"/>
+          <a:srcRect/>
+          <a:stretch>
+            <a:fillRect/>
+          </a:stretch>
+        </p:blipFill>
+        <p:spPr bwMode="auto">
+          <a:xfrm>
+            <a:off x="467544" y="1964010"/>
+            <a:ext cx="8269288" cy="4705350"/>
+          </a:xfrm>
+          <a:prstGeom prst="rect">
+            <a:avLst/>
+          </a:prstGeom>
+          <a:noFill/>
+        </p:spPr>
+      </p:pic>
+    </p:spTree>
+    <p:extLst>
+      <p:ext uri="{BB962C8B-B14F-4D97-AF65-F5344CB8AC3E}">
+        <p14:creationId xmlns="" xmlns:p14="http://schemas.microsoft.com/office/powerpoint/2010/main" val="2756733679"/>
+      </p:ext>
+    </p:extLst>
+  </p:cSld>
+  <p:clrMapOvr>
+    <a:masterClrMapping/>
+  </p:clrMapOvr>
+  <p:timing>
+    <p:tnLst>
+      <p:par>
+        <p:cTn id="1" dur="indefinite" restart="never" nodeType="tmRoot">
+          <p:childTnLst>
+            <p:seq concurrent="1" nextAc="seek">
+              <p:cTn id="2" dur="indefinite" nodeType="mainSeq">
+                <p:childTnLst>
+                  <p:par>
+                    <p:cTn id="3" fill="hold">
+                      <p:stCondLst>
+                        <p:cond delay="indefinite"/>
+                      </p:stCondLst>
+                      <p:childTnLst>
+                        <p:par>
+                          <p:cTn id="4" fill="hold">
+                            <p:stCondLst>
+                              <p:cond delay="0"/>
+                            </p:stCondLst>
+                            <p:childTnLst>
+                              <p:par>
+                                <p:cTn id="5" presetID="1" presetClass="entr" presetSubtype="0" fill="hold" grpId="0" nodeType="clickEffect">
+                                  <p:stCondLst>
+                                    <p:cond delay="0"/>
+                                  </p:stCondLst>
+                                  <p:childTnLst>
+                                    <p:set>
+                                      <p:cBhvr>
+                                        <p:cTn id="6" dur="1" fill="hold">
+                                          <p:stCondLst>
+                                            <p:cond delay="0"/>
+                                          </p:stCondLst>
+                                        </p:cTn>
+                                        <p:tgtEl>
+                                          <p:spTgt spid="3">
+                                            <p:txEl>
+                                              <p:pRg st="0" end="0"/>
+                                            </p:txEl>
+                                          </p:spTgt>
+                                        </p:tgtEl>
+                                        <p:attrNameLst>
+                                          <p:attrName>style.visibility</p:attrName>
+                                        </p:attrNameLst>
+                                      </p:cBhvr>
+                                      <p:to>
+                                        <p:strVal val="visible"/>
+                                      </p:to>
+                                    </p:set>
+                                  </p:childTnLst>
+                                </p:cTn>
+                              </p:par>
+                            </p:childTnLst>
+                          </p:cTn>
+                        </p:par>
+                      </p:childTnLst>
+                    </p:cTn>
+                  </p:par>
+                </p:childTnLst>
+              </p:cTn>
+              <p:prevCondLst>
+                <p:cond evt="onPrev" delay="0">
+                  <p:tgtEl>
+                    <p:sldTgt/>
+                  </p:tgtEl>
+                </p:cond>
+              </p:prevCondLst>
+              <p:nextCondLst>
+                <p:cond evt="onNext" delay="0">
+                  <p:tgtEl>
+                    <p:sldTgt/>
+                  </p:tgtEl>
+                </p:cond>
+              </p:nextCondLst>
+            </p:seq>
+          </p:childTnLst>
+        </p:cTn>
+      </p:par>
+    </p:tnLst>
+    <p:bldLst>
+      <p:bldP spid="3" grpId="0" build="p"/>
+    </p:bldLst>
   </p:timing>
 </p:sld>
 </file>

</xml_diff>

<commit_message>
added fazit and erweiterungen to presentation
</commit_message>
<xml_diff>
--- a/Doku/Puzzle.pptx
+++ b/Doku/Puzzle.pptx
@@ -5,7 +5,7 @@
     <p:sldMasterId id="2147483708" r:id="rId1"/>
   </p:sldMasterIdLst>
   <p:notesMasterIdLst>
-    <p:notesMasterId r:id="rId23"/>
+    <p:notesMasterId r:id="rId25"/>
   </p:notesMasterIdLst>
   <p:sldIdLst>
     <p:sldId id="256" r:id="rId2"/>
@@ -28,7 +28,9 @@
     <p:sldId id="284" r:id="rId19"/>
     <p:sldId id="285" r:id="rId20"/>
     <p:sldId id="286" r:id="rId21"/>
-    <p:sldId id="266" r:id="rId22"/>
+    <p:sldId id="287" r:id="rId22"/>
+    <p:sldId id="288" r:id="rId23"/>
+    <p:sldId id="266" r:id="rId24"/>
   </p:sldIdLst>
   <p:sldSz cx="9144000" cy="6858000" type="screen4x3"/>
   <p:notesSz cx="6858000" cy="9144000"/>
@@ -213,7 +215,7 @@
             <a:fld id="{9CCF7261-FAE9-431D-A535-F0D32AAE8354}" type="datetimeFigureOut">
               <a:rPr lang="de-CH" smtClean="0"/>
               <a:pPr/>
-              <a:t>04.01.2013</a:t>
+              <a:t>05.01.2013</a:t>
             </a:fld>
             <a:endParaRPr lang="de-CH"/>
           </a:p>
@@ -384,7 +386,7 @@
     </p:spTree>
     <p:extLst>
       <p:ext uri="{BB962C8B-B14F-4D97-AF65-F5344CB8AC3E}">
-        <p14:creationId xmlns:p14="http://schemas.microsoft.com/office/powerpoint/2010/main" xmlns="" val="352693751"/>
+        <p14:creationId xmlns:p14="http://schemas.microsoft.com/office/powerpoint/2010/main" val="352693751"/>
       </p:ext>
     </p:extLst>
   </p:cSld>
@@ -544,7 +546,7 @@
             <a:fld id="{0B8AC65F-F2B9-4AE9-880A-F19E8D9538B7}" type="datetimeFigureOut">
               <a:rPr lang="de-CH" smtClean="0"/>
               <a:pPr/>
-              <a:t>04.01.2013</a:t>
+              <a:t>05.01.2013</a:t>
             </a:fld>
             <a:endParaRPr lang="de-CH"/>
           </a:p>
@@ -862,7 +864,7 @@
             <a:fld id="{0B8AC65F-F2B9-4AE9-880A-F19E8D9538B7}" type="datetimeFigureOut">
               <a:rPr lang="de-CH" smtClean="0"/>
               <a:pPr/>
-              <a:t>04.01.2013</a:t>
+              <a:t>05.01.2013</a:t>
             </a:fld>
             <a:endParaRPr lang="de-CH"/>
           </a:p>
@@ -1039,7 +1041,7 @@
             <a:fld id="{0B8AC65F-F2B9-4AE9-880A-F19E8D9538B7}" type="datetimeFigureOut">
               <a:rPr lang="de-CH" smtClean="0"/>
               <a:pPr/>
-              <a:t>04.01.2013</a:t>
+              <a:t>05.01.2013</a:t>
             </a:fld>
             <a:endParaRPr lang="de-CH"/>
           </a:p>
@@ -1159,7 +1161,7 @@
             <a:fld id="{0B8AC65F-F2B9-4AE9-880A-F19E8D9538B7}" type="datetimeFigureOut">
               <a:rPr lang="de-CH" smtClean="0"/>
               <a:pPr/>
-              <a:t>04.01.2013</a:t>
+              <a:t>05.01.2013</a:t>
             </a:fld>
             <a:endParaRPr lang="de-CH"/>
           </a:p>
@@ -1459,7 +1461,7 @@
             <a:fld id="{0B8AC65F-F2B9-4AE9-880A-F19E8D9538B7}" type="datetimeFigureOut">
               <a:rPr lang="de-CH" smtClean="0"/>
               <a:pPr/>
-              <a:t>04.01.2013</a:t>
+              <a:t>05.01.2013</a:t>
             </a:fld>
             <a:endParaRPr lang="de-CH"/>
           </a:p>
@@ -1754,7 +1756,7 @@
             <a:fld id="{0B8AC65F-F2B9-4AE9-880A-F19E8D9538B7}" type="datetimeFigureOut">
               <a:rPr lang="de-CH" smtClean="0"/>
               <a:pPr/>
-              <a:t>04.01.2013</a:t>
+              <a:t>05.01.2013</a:t>
             </a:fld>
             <a:endParaRPr lang="de-CH"/>
           </a:p>
@@ -2184,7 +2186,7 @@
             <a:fld id="{0B8AC65F-F2B9-4AE9-880A-F19E8D9538B7}" type="datetimeFigureOut">
               <a:rPr lang="de-CH" smtClean="0"/>
               <a:pPr/>
-              <a:t>04.01.2013</a:t>
+              <a:t>05.01.2013</a:t>
             </a:fld>
             <a:endParaRPr lang="de-CH"/>
           </a:p>
@@ -2304,7 +2306,7 @@
             <a:fld id="{0B8AC65F-F2B9-4AE9-880A-F19E8D9538B7}" type="datetimeFigureOut">
               <a:rPr lang="de-CH" smtClean="0"/>
               <a:pPr/>
-              <a:t>04.01.2013</a:t>
+              <a:t>05.01.2013</a:t>
             </a:fld>
             <a:endParaRPr lang="de-CH"/>
           </a:p>
@@ -2396,7 +2398,7 @@
             <a:fld id="{0B8AC65F-F2B9-4AE9-880A-F19E8D9538B7}" type="datetimeFigureOut">
               <a:rPr lang="de-CH" smtClean="0"/>
               <a:pPr/>
-              <a:t>04.01.2013</a:t>
+              <a:t>05.01.2013</a:t>
             </a:fld>
             <a:endParaRPr lang="de-CH"/>
           </a:p>
@@ -2648,7 +2650,7 @@
             <a:fld id="{0B8AC65F-F2B9-4AE9-880A-F19E8D9538B7}" type="datetimeFigureOut">
               <a:rPr lang="de-CH" smtClean="0"/>
               <a:pPr/>
-              <a:t>04.01.2013</a:t>
+              <a:t>05.01.2013</a:t>
             </a:fld>
             <a:endParaRPr lang="de-CH"/>
           </a:p>
@@ -3166,7 +3168,7 @@
             <a:fld id="{0B8AC65F-F2B9-4AE9-880A-F19E8D9538B7}" type="datetimeFigureOut">
               <a:rPr lang="de-CH" smtClean="0"/>
               <a:pPr/>
-              <a:t>04.01.2013</a:t>
+              <a:t>05.01.2013</a:t>
             </a:fld>
             <a:endParaRPr lang="de-CH"/>
           </a:p>
@@ -3398,7 +3400,7 @@
             <a:fld id="{0B8AC65F-F2B9-4AE9-880A-F19E8D9538B7}" type="datetimeFigureOut">
               <a:rPr lang="de-CH" smtClean="0"/>
               <a:pPr/>
-              <a:t>04.01.2013</a:t>
+              <a:t>05.01.2013</a:t>
             </a:fld>
             <a:endParaRPr lang="de-CH"/>
           </a:p>
@@ -4169,7 +4171,7 @@
           <a:blip r:embed="rId2" cstate="print">
             <a:extLst>
               <a:ext uri="{BEBA8EAE-BF5A-486C-A8C5-ECC9F3942E4B}">
-                <a14:imgProps xmlns:a14="http://schemas.microsoft.com/office/drawing/2010/main" xmlns="">
+                <a14:imgProps xmlns:a14="http://schemas.microsoft.com/office/drawing/2010/main">
                   <a14:imgLayer r:embed="rId3">
                     <a14:imgEffect>
                       <a14:backgroundRemoval t="350" b="100000" l="0" r="100000">
@@ -4203,7 +4205,7 @@
                 </a14:imgProps>
               </a:ext>
               <a:ext uri="{28A0092B-C50C-407E-A947-70E740481C1C}">
-                <a14:useLocalDpi xmlns:a14="http://schemas.microsoft.com/office/drawing/2010/main" xmlns="" val="0"/>
+                <a14:useLocalDpi xmlns:a14="http://schemas.microsoft.com/office/drawing/2010/main" val="0"/>
               </a:ext>
             </a:extLst>
           </a:blip>
@@ -4223,7 +4225,7 @@
           <a:noFill/>
           <a:extLst>
             <a:ext uri="{909E8E84-426E-40DD-AFC4-6F175D3DCCD1}">
-              <a14:hiddenFill xmlns:a14="http://schemas.microsoft.com/office/drawing/2010/main" xmlns="">
+              <a14:hiddenFill xmlns:a14="http://schemas.microsoft.com/office/drawing/2010/main">
                 <a:solidFill>
                   <a:srgbClr val="FFFFFF"/>
                 </a:solidFill>
@@ -4235,7 +4237,7 @@
     </p:spTree>
     <p:extLst>
       <p:ext uri="{BB962C8B-B14F-4D97-AF65-F5344CB8AC3E}">
-        <p14:creationId xmlns:p14="http://schemas.microsoft.com/office/powerpoint/2010/main" xmlns="" val="1704400666"/>
+        <p14:creationId xmlns:p14="http://schemas.microsoft.com/office/powerpoint/2010/main" val="1704400666"/>
       </p:ext>
     </p:extLst>
   </p:cSld>
@@ -4394,7 +4396,7 @@
     </p:spTree>
     <p:extLst>
       <p:ext uri="{BB962C8B-B14F-4D97-AF65-F5344CB8AC3E}">
-        <p14:creationId xmlns:p14="http://schemas.microsoft.com/office/powerpoint/2010/main" xmlns="" val="2756733679"/>
+        <p14:creationId xmlns:p14="http://schemas.microsoft.com/office/powerpoint/2010/main" val="2756733679"/>
       </p:ext>
     </p:extLst>
   </p:cSld>
@@ -4632,7 +4634,7 @@
     </p:spTree>
     <p:extLst>
       <p:ext uri="{BB962C8B-B14F-4D97-AF65-F5344CB8AC3E}">
-        <p14:creationId xmlns:p14="http://schemas.microsoft.com/office/powerpoint/2010/main" xmlns="" val="2756733679"/>
+        <p14:creationId xmlns:p14="http://schemas.microsoft.com/office/powerpoint/2010/main" val="2756733679"/>
       </p:ext>
     </p:extLst>
   </p:cSld>
@@ -4847,7 +4849,7 @@
     </p:spTree>
     <p:extLst>
       <p:ext uri="{BB962C8B-B14F-4D97-AF65-F5344CB8AC3E}">
-        <p14:creationId xmlns:p14="http://schemas.microsoft.com/office/powerpoint/2010/main" xmlns="" val="2756733679"/>
+        <p14:creationId xmlns:p14="http://schemas.microsoft.com/office/powerpoint/2010/main" val="2756733679"/>
       </p:ext>
     </p:extLst>
   </p:cSld>
@@ -5070,7 +5072,7 @@
     </p:spTree>
     <p:extLst>
       <p:ext uri="{BB962C8B-B14F-4D97-AF65-F5344CB8AC3E}">
-        <p14:creationId xmlns:p14="http://schemas.microsoft.com/office/powerpoint/2010/main" xmlns="" val="2756733679"/>
+        <p14:creationId xmlns:p14="http://schemas.microsoft.com/office/powerpoint/2010/main" val="2756733679"/>
       </p:ext>
     </p:extLst>
   </p:cSld>
@@ -5244,13 +5246,8 @@
           <a:p>
             <a:r>
               <a:rPr lang="de-CH" dirty="0" smtClean="0"/>
-              <a:t>Auf GUI-Anwendung </a:t>
-            </a:r>
-            <a:r>
-              <a:rPr lang="de-CH" dirty="0" smtClean="0"/>
-              <a:t>geändert</a:t>
-            </a:r>
-            <a:endParaRPr lang="de-CH" dirty="0" smtClean="0"/>
+              <a:t>Auf GUI-Anwendung geändert</a:t>
+            </a:r>
           </a:p>
           <a:p>
             <a:r>
@@ -5269,10 +5266,130 @@
           </a:p>
         </p:txBody>
       </p:sp>
+      <p:pic>
+        <p:nvPicPr>
+          <p:cNvPr id="4" name="Picture 2" descr="http://www.transfer-21.de/_img/7c6e7b91.jpg"/>
+          <p:cNvPicPr>
+            <a:picLocks noChangeAspect="1" noChangeArrowheads="1"/>
+          </p:cNvPicPr>
+          <p:nvPr/>
+        </p:nvPicPr>
+        <p:blipFill rotWithShape="1">
+          <a:blip r:embed="rId2" cstate="print">
+            <a:extLst>
+              <a:ext uri="{BEBA8EAE-BF5A-486C-A8C5-ECC9F3942E4B}">
+                <a14:imgProps xmlns:a14="http://schemas.microsoft.com/office/drawing/2010/main">
+                  <a14:imgLayer r:embed="rId3">
+                    <a14:imgEffect>
+                      <a14:backgroundRemoval t="0" b="100000" l="0" r="100000">
+                        <a14:foregroundMark x1="32571" y1="42577" x2="32286" y2="92157"/>
+                        <a14:foregroundMark x1="17143" y1="55462" x2="45143" y2="79832"/>
+                        <a14:foregroundMark x1="46000" y1="55182" x2="17714" y2="83193"/>
+                        <a14:foregroundMark x1="32000" y1="42297" x2="32000" y2="42297"/>
+                        <a14:foregroundMark x1="27429" y1="42017" x2="27429" y2="42017"/>
+                        <a14:backgroundMark x1="92286" y1="91597" x2="79143" y2="10364"/>
+                        <a14:backgroundMark x1="88286" y1="89916" x2="67143" y2="2241"/>
+                        <a14:backgroundMark x1="84000" y1="94398" x2="58286" y2="3922"/>
+                        <a14:backgroundMark x1="74571" y1="94118" x2="52571" y2="10084"/>
+                        <a14:backgroundMark x1="70857" y1="93277" x2="45429" y2="18207"/>
+                        <a14:backgroundMark x1="61714" y1="94398" x2="53429" y2="63025"/>
+                        <a14:backgroundMark x1="23714" y1="12045" x2="46000" y2="40056"/>
+                        <a14:backgroundMark x1="12857" y1="15406" x2="46000" y2="47059"/>
+                        <a14:backgroundMark x1="7429" y1="27451" x2="25429" y2="45658"/>
+                        <a14:backgroundMark x1="9429" y1="43697" x2="16857" y2="44818"/>
+                        <a14:backgroundMark x1="11714" y1="50980" x2="17143" y2="49860"/>
+                        <a14:backgroundMark x1="48857" y1="87675" x2="52571" y2="81793"/>
+                      </a14:backgroundRemoval>
+                    </a14:imgEffect>
+                  </a14:imgLayer>
+                </a14:imgProps>
+              </a:ext>
+              <a:ext uri="{28A0092B-C50C-407E-A947-70E740481C1C}">
+                <a14:useLocalDpi xmlns:a14="http://schemas.microsoft.com/office/drawing/2010/main" val="0"/>
+              </a:ext>
+            </a:extLst>
+          </a:blip>
+          <a:srcRect l="13860" t="36472" r="50000" b="2715"/>
+          <a:stretch/>
+        </p:blipFill>
+        <p:spPr bwMode="auto">
+          <a:xfrm rot="2525426">
+            <a:off x="5998336" y="3778495"/>
+            <a:ext cx="798741" cy="1370926"/>
+          </a:xfrm>
+          <a:prstGeom prst="rect">
+            <a:avLst/>
+          </a:prstGeom>
+          <a:noFill/>
+          <a:extLst>
+            <a:ext uri="{909E8E84-426E-40DD-AFC4-6F175D3DCCD1}">
+              <a14:hiddenFill xmlns:a14="http://schemas.microsoft.com/office/drawing/2010/main">
+                <a:solidFill>
+                  <a:srgbClr val="FFFFFF"/>
+                </a:solidFill>
+              </a14:hiddenFill>
+            </a:ext>
+          </a:extLst>
+        </p:spPr>
+      </p:pic>
+      <p:pic>
+        <p:nvPicPr>
+          <p:cNvPr id="5" name="Picture 2" descr="http://www.transfer-21.de/_img/7c6e7b91.jpg"/>
+          <p:cNvPicPr>
+            <a:picLocks noChangeAspect="1" noChangeArrowheads="1"/>
+          </p:cNvPicPr>
+          <p:nvPr/>
+        </p:nvPicPr>
+        <p:blipFill rotWithShape="1">
+          <a:blip r:embed="rId4" cstate="print">
+            <a:extLst>
+              <a:ext uri="{BEBA8EAE-BF5A-486C-A8C5-ECC9F3942E4B}">
+                <a14:imgProps xmlns:a14="http://schemas.microsoft.com/office/drawing/2010/main">
+                  <a14:imgLayer r:embed="rId3">
+                    <a14:imgEffect>
+                      <a14:backgroundRemoval t="37255" b="85994" l="36286" r="100000">
+                        <a14:backgroundMark x1="44286" y1="81513" x2="42286" y2="85434"/>
+                        <a14:backgroundMark x1="48000" y1="80392" x2="47714" y2="86835"/>
+                        <a14:backgroundMark x1="81429" y1="50700" x2="87429" y2="49580"/>
+                        <a14:backgroundMark x1="55429" y1="48179" x2="45714" y2="50700"/>
+                        <a14:backgroundMark x1="46286" y1="47059" x2="48000" y2="55182"/>
+                      </a14:backgroundRemoval>
+                    </a14:imgEffect>
+                  </a14:imgLayer>
+                </a14:imgProps>
+              </a:ext>
+              <a:ext uri="{28A0092B-C50C-407E-A947-70E740481C1C}">
+                <a14:useLocalDpi xmlns:a14="http://schemas.microsoft.com/office/drawing/2010/main" val="0"/>
+              </a:ext>
+            </a:extLst>
+          </a:blip>
+          <a:srcRect l="36828" t="36401" b="10588"/>
+          <a:stretch/>
+        </p:blipFill>
+        <p:spPr bwMode="auto">
+          <a:xfrm rot="2525426">
+            <a:off x="7312754" y="3598807"/>
+            <a:ext cx="1396180" cy="1195039"/>
+          </a:xfrm>
+          <a:prstGeom prst="rect">
+            <a:avLst/>
+          </a:prstGeom>
+          <a:noFill/>
+          <a:extLst>
+            <a:ext uri="{909E8E84-426E-40DD-AFC4-6F175D3DCCD1}">
+              <a14:hiddenFill xmlns:a14="http://schemas.microsoft.com/office/drawing/2010/main">
+                <a:solidFill>
+                  <a:srgbClr val="FFFFFF"/>
+                </a:solidFill>
+              </a14:hiddenFill>
+            </a:ext>
+          </a:extLst>
+        </p:spPr>
+      </p:pic>
     </p:spTree>
     <p:extLst>
       <p:ext uri="{BB962C8B-B14F-4D97-AF65-F5344CB8AC3E}">
-        <p14:creationId xmlns:p14="http://schemas.microsoft.com/office/powerpoint/2010/main" xmlns="" val="1334996816"/>
+        <p14:creationId xmlns:p14="http://schemas.microsoft.com/office/powerpoint/2010/main" val="1334996816"/>
       </p:ext>
     </p:extLst>
   </p:cSld>
@@ -7888,7 +8005,7 @@
     </p:spTree>
     <p:extLst>
       <p:ext uri="{BB962C8B-B14F-4D97-AF65-F5344CB8AC3E}">
-        <p14:creationId xmlns:p14="http://schemas.microsoft.com/office/powerpoint/2010/main" xmlns="" val="2054773068"/>
+        <p14:creationId xmlns:p14="http://schemas.microsoft.com/office/powerpoint/2010/main" val="2054773068"/>
       </p:ext>
     </p:extLst>
   </p:cSld>
@@ -8884,7 +9001,7 @@
     </p:spTree>
     <p:extLst>
       <p:ext uri="{BB962C8B-B14F-4D97-AF65-F5344CB8AC3E}">
-        <p14:creationId xmlns:p14="http://schemas.microsoft.com/office/powerpoint/2010/main" xmlns="" val="1487937273"/>
+        <p14:creationId xmlns:p14="http://schemas.microsoft.com/office/powerpoint/2010/main" val="1487937273"/>
       </p:ext>
     </p:extLst>
   </p:cSld>
@@ -10836,7 +10953,7 @@
     </p:spTree>
     <p:extLst>
       <p:ext uri="{BB962C8B-B14F-4D97-AF65-F5344CB8AC3E}">
-        <p14:creationId xmlns:p14="http://schemas.microsoft.com/office/powerpoint/2010/main" xmlns="" val="858953006"/>
+        <p14:creationId xmlns:p14="http://schemas.microsoft.com/office/powerpoint/2010/main" val="858953006"/>
       </p:ext>
     </p:extLst>
   </p:cSld>
@@ -11957,18 +12074,7 @@
                 <a:ea typeface="Times New Roman"/>
                 <a:cs typeface="Courier New" pitchFamily="49" charset="0"/>
               </a:rPr>
-              <a:t> </a:t>
-            </a:r>
-            <a:r>
-              <a:rPr lang="en-US" sz="1100" dirty="0" smtClean="0">
-                <a:solidFill>
-                  <a:srgbClr val="808000"/>
-                </a:solidFill>
-                <a:latin typeface="Courier New" pitchFamily="49" charset="0"/>
-                <a:ea typeface="Times New Roman"/>
-                <a:cs typeface="Courier New" pitchFamily="49" charset="0"/>
-              </a:rPr>
-              <a:t>       </a:t>
+              <a:t>        </a:t>
             </a:r>
             <a:r>
               <a:rPr lang="de-CH" sz="1100" dirty="0" err="1" smtClean="0">
@@ -12684,18 +12790,7 @@
                 <a:ea typeface="Times New Roman"/>
                 <a:cs typeface="Courier New" pitchFamily="49" charset="0"/>
               </a:rPr>
-              <a:t>        e</a:t>
-            </a:r>
-            <a:r>
-              <a:rPr lang="en-US" sz="1100" dirty="0" smtClean="0">
-                <a:solidFill>
-                  <a:srgbClr val="808000"/>
-                </a:solidFill>
-                <a:latin typeface="Courier New" pitchFamily="49" charset="0"/>
-                <a:ea typeface="Times New Roman"/>
-                <a:cs typeface="Courier New" pitchFamily="49" charset="0"/>
-              </a:rPr>
-              <a:t>lse</a:t>
+              <a:t>        else</a:t>
             </a:r>
             <a:endParaRPr lang="en-US" sz="1100" dirty="0">
               <a:latin typeface="Courier New" pitchFamily="49" charset="0"/>
@@ -13347,7 +13442,7 @@
     </p:spTree>
     <p:extLst>
       <p:ext uri="{BB962C8B-B14F-4D97-AF65-F5344CB8AC3E}">
-        <p14:creationId xmlns:p14="http://schemas.microsoft.com/office/powerpoint/2010/main" xmlns="" val="5471565"/>
+        <p14:creationId xmlns:p14="http://schemas.microsoft.com/office/powerpoint/2010/main" val="5471565"/>
       </p:ext>
     </p:extLst>
   </p:cSld>
@@ -14245,7 +14340,7 @@
     </p:spTree>
     <p:extLst>
       <p:ext uri="{BB962C8B-B14F-4D97-AF65-F5344CB8AC3E}">
-        <p14:creationId xmlns:p14="http://schemas.microsoft.com/office/powerpoint/2010/main" xmlns="" val="1676534572"/>
+        <p14:creationId xmlns:p14="http://schemas.microsoft.com/office/powerpoint/2010/main" val="1676534572"/>
       </p:ext>
     </p:extLst>
   </p:cSld>
@@ -14482,33 +14577,34 @@
           </a:p>
           <a:p>
             <a:r>
-              <a:rPr lang="de-CH" dirty="0" err="1" smtClean="0"/>
-              <a:t>OpenCV</a:t>
-            </a:r>
+              <a:rPr lang="de-CH" dirty="0"/>
+              <a:t>Programmablauf</a:t>
+            </a:r>
+          </a:p>
+          <a:p>
             <a:r>
               <a:rPr lang="de-CH" dirty="0" smtClean="0"/>
-              <a:t> / </a:t>
-            </a:r>
-            <a:r>
-              <a:rPr lang="de-CH" dirty="0" err="1" smtClean="0"/>
-              <a:t>Qt</a:t>
-            </a:r>
+              <a:t>Implementation</a:t>
+            </a:r>
+          </a:p>
+          <a:p>
             <a:r>
               <a:rPr lang="de-CH" dirty="0" smtClean="0"/>
-              <a:t> </a:t>
-            </a:r>
-            <a:r>
-              <a:rPr lang="de-CH" dirty="0" err="1" smtClean="0"/>
-              <a:t>Creator</a:t>
+              <a:t>Mögliche Erweiterungen</a:t>
+            </a:r>
+          </a:p>
+          <a:p>
+            <a:r>
+              <a:rPr lang="de-CH" dirty="0" smtClean="0"/>
+              <a:t>Fazit</a:t>
+            </a:r>
+          </a:p>
+          <a:p>
+            <a:r>
+              <a:rPr lang="de-CH" dirty="0" smtClean="0"/>
+              <a:t>Programm Demo</a:t>
             </a:r>
             <a:endParaRPr lang="de-CH" dirty="0" smtClean="0"/>
-          </a:p>
-          <a:p>
-            <a:r>
-              <a:rPr lang="de-CH" dirty="0" smtClean="0"/>
-              <a:t>Programmablauf</a:t>
-            </a:r>
-            <a:endParaRPr lang="de-CH" dirty="0"/>
           </a:p>
           <a:p>
             <a:pPr lvl="1"/>
@@ -14528,7 +14624,7 @@
           <a:blip r:embed="rId2" cstate="print">
             <a:extLst>
               <a:ext uri="{BEBA8EAE-BF5A-486C-A8C5-ECC9F3942E4B}">
-                <a14:imgProps xmlns:a14="http://schemas.microsoft.com/office/drawing/2010/main" xmlns="">
+                <a14:imgProps xmlns:a14="http://schemas.microsoft.com/office/drawing/2010/main">
                   <a14:imgLayer r:embed="rId3">
                     <a14:imgEffect>
                       <a14:backgroundRemoval t="0" b="100000" l="0" r="100000">
@@ -14555,7 +14651,7 @@
                 </a14:imgProps>
               </a:ext>
               <a:ext uri="{28A0092B-C50C-407E-A947-70E740481C1C}">
-                <a14:useLocalDpi xmlns:a14="http://schemas.microsoft.com/office/drawing/2010/main" xmlns="" val="0"/>
+                <a14:useLocalDpi xmlns:a14="http://schemas.microsoft.com/office/drawing/2010/main" val="0"/>
               </a:ext>
             </a:extLst>
           </a:blip>
@@ -14573,7 +14669,7 @@
           <a:noFill/>
           <a:extLst>
             <a:ext uri="{909E8E84-426E-40DD-AFC4-6F175D3DCCD1}">
-              <a14:hiddenFill xmlns:a14="http://schemas.microsoft.com/office/drawing/2010/main" xmlns="">
+              <a14:hiddenFill xmlns:a14="http://schemas.microsoft.com/office/drawing/2010/main">
                 <a:solidFill>
                   <a:srgbClr val="FFFFFF"/>
                 </a:solidFill>
@@ -14594,7 +14690,7 @@
           <a:blip r:embed="rId4" cstate="print">
             <a:extLst>
               <a:ext uri="{BEBA8EAE-BF5A-486C-A8C5-ECC9F3942E4B}">
-                <a14:imgProps xmlns:a14="http://schemas.microsoft.com/office/drawing/2010/main" xmlns="">
+                <a14:imgProps xmlns:a14="http://schemas.microsoft.com/office/drawing/2010/main">
                   <a14:imgLayer r:embed="rId3">
                     <a14:imgEffect>
                       <a14:backgroundRemoval t="37255" b="85994" l="36286" r="100000">
@@ -14609,7 +14705,7 @@
                 </a14:imgProps>
               </a:ext>
               <a:ext uri="{28A0092B-C50C-407E-A947-70E740481C1C}">
-                <a14:useLocalDpi xmlns:a14="http://schemas.microsoft.com/office/drawing/2010/main" xmlns="" val="0"/>
+                <a14:useLocalDpi xmlns:a14="http://schemas.microsoft.com/office/drawing/2010/main" val="0"/>
               </a:ext>
             </a:extLst>
           </a:blip>
@@ -14627,7 +14723,7 @@
           <a:noFill/>
           <a:extLst>
             <a:ext uri="{909E8E84-426E-40DD-AFC4-6F175D3DCCD1}">
-              <a14:hiddenFill xmlns:a14="http://schemas.microsoft.com/office/drawing/2010/main" xmlns="">
+              <a14:hiddenFill xmlns:a14="http://schemas.microsoft.com/office/drawing/2010/main">
                 <a:solidFill>
                   <a:srgbClr val="FFFFFF"/>
                 </a:solidFill>
@@ -14639,7 +14735,7 @@
     </p:spTree>
     <p:extLst>
       <p:ext uri="{BB962C8B-B14F-4D97-AF65-F5344CB8AC3E}">
-        <p14:creationId xmlns:p14="http://schemas.microsoft.com/office/powerpoint/2010/main" xmlns="" val="1387166899"/>
+        <p14:creationId xmlns:p14="http://schemas.microsoft.com/office/powerpoint/2010/main" val="1387166899"/>
       </p:ext>
     </p:extLst>
   </p:cSld>
@@ -14746,15 +14842,33 @@
                                   </p:childTnLst>
                                 </p:cTn>
                               </p:par>
+                            </p:childTnLst>
+                          </p:cTn>
+                        </p:par>
+                      </p:childTnLst>
+                    </p:cTn>
+                  </p:par>
+                  <p:par>
+                    <p:cTn id="11" fill="hold">
+                      <p:stCondLst>
+                        <p:cond delay="indefinite"/>
+                      </p:stCondLst>
+                      <p:childTnLst>
+                        <p:par>
+                          <p:cTn id="12" fill="hold">
+                            <p:stCondLst>
+                              <p:cond delay="0"/>
+                            </p:stCondLst>
+                            <p:childTnLst>
                               <p:par>
-                                <p:cTn id="11" presetID="1" presetClass="entr" presetSubtype="0" fill="hold" grpId="0" nodeType="withEffect">
+                                <p:cTn id="13" presetID="1" presetClass="entr" presetSubtype="0" fill="hold" grpId="0" nodeType="clickEffect">
                                   <p:stCondLst>
                                     <p:cond delay="0"/>
                                   </p:stCondLst>
                                   <p:childTnLst>
                                     <p:set>
                                       <p:cBhvr>
-                                        <p:cTn id="12" dur="1" fill="hold">
+                                        <p:cTn id="14" dur="1" fill="hold">
                                           <p:stCondLst>
                                             <p:cond delay="0"/>
                                           </p:stCondLst>
@@ -14777,26 +14891,8 @@
                                   </p:childTnLst>
                                 </p:cTn>
                               </p:par>
-                            </p:childTnLst>
-                          </p:cTn>
-                        </p:par>
-                      </p:childTnLst>
-                    </p:cTn>
-                  </p:par>
-                  <p:par>
-                    <p:cTn id="13" fill="hold">
-                      <p:stCondLst>
-                        <p:cond delay="indefinite"/>
-                      </p:stCondLst>
-                      <p:childTnLst>
-                        <p:par>
-                          <p:cTn id="14" fill="hold">
-                            <p:stCondLst>
-                              <p:cond delay="0"/>
-                            </p:stCondLst>
-                            <p:childTnLst>
                               <p:par>
-                                <p:cTn id="15" presetID="1" presetClass="entr" presetSubtype="0" fill="hold" grpId="0" nodeType="clickEffect">
+                                <p:cTn id="15" presetID="1" presetClass="entr" presetSubtype="0" fill="hold" grpId="0" nodeType="withEffect">
                                   <p:stCondLst>
                                     <p:cond delay="0"/>
                                   </p:stCondLst>
@@ -14812,6 +14908,153 @@
                                           <p:spTgt spid="3">
                                             <p:txEl>
                                               <p:pRg st="3" end="3"/>
+                                            </p:txEl>
+                                          </p:spTgt>
+                                        </p:tgtEl>
+                                        <p:attrNameLst>
+                                          <p:attrName>style.visibility</p:attrName>
+                                        </p:attrNameLst>
+                                      </p:cBhvr>
+                                      <p:to>
+                                        <p:strVal val="visible"/>
+                                      </p:to>
+                                    </p:set>
+                                  </p:childTnLst>
+                                </p:cTn>
+                              </p:par>
+                            </p:childTnLst>
+                          </p:cTn>
+                        </p:par>
+                      </p:childTnLst>
+                    </p:cTn>
+                  </p:par>
+                  <p:par>
+                    <p:cTn id="17" fill="hold">
+                      <p:stCondLst>
+                        <p:cond delay="indefinite"/>
+                      </p:stCondLst>
+                      <p:childTnLst>
+                        <p:par>
+                          <p:cTn id="18" fill="hold">
+                            <p:stCondLst>
+                              <p:cond delay="0"/>
+                            </p:stCondLst>
+                            <p:childTnLst>
+                              <p:par>
+                                <p:cTn id="19" presetID="1" presetClass="entr" presetSubtype="0" fill="hold" grpId="0" nodeType="clickEffect">
+                                  <p:stCondLst>
+                                    <p:cond delay="0"/>
+                                  </p:stCondLst>
+                                  <p:childTnLst>
+                                    <p:set>
+                                      <p:cBhvr>
+                                        <p:cTn id="20" dur="1" fill="hold">
+                                          <p:stCondLst>
+                                            <p:cond delay="0"/>
+                                          </p:stCondLst>
+                                        </p:cTn>
+                                        <p:tgtEl>
+                                          <p:spTgt spid="3">
+                                            <p:txEl>
+                                              <p:pRg st="4" end="4"/>
+                                            </p:txEl>
+                                          </p:spTgt>
+                                        </p:tgtEl>
+                                        <p:attrNameLst>
+                                          <p:attrName>style.visibility</p:attrName>
+                                        </p:attrNameLst>
+                                      </p:cBhvr>
+                                      <p:to>
+                                        <p:strVal val="visible"/>
+                                      </p:to>
+                                    </p:set>
+                                  </p:childTnLst>
+                                </p:cTn>
+                              </p:par>
+                            </p:childTnLst>
+                          </p:cTn>
+                        </p:par>
+                      </p:childTnLst>
+                    </p:cTn>
+                  </p:par>
+                  <p:par>
+                    <p:cTn id="21" fill="hold">
+                      <p:stCondLst>
+                        <p:cond delay="indefinite"/>
+                      </p:stCondLst>
+                      <p:childTnLst>
+                        <p:par>
+                          <p:cTn id="22" fill="hold">
+                            <p:stCondLst>
+                              <p:cond delay="0"/>
+                            </p:stCondLst>
+                            <p:childTnLst>
+                              <p:par>
+                                <p:cTn id="23" presetID="1" presetClass="entr" presetSubtype="0" fill="hold" grpId="0" nodeType="clickEffect">
+                                  <p:stCondLst>
+                                    <p:cond delay="0"/>
+                                  </p:stCondLst>
+                                  <p:childTnLst>
+                                    <p:set>
+                                      <p:cBhvr>
+                                        <p:cTn id="24" dur="1" fill="hold">
+                                          <p:stCondLst>
+                                            <p:cond delay="0"/>
+                                          </p:stCondLst>
+                                        </p:cTn>
+                                        <p:tgtEl>
+                                          <p:spTgt spid="3">
+                                            <p:txEl>
+                                              <p:pRg st="5" end="5"/>
+                                            </p:txEl>
+                                          </p:spTgt>
+                                        </p:tgtEl>
+                                        <p:attrNameLst>
+                                          <p:attrName>style.visibility</p:attrName>
+                                        </p:attrNameLst>
+                                      </p:cBhvr>
+                                      <p:to>
+                                        <p:strVal val="visible"/>
+                                      </p:to>
+                                    </p:set>
+                                  </p:childTnLst>
+                                </p:cTn>
+                              </p:par>
+                            </p:childTnLst>
+                          </p:cTn>
+                        </p:par>
+                      </p:childTnLst>
+                    </p:cTn>
+                  </p:par>
+                  <p:par>
+                    <p:cTn id="25" fill="hold">
+                      <p:stCondLst>
+                        <p:cond delay="indefinite"/>
+                      </p:stCondLst>
+                      <p:childTnLst>
+                        <p:par>
+                          <p:cTn id="26" fill="hold">
+                            <p:stCondLst>
+                              <p:cond delay="0"/>
+                            </p:stCondLst>
+                            <p:childTnLst>
+                              <p:par>
+                                <p:cTn id="27" presetID="1" presetClass="entr" presetSubtype="0" fill="hold" grpId="0" nodeType="clickEffect">
+                                  <p:stCondLst>
+                                    <p:cond delay="0"/>
+                                  </p:stCondLst>
+                                  <p:childTnLst>
+                                    <p:set>
+                                      <p:cBhvr>
+                                        <p:cTn id="28" dur="1" fill="hold">
+                                          <p:stCondLst>
+                                            <p:cond delay="0"/>
+                                          </p:stCondLst>
+                                        </p:cTn>
+                                        <p:tgtEl>
+                                          <p:spTgt spid="3">
+                                            <p:txEl>
+                                              <p:pRg st="6" end="6"/>
                                             </p:txEl>
                                           </p:spTgt>
                                         </p:tgtEl>
@@ -15794,7 +16037,7 @@
     </p:spTree>
     <p:extLst>
       <p:ext uri="{BB962C8B-B14F-4D97-AF65-F5344CB8AC3E}">
-        <p14:creationId xmlns:p14="http://schemas.microsoft.com/office/powerpoint/2010/main" xmlns="" val="2092770188"/>
+        <p14:creationId xmlns:p14="http://schemas.microsoft.com/office/powerpoint/2010/main" val="2092770188"/>
       </p:ext>
     </p:extLst>
   </p:cSld>
@@ -16136,7 +16379,7 @@
           <a:p>
             <a:r>
               <a:rPr lang="de-CH" dirty="0" smtClean="0"/>
-              <a:t>Programm Demo</a:t>
+              <a:t>Mögliche Erweiterungen</a:t>
             </a:r>
             <a:endParaRPr lang="de-CH" dirty="0"/>
           </a:p>
@@ -16157,6 +16400,762 @@
           <a:bodyPr/>
           <a:lstStyle/>
           <a:p>
+            <a:r>
+              <a:rPr lang="de-CH" dirty="0" smtClean="0"/>
+              <a:t>Bessere </a:t>
+            </a:r>
+            <a:r>
+              <a:rPr lang="de-CH" dirty="0" err="1" smtClean="0"/>
+              <a:t>Binarisierung</a:t>
+            </a:r>
+            <a:endParaRPr lang="de-CH" dirty="0" smtClean="0"/>
+          </a:p>
+          <a:p>
+            <a:r>
+              <a:rPr lang="de-CH" dirty="0" smtClean="0"/>
+              <a:t>Eigene Features erstellen und anwenden</a:t>
+            </a:r>
+            <a:endParaRPr lang="de-CH" dirty="0" smtClean="0"/>
+          </a:p>
+          <a:p>
+            <a:r>
+              <a:rPr lang="de-CH" dirty="0" smtClean="0"/>
+              <a:t>Nebst geometrischen Features auch Farbähnlichkeit berücksichtigen</a:t>
+            </a:r>
+          </a:p>
+          <a:p>
+            <a:r>
+              <a:rPr lang="de-CH" dirty="0" smtClean="0"/>
+              <a:t>Leerraum-Minimierung</a:t>
+            </a:r>
+            <a:endParaRPr lang="de-CH" dirty="0" smtClean="0"/>
+          </a:p>
+          <a:p>
+            <a:r>
+              <a:rPr lang="de-CH" dirty="0" smtClean="0"/>
+              <a:t>Puzzle automatisch zusammensetzen</a:t>
+            </a:r>
+            <a:endParaRPr lang="de-CH" dirty="0" smtClean="0"/>
+          </a:p>
+          <a:p>
+            <a:endParaRPr lang="de-CH" dirty="0" smtClean="0"/>
+          </a:p>
+          <a:p>
+            <a:endParaRPr lang="de-CH" dirty="0" smtClean="0"/>
+          </a:p>
+          <a:p>
+            <a:endParaRPr lang="de-CH" dirty="0"/>
+          </a:p>
+        </p:txBody>
+      </p:sp>
+      <p:pic>
+        <p:nvPicPr>
+          <p:cNvPr id="4" name="Picture 2" descr="http://www.transfer-21.de/_img/7c6e7b91.jpg"/>
+          <p:cNvPicPr>
+            <a:picLocks noChangeAspect="1" noChangeArrowheads="1"/>
+          </p:cNvPicPr>
+          <p:nvPr/>
+        </p:nvPicPr>
+        <p:blipFill rotWithShape="1">
+          <a:blip r:embed="rId2" cstate="print">
+            <a:extLst>
+              <a:ext uri="{BEBA8EAE-BF5A-486C-A8C5-ECC9F3942E4B}">
+                <a14:imgProps xmlns:a14="http://schemas.microsoft.com/office/drawing/2010/main">
+                  <a14:imgLayer r:embed="rId3">
+                    <a14:imgEffect>
+                      <a14:backgroundRemoval t="0" b="100000" l="0" r="100000">
+                        <a14:foregroundMark x1="32571" y1="42577" x2="32286" y2="92157"/>
+                        <a14:foregroundMark x1="17143" y1="55462" x2="45143" y2="79832"/>
+                        <a14:foregroundMark x1="46000" y1="55182" x2="17714" y2="83193"/>
+                        <a14:foregroundMark x1="32000" y1="42297" x2="32000" y2="42297"/>
+                        <a14:foregroundMark x1="27429" y1="42017" x2="27429" y2="42017"/>
+                        <a14:backgroundMark x1="92286" y1="91597" x2="79143" y2="10364"/>
+                        <a14:backgroundMark x1="88286" y1="89916" x2="67143" y2="2241"/>
+                        <a14:backgroundMark x1="84000" y1="94398" x2="58286" y2="3922"/>
+                        <a14:backgroundMark x1="74571" y1="94118" x2="52571" y2="10084"/>
+                        <a14:backgroundMark x1="70857" y1="93277" x2="45429" y2="18207"/>
+                        <a14:backgroundMark x1="61714" y1="94398" x2="53429" y2="63025"/>
+                        <a14:backgroundMark x1="23714" y1="12045" x2="46000" y2="40056"/>
+                        <a14:backgroundMark x1="12857" y1="15406" x2="46000" y2="47059"/>
+                        <a14:backgroundMark x1="7429" y1="27451" x2="25429" y2="45658"/>
+                        <a14:backgroundMark x1="9429" y1="43697" x2="16857" y2="44818"/>
+                        <a14:backgroundMark x1="11714" y1="50980" x2="17143" y2="49860"/>
+                        <a14:backgroundMark x1="48857" y1="87675" x2="52571" y2="81793"/>
+                      </a14:backgroundRemoval>
+                    </a14:imgEffect>
+                  </a14:imgLayer>
+                </a14:imgProps>
+              </a:ext>
+              <a:ext uri="{28A0092B-C50C-407E-A947-70E740481C1C}">
+                <a14:useLocalDpi xmlns:a14="http://schemas.microsoft.com/office/drawing/2010/main" val="0"/>
+              </a:ext>
+            </a:extLst>
+          </a:blip>
+          <a:srcRect l="13860" t="36472" r="50000" b="2715"/>
+          <a:stretch/>
+        </p:blipFill>
+        <p:spPr bwMode="auto">
+          <a:xfrm rot="2525426">
+            <a:off x="5998336" y="3778495"/>
+            <a:ext cx="798741" cy="1370926"/>
+          </a:xfrm>
+          <a:prstGeom prst="rect">
+            <a:avLst/>
+          </a:prstGeom>
+          <a:noFill/>
+          <a:extLst>
+            <a:ext uri="{909E8E84-426E-40DD-AFC4-6F175D3DCCD1}">
+              <a14:hiddenFill xmlns:a14="http://schemas.microsoft.com/office/drawing/2010/main">
+                <a:solidFill>
+                  <a:srgbClr val="FFFFFF"/>
+                </a:solidFill>
+              </a14:hiddenFill>
+            </a:ext>
+          </a:extLst>
+        </p:spPr>
+      </p:pic>
+      <p:pic>
+        <p:nvPicPr>
+          <p:cNvPr id="5" name="Picture 2" descr="http://www.transfer-21.de/_img/7c6e7b91.jpg"/>
+          <p:cNvPicPr>
+            <a:picLocks noChangeAspect="1" noChangeArrowheads="1"/>
+          </p:cNvPicPr>
+          <p:nvPr/>
+        </p:nvPicPr>
+        <p:blipFill rotWithShape="1">
+          <a:blip r:embed="rId4" cstate="print">
+            <a:extLst>
+              <a:ext uri="{BEBA8EAE-BF5A-486C-A8C5-ECC9F3942E4B}">
+                <a14:imgProps xmlns:a14="http://schemas.microsoft.com/office/drawing/2010/main">
+                  <a14:imgLayer r:embed="rId3">
+                    <a14:imgEffect>
+                      <a14:backgroundRemoval t="37255" b="85994" l="36286" r="100000">
+                        <a14:backgroundMark x1="44286" y1="81513" x2="42286" y2="85434"/>
+                        <a14:backgroundMark x1="48000" y1="80392" x2="47714" y2="86835"/>
+                        <a14:backgroundMark x1="81429" y1="50700" x2="87429" y2="49580"/>
+                        <a14:backgroundMark x1="55429" y1="48179" x2="45714" y2="50700"/>
+                        <a14:backgroundMark x1="46286" y1="47059" x2="48000" y2="55182"/>
+                      </a14:backgroundRemoval>
+                    </a14:imgEffect>
+                  </a14:imgLayer>
+                </a14:imgProps>
+              </a:ext>
+              <a:ext uri="{28A0092B-C50C-407E-A947-70E740481C1C}">
+                <a14:useLocalDpi xmlns:a14="http://schemas.microsoft.com/office/drawing/2010/main" val="0"/>
+              </a:ext>
+            </a:extLst>
+          </a:blip>
+          <a:srcRect l="36828" t="36401" b="10588"/>
+          <a:stretch/>
+        </p:blipFill>
+        <p:spPr bwMode="auto">
+          <a:xfrm rot="2525426">
+            <a:off x="7312754" y="3598807"/>
+            <a:ext cx="1396180" cy="1195039"/>
+          </a:xfrm>
+          <a:prstGeom prst="rect">
+            <a:avLst/>
+          </a:prstGeom>
+          <a:noFill/>
+          <a:extLst>
+            <a:ext uri="{909E8E84-426E-40DD-AFC4-6F175D3DCCD1}">
+              <a14:hiddenFill xmlns:a14="http://schemas.microsoft.com/office/drawing/2010/main">
+                <a:solidFill>
+                  <a:srgbClr val="FFFFFF"/>
+                </a:solidFill>
+              </a14:hiddenFill>
+            </a:ext>
+          </a:extLst>
+        </p:spPr>
+      </p:pic>
+    </p:spTree>
+    <p:extLst>
+      <p:ext uri="{BB962C8B-B14F-4D97-AF65-F5344CB8AC3E}">
+        <p14:creationId xmlns:p14="http://schemas.microsoft.com/office/powerpoint/2010/main" val="2693954274"/>
+      </p:ext>
+    </p:extLst>
+  </p:cSld>
+  <p:clrMapOvr>
+    <a:masterClrMapping/>
+  </p:clrMapOvr>
+  <p:timing>
+    <p:tnLst>
+      <p:par>
+        <p:cTn id="1" dur="indefinite" restart="never" nodeType="tmRoot">
+          <p:childTnLst>
+            <p:seq concurrent="1" nextAc="seek">
+              <p:cTn id="2" dur="indefinite" nodeType="mainSeq">
+                <p:childTnLst>
+                  <p:par>
+                    <p:cTn id="3" fill="hold">
+                      <p:stCondLst>
+                        <p:cond delay="indefinite"/>
+                      </p:stCondLst>
+                      <p:childTnLst>
+                        <p:par>
+                          <p:cTn id="4" fill="hold">
+                            <p:stCondLst>
+                              <p:cond delay="0"/>
+                            </p:stCondLst>
+                            <p:childTnLst>
+                              <p:par>
+                                <p:cTn id="5" presetID="1" presetClass="entr" presetSubtype="0" fill="hold" grpId="0" nodeType="clickEffect">
+                                  <p:stCondLst>
+                                    <p:cond delay="0"/>
+                                  </p:stCondLst>
+                                  <p:childTnLst>
+                                    <p:set>
+                                      <p:cBhvr>
+                                        <p:cTn id="6" dur="1" fill="hold">
+                                          <p:stCondLst>
+                                            <p:cond delay="0"/>
+                                          </p:stCondLst>
+                                        </p:cTn>
+                                        <p:tgtEl>
+                                          <p:spTgt spid="3">
+                                            <p:txEl>
+                                              <p:pRg st="0" end="0"/>
+                                            </p:txEl>
+                                          </p:spTgt>
+                                        </p:tgtEl>
+                                        <p:attrNameLst>
+                                          <p:attrName>style.visibility</p:attrName>
+                                        </p:attrNameLst>
+                                      </p:cBhvr>
+                                      <p:to>
+                                        <p:strVal val="visible"/>
+                                      </p:to>
+                                    </p:set>
+                                  </p:childTnLst>
+                                </p:cTn>
+                              </p:par>
+                            </p:childTnLst>
+                          </p:cTn>
+                        </p:par>
+                      </p:childTnLst>
+                    </p:cTn>
+                  </p:par>
+                  <p:par>
+                    <p:cTn id="7" fill="hold">
+                      <p:stCondLst>
+                        <p:cond delay="indefinite"/>
+                      </p:stCondLst>
+                      <p:childTnLst>
+                        <p:par>
+                          <p:cTn id="8" fill="hold">
+                            <p:stCondLst>
+                              <p:cond delay="0"/>
+                            </p:stCondLst>
+                            <p:childTnLst>
+                              <p:par>
+                                <p:cTn id="9" presetID="1" presetClass="entr" presetSubtype="0" fill="hold" grpId="0" nodeType="clickEffect">
+                                  <p:stCondLst>
+                                    <p:cond delay="0"/>
+                                  </p:stCondLst>
+                                  <p:childTnLst>
+                                    <p:set>
+                                      <p:cBhvr>
+                                        <p:cTn id="10" dur="1" fill="hold">
+                                          <p:stCondLst>
+                                            <p:cond delay="0"/>
+                                          </p:stCondLst>
+                                        </p:cTn>
+                                        <p:tgtEl>
+                                          <p:spTgt spid="3">
+                                            <p:txEl>
+                                              <p:pRg st="1" end="1"/>
+                                            </p:txEl>
+                                          </p:spTgt>
+                                        </p:tgtEl>
+                                        <p:attrNameLst>
+                                          <p:attrName>style.visibility</p:attrName>
+                                        </p:attrNameLst>
+                                      </p:cBhvr>
+                                      <p:to>
+                                        <p:strVal val="visible"/>
+                                      </p:to>
+                                    </p:set>
+                                  </p:childTnLst>
+                                </p:cTn>
+                              </p:par>
+                            </p:childTnLst>
+                          </p:cTn>
+                        </p:par>
+                      </p:childTnLst>
+                    </p:cTn>
+                  </p:par>
+                  <p:par>
+                    <p:cTn id="11" fill="hold">
+                      <p:stCondLst>
+                        <p:cond delay="indefinite"/>
+                      </p:stCondLst>
+                      <p:childTnLst>
+                        <p:par>
+                          <p:cTn id="12" fill="hold">
+                            <p:stCondLst>
+                              <p:cond delay="0"/>
+                            </p:stCondLst>
+                            <p:childTnLst>
+                              <p:par>
+                                <p:cTn id="13" presetID="1" presetClass="entr" presetSubtype="0" fill="hold" grpId="0" nodeType="clickEffect">
+                                  <p:stCondLst>
+                                    <p:cond delay="0"/>
+                                  </p:stCondLst>
+                                  <p:childTnLst>
+                                    <p:set>
+                                      <p:cBhvr>
+                                        <p:cTn id="14" dur="1" fill="hold">
+                                          <p:stCondLst>
+                                            <p:cond delay="0"/>
+                                          </p:stCondLst>
+                                        </p:cTn>
+                                        <p:tgtEl>
+                                          <p:spTgt spid="3">
+                                            <p:txEl>
+                                              <p:pRg st="2" end="2"/>
+                                            </p:txEl>
+                                          </p:spTgt>
+                                        </p:tgtEl>
+                                        <p:attrNameLst>
+                                          <p:attrName>style.visibility</p:attrName>
+                                        </p:attrNameLst>
+                                      </p:cBhvr>
+                                      <p:to>
+                                        <p:strVal val="visible"/>
+                                      </p:to>
+                                    </p:set>
+                                  </p:childTnLst>
+                                </p:cTn>
+                              </p:par>
+                            </p:childTnLst>
+                          </p:cTn>
+                        </p:par>
+                      </p:childTnLst>
+                    </p:cTn>
+                  </p:par>
+                  <p:par>
+                    <p:cTn id="15" fill="hold">
+                      <p:stCondLst>
+                        <p:cond delay="indefinite"/>
+                      </p:stCondLst>
+                      <p:childTnLst>
+                        <p:par>
+                          <p:cTn id="16" fill="hold">
+                            <p:stCondLst>
+                              <p:cond delay="0"/>
+                            </p:stCondLst>
+                            <p:childTnLst>
+                              <p:par>
+                                <p:cTn id="17" presetID="1" presetClass="entr" presetSubtype="0" fill="hold" grpId="0" nodeType="clickEffect">
+                                  <p:stCondLst>
+                                    <p:cond delay="0"/>
+                                  </p:stCondLst>
+                                  <p:childTnLst>
+                                    <p:set>
+                                      <p:cBhvr>
+                                        <p:cTn id="18" dur="1" fill="hold">
+                                          <p:stCondLst>
+                                            <p:cond delay="0"/>
+                                          </p:stCondLst>
+                                        </p:cTn>
+                                        <p:tgtEl>
+                                          <p:spTgt spid="3">
+                                            <p:txEl>
+                                              <p:pRg st="3" end="3"/>
+                                            </p:txEl>
+                                          </p:spTgt>
+                                        </p:tgtEl>
+                                        <p:attrNameLst>
+                                          <p:attrName>style.visibility</p:attrName>
+                                        </p:attrNameLst>
+                                      </p:cBhvr>
+                                      <p:to>
+                                        <p:strVal val="visible"/>
+                                      </p:to>
+                                    </p:set>
+                                  </p:childTnLst>
+                                </p:cTn>
+                              </p:par>
+                            </p:childTnLst>
+                          </p:cTn>
+                        </p:par>
+                      </p:childTnLst>
+                    </p:cTn>
+                  </p:par>
+                  <p:par>
+                    <p:cTn id="19" fill="hold">
+                      <p:stCondLst>
+                        <p:cond delay="indefinite"/>
+                      </p:stCondLst>
+                      <p:childTnLst>
+                        <p:par>
+                          <p:cTn id="20" fill="hold">
+                            <p:stCondLst>
+                              <p:cond delay="0"/>
+                            </p:stCondLst>
+                            <p:childTnLst>
+                              <p:par>
+                                <p:cTn id="21" presetID="1" presetClass="entr" presetSubtype="0" fill="hold" grpId="0" nodeType="clickEffect">
+                                  <p:stCondLst>
+                                    <p:cond delay="0"/>
+                                  </p:stCondLst>
+                                  <p:childTnLst>
+                                    <p:set>
+                                      <p:cBhvr>
+                                        <p:cTn id="22" dur="1" fill="hold">
+                                          <p:stCondLst>
+                                            <p:cond delay="0"/>
+                                          </p:stCondLst>
+                                        </p:cTn>
+                                        <p:tgtEl>
+                                          <p:spTgt spid="3">
+                                            <p:txEl>
+                                              <p:pRg st="4" end="4"/>
+                                            </p:txEl>
+                                          </p:spTgt>
+                                        </p:tgtEl>
+                                        <p:attrNameLst>
+                                          <p:attrName>style.visibility</p:attrName>
+                                        </p:attrNameLst>
+                                      </p:cBhvr>
+                                      <p:to>
+                                        <p:strVal val="visible"/>
+                                      </p:to>
+                                    </p:set>
+                                  </p:childTnLst>
+                                </p:cTn>
+                              </p:par>
+                            </p:childTnLst>
+                          </p:cTn>
+                        </p:par>
+                      </p:childTnLst>
+                    </p:cTn>
+                  </p:par>
+                </p:childTnLst>
+              </p:cTn>
+              <p:prevCondLst>
+                <p:cond evt="onPrev" delay="0">
+                  <p:tgtEl>
+                    <p:sldTgt/>
+                  </p:tgtEl>
+                </p:cond>
+              </p:prevCondLst>
+              <p:nextCondLst>
+                <p:cond evt="onNext" delay="0">
+                  <p:tgtEl>
+                    <p:sldTgt/>
+                  </p:tgtEl>
+                </p:cond>
+              </p:nextCondLst>
+            </p:seq>
+          </p:childTnLst>
+        </p:cTn>
+      </p:par>
+    </p:tnLst>
+    <p:bldLst>
+      <p:bldP spid="3" grpId="0" build="p"/>
+    </p:bldLst>
+  </p:timing>
+</p:sld>
+</file>
+
+<file path=ppt/slides/slide22.xml><?xml version="1.0" encoding="utf-8"?>
+<p:sld xmlns:a="http://schemas.openxmlformats.org/drawingml/2006/main" xmlns:r="http://schemas.openxmlformats.org/officeDocument/2006/relationships" xmlns:p="http://schemas.openxmlformats.org/presentationml/2006/main">
+  <p:cSld>
+    <p:spTree>
+      <p:nvGrpSpPr>
+        <p:cNvPr id="1" name=""/>
+        <p:cNvGrpSpPr/>
+        <p:nvPr/>
+      </p:nvGrpSpPr>
+      <p:grpSpPr>
+        <a:xfrm>
+          <a:off x="0" y="0"/>
+          <a:ext cx="0" cy="0"/>
+          <a:chOff x="0" y="0"/>
+          <a:chExt cx="0" cy="0"/>
+        </a:xfrm>
+      </p:grpSpPr>
+      <p:sp>
+        <p:nvSpPr>
+          <p:cNvPr id="2" name="Titel 1"/>
+          <p:cNvSpPr>
+            <a:spLocks noGrp="1"/>
+          </p:cNvSpPr>
+          <p:nvPr>
+            <p:ph type="title"/>
+          </p:nvPr>
+        </p:nvSpPr>
+        <p:spPr/>
+        <p:txBody>
+          <a:bodyPr/>
+          <a:lstStyle/>
+          <a:p>
+            <a:r>
+              <a:rPr lang="de-CH" dirty="0" smtClean="0"/>
+              <a:t>Fazit</a:t>
+            </a:r>
+            <a:endParaRPr lang="de-CH" dirty="0"/>
+          </a:p>
+        </p:txBody>
+      </p:sp>
+      <p:sp>
+        <p:nvSpPr>
+          <p:cNvPr id="3" name="Inhaltsplatzhalter 2"/>
+          <p:cNvSpPr>
+            <a:spLocks noGrp="1"/>
+          </p:cNvSpPr>
+          <p:nvPr>
+            <p:ph sz="quarter" idx="13"/>
+          </p:nvPr>
+        </p:nvSpPr>
+        <p:spPr/>
+        <p:txBody>
+          <a:bodyPr/>
+          <a:lstStyle/>
+          <a:p>
+            <a:r>
+              <a:rPr lang="de-CH" dirty="0" err="1" smtClean="0"/>
+              <a:t>Qt</a:t>
+            </a:r>
+            <a:r>
+              <a:rPr lang="de-CH" dirty="0" smtClean="0"/>
+              <a:t> und </a:t>
+            </a:r>
+            <a:r>
+              <a:rPr lang="de-CH" dirty="0" err="1" smtClean="0"/>
+              <a:t>OpenCV</a:t>
+            </a:r>
+            <a:r>
+              <a:rPr lang="de-CH" dirty="0" smtClean="0"/>
+              <a:t> sehr umfangreich</a:t>
+            </a:r>
+          </a:p>
+          <a:p>
+            <a:r>
+              <a:rPr lang="de-CH" dirty="0" smtClean="0"/>
+              <a:t>Viele Funktionen</a:t>
+            </a:r>
+          </a:p>
+          <a:p>
+            <a:r>
+              <a:rPr lang="de-CH" dirty="0" smtClean="0"/>
+              <a:t>C++ </a:t>
+            </a:r>
+          </a:p>
+          <a:p>
+            <a:r>
+              <a:rPr lang="de-CH" dirty="0" smtClean="0"/>
+              <a:t>Guter Einstieg in die Bildverarbeitung</a:t>
+            </a:r>
+            <a:endParaRPr lang="de-CH" dirty="0" smtClean="0"/>
+          </a:p>
+          <a:p>
+            <a:endParaRPr lang="de-CH" dirty="0" smtClean="0"/>
+          </a:p>
+          <a:p>
+            <a:endParaRPr lang="de-CH" dirty="0" smtClean="0"/>
+          </a:p>
+          <a:p>
+            <a:endParaRPr lang="de-CH" dirty="0"/>
+          </a:p>
+        </p:txBody>
+      </p:sp>
+      <p:pic>
+        <p:nvPicPr>
+          <p:cNvPr id="4" name="Picture 2" descr="http://www.transfer-21.de/_img/7c6e7b91.jpg"/>
+          <p:cNvPicPr>
+            <a:picLocks noChangeAspect="1" noChangeArrowheads="1"/>
+          </p:cNvPicPr>
+          <p:nvPr/>
+        </p:nvPicPr>
+        <p:blipFill rotWithShape="1">
+          <a:blip r:embed="rId2" cstate="print">
+            <a:extLst>
+              <a:ext uri="{BEBA8EAE-BF5A-486C-A8C5-ECC9F3942E4B}">
+                <a14:imgProps xmlns:a14="http://schemas.microsoft.com/office/drawing/2010/main">
+                  <a14:imgLayer r:embed="rId3">
+                    <a14:imgEffect>
+                      <a14:backgroundRemoval t="0" b="100000" l="0" r="100000">
+                        <a14:foregroundMark x1="32571" y1="42577" x2="32286" y2="92157"/>
+                        <a14:foregroundMark x1="17143" y1="55462" x2="45143" y2="79832"/>
+                        <a14:foregroundMark x1="46000" y1="55182" x2="17714" y2="83193"/>
+                        <a14:foregroundMark x1="32000" y1="42297" x2="32000" y2="42297"/>
+                        <a14:foregroundMark x1="27429" y1="42017" x2="27429" y2="42017"/>
+                        <a14:backgroundMark x1="92286" y1="91597" x2="79143" y2="10364"/>
+                        <a14:backgroundMark x1="88286" y1="89916" x2="67143" y2="2241"/>
+                        <a14:backgroundMark x1="84000" y1="94398" x2="58286" y2="3922"/>
+                        <a14:backgroundMark x1="74571" y1="94118" x2="52571" y2="10084"/>
+                        <a14:backgroundMark x1="70857" y1="93277" x2="45429" y2="18207"/>
+                        <a14:backgroundMark x1="61714" y1="94398" x2="53429" y2="63025"/>
+                        <a14:backgroundMark x1="23714" y1="12045" x2="46000" y2="40056"/>
+                        <a14:backgroundMark x1="12857" y1="15406" x2="46000" y2="47059"/>
+                        <a14:backgroundMark x1="7429" y1="27451" x2="25429" y2="45658"/>
+                        <a14:backgroundMark x1="9429" y1="43697" x2="16857" y2="44818"/>
+                        <a14:backgroundMark x1="11714" y1="50980" x2="17143" y2="49860"/>
+                        <a14:backgroundMark x1="48857" y1="87675" x2="52571" y2="81793"/>
+                      </a14:backgroundRemoval>
+                    </a14:imgEffect>
+                  </a14:imgLayer>
+                </a14:imgProps>
+              </a:ext>
+              <a:ext uri="{28A0092B-C50C-407E-A947-70E740481C1C}">
+                <a14:useLocalDpi xmlns:a14="http://schemas.microsoft.com/office/drawing/2010/main" val="0"/>
+              </a:ext>
+            </a:extLst>
+          </a:blip>
+          <a:srcRect l="13860" t="36472" r="50000" b="2715"/>
+          <a:stretch/>
+        </p:blipFill>
+        <p:spPr bwMode="auto">
+          <a:xfrm rot="2525426">
+            <a:off x="5998336" y="3778495"/>
+            <a:ext cx="798741" cy="1370926"/>
+          </a:xfrm>
+          <a:prstGeom prst="rect">
+            <a:avLst/>
+          </a:prstGeom>
+          <a:noFill/>
+          <a:extLst>
+            <a:ext uri="{909E8E84-426E-40DD-AFC4-6F175D3DCCD1}">
+              <a14:hiddenFill xmlns:a14="http://schemas.microsoft.com/office/drawing/2010/main">
+                <a:solidFill>
+                  <a:srgbClr val="FFFFFF"/>
+                </a:solidFill>
+              </a14:hiddenFill>
+            </a:ext>
+          </a:extLst>
+        </p:spPr>
+      </p:pic>
+      <p:pic>
+        <p:nvPicPr>
+          <p:cNvPr id="5" name="Picture 2" descr="http://www.transfer-21.de/_img/7c6e7b91.jpg"/>
+          <p:cNvPicPr>
+            <a:picLocks noChangeAspect="1" noChangeArrowheads="1"/>
+          </p:cNvPicPr>
+          <p:nvPr/>
+        </p:nvPicPr>
+        <p:blipFill rotWithShape="1">
+          <a:blip r:embed="rId4" cstate="print">
+            <a:extLst>
+              <a:ext uri="{BEBA8EAE-BF5A-486C-A8C5-ECC9F3942E4B}">
+                <a14:imgProps xmlns:a14="http://schemas.microsoft.com/office/drawing/2010/main">
+                  <a14:imgLayer r:embed="rId3">
+                    <a14:imgEffect>
+                      <a14:backgroundRemoval t="37255" b="85994" l="36286" r="100000">
+                        <a14:backgroundMark x1="44286" y1="81513" x2="42286" y2="85434"/>
+                        <a14:backgroundMark x1="48000" y1="80392" x2="47714" y2="86835"/>
+                        <a14:backgroundMark x1="81429" y1="50700" x2="87429" y2="49580"/>
+                        <a14:backgroundMark x1="55429" y1="48179" x2="45714" y2="50700"/>
+                        <a14:backgroundMark x1="46286" y1="47059" x2="48000" y2="55182"/>
+                      </a14:backgroundRemoval>
+                    </a14:imgEffect>
+                  </a14:imgLayer>
+                </a14:imgProps>
+              </a:ext>
+              <a:ext uri="{28A0092B-C50C-407E-A947-70E740481C1C}">
+                <a14:useLocalDpi xmlns:a14="http://schemas.microsoft.com/office/drawing/2010/main" val="0"/>
+              </a:ext>
+            </a:extLst>
+          </a:blip>
+          <a:srcRect l="36828" t="36401" b="10588"/>
+          <a:stretch/>
+        </p:blipFill>
+        <p:spPr bwMode="auto">
+          <a:xfrm rot="2525426">
+            <a:off x="7312754" y="3598807"/>
+            <a:ext cx="1396180" cy="1195039"/>
+          </a:xfrm>
+          <a:prstGeom prst="rect">
+            <a:avLst/>
+          </a:prstGeom>
+          <a:noFill/>
+          <a:extLst>
+            <a:ext uri="{909E8E84-426E-40DD-AFC4-6F175D3DCCD1}">
+              <a14:hiddenFill xmlns:a14="http://schemas.microsoft.com/office/drawing/2010/main">
+                <a:solidFill>
+                  <a:srgbClr val="FFFFFF"/>
+                </a:solidFill>
+              </a14:hiddenFill>
+            </a:ext>
+          </a:extLst>
+        </p:spPr>
+      </p:pic>
+    </p:spTree>
+    <p:extLst>
+      <p:ext uri="{BB962C8B-B14F-4D97-AF65-F5344CB8AC3E}">
+        <p14:creationId xmlns:p14="http://schemas.microsoft.com/office/powerpoint/2010/main" val="3826276694"/>
+      </p:ext>
+    </p:extLst>
+  </p:cSld>
+  <p:clrMapOvr>
+    <a:masterClrMapping/>
+  </p:clrMapOvr>
+  <p:timing>
+    <p:tnLst>
+      <p:par>
+        <p:cTn id="1" dur="indefinite" restart="never" nodeType="tmRoot"/>
+      </p:par>
+    </p:tnLst>
+  </p:timing>
+</p:sld>
+</file>
+
+<file path=ppt/slides/slide23.xml><?xml version="1.0" encoding="utf-8"?>
+<p:sld xmlns:a="http://schemas.openxmlformats.org/drawingml/2006/main" xmlns:r="http://schemas.openxmlformats.org/officeDocument/2006/relationships" xmlns:p="http://schemas.openxmlformats.org/presentationml/2006/main">
+  <p:cSld>
+    <p:spTree>
+      <p:nvGrpSpPr>
+        <p:cNvPr id="1" name=""/>
+        <p:cNvGrpSpPr/>
+        <p:nvPr/>
+      </p:nvGrpSpPr>
+      <p:grpSpPr>
+        <a:xfrm>
+          <a:off x="0" y="0"/>
+          <a:ext cx="0" cy="0"/>
+          <a:chOff x="0" y="0"/>
+          <a:chExt cx="0" cy="0"/>
+        </a:xfrm>
+      </p:grpSpPr>
+      <p:sp>
+        <p:nvSpPr>
+          <p:cNvPr id="2" name="Titel 1"/>
+          <p:cNvSpPr>
+            <a:spLocks noGrp="1"/>
+          </p:cNvSpPr>
+          <p:nvPr>
+            <p:ph type="title"/>
+          </p:nvPr>
+        </p:nvSpPr>
+        <p:spPr/>
+        <p:txBody>
+          <a:bodyPr/>
+          <a:lstStyle/>
+          <a:p>
+            <a:r>
+              <a:rPr lang="de-CH" dirty="0" smtClean="0"/>
+              <a:t>Programm Demo</a:t>
+            </a:r>
+            <a:endParaRPr lang="de-CH" dirty="0"/>
+          </a:p>
+        </p:txBody>
+      </p:sp>
+      <p:sp>
+        <p:nvSpPr>
+          <p:cNvPr id="3" name="Inhaltsplatzhalter 2"/>
+          <p:cNvSpPr>
+            <a:spLocks noGrp="1"/>
+          </p:cNvSpPr>
+          <p:nvPr>
+            <p:ph sz="quarter" idx="13"/>
+          </p:nvPr>
+        </p:nvSpPr>
+        <p:spPr/>
+        <p:txBody>
+          <a:bodyPr/>
+          <a:lstStyle/>
+          <a:p>
             <a:endParaRPr lang="de-CH" dirty="0" smtClean="0"/>
           </a:p>
           <a:p>
@@ -16176,7 +17175,7 @@
           <a:blip r:embed="rId2" cstate="screen">
             <a:extLst>
               <a:ext uri="{28A0092B-C50C-407E-A947-70E740481C1C}">
-                <a14:useLocalDpi xmlns:a14="http://schemas.microsoft.com/office/drawing/2010/main" xmlns="" val="0"/>
+                <a14:useLocalDpi xmlns:a14="http://schemas.microsoft.com/office/drawing/2010/main" val="0"/>
               </a:ext>
             </a:extLst>
           </a:blip>
@@ -16201,7 +17200,7 @@
           </a:effectLst>
           <a:extLst>
             <a:ext uri="{909E8E84-426E-40DD-AFC4-6F175D3DCCD1}">
-              <a14:hiddenFill xmlns:a14="http://schemas.microsoft.com/office/drawing/2010/main" xmlns="">
+              <a14:hiddenFill xmlns:a14="http://schemas.microsoft.com/office/drawing/2010/main">
                 <a:solidFill>
                   <a:srgbClr val="FFFFFF"/>
                 </a:solidFill>
@@ -16213,7 +17212,7 @@
     </p:spTree>
     <p:extLst>
       <p:ext uri="{BB962C8B-B14F-4D97-AF65-F5344CB8AC3E}">
-        <p14:creationId xmlns:p14="http://schemas.microsoft.com/office/powerpoint/2010/main" xmlns="" val="1595990863"/>
+        <p14:creationId xmlns:p14="http://schemas.microsoft.com/office/powerpoint/2010/main" val="1595990863"/>
       </p:ext>
     </p:extLst>
   </p:cSld>
@@ -16287,15 +17286,7 @@
           <a:p>
             <a:r>
               <a:rPr lang="de-CH" dirty="0" smtClean="0"/>
-              <a:t>Viele </a:t>
-            </a:r>
-            <a:r>
-              <a:rPr lang="de-CH" dirty="0" smtClean="0"/>
-              <a:t>verschiedene </a:t>
-            </a:r>
-            <a:r>
-              <a:rPr lang="de-CH" dirty="0" smtClean="0"/>
-              <a:t>Projekte</a:t>
+              <a:t>Viele verschiedene Projekte</a:t>
             </a:r>
           </a:p>
           <a:p>
@@ -16364,7 +17355,7 @@
           <a:blip r:embed="rId2" cstate="print">
             <a:extLst>
               <a:ext uri="{BEBA8EAE-BF5A-486C-A8C5-ECC9F3942E4B}">
-                <a14:imgProps xmlns:a14="http://schemas.microsoft.com/office/drawing/2010/main" xmlns="">
+                <a14:imgProps xmlns:a14="http://schemas.microsoft.com/office/drawing/2010/main">
                   <a14:imgLayer r:embed="rId3">
                     <a14:imgEffect>
                       <a14:backgroundRemoval t="0" b="100000" l="0" r="100000">
@@ -16391,7 +17382,7 @@
                 </a14:imgProps>
               </a:ext>
               <a:ext uri="{28A0092B-C50C-407E-A947-70E740481C1C}">
-                <a14:useLocalDpi xmlns:a14="http://schemas.microsoft.com/office/drawing/2010/main" xmlns="" val="0"/>
+                <a14:useLocalDpi xmlns:a14="http://schemas.microsoft.com/office/drawing/2010/main" val="0"/>
               </a:ext>
             </a:extLst>
           </a:blip>
@@ -16409,7 +17400,7 @@
           <a:noFill/>
           <a:extLst>
             <a:ext uri="{909E8E84-426E-40DD-AFC4-6F175D3DCCD1}">
-              <a14:hiddenFill xmlns:a14="http://schemas.microsoft.com/office/drawing/2010/main" xmlns="">
+              <a14:hiddenFill xmlns:a14="http://schemas.microsoft.com/office/drawing/2010/main">
                 <a:solidFill>
                   <a:srgbClr val="FFFFFF"/>
                 </a:solidFill>
@@ -16430,7 +17421,7 @@
           <a:blip r:embed="rId4" cstate="print">
             <a:extLst>
               <a:ext uri="{BEBA8EAE-BF5A-486C-A8C5-ECC9F3942E4B}">
-                <a14:imgProps xmlns:a14="http://schemas.microsoft.com/office/drawing/2010/main" xmlns="">
+                <a14:imgProps xmlns:a14="http://schemas.microsoft.com/office/drawing/2010/main">
                   <a14:imgLayer r:embed="rId3">
                     <a14:imgEffect>
                       <a14:backgroundRemoval t="37255" b="85994" l="36286" r="100000">
@@ -16445,7 +17436,7 @@
                 </a14:imgProps>
               </a:ext>
               <a:ext uri="{28A0092B-C50C-407E-A947-70E740481C1C}">
-                <a14:useLocalDpi xmlns:a14="http://schemas.microsoft.com/office/drawing/2010/main" xmlns="" val="0"/>
+                <a14:useLocalDpi xmlns:a14="http://schemas.microsoft.com/office/drawing/2010/main" val="0"/>
               </a:ext>
             </a:extLst>
           </a:blip>
@@ -16463,7 +17454,7 @@
           <a:noFill/>
           <a:extLst>
             <a:ext uri="{909E8E84-426E-40DD-AFC4-6F175D3DCCD1}">
-              <a14:hiddenFill xmlns:a14="http://schemas.microsoft.com/office/drawing/2010/main" xmlns="">
+              <a14:hiddenFill xmlns:a14="http://schemas.microsoft.com/office/drawing/2010/main">
                 <a:solidFill>
                   <a:srgbClr val="FFFFFF"/>
                 </a:solidFill>
@@ -16475,7 +17466,7 @@
     </p:spTree>
     <p:extLst>
       <p:ext uri="{BB962C8B-B14F-4D97-AF65-F5344CB8AC3E}">
-        <p14:creationId xmlns:p14="http://schemas.microsoft.com/office/powerpoint/2010/main" xmlns="" val="1599884037"/>
+        <p14:creationId xmlns:p14="http://schemas.microsoft.com/office/powerpoint/2010/main" val="1599884037"/>
       </p:ext>
     </p:extLst>
   </p:cSld>
@@ -16938,7 +17929,7 @@
           <a:blip r:embed="rId2" cstate="print">
             <a:extLst>
               <a:ext uri="{BEBA8EAE-BF5A-486C-A8C5-ECC9F3942E4B}">
-                <a14:imgProps xmlns:a14="http://schemas.microsoft.com/office/drawing/2010/main" xmlns="">
+                <a14:imgProps xmlns:a14="http://schemas.microsoft.com/office/drawing/2010/main">
                   <a14:imgLayer r:embed="rId3">
                     <a14:imgEffect>
                       <a14:backgroundRemoval t="0" b="100000" l="0" r="100000">
@@ -16965,7 +17956,7 @@
                 </a14:imgProps>
               </a:ext>
               <a:ext uri="{28A0092B-C50C-407E-A947-70E740481C1C}">
-                <a14:useLocalDpi xmlns:a14="http://schemas.microsoft.com/office/drawing/2010/main" xmlns="" val="0"/>
+                <a14:useLocalDpi xmlns:a14="http://schemas.microsoft.com/office/drawing/2010/main" val="0"/>
               </a:ext>
             </a:extLst>
           </a:blip>
@@ -16983,7 +17974,7 @@
           <a:noFill/>
           <a:extLst>
             <a:ext uri="{909E8E84-426E-40DD-AFC4-6F175D3DCCD1}">
-              <a14:hiddenFill xmlns:a14="http://schemas.microsoft.com/office/drawing/2010/main" xmlns="">
+              <a14:hiddenFill xmlns:a14="http://schemas.microsoft.com/office/drawing/2010/main">
                 <a:solidFill>
                   <a:srgbClr val="FFFFFF"/>
                 </a:solidFill>
@@ -17004,7 +17995,7 @@
           <a:blip r:embed="rId4" cstate="print">
             <a:extLst>
               <a:ext uri="{BEBA8EAE-BF5A-486C-A8C5-ECC9F3942E4B}">
-                <a14:imgProps xmlns:a14="http://schemas.microsoft.com/office/drawing/2010/main" xmlns="">
+                <a14:imgProps xmlns:a14="http://schemas.microsoft.com/office/drawing/2010/main">
                   <a14:imgLayer r:embed="rId3">
                     <a14:imgEffect>
                       <a14:backgroundRemoval t="37255" b="85994" l="36286" r="100000">
@@ -17019,7 +18010,7 @@
                 </a14:imgProps>
               </a:ext>
               <a:ext uri="{28A0092B-C50C-407E-A947-70E740481C1C}">
-                <a14:useLocalDpi xmlns:a14="http://schemas.microsoft.com/office/drawing/2010/main" xmlns="" val="0"/>
+                <a14:useLocalDpi xmlns:a14="http://schemas.microsoft.com/office/drawing/2010/main" val="0"/>
               </a:ext>
             </a:extLst>
           </a:blip>
@@ -17037,7 +18028,7 @@
           <a:noFill/>
           <a:extLst>
             <a:ext uri="{909E8E84-426E-40DD-AFC4-6F175D3DCCD1}">
-              <a14:hiddenFill xmlns:a14="http://schemas.microsoft.com/office/drawing/2010/main" xmlns="">
+              <a14:hiddenFill xmlns:a14="http://schemas.microsoft.com/office/drawing/2010/main">
                 <a:solidFill>
                   <a:srgbClr val="FFFFFF"/>
                 </a:solidFill>
@@ -17183,7 +18174,7 @@
     </p:spTree>
     <p:extLst>
       <p:ext uri="{BB962C8B-B14F-4D97-AF65-F5344CB8AC3E}">
-        <p14:creationId xmlns:p14="http://schemas.microsoft.com/office/powerpoint/2010/main" xmlns="" val="2756733679"/>
+        <p14:creationId xmlns:p14="http://schemas.microsoft.com/office/powerpoint/2010/main" val="2756733679"/>
       </p:ext>
     </p:extLst>
   </p:cSld>
@@ -17390,7 +18381,7 @@
           <a:blip r:embed="rId2" cstate="print">
             <a:extLst>
               <a:ext uri="{BEBA8EAE-BF5A-486C-A8C5-ECC9F3942E4B}">
-                <a14:imgProps xmlns:a14="http://schemas.microsoft.com/office/drawing/2010/main" xmlns="">
+                <a14:imgProps xmlns:a14="http://schemas.microsoft.com/office/drawing/2010/main">
                   <a14:imgLayer r:embed="rId3">
                     <a14:imgEffect>
                       <a14:backgroundRemoval t="0" b="100000" l="0" r="100000">
@@ -17417,7 +18408,7 @@
                 </a14:imgProps>
               </a:ext>
               <a:ext uri="{28A0092B-C50C-407E-A947-70E740481C1C}">
-                <a14:useLocalDpi xmlns:a14="http://schemas.microsoft.com/office/drawing/2010/main" xmlns="" val="0"/>
+                <a14:useLocalDpi xmlns:a14="http://schemas.microsoft.com/office/drawing/2010/main" val="0"/>
               </a:ext>
             </a:extLst>
           </a:blip>
@@ -17435,7 +18426,7 @@
           <a:noFill/>
           <a:extLst>
             <a:ext uri="{909E8E84-426E-40DD-AFC4-6F175D3DCCD1}">
-              <a14:hiddenFill xmlns:a14="http://schemas.microsoft.com/office/drawing/2010/main" xmlns="">
+              <a14:hiddenFill xmlns:a14="http://schemas.microsoft.com/office/drawing/2010/main">
                 <a:solidFill>
                   <a:srgbClr val="FFFFFF"/>
                 </a:solidFill>
@@ -17456,7 +18447,7 @@
           <a:blip r:embed="rId4" cstate="print">
             <a:extLst>
               <a:ext uri="{BEBA8EAE-BF5A-486C-A8C5-ECC9F3942E4B}">
-                <a14:imgProps xmlns:a14="http://schemas.microsoft.com/office/drawing/2010/main" xmlns="">
+                <a14:imgProps xmlns:a14="http://schemas.microsoft.com/office/drawing/2010/main">
                   <a14:imgLayer r:embed="rId3">
                     <a14:imgEffect>
                       <a14:backgroundRemoval t="37255" b="85994" l="36286" r="100000">
@@ -17471,7 +18462,7 @@
                 </a14:imgProps>
               </a:ext>
               <a:ext uri="{28A0092B-C50C-407E-A947-70E740481C1C}">
-                <a14:useLocalDpi xmlns:a14="http://schemas.microsoft.com/office/drawing/2010/main" xmlns="" val="0"/>
+                <a14:useLocalDpi xmlns:a14="http://schemas.microsoft.com/office/drawing/2010/main" val="0"/>
               </a:ext>
             </a:extLst>
           </a:blip>
@@ -17489,7 +18480,7 @@
           <a:noFill/>
           <a:extLst>
             <a:ext uri="{909E8E84-426E-40DD-AFC4-6F175D3DCCD1}">
-              <a14:hiddenFill xmlns:a14="http://schemas.microsoft.com/office/drawing/2010/main" xmlns="">
+              <a14:hiddenFill xmlns:a14="http://schemas.microsoft.com/office/drawing/2010/main">
                 <a:solidFill>
                   <a:srgbClr val="FFFFFF"/>
                 </a:solidFill>
@@ -17501,7 +18492,7 @@
     </p:spTree>
     <p:extLst>
       <p:ext uri="{BB962C8B-B14F-4D97-AF65-F5344CB8AC3E}">
-        <p14:creationId xmlns:p14="http://schemas.microsoft.com/office/powerpoint/2010/main" xmlns="" val="2756733679"/>
+        <p14:creationId xmlns:p14="http://schemas.microsoft.com/office/powerpoint/2010/main" val="2756733679"/>
       </p:ext>
     </p:extLst>
   </p:cSld>
@@ -17864,7 +18855,7 @@
           <a:blip r:embed="rId2" cstate="print">
             <a:extLst>
               <a:ext uri="{BEBA8EAE-BF5A-486C-A8C5-ECC9F3942E4B}">
-                <a14:imgProps xmlns:a14="http://schemas.microsoft.com/office/drawing/2010/main" xmlns="">
+                <a14:imgProps xmlns:a14="http://schemas.microsoft.com/office/drawing/2010/main">
                   <a14:imgLayer r:embed="rId3">
                     <a14:imgEffect>
                       <a14:backgroundRemoval t="0" b="100000" l="0" r="100000">
@@ -17875,7 +18866,7 @@
                 </a14:imgProps>
               </a:ext>
               <a:ext uri="{28A0092B-C50C-407E-A947-70E740481C1C}">
-                <a14:useLocalDpi xmlns:a14="http://schemas.microsoft.com/office/drawing/2010/main" xmlns="" val="0"/>
+                <a14:useLocalDpi xmlns:a14="http://schemas.microsoft.com/office/drawing/2010/main" val="0"/>
               </a:ext>
             </a:extLst>
           </a:blip>
@@ -17899,14 +18890,14 @@
           <a:effectLst/>
           <a:extLst>
             <a:ext uri="{909E8E84-426E-40DD-AFC4-6F175D3DCCD1}">
-              <a14:hiddenFill xmlns:a14="http://schemas.microsoft.com/office/drawing/2010/main" xmlns="">
+              <a14:hiddenFill xmlns:a14="http://schemas.microsoft.com/office/drawing/2010/main">
                 <a:solidFill>
                   <a:schemeClr val="accent1"/>
                 </a:solidFill>
               </a14:hiddenFill>
             </a:ext>
             <a:ext uri="{91240B29-F687-4F45-9708-019B960494DF}">
-              <a14:hiddenLine xmlns:a14="http://schemas.microsoft.com/office/drawing/2010/main" xmlns="" w="9525">
+              <a14:hiddenLine xmlns:a14="http://schemas.microsoft.com/office/drawing/2010/main" w="9525">
                 <a:solidFill>
                   <a:schemeClr val="tx1"/>
                 </a:solidFill>
@@ -17916,7 +18907,7 @@
               </a14:hiddenLine>
             </a:ext>
             <a:ext uri="{AF507438-7753-43E0-B8FC-AC1667EBCBE1}">
-              <a14:hiddenEffects xmlns:a14="http://schemas.microsoft.com/office/drawing/2010/main" xmlns="">
+              <a14:hiddenEffects xmlns:a14="http://schemas.microsoft.com/office/drawing/2010/main">
                 <a:effectLst>
                   <a:outerShdw dist="35921" dir="2700000" algn="ctr" rotWithShape="0">
                     <a:schemeClr val="bg2"/>
@@ -17939,7 +18930,7 @@
           <a:blip r:embed="rId4" cstate="print">
             <a:extLst>
               <a:ext uri="{BEBA8EAE-BF5A-486C-A8C5-ECC9F3942E4B}">
-                <a14:imgProps xmlns:a14="http://schemas.microsoft.com/office/drawing/2010/main" xmlns="">
+                <a14:imgProps xmlns:a14="http://schemas.microsoft.com/office/drawing/2010/main">
                   <a14:imgLayer r:embed="rId5">
                     <a14:imgEffect>
                       <a14:backgroundRemoval t="10000" b="90000" l="10000" r="90000"/>
@@ -17948,7 +18939,7 @@
                 </a14:imgProps>
               </a:ext>
               <a:ext uri="{28A0092B-C50C-407E-A947-70E740481C1C}">
-                <a14:useLocalDpi xmlns:a14="http://schemas.microsoft.com/office/drawing/2010/main" xmlns="" val="0"/>
+                <a14:useLocalDpi xmlns:a14="http://schemas.microsoft.com/office/drawing/2010/main" val="0"/>
               </a:ext>
             </a:extLst>
           </a:blip>
@@ -17972,14 +18963,14 @@
           <a:effectLst/>
           <a:extLst>
             <a:ext uri="{909E8E84-426E-40DD-AFC4-6F175D3DCCD1}">
-              <a14:hiddenFill xmlns:a14="http://schemas.microsoft.com/office/drawing/2010/main" xmlns="">
+              <a14:hiddenFill xmlns:a14="http://schemas.microsoft.com/office/drawing/2010/main">
                 <a:solidFill>
                   <a:schemeClr val="accent1"/>
                 </a:solidFill>
               </a14:hiddenFill>
             </a:ext>
             <a:ext uri="{91240B29-F687-4F45-9708-019B960494DF}">
-              <a14:hiddenLine xmlns:a14="http://schemas.microsoft.com/office/drawing/2010/main" xmlns="" w="9525">
+              <a14:hiddenLine xmlns:a14="http://schemas.microsoft.com/office/drawing/2010/main" w="9525">
                 <a:solidFill>
                   <a:schemeClr val="tx1"/>
                 </a:solidFill>
@@ -17989,7 +18980,7 @@
               </a14:hiddenLine>
             </a:ext>
             <a:ext uri="{AF507438-7753-43E0-B8FC-AC1667EBCBE1}">
-              <a14:hiddenEffects xmlns:a14="http://schemas.microsoft.com/office/drawing/2010/main" xmlns="">
+              <a14:hiddenEffects xmlns:a14="http://schemas.microsoft.com/office/drawing/2010/main">
                 <a:effectLst>
                   <a:outerShdw dist="35921" dir="2700000" algn="ctr" rotWithShape="0">
                     <a:schemeClr val="bg2"/>
@@ -18026,7 +19017,7 @@
             <a:blip r:embed="rId4" cstate="print">
               <a:extLst>
                 <a:ext uri="{BEBA8EAE-BF5A-486C-A8C5-ECC9F3942E4B}">
-                  <a14:imgProps xmlns:a14="http://schemas.microsoft.com/office/drawing/2010/main" xmlns="">
+                  <a14:imgProps xmlns:a14="http://schemas.microsoft.com/office/drawing/2010/main">
                     <a14:imgLayer r:embed="rId5">
                       <a14:imgEffect>
                         <a14:backgroundRemoval t="10000" b="90000" l="10000" r="90000"/>
@@ -18035,7 +19026,7 @@
                   </a14:imgProps>
                 </a:ext>
                 <a:ext uri="{28A0092B-C50C-407E-A947-70E740481C1C}">
-                  <a14:useLocalDpi xmlns:a14="http://schemas.microsoft.com/office/drawing/2010/main" xmlns="" val="0"/>
+                  <a14:useLocalDpi xmlns:a14="http://schemas.microsoft.com/office/drawing/2010/main" val="0"/>
                 </a:ext>
               </a:extLst>
             </a:blip>
@@ -18059,14 +19050,14 @@
             <a:effectLst/>
             <a:extLst>
               <a:ext uri="{909E8E84-426E-40DD-AFC4-6F175D3DCCD1}">
-                <a14:hiddenFill xmlns:a14="http://schemas.microsoft.com/office/drawing/2010/main" xmlns="">
+                <a14:hiddenFill xmlns:a14="http://schemas.microsoft.com/office/drawing/2010/main">
                   <a:solidFill>
                     <a:schemeClr val="accent1"/>
                   </a:solidFill>
                 </a14:hiddenFill>
               </a:ext>
               <a:ext uri="{91240B29-F687-4F45-9708-019B960494DF}">
-                <a14:hiddenLine xmlns:a14="http://schemas.microsoft.com/office/drawing/2010/main" xmlns="" w="9525">
+                <a14:hiddenLine xmlns:a14="http://schemas.microsoft.com/office/drawing/2010/main" w="9525">
                   <a:solidFill>
                     <a:schemeClr val="tx1"/>
                   </a:solidFill>
@@ -18076,7 +19067,7 @@
                 </a14:hiddenLine>
               </a:ext>
               <a:ext uri="{AF507438-7753-43E0-B8FC-AC1667EBCBE1}">
-                <a14:hiddenEffects xmlns:a14="http://schemas.microsoft.com/office/drawing/2010/main" xmlns="">
+                <a14:hiddenEffects xmlns:a14="http://schemas.microsoft.com/office/drawing/2010/main">
                   <a:effectLst>
                     <a:outerShdw dist="35921" dir="2700000" algn="ctr" rotWithShape="0">
                       <a:schemeClr val="bg2"/>
@@ -18394,7 +19385,7 @@
             <a:blip r:embed="rId4" cstate="print">
               <a:extLst>
                 <a:ext uri="{BEBA8EAE-BF5A-486C-A8C5-ECC9F3942E4B}">
-                  <a14:imgProps xmlns:a14="http://schemas.microsoft.com/office/drawing/2010/main" xmlns="">
+                  <a14:imgProps xmlns:a14="http://schemas.microsoft.com/office/drawing/2010/main">
                     <a14:imgLayer r:embed="rId5">
                       <a14:imgEffect>
                         <a14:backgroundRemoval t="10000" b="90000" l="10000" r="90000"/>
@@ -18403,7 +19394,7 @@
                   </a14:imgProps>
                 </a:ext>
                 <a:ext uri="{28A0092B-C50C-407E-A947-70E740481C1C}">
-                  <a14:useLocalDpi xmlns:a14="http://schemas.microsoft.com/office/drawing/2010/main" xmlns="" val="0"/>
+                  <a14:useLocalDpi xmlns:a14="http://schemas.microsoft.com/office/drawing/2010/main" val="0"/>
                 </a:ext>
               </a:extLst>
             </a:blip>
@@ -18427,14 +19418,14 @@
             <a:effectLst/>
             <a:extLst>
               <a:ext uri="{909E8E84-426E-40DD-AFC4-6F175D3DCCD1}">
-                <a14:hiddenFill xmlns:a14="http://schemas.microsoft.com/office/drawing/2010/main" xmlns="">
+                <a14:hiddenFill xmlns:a14="http://schemas.microsoft.com/office/drawing/2010/main">
                   <a:solidFill>
                     <a:schemeClr val="accent1"/>
                   </a:solidFill>
                 </a14:hiddenFill>
               </a:ext>
               <a:ext uri="{91240B29-F687-4F45-9708-019B960494DF}">
-                <a14:hiddenLine xmlns:a14="http://schemas.microsoft.com/office/drawing/2010/main" xmlns="" w="9525">
+                <a14:hiddenLine xmlns:a14="http://schemas.microsoft.com/office/drawing/2010/main" w="9525">
                   <a:solidFill>
                     <a:schemeClr val="tx1"/>
                   </a:solidFill>
@@ -18444,7 +19435,7 @@
                 </a14:hiddenLine>
               </a:ext>
               <a:ext uri="{AF507438-7753-43E0-B8FC-AC1667EBCBE1}">
-                <a14:hiddenEffects xmlns:a14="http://schemas.microsoft.com/office/drawing/2010/main" xmlns="">
+                <a14:hiddenEffects xmlns:a14="http://schemas.microsoft.com/office/drawing/2010/main">
                   <a:effectLst>
                     <a:outerShdw dist="35921" dir="2700000" algn="ctr" rotWithShape="0">
                       <a:schemeClr val="bg2"/>
@@ -18708,7 +19699,7 @@
               <a:blip r:embed="rId4" cstate="print">
                 <a:extLst>
                   <a:ext uri="{BEBA8EAE-BF5A-486C-A8C5-ECC9F3942E4B}">
-                    <a14:imgProps xmlns:a14="http://schemas.microsoft.com/office/drawing/2010/main" xmlns="">
+                    <a14:imgProps xmlns:a14="http://schemas.microsoft.com/office/drawing/2010/main">
                       <a14:imgLayer r:embed="rId5">
                         <a14:imgEffect>
                           <a14:backgroundRemoval t="10000" b="90000" l="10000" r="90000"/>
@@ -18717,7 +19708,7 @@
                     </a14:imgProps>
                   </a:ext>
                   <a:ext uri="{28A0092B-C50C-407E-A947-70E740481C1C}">
-                    <a14:useLocalDpi xmlns:a14="http://schemas.microsoft.com/office/drawing/2010/main" xmlns="" val="0"/>
+                    <a14:useLocalDpi xmlns:a14="http://schemas.microsoft.com/office/drawing/2010/main" val="0"/>
                   </a:ext>
                 </a:extLst>
               </a:blip>
@@ -18741,14 +19732,14 @@
               <a:effectLst/>
               <a:extLst>
                 <a:ext uri="{909E8E84-426E-40DD-AFC4-6F175D3DCCD1}">
-                  <a14:hiddenFill xmlns:a14="http://schemas.microsoft.com/office/drawing/2010/main" xmlns="">
+                  <a14:hiddenFill xmlns:a14="http://schemas.microsoft.com/office/drawing/2010/main">
                     <a:solidFill>
                       <a:schemeClr val="accent1"/>
                     </a:solidFill>
                   </a14:hiddenFill>
                 </a:ext>
                 <a:ext uri="{91240B29-F687-4F45-9708-019B960494DF}">
-                  <a14:hiddenLine xmlns:a14="http://schemas.microsoft.com/office/drawing/2010/main" xmlns="" w="9525">
+                  <a14:hiddenLine xmlns:a14="http://schemas.microsoft.com/office/drawing/2010/main" w="9525">
                     <a:solidFill>
                       <a:schemeClr val="tx1"/>
                     </a:solidFill>
@@ -18758,7 +19749,7 @@
                   </a14:hiddenLine>
                 </a:ext>
                 <a:ext uri="{AF507438-7753-43E0-B8FC-AC1667EBCBE1}">
-                  <a14:hiddenEffects xmlns:a14="http://schemas.microsoft.com/office/drawing/2010/main" xmlns="">
+                  <a14:hiddenEffects xmlns:a14="http://schemas.microsoft.com/office/drawing/2010/main">
                     <a:effectLst>
                       <a:outerShdw dist="35921" dir="2700000" algn="ctr" rotWithShape="0">
                         <a:schemeClr val="bg2"/>
@@ -19063,7 +20054,7 @@
               <a:blip r:embed="rId4" cstate="print">
                 <a:extLst>
                   <a:ext uri="{BEBA8EAE-BF5A-486C-A8C5-ECC9F3942E4B}">
-                    <a14:imgProps xmlns:a14="http://schemas.microsoft.com/office/drawing/2010/main" xmlns="">
+                    <a14:imgProps xmlns:a14="http://schemas.microsoft.com/office/drawing/2010/main">
                       <a14:imgLayer r:embed="rId5">
                         <a14:imgEffect>
                           <a14:backgroundRemoval t="10000" b="90000" l="10000" r="90000"/>
@@ -19072,7 +20063,7 @@
                     </a14:imgProps>
                   </a:ext>
                   <a:ext uri="{28A0092B-C50C-407E-A947-70E740481C1C}">
-                    <a14:useLocalDpi xmlns:a14="http://schemas.microsoft.com/office/drawing/2010/main" xmlns="" val="0"/>
+                    <a14:useLocalDpi xmlns:a14="http://schemas.microsoft.com/office/drawing/2010/main" val="0"/>
                   </a:ext>
                 </a:extLst>
               </a:blip>
@@ -19096,14 +20087,14 @@
               <a:effectLst/>
               <a:extLst>
                 <a:ext uri="{909E8E84-426E-40DD-AFC4-6F175D3DCCD1}">
-                  <a14:hiddenFill xmlns:a14="http://schemas.microsoft.com/office/drawing/2010/main" xmlns="">
+                  <a14:hiddenFill xmlns:a14="http://schemas.microsoft.com/office/drawing/2010/main">
                     <a:solidFill>
                       <a:schemeClr val="accent1"/>
                     </a:solidFill>
                   </a14:hiddenFill>
                 </a:ext>
                 <a:ext uri="{91240B29-F687-4F45-9708-019B960494DF}">
-                  <a14:hiddenLine xmlns:a14="http://schemas.microsoft.com/office/drawing/2010/main" xmlns="" w="9525">
+                  <a14:hiddenLine xmlns:a14="http://schemas.microsoft.com/office/drawing/2010/main" w="9525">
                     <a:solidFill>
                       <a:schemeClr val="tx1"/>
                     </a:solidFill>
@@ -19113,7 +20104,7 @@
                   </a14:hiddenLine>
                 </a:ext>
                 <a:ext uri="{AF507438-7753-43E0-B8FC-AC1667EBCBE1}">
-                  <a14:hiddenEffects xmlns:a14="http://schemas.microsoft.com/office/drawing/2010/main" xmlns="">
+                  <a14:hiddenEffects xmlns:a14="http://schemas.microsoft.com/office/drawing/2010/main">
                     <a:effectLst>
                       <a:outerShdw dist="35921" dir="2700000" algn="ctr" rotWithShape="0">
                         <a:schemeClr val="bg2"/>
@@ -20024,7 +21015,7 @@
     </p:spTree>
     <p:extLst>
       <p:ext uri="{BB962C8B-B14F-4D97-AF65-F5344CB8AC3E}">
-        <p14:creationId xmlns:p14="http://schemas.microsoft.com/office/powerpoint/2010/main" xmlns="" val="935031736"/>
+        <p14:creationId xmlns:p14="http://schemas.microsoft.com/office/powerpoint/2010/main" val="935031736"/>
       </p:ext>
     </p:extLst>
   </p:cSld>
@@ -20747,7 +21738,7 @@
     </p:spTree>
     <p:extLst>
       <p:ext uri="{BB962C8B-B14F-4D97-AF65-F5344CB8AC3E}">
-        <p14:creationId xmlns:p14="http://schemas.microsoft.com/office/powerpoint/2010/main" xmlns="" val="2756733679"/>
+        <p14:creationId xmlns:p14="http://schemas.microsoft.com/office/powerpoint/2010/main" val="2756733679"/>
       </p:ext>
     </p:extLst>
   </p:cSld>
@@ -20927,7 +21918,7 @@
     </p:spTree>
     <p:extLst>
       <p:ext uri="{BB962C8B-B14F-4D97-AF65-F5344CB8AC3E}">
-        <p14:creationId xmlns:p14="http://schemas.microsoft.com/office/powerpoint/2010/main" xmlns="" val="2756733679"/>
+        <p14:creationId xmlns:p14="http://schemas.microsoft.com/office/powerpoint/2010/main" val="2756733679"/>
       </p:ext>
     </p:extLst>
   </p:cSld>
@@ -21112,7 +22103,7 @@
     </p:spTree>
     <p:extLst>
       <p:ext uri="{BB962C8B-B14F-4D97-AF65-F5344CB8AC3E}">
-        <p14:creationId xmlns:p14="http://schemas.microsoft.com/office/powerpoint/2010/main" xmlns="" val="2756733679"/>
+        <p14:creationId xmlns:p14="http://schemas.microsoft.com/office/powerpoint/2010/main" val="2756733679"/>
       </p:ext>
     </p:extLst>
   </p:cSld>

</xml_diff>

<commit_message>
changed the order of the program steps (labels)
</commit_message>
<xml_diff>
--- a/Doku/Puzzle.pptx
+++ b/Doku/Puzzle.pptx
@@ -386,7 +386,7 @@
     </p:spTree>
     <p:extLst>
       <p:ext uri="{BB962C8B-B14F-4D97-AF65-F5344CB8AC3E}">
-        <p14:creationId xmlns:p14="http://schemas.microsoft.com/office/powerpoint/2010/main" val="352693751"/>
+        <p14:creationId xmlns:p14="http://schemas.microsoft.com/office/powerpoint/2010/main" xmlns="" val="352693751"/>
       </p:ext>
     </p:extLst>
   </p:cSld>
@@ -4171,7 +4171,7 @@
           <a:blip r:embed="rId2" cstate="print">
             <a:extLst>
               <a:ext uri="{BEBA8EAE-BF5A-486C-A8C5-ECC9F3942E4B}">
-                <a14:imgProps xmlns:a14="http://schemas.microsoft.com/office/drawing/2010/main">
+                <a14:imgProps xmlns:a14="http://schemas.microsoft.com/office/drawing/2010/main" xmlns="">
                   <a14:imgLayer r:embed="rId3">
                     <a14:imgEffect>
                       <a14:backgroundRemoval t="350" b="100000" l="0" r="100000">
@@ -4205,7 +4205,7 @@
                 </a14:imgProps>
               </a:ext>
               <a:ext uri="{28A0092B-C50C-407E-A947-70E740481C1C}">
-                <a14:useLocalDpi xmlns:a14="http://schemas.microsoft.com/office/drawing/2010/main" val="0"/>
+                <a14:useLocalDpi xmlns:a14="http://schemas.microsoft.com/office/drawing/2010/main" xmlns="" val="0"/>
               </a:ext>
             </a:extLst>
           </a:blip>
@@ -4225,7 +4225,7 @@
           <a:noFill/>
           <a:extLst>
             <a:ext uri="{909E8E84-426E-40DD-AFC4-6F175D3DCCD1}">
-              <a14:hiddenFill xmlns:a14="http://schemas.microsoft.com/office/drawing/2010/main">
+              <a14:hiddenFill xmlns:a14="http://schemas.microsoft.com/office/drawing/2010/main" xmlns="">
                 <a:solidFill>
                   <a:srgbClr val="FFFFFF"/>
                 </a:solidFill>
@@ -4237,7 +4237,7 @@
     </p:spTree>
     <p:extLst>
       <p:ext uri="{BB962C8B-B14F-4D97-AF65-F5344CB8AC3E}">
-        <p14:creationId xmlns:p14="http://schemas.microsoft.com/office/powerpoint/2010/main" val="1704400666"/>
+        <p14:creationId xmlns:p14="http://schemas.microsoft.com/office/powerpoint/2010/main" xmlns="" val="1704400666"/>
       </p:ext>
     </p:extLst>
   </p:cSld>
@@ -4396,7 +4396,7 @@
     </p:spTree>
     <p:extLst>
       <p:ext uri="{BB962C8B-B14F-4D97-AF65-F5344CB8AC3E}">
-        <p14:creationId xmlns:p14="http://schemas.microsoft.com/office/powerpoint/2010/main" val="2756733679"/>
+        <p14:creationId xmlns:p14="http://schemas.microsoft.com/office/powerpoint/2010/main" xmlns="" val="2756733679"/>
       </p:ext>
     </p:extLst>
   </p:cSld>
@@ -4634,7 +4634,7 @@
     </p:spTree>
     <p:extLst>
       <p:ext uri="{BB962C8B-B14F-4D97-AF65-F5344CB8AC3E}">
-        <p14:creationId xmlns:p14="http://schemas.microsoft.com/office/powerpoint/2010/main" val="2756733679"/>
+        <p14:creationId xmlns:p14="http://schemas.microsoft.com/office/powerpoint/2010/main" xmlns="" val="2756733679"/>
       </p:ext>
     </p:extLst>
   </p:cSld>
@@ -4849,7 +4849,7 @@
     </p:spTree>
     <p:extLst>
       <p:ext uri="{BB962C8B-B14F-4D97-AF65-F5344CB8AC3E}">
-        <p14:creationId xmlns:p14="http://schemas.microsoft.com/office/powerpoint/2010/main" val="2756733679"/>
+        <p14:creationId xmlns:p14="http://schemas.microsoft.com/office/powerpoint/2010/main" xmlns="" val="2756733679"/>
       </p:ext>
     </p:extLst>
   </p:cSld>
@@ -5072,7 +5072,7 @@
     </p:spTree>
     <p:extLst>
       <p:ext uri="{BB962C8B-B14F-4D97-AF65-F5344CB8AC3E}">
-        <p14:creationId xmlns:p14="http://schemas.microsoft.com/office/powerpoint/2010/main" val="2756733679"/>
+        <p14:creationId xmlns:p14="http://schemas.microsoft.com/office/powerpoint/2010/main" xmlns="" val="2756733679"/>
       </p:ext>
     </p:extLst>
   </p:cSld>
@@ -5278,7 +5278,7 @@
           <a:blip r:embed="rId2" cstate="print">
             <a:extLst>
               <a:ext uri="{BEBA8EAE-BF5A-486C-A8C5-ECC9F3942E4B}">
-                <a14:imgProps xmlns:a14="http://schemas.microsoft.com/office/drawing/2010/main">
+                <a14:imgProps xmlns:a14="http://schemas.microsoft.com/office/drawing/2010/main" xmlns="">
                   <a14:imgLayer r:embed="rId3">
                     <a14:imgEffect>
                       <a14:backgroundRemoval t="0" b="100000" l="0" r="100000">
@@ -5305,7 +5305,7 @@
                 </a14:imgProps>
               </a:ext>
               <a:ext uri="{28A0092B-C50C-407E-A947-70E740481C1C}">
-                <a14:useLocalDpi xmlns:a14="http://schemas.microsoft.com/office/drawing/2010/main" val="0"/>
+                <a14:useLocalDpi xmlns:a14="http://schemas.microsoft.com/office/drawing/2010/main" xmlns="" val="0"/>
               </a:ext>
             </a:extLst>
           </a:blip>
@@ -5323,7 +5323,7 @@
           <a:noFill/>
           <a:extLst>
             <a:ext uri="{909E8E84-426E-40DD-AFC4-6F175D3DCCD1}">
-              <a14:hiddenFill xmlns:a14="http://schemas.microsoft.com/office/drawing/2010/main">
+              <a14:hiddenFill xmlns:a14="http://schemas.microsoft.com/office/drawing/2010/main" xmlns="">
                 <a:solidFill>
                   <a:srgbClr val="FFFFFF"/>
                 </a:solidFill>
@@ -5344,7 +5344,7 @@
           <a:blip r:embed="rId4" cstate="print">
             <a:extLst>
               <a:ext uri="{BEBA8EAE-BF5A-486C-A8C5-ECC9F3942E4B}">
-                <a14:imgProps xmlns:a14="http://schemas.microsoft.com/office/drawing/2010/main">
+                <a14:imgProps xmlns:a14="http://schemas.microsoft.com/office/drawing/2010/main" xmlns="">
                   <a14:imgLayer r:embed="rId3">
                     <a14:imgEffect>
                       <a14:backgroundRemoval t="37255" b="85994" l="36286" r="100000">
@@ -5359,7 +5359,7 @@
                 </a14:imgProps>
               </a:ext>
               <a:ext uri="{28A0092B-C50C-407E-A947-70E740481C1C}">
-                <a14:useLocalDpi xmlns:a14="http://schemas.microsoft.com/office/drawing/2010/main" val="0"/>
+                <a14:useLocalDpi xmlns:a14="http://schemas.microsoft.com/office/drawing/2010/main" xmlns="" val="0"/>
               </a:ext>
             </a:extLst>
           </a:blip>
@@ -5377,7 +5377,7 @@
           <a:noFill/>
           <a:extLst>
             <a:ext uri="{909E8E84-426E-40DD-AFC4-6F175D3DCCD1}">
-              <a14:hiddenFill xmlns:a14="http://schemas.microsoft.com/office/drawing/2010/main">
+              <a14:hiddenFill xmlns:a14="http://schemas.microsoft.com/office/drawing/2010/main" xmlns="">
                 <a:solidFill>
                   <a:srgbClr val="FFFFFF"/>
                 </a:solidFill>
@@ -5389,7 +5389,7 @@
     </p:spTree>
     <p:extLst>
       <p:ext uri="{BB962C8B-B14F-4D97-AF65-F5344CB8AC3E}">
-        <p14:creationId xmlns:p14="http://schemas.microsoft.com/office/powerpoint/2010/main" val="1334996816"/>
+        <p14:creationId xmlns:p14="http://schemas.microsoft.com/office/powerpoint/2010/main" xmlns="" val="1334996816"/>
       </p:ext>
     </p:extLst>
   </p:cSld>
@@ -8005,7 +8005,7 @@
     </p:spTree>
     <p:extLst>
       <p:ext uri="{BB962C8B-B14F-4D97-AF65-F5344CB8AC3E}">
-        <p14:creationId xmlns:p14="http://schemas.microsoft.com/office/powerpoint/2010/main" val="2054773068"/>
+        <p14:creationId xmlns:p14="http://schemas.microsoft.com/office/powerpoint/2010/main" xmlns="" val="2054773068"/>
       </p:ext>
     </p:extLst>
   </p:cSld>
@@ -9001,7 +9001,7 @@
     </p:spTree>
     <p:extLst>
       <p:ext uri="{BB962C8B-B14F-4D97-AF65-F5344CB8AC3E}">
-        <p14:creationId xmlns:p14="http://schemas.microsoft.com/office/powerpoint/2010/main" val="1487937273"/>
+        <p14:creationId xmlns:p14="http://schemas.microsoft.com/office/powerpoint/2010/main" xmlns="" val="1487937273"/>
       </p:ext>
     </p:extLst>
   </p:cSld>
@@ -10953,7 +10953,7 @@
     </p:spTree>
     <p:extLst>
       <p:ext uri="{BB962C8B-B14F-4D97-AF65-F5344CB8AC3E}">
-        <p14:creationId xmlns:p14="http://schemas.microsoft.com/office/powerpoint/2010/main" val="858953006"/>
+        <p14:creationId xmlns:p14="http://schemas.microsoft.com/office/powerpoint/2010/main" xmlns="" val="858953006"/>
       </p:ext>
     </p:extLst>
   </p:cSld>
@@ -13442,7 +13442,7 @@
     </p:spTree>
     <p:extLst>
       <p:ext uri="{BB962C8B-B14F-4D97-AF65-F5344CB8AC3E}">
-        <p14:creationId xmlns:p14="http://schemas.microsoft.com/office/powerpoint/2010/main" val="5471565"/>
+        <p14:creationId xmlns:p14="http://schemas.microsoft.com/office/powerpoint/2010/main" xmlns="" val="5471565"/>
       </p:ext>
     </p:extLst>
   </p:cSld>
@@ -14340,7 +14340,7 @@
     </p:spTree>
     <p:extLst>
       <p:ext uri="{BB962C8B-B14F-4D97-AF65-F5344CB8AC3E}">
-        <p14:creationId xmlns:p14="http://schemas.microsoft.com/office/powerpoint/2010/main" val="1676534572"/>
+        <p14:creationId xmlns:p14="http://schemas.microsoft.com/office/powerpoint/2010/main" xmlns="" val="1676534572"/>
       </p:ext>
     </p:extLst>
   </p:cSld>
@@ -14604,7 +14604,6 @@
               <a:rPr lang="de-CH" dirty="0" smtClean="0"/>
               <a:t>Programm Demo</a:t>
             </a:r>
-            <a:endParaRPr lang="de-CH" dirty="0" smtClean="0"/>
           </a:p>
           <a:p>
             <a:pPr lvl="1"/>
@@ -14624,7 +14623,7 @@
           <a:blip r:embed="rId2" cstate="print">
             <a:extLst>
               <a:ext uri="{BEBA8EAE-BF5A-486C-A8C5-ECC9F3942E4B}">
-                <a14:imgProps xmlns:a14="http://schemas.microsoft.com/office/drawing/2010/main">
+                <a14:imgProps xmlns:a14="http://schemas.microsoft.com/office/drawing/2010/main" xmlns="">
                   <a14:imgLayer r:embed="rId3">
                     <a14:imgEffect>
                       <a14:backgroundRemoval t="0" b="100000" l="0" r="100000">
@@ -14651,7 +14650,7 @@
                 </a14:imgProps>
               </a:ext>
               <a:ext uri="{28A0092B-C50C-407E-A947-70E740481C1C}">
-                <a14:useLocalDpi xmlns:a14="http://schemas.microsoft.com/office/drawing/2010/main" val="0"/>
+                <a14:useLocalDpi xmlns:a14="http://schemas.microsoft.com/office/drawing/2010/main" xmlns="" val="0"/>
               </a:ext>
             </a:extLst>
           </a:blip>
@@ -14669,7 +14668,7 @@
           <a:noFill/>
           <a:extLst>
             <a:ext uri="{909E8E84-426E-40DD-AFC4-6F175D3DCCD1}">
-              <a14:hiddenFill xmlns:a14="http://schemas.microsoft.com/office/drawing/2010/main">
+              <a14:hiddenFill xmlns:a14="http://schemas.microsoft.com/office/drawing/2010/main" xmlns="">
                 <a:solidFill>
                   <a:srgbClr val="FFFFFF"/>
                 </a:solidFill>
@@ -14690,7 +14689,7 @@
           <a:blip r:embed="rId4" cstate="print">
             <a:extLst>
               <a:ext uri="{BEBA8EAE-BF5A-486C-A8C5-ECC9F3942E4B}">
-                <a14:imgProps xmlns:a14="http://schemas.microsoft.com/office/drawing/2010/main">
+                <a14:imgProps xmlns:a14="http://schemas.microsoft.com/office/drawing/2010/main" xmlns="">
                   <a14:imgLayer r:embed="rId3">
                     <a14:imgEffect>
                       <a14:backgroundRemoval t="37255" b="85994" l="36286" r="100000">
@@ -14705,7 +14704,7 @@
                 </a14:imgProps>
               </a:ext>
               <a:ext uri="{28A0092B-C50C-407E-A947-70E740481C1C}">
-                <a14:useLocalDpi xmlns:a14="http://schemas.microsoft.com/office/drawing/2010/main" val="0"/>
+                <a14:useLocalDpi xmlns:a14="http://schemas.microsoft.com/office/drawing/2010/main" xmlns="" val="0"/>
               </a:ext>
             </a:extLst>
           </a:blip>
@@ -14723,7 +14722,7 @@
           <a:noFill/>
           <a:extLst>
             <a:ext uri="{909E8E84-426E-40DD-AFC4-6F175D3DCCD1}">
-              <a14:hiddenFill xmlns:a14="http://schemas.microsoft.com/office/drawing/2010/main">
+              <a14:hiddenFill xmlns:a14="http://schemas.microsoft.com/office/drawing/2010/main" xmlns="">
                 <a:solidFill>
                   <a:srgbClr val="FFFFFF"/>
                 </a:solidFill>
@@ -14735,7 +14734,7 @@
     </p:spTree>
     <p:extLst>
       <p:ext uri="{BB962C8B-B14F-4D97-AF65-F5344CB8AC3E}">
-        <p14:creationId xmlns:p14="http://schemas.microsoft.com/office/powerpoint/2010/main" val="1387166899"/>
+        <p14:creationId xmlns:p14="http://schemas.microsoft.com/office/powerpoint/2010/main" xmlns="" val="1387166899"/>
       </p:ext>
     </p:extLst>
   </p:cSld>
@@ -16037,7 +16036,7 @@
     </p:spTree>
     <p:extLst>
       <p:ext uri="{BB962C8B-B14F-4D97-AF65-F5344CB8AC3E}">
-        <p14:creationId xmlns:p14="http://schemas.microsoft.com/office/powerpoint/2010/main" val="2092770188"/>
+        <p14:creationId xmlns:p14="http://schemas.microsoft.com/office/powerpoint/2010/main" xmlns="" val="2092770188"/>
       </p:ext>
     </p:extLst>
   </p:cSld>
@@ -16415,7 +16414,6 @@
               <a:rPr lang="de-CH" dirty="0" smtClean="0"/>
               <a:t>Eigene Features erstellen und anwenden</a:t>
             </a:r>
-            <a:endParaRPr lang="de-CH" dirty="0" smtClean="0"/>
           </a:p>
           <a:p>
             <a:r>
@@ -16428,14 +16426,12 @@
               <a:rPr lang="de-CH" dirty="0" smtClean="0"/>
               <a:t>Leerraum-Minimierung</a:t>
             </a:r>
-            <a:endParaRPr lang="de-CH" dirty="0" smtClean="0"/>
           </a:p>
           <a:p>
             <a:r>
               <a:rPr lang="de-CH" dirty="0" smtClean="0"/>
               <a:t>Puzzle automatisch zusammensetzen</a:t>
             </a:r>
-            <a:endParaRPr lang="de-CH" dirty="0" smtClean="0"/>
           </a:p>
           <a:p>
             <a:endParaRPr lang="de-CH" dirty="0" smtClean="0"/>
@@ -16460,7 +16456,7 @@
           <a:blip r:embed="rId2" cstate="print">
             <a:extLst>
               <a:ext uri="{BEBA8EAE-BF5A-486C-A8C5-ECC9F3942E4B}">
-                <a14:imgProps xmlns:a14="http://schemas.microsoft.com/office/drawing/2010/main">
+                <a14:imgProps xmlns:a14="http://schemas.microsoft.com/office/drawing/2010/main" xmlns="">
                   <a14:imgLayer r:embed="rId3">
                     <a14:imgEffect>
                       <a14:backgroundRemoval t="0" b="100000" l="0" r="100000">
@@ -16487,7 +16483,7 @@
                 </a14:imgProps>
               </a:ext>
               <a:ext uri="{28A0092B-C50C-407E-A947-70E740481C1C}">
-                <a14:useLocalDpi xmlns:a14="http://schemas.microsoft.com/office/drawing/2010/main" val="0"/>
+                <a14:useLocalDpi xmlns:a14="http://schemas.microsoft.com/office/drawing/2010/main" xmlns="" val="0"/>
               </a:ext>
             </a:extLst>
           </a:blip>
@@ -16505,7 +16501,7 @@
           <a:noFill/>
           <a:extLst>
             <a:ext uri="{909E8E84-426E-40DD-AFC4-6F175D3DCCD1}">
-              <a14:hiddenFill xmlns:a14="http://schemas.microsoft.com/office/drawing/2010/main">
+              <a14:hiddenFill xmlns:a14="http://schemas.microsoft.com/office/drawing/2010/main" xmlns="">
                 <a:solidFill>
                   <a:srgbClr val="FFFFFF"/>
                 </a:solidFill>
@@ -16526,7 +16522,7 @@
           <a:blip r:embed="rId4" cstate="print">
             <a:extLst>
               <a:ext uri="{BEBA8EAE-BF5A-486C-A8C5-ECC9F3942E4B}">
-                <a14:imgProps xmlns:a14="http://schemas.microsoft.com/office/drawing/2010/main">
+                <a14:imgProps xmlns:a14="http://schemas.microsoft.com/office/drawing/2010/main" xmlns="">
                   <a14:imgLayer r:embed="rId3">
                     <a14:imgEffect>
                       <a14:backgroundRemoval t="37255" b="85994" l="36286" r="100000">
@@ -16541,7 +16537,7 @@
                 </a14:imgProps>
               </a:ext>
               <a:ext uri="{28A0092B-C50C-407E-A947-70E740481C1C}">
-                <a14:useLocalDpi xmlns:a14="http://schemas.microsoft.com/office/drawing/2010/main" val="0"/>
+                <a14:useLocalDpi xmlns:a14="http://schemas.microsoft.com/office/drawing/2010/main" xmlns="" val="0"/>
               </a:ext>
             </a:extLst>
           </a:blip>
@@ -16559,7 +16555,7 @@
           <a:noFill/>
           <a:extLst>
             <a:ext uri="{909E8E84-426E-40DD-AFC4-6F175D3DCCD1}">
-              <a14:hiddenFill xmlns:a14="http://schemas.microsoft.com/office/drawing/2010/main">
+              <a14:hiddenFill xmlns:a14="http://schemas.microsoft.com/office/drawing/2010/main" xmlns="">
                 <a:solidFill>
                   <a:srgbClr val="FFFFFF"/>
                 </a:solidFill>
@@ -16571,7 +16567,7 @@
     </p:spTree>
     <p:extLst>
       <p:ext uri="{BB962C8B-B14F-4D97-AF65-F5344CB8AC3E}">
-        <p14:creationId xmlns:p14="http://schemas.microsoft.com/office/powerpoint/2010/main" val="2693954274"/>
+        <p14:creationId xmlns:p14="http://schemas.microsoft.com/office/powerpoint/2010/main" xmlns="" val="2693954274"/>
       </p:ext>
     </p:extLst>
   </p:cSld>
@@ -16948,7 +16944,6 @@
               <a:rPr lang="de-CH" dirty="0" smtClean="0"/>
               <a:t>Guter Einstieg in die Bildverarbeitung</a:t>
             </a:r>
-            <a:endParaRPr lang="de-CH" dirty="0" smtClean="0"/>
           </a:p>
           <a:p>
             <a:endParaRPr lang="de-CH" dirty="0" smtClean="0"/>
@@ -16973,7 +16968,7 @@
           <a:blip r:embed="rId2" cstate="print">
             <a:extLst>
               <a:ext uri="{BEBA8EAE-BF5A-486C-A8C5-ECC9F3942E4B}">
-                <a14:imgProps xmlns:a14="http://schemas.microsoft.com/office/drawing/2010/main">
+                <a14:imgProps xmlns:a14="http://schemas.microsoft.com/office/drawing/2010/main" xmlns="">
                   <a14:imgLayer r:embed="rId3">
                     <a14:imgEffect>
                       <a14:backgroundRemoval t="0" b="100000" l="0" r="100000">
@@ -17000,7 +16995,7 @@
                 </a14:imgProps>
               </a:ext>
               <a:ext uri="{28A0092B-C50C-407E-A947-70E740481C1C}">
-                <a14:useLocalDpi xmlns:a14="http://schemas.microsoft.com/office/drawing/2010/main" val="0"/>
+                <a14:useLocalDpi xmlns:a14="http://schemas.microsoft.com/office/drawing/2010/main" xmlns="" val="0"/>
               </a:ext>
             </a:extLst>
           </a:blip>
@@ -17018,7 +17013,7 @@
           <a:noFill/>
           <a:extLst>
             <a:ext uri="{909E8E84-426E-40DD-AFC4-6F175D3DCCD1}">
-              <a14:hiddenFill xmlns:a14="http://schemas.microsoft.com/office/drawing/2010/main">
+              <a14:hiddenFill xmlns:a14="http://schemas.microsoft.com/office/drawing/2010/main" xmlns="">
                 <a:solidFill>
                   <a:srgbClr val="FFFFFF"/>
                 </a:solidFill>
@@ -17039,7 +17034,7 @@
           <a:blip r:embed="rId4" cstate="print">
             <a:extLst>
               <a:ext uri="{BEBA8EAE-BF5A-486C-A8C5-ECC9F3942E4B}">
-                <a14:imgProps xmlns:a14="http://schemas.microsoft.com/office/drawing/2010/main">
+                <a14:imgProps xmlns:a14="http://schemas.microsoft.com/office/drawing/2010/main" xmlns="">
                   <a14:imgLayer r:embed="rId3">
                     <a14:imgEffect>
                       <a14:backgroundRemoval t="37255" b="85994" l="36286" r="100000">
@@ -17054,7 +17049,7 @@
                 </a14:imgProps>
               </a:ext>
               <a:ext uri="{28A0092B-C50C-407E-A947-70E740481C1C}">
-                <a14:useLocalDpi xmlns:a14="http://schemas.microsoft.com/office/drawing/2010/main" val="0"/>
+                <a14:useLocalDpi xmlns:a14="http://schemas.microsoft.com/office/drawing/2010/main" xmlns="" val="0"/>
               </a:ext>
             </a:extLst>
           </a:blip>
@@ -17072,7 +17067,7 @@
           <a:noFill/>
           <a:extLst>
             <a:ext uri="{909E8E84-426E-40DD-AFC4-6F175D3DCCD1}">
-              <a14:hiddenFill xmlns:a14="http://schemas.microsoft.com/office/drawing/2010/main">
+              <a14:hiddenFill xmlns:a14="http://schemas.microsoft.com/office/drawing/2010/main" xmlns="">
                 <a:solidFill>
                   <a:srgbClr val="FFFFFF"/>
                 </a:solidFill>
@@ -17084,7 +17079,7 @@
     </p:spTree>
     <p:extLst>
       <p:ext uri="{BB962C8B-B14F-4D97-AF65-F5344CB8AC3E}">
-        <p14:creationId xmlns:p14="http://schemas.microsoft.com/office/powerpoint/2010/main" val="3826276694"/>
+        <p14:creationId xmlns:p14="http://schemas.microsoft.com/office/powerpoint/2010/main" xmlns="" val="3826276694"/>
       </p:ext>
     </p:extLst>
   </p:cSld>
@@ -17175,7 +17170,7 @@
           <a:blip r:embed="rId2" cstate="screen">
             <a:extLst>
               <a:ext uri="{28A0092B-C50C-407E-A947-70E740481C1C}">
-                <a14:useLocalDpi xmlns:a14="http://schemas.microsoft.com/office/drawing/2010/main" val="0"/>
+                <a14:useLocalDpi xmlns:a14="http://schemas.microsoft.com/office/drawing/2010/main" xmlns="" val="0"/>
               </a:ext>
             </a:extLst>
           </a:blip>
@@ -17200,7 +17195,7 @@
           </a:effectLst>
           <a:extLst>
             <a:ext uri="{909E8E84-426E-40DD-AFC4-6F175D3DCCD1}">
-              <a14:hiddenFill xmlns:a14="http://schemas.microsoft.com/office/drawing/2010/main">
+              <a14:hiddenFill xmlns:a14="http://schemas.microsoft.com/office/drawing/2010/main" xmlns="">
                 <a:solidFill>
                   <a:srgbClr val="FFFFFF"/>
                 </a:solidFill>
@@ -17212,7 +17207,7 @@
     </p:spTree>
     <p:extLst>
       <p:ext uri="{BB962C8B-B14F-4D97-AF65-F5344CB8AC3E}">
-        <p14:creationId xmlns:p14="http://schemas.microsoft.com/office/powerpoint/2010/main" val="1595990863"/>
+        <p14:creationId xmlns:p14="http://schemas.microsoft.com/office/powerpoint/2010/main" xmlns="" val="1595990863"/>
       </p:ext>
     </p:extLst>
   </p:cSld>
@@ -17355,7 +17350,7 @@
           <a:blip r:embed="rId2" cstate="print">
             <a:extLst>
               <a:ext uri="{BEBA8EAE-BF5A-486C-A8C5-ECC9F3942E4B}">
-                <a14:imgProps xmlns:a14="http://schemas.microsoft.com/office/drawing/2010/main">
+                <a14:imgProps xmlns:a14="http://schemas.microsoft.com/office/drawing/2010/main" xmlns="">
                   <a14:imgLayer r:embed="rId3">
                     <a14:imgEffect>
                       <a14:backgroundRemoval t="0" b="100000" l="0" r="100000">
@@ -17382,7 +17377,7 @@
                 </a14:imgProps>
               </a:ext>
               <a:ext uri="{28A0092B-C50C-407E-A947-70E740481C1C}">
-                <a14:useLocalDpi xmlns:a14="http://schemas.microsoft.com/office/drawing/2010/main" val="0"/>
+                <a14:useLocalDpi xmlns:a14="http://schemas.microsoft.com/office/drawing/2010/main" xmlns="" val="0"/>
               </a:ext>
             </a:extLst>
           </a:blip>
@@ -17400,7 +17395,7 @@
           <a:noFill/>
           <a:extLst>
             <a:ext uri="{909E8E84-426E-40DD-AFC4-6F175D3DCCD1}">
-              <a14:hiddenFill xmlns:a14="http://schemas.microsoft.com/office/drawing/2010/main">
+              <a14:hiddenFill xmlns:a14="http://schemas.microsoft.com/office/drawing/2010/main" xmlns="">
                 <a:solidFill>
                   <a:srgbClr val="FFFFFF"/>
                 </a:solidFill>
@@ -17421,7 +17416,7 @@
           <a:blip r:embed="rId4" cstate="print">
             <a:extLst>
               <a:ext uri="{BEBA8EAE-BF5A-486C-A8C5-ECC9F3942E4B}">
-                <a14:imgProps xmlns:a14="http://schemas.microsoft.com/office/drawing/2010/main">
+                <a14:imgProps xmlns:a14="http://schemas.microsoft.com/office/drawing/2010/main" xmlns="">
                   <a14:imgLayer r:embed="rId3">
                     <a14:imgEffect>
                       <a14:backgroundRemoval t="37255" b="85994" l="36286" r="100000">
@@ -17436,7 +17431,7 @@
                 </a14:imgProps>
               </a:ext>
               <a:ext uri="{28A0092B-C50C-407E-A947-70E740481C1C}">
-                <a14:useLocalDpi xmlns:a14="http://schemas.microsoft.com/office/drawing/2010/main" val="0"/>
+                <a14:useLocalDpi xmlns:a14="http://schemas.microsoft.com/office/drawing/2010/main" xmlns="" val="0"/>
               </a:ext>
             </a:extLst>
           </a:blip>
@@ -17454,7 +17449,7 @@
           <a:noFill/>
           <a:extLst>
             <a:ext uri="{909E8E84-426E-40DD-AFC4-6F175D3DCCD1}">
-              <a14:hiddenFill xmlns:a14="http://schemas.microsoft.com/office/drawing/2010/main">
+              <a14:hiddenFill xmlns:a14="http://schemas.microsoft.com/office/drawing/2010/main" xmlns="">
                 <a:solidFill>
                   <a:srgbClr val="FFFFFF"/>
                 </a:solidFill>
@@ -17466,7 +17461,7 @@
     </p:spTree>
     <p:extLst>
       <p:ext uri="{BB962C8B-B14F-4D97-AF65-F5344CB8AC3E}">
-        <p14:creationId xmlns:p14="http://schemas.microsoft.com/office/powerpoint/2010/main" val="1599884037"/>
+        <p14:creationId xmlns:p14="http://schemas.microsoft.com/office/powerpoint/2010/main" xmlns="" val="1599884037"/>
       </p:ext>
     </p:extLst>
   </p:cSld>
@@ -17929,7 +17924,7 @@
           <a:blip r:embed="rId2" cstate="print">
             <a:extLst>
               <a:ext uri="{BEBA8EAE-BF5A-486C-A8C5-ECC9F3942E4B}">
-                <a14:imgProps xmlns:a14="http://schemas.microsoft.com/office/drawing/2010/main">
+                <a14:imgProps xmlns:a14="http://schemas.microsoft.com/office/drawing/2010/main" xmlns="">
                   <a14:imgLayer r:embed="rId3">
                     <a14:imgEffect>
                       <a14:backgroundRemoval t="0" b="100000" l="0" r="100000">
@@ -17956,7 +17951,7 @@
                 </a14:imgProps>
               </a:ext>
               <a:ext uri="{28A0092B-C50C-407E-A947-70E740481C1C}">
-                <a14:useLocalDpi xmlns:a14="http://schemas.microsoft.com/office/drawing/2010/main" val="0"/>
+                <a14:useLocalDpi xmlns:a14="http://schemas.microsoft.com/office/drawing/2010/main" xmlns="" val="0"/>
               </a:ext>
             </a:extLst>
           </a:blip>
@@ -17974,7 +17969,7 @@
           <a:noFill/>
           <a:extLst>
             <a:ext uri="{909E8E84-426E-40DD-AFC4-6F175D3DCCD1}">
-              <a14:hiddenFill xmlns:a14="http://schemas.microsoft.com/office/drawing/2010/main">
+              <a14:hiddenFill xmlns:a14="http://schemas.microsoft.com/office/drawing/2010/main" xmlns="">
                 <a:solidFill>
                   <a:srgbClr val="FFFFFF"/>
                 </a:solidFill>
@@ -17995,7 +17990,7 @@
           <a:blip r:embed="rId4" cstate="print">
             <a:extLst>
               <a:ext uri="{BEBA8EAE-BF5A-486C-A8C5-ECC9F3942E4B}">
-                <a14:imgProps xmlns:a14="http://schemas.microsoft.com/office/drawing/2010/main">
+                <a14:imgProps xmlns:a14="http://schemas.microsoft.com/office/drawing/2010/main" xmlns="">
                   <a14:imgLayer r:embed="rId3">
                     <a14:imgEffect>
                       <a14:backgroundRemoval t="37255" b="85994" l="36286" r="100000">
@@ -18010,7 +18005,7 @@
                 </a14:imgProps>
               </a:ext>
               <a:ext uri="{28A0092B-C50C-407E-A947-70E740481C1C}">
-                <a14:useLocalDpi xmlns:a14="http://schemas.microsoft.com/office/drawing/2010/main" val="0"/>
+                <a14:useLocalDpi xmlns:a14="http://schemas.microsoft.com/office/drawing/2010/main" xmlns="" val="0"/>
               </a:ext>
             </a:extLst>
           </a:blip>
@@ -18028,7 +18023,7 @@
           <a:noFill/>
           <a:extLst>
             <a:ext uri="{909E8E84-426E-40DD-AFC4-6F175D3DCCD1}">
-              <a14:hiddenFill xmlns:a14="http://schemas.microsoft.com/office/drawing/2010/main">
+              <a14:hiddenFill xmlns:a14="http://schemas.microsoft.com/office/drawing/2010/main" xmlns="">
                 <a:solidFill>
                   <a:srgbClr val="FFFFFF"/>
                 </a:solidFill>
@@ -18174,7 +18169,7 @@
     </p:spTree>
     <p:extLst>
       <p:ext uri="{BB962C8B-B14F-4D97-AF65-F5344CB8AC3E}">
-        <p14:creationId xmlns:p14="http://schemas.microsoft.com/office/powerpoint/2010/main" val="2756733679"/>
+        <p14:creationId xmlns:p14="http://schemas.microsoft.com/office/powerpoint/2010/main" xmlns="" val="2756733679"/>
       </p:ext>
     </p:extLst>
   </p:cSld>
@@ -18381,7 +18376,7 @@
           <a:blip r:embed="rId2" cstate="print">
             <a:extLst>
               <a:ext uri="{BEBA8EAE-BF5A-486C-A8C5-ECC9F3942E4B}">
-                <a14:imgProps xmlns:a14="http://schemas.microsoft.com/office/drawing/2010/main">
+                <a14:imgProps xmlns:a14="http://schemas.microsoft.com/office/drawing/2010/main" xmlns="">
                   <a14:imgLayer r:embed="rId3">
                     <a14:imgEffect>
                       <a14:backgroundRemoval t="0" b="100000" l="0" r="100000">
@@ -18408,7 +18403,7 @@
                 </a14:imgProps>
               </a:ext>
               <a:ext uri="{28A0092B-C50C-407E-A947-70E740481C1C}">
-                <a14:useLocalDpi xmlns:a14="http://schemas.microsoft.com/office/drawing/2010/main" val="0"/>
+                <a14:useLocalDpi xmlns:a14="http://schemas.microsoft.com/office/drawing/2010/main" xmlns="" val="0"/>
               </a:ext>
             </a:extLst>
           </a:blip>
@@ -18426,7 +18421,7 @@
           <a:noFill/>
           <a:extLst>
             <a:ext uri="{909E8E84-426E-40DD-AFC4-6F175D3DCCD1}">
-              <a14:hiddenFill xmlns:a14="http://schemas.microsoft.com/office/drawing/2010/main">
+              <a14:hiddenFill xmlns:a14="http://schemas.microsoft.com/office/drawing/2010/main" xmlns="">
                 <a:solidFill>
                   <a:srgbClr val="FFFFFF"/>
                 </a:solidFill>
@@ -18447,7 +18442,7 @@
           <a:blip r:embed="rId4" cstate="print">
             <a:extLst>
               <a:ext uri="{BEBA8EAE-BF5A-486C-A8C5-ECC9F3942E4B}">
-                <a14:imgProps xmlns:a14="http://schemas.microsoft.com/office/drawing/2010/main">
+                <a14:imgProps xmlns:a14="http://schemas.microsoft.com/office/drawing/2010/main" xmlns="">
                   <a14:imgLayer r:embed="rId3">
                     <a14:imgEffect>
                       <a14:backgroundRemoval t="37255" b="85994" l="36286" r="100000">
@@ -18462,7 +18457,7 @@
                 </a14:imgProps>
               </a:ext>
               <a:ext uri="{28A0092B-C50C-407E-A947-70E740481C1C}">
-                <a14:useLocalDpi xmlns:a14="http://schemas.microsoft.com/office/drawing/2010/main" val="0"/>
+                <a14:useLocalDpi xmlns:a14="http://schemas.microsoft.com/office/drawing/2010/main" xmlns="" val="0"/>
               </a:ext>
             </a:extLst>
           </a:blip>
@@ -18480,7 +18475,7 @@
           <a:noFill/>
           <a:extLst>
             <a:ext uri="{909E8E84-426E-40DD-AFC4-6F175D3DCCD1}">
-              <a14:hiddenFill xmlns:a14="http://schemas.microsoft.com/office/drawing/2010/main">
+              <a14:hiddenFill xmlns:a14="http://schemas.microsoft.com/office/drawing/2010/main" xmlns="">
                 <a:solidFill>
                   <a:srgbClr val="FFFFFF"/>
                 </a:solidFill>
@@ -18492,7 +18487,7 @@
     </p:spTree>
     <p:extLst>
       <p:ext uri="{BB962C8B-B14F-4D97-AF65-F5344CB8AC3E}">
-        <p14:creationId xmlns:p14="http://schemas.microsoft.com/office/powerpoint/2010/main" val="2756733679"/>
+        <p14:creationId xmlns:p14="http://schemas.microsoft.com/office/powerpoint/2010/main" xmlns="" val="2756733679"/>
       </p:ext>
     </p:extLst>
   </p:cSld>
@@ -18801,7 +18796,17 @@
           <a:p>
             <a:r>
               <a:rPr lang="de-CH" dirty="0" smtClean="0"/>
-              <a:t>Linien erkennen</a:t>
+              <a:t>Alle Teile mit Labels versehen</a:t>
+            </a:r>
+          </a:p>
+          <a:p>
+            <a:r>
+              <a:rPr lang="de-CH" dirty="0" smtClean="0"/>
+              <a:t>Linien </a:t>
+            </a:r>
+            <a:r>
+              <a:rPr lang="de-CH" dirty="0" smtClean="0"/>
+              <a:t>erkennen</a:t>
             </a:r>
           </a:p>
           <a:p>
@@ -18813,13 +18818,11 @@
           <a:p>
             <a:r>
               <a:rPr lang="de-CH" dirty="0" smtClean="0"/>
-              <a:t>Alle Teile mit Labels versehen</a:t>
-            </a:r>
-          </a:p>
-          <a:p>
+              <a:t>Features </a:t>
+            </a:r>
             <a:r>
               <a:rPr lang="de-CH" dirty="0" smtClean="0"/>
-              <a:t>Features definieren</a:t>
+              <a:t>definieren</a:t>
             </a:r>
           </a:p>
           <a:p>
@@ -18855,7 +18858,7 @@
           <a:blip r:embed="rId2" cstate="print">
             <a:extLst>
               <a:ext uri="{BEBA8EAE-BF5A-486C-A8C5-ECC9F3942E4B}">
-                <a14:imgProps xmlns:a14="http://schemas.microsoft.com/office/drawing/2010/main">
+                <a14:imgProps xmlns:a14="http://schemas.microsoft.com/office/drawing/2010/main" xmlns="">
                   <a14:imgLayer r:embed="rId3">
                     <a14:imgEffect>
                       <a14:backgroundRemoval t="0" b="100000" l="0" r="100000">
@@ -18866,7 +18869,7 @@
                 </a14:imgProps>
               </a:ext>
               <a:ext uri="{28A0092B-C50C-407E-A947-70E740481C1C}">
-                <a14:useLocalDpi xmlns:a14="http://schemas.microsoft.com/office/drawing/2010/main" val="0"/>
+                <a14:useLocalDpi xmlns:a14="http://schemas.microsoft.com/office/drawing/2010/main" xmlns="" val="0"/>
               </a:ext>
             </a:extLst>
           </a:blip>
@@ -18890,14 +18893,14 @@
           <a:effectLst/>
           <a:extLst>
             <a:ext uri="{909E8E84-426E-40DD-AFC4-6F175D3DCCD1}">
-              <a14:hiddenFill xmlns:a14="http://schemas.microsoft.com/office/drawing/2010/main">
+              <a14:hiddenFill xmlns:a14="http://schemas.microsoft.com/office/drawing/2010/main" xmlns="">
                 <a:solidFill>
                   <a:schemeClr val="accent1"/>
                 </a:solidFill>
               </a14:hiddenFill>
             </a:ext>
             <a:ext uri="{91240B29-F687-4F45-9708-019B960494DF}">
-              <a14:hiddenLine xmlns:a14="http://schemas.microsoft.com/office/drawing/2010/main" w="9525">
+              <a14:hiddenLine xmlns:a14="http://schemas.microsoft.com/office/drawing/2010/main" xmlns="" w="9525">
                 <a:solidFill>
                   <a:schemeClr val="tx1"/>
                 </a:solidFill>
@@ -18907,7 +18910,7 @@
               </a14:hiddenLine>
             </a:ext>
             <a:ext uri="{AF507438-7753-43E0-B8FC-AC1667EBCBE1}">
-              <a14:hiddenEffects xmlns:a14="http://schemas.microsoft.com/office/drawing/2010/main">
+              <a14:hiddenEffects xmlns:a14="http://schemas.microsoft.com/office/drawing/2010/main" xmlns="">
                 <a:effectLst>
                   <a:outerShdw dist="35921" dir="2700000" algn="ctr" rotWithShape="0">
                     <a:schemeClr val="bg2"/>
@@ -18930,7 +18933,7 @@
           <a:blip r:embed="rId4" cstate="print">
             <a:extLst>
               <a:ext uri="{BEBA8EAE-BF5A-486C-A8C5-ECC9F3942E4B}">
-                <a14:imgProps xmlns:a14="http://schemas.microsoft.com/office/drawing/2010/main">
+                <a14:imgProps xmlns:a14="http://schemas.microsoft.com/office/drawing/2010/main" xmlns="">
                   <a14:imgLayer r:embed="rId5">
                     <a14:imgEffect>
                       <a14:backgroundRemoval t="10000" b="90000" l="10000" r="90000"/>
@@ -18939,7 +18942,7 @@
                 </a14:imgProps>
               </a:ext>
               <a:ext uri="{28A0092B-C50C-407E-A947-70E740481C1C}">
-                <a14:useLocalDpi xmlns:a14="http://schemas.microsoft.com/office/drawing/2010/main" val="0"/>
+                <a14:useLocalDpi xmlns:a14="http://schemas.microsoft.com/office/drawing/2010/main" xmlns="" val="0"/>
               </a:ext>
             </a:extLst>
           </a:blip>
@@ -18963,14 +18966,14 @@
           <a:effectLst/>
           <a:extLst>
             <a:ext uri="{909E8E84-426E-40DD-AFC4-6F175D3DCCD1}">
-              <a14:hiddenFill xmlns:a14="http://schemas.microsoft.com/office/drawing/2010/main">
+              <a14:hiddenFill xmlns:a14="http://schemas.microsoft.com/office/drawing/2010/main" xmlns="">
                 <a:solidFill>
                   <a:schemeClr val="accent1"/>
                 </a:solidFill>
               </a14:hiddenFill>
             </a:ext>
             <a:ext uri="{91240B29-F687-4F45-9708-019B960494DF}">
-              <a14:hiddenLine xmlns:a14="http://schemas.microsoft.com/office/drawing/2010/main" w="9525">
+              <a14:hiddenLine xmlns:a14="http://schemas.microsoft.com/office/drawing/2010/main" xmlns="" w="9525">
                 <a:solidFill>
                   <a:schemeClr val="tx1"/>
                 </a:solidFill>
@@ -18980,7 +18983,7 @@
               </a14:hiddenLine>
             </a:ext>
             <a:ext uri="{AF507438-7753-43E0-B8FC-AC1667EBCBE1}">
-              <a14:hiddenEffects xmlns:a14="http://schemas.microsoft.com/office/drawing/2010/main">
+              <a14:hiddenEffects xmlns:a14="http://schemas.microsoft.com/office/drawing/2010/main" xmlns="">
                 <a:effectLst>
                   <a:outerShdw dist="35921" dir="2700000" algn="ctr" rotWithShape="0">
                     <a:schemeClr val="bg2"/>
@@ -19017,7 +19020,7 @@
             <a:blip r:embed="rId4" cstate="print">
               <a:extLst>
                 <a:ext uri="{BEBA8EAE-BF5A-486C-A8C5-ECC9F3942E4B}">
-                  <a14:imgProps xmlns:a14="http://schemas.microsoft.com/office/drawing/2010/main">
+                  <a14:imgProps xmlns:a14="http://schemas.microsoft.com/office/drawing/2010/main" xmlns="">
                     <a14:imgLayer r:embed="rId5">
                       <a14:imgEffect>
                         <a14:backgroundRemoval t="10000" b="90000" l="10000" r="90000"/>
@@ -19026,7 +19029,7 @@
                   </a14:imgProps>
                 </a:ext>
                 <a:ext uri="{28A0092B-C50C-407E-A947-70E740481C1C}">
-                  <a14:useLocalDpi xmlns:a14="http://schemas.microsoft.com/office/drawing/2010/main" val="0"/>
+                  <a14:useLocalDpi xmlns:a14="http://schemas.microsoft.com/office/drawing/2010/main" xmlns="" val="0"/>
                 </a:ext>
               </a:extLst>
             </a:blip>
@@ -19050,14 +19053,14 @@
             <a:effectLst/>
             <a:extLst>
               <a:ext uri="{909E8E84-426E-40DD-AFC4-6F175D3DCCD1}">
-                <a14:hiddenFill xmlns:a14="http://schemas.microsoft.com/office/drawing/2010/main">
+                <a14:hiddenFill xmlns:a14="http://schemas.microsoft.com/office/drawing/2010/main" xmlns="">
                   <a:solidFill>
                     <a:schemeClr val="accent1"/>
                   </a:solidFill>
                 </a14:hiddenFill>
               </a:ext>
               <a:ext uri="{91240B29-F687-4F45-9708-019B960494DF}">
-                <a14:hiddenLine xmlns:a14="http://schemas.microsoft.com/office/drawing/2010/main" w="9525">
+                <a14:hiddenLine xmlns:a14="http://schemas.microsoft.com/office/drawing/2010/main" xmlns="" w="9525">
                   <a:solidFill>
                     <a:schemeClr val="tx1"/>
                   </a:solidFill>
@@ -19067,7 +19070,7 @@
                 </a14:hiddenLine>
               </a:ext>
               <a:ext uri="{AF507438-7753-43E0-B8FC-AC1667EBCBE1}">
-                <a14:hiddenEffects xmlns:a14="http://schemas.microsoft.com/office/drawing/2010/main">
+                <a14:hiddenEffects xmlns:a14="http://schemas.microsoft.com/office/drawing/2010/main" xmlns="">
                   <a:effectLst>
                     <a:outerShdw dist="35921" dir="2700000" algn="ctr" rotWithShape="0">
                       <a:schemeClr val="bg2"/>
@@ -19385,7 +19388,7 @@
             <a:blip r:embed="rId4" cstate="print">
               <a:extLst>
                 <a:ext uri="{BEBA8EAE-BF5A-486C-A8C5-ECC9F3942E4B}">
-                  <a14:imgProps xmlns:a14="http://schemas.microsoft.com/office/drawing/2010/main">
+                  <a14:imgProps xmlns:a14="http://schemas.microsoft.com/office/drawing/2010/main" xmlns="">
                     <a14:imgLayer r:embed="rId5">
                       <a14:imgEffect>
                         <a14:backgroundRemoval t="10000" b="90000" l="10000" r="90000"/>
@@ -19394,7 +19397,7 @@
                   </a14:imgProps>
                 </a:ext>
                 <a:ext uri="{28A0092B-C50C-407E-A947-70E740481C1C}">
-                  <a14:useLocalDpi xmlns:a14="http://schemas.microsoft.com/office/drawing/2010/main" val="0"/>
+                  <a14:useLocalDpi xmlns:a14="http://schemas.microsoft.com/office/drawing/2010/main" xmlns="" val="0"/>
                 </a:ext>
               </a:extLst>
             </a:blip>
@@ -19418,14 +19421,14 @@
             <a:effectLst/>
             <a:extLst>
               <a:ext uri="{909E8E84-426E-40DD-AFC4-6F175D3DCCD1}">
-                <a14:hiddenFill xmlns:a14="http://schemas.microsoft.com/office/drawing/2010/main">
+                <a14:hiddenFill xmlns:a14="http://schemas.microsoft.com/office/drawing/2010/main" xmlns="">
                   <a:solidFill>
                     <a:schemeClr val="accent1"/>
                   </a:solidFill>
                 </a14:hiddenFill>
               </a:ext>
               <a:ext uri="{91240B29-F687-4F45-9708-019B960494DF}">
-                <a14:hiddenLine xmlns:a14="http://schemas.microsoft.com/office/drawing/2010/main" w="9525">
+                <a14:hiddenLine xmlns:a14="http://schemas.microsoft.com/office/drawing/2010/main" xmlns="" w="9525">
                   <a:solidFill>
                     <a:schemeClr val="tx1"/>
                   </a:solidFill>
@@ -19435,7 +19438,7 @@
                 </a14:hiddenLine>
               </a:ext>
               <a:ext uri="{AF507438-7753-43E0-B8FC-AC1667EBCBE1}">
-                <a14:hiddenEffects xmlns:a14="http://schemas.microsoft.com/office/drawing/2010/main">
+                <a14:hiddenEffects xmlns:a14="http://schemas.microsoft.com/office/drawing/2010/main" xmlns="">
                   <a:effectLst>
                     <a:outerShdw dist="35921" dir="2700000" algn="ctr" rotWithShape="0">
                       <a:schemeClr val="bg2"/>
@@ -19661,7 +19664,7 @@
       </p:grpSp>
       <p:grpSp>
         <p:nvGrpSpPr>
-          <p:cNvPr id="32" name="Gruppieren 31"/>
+          <p:cNvPr id="43" name="Gruppieren 42"/>
           <p:cNvGrpSpPr/>
           <p:nvPr/>
         </p:nvGrpSpPr>
@@ -19669,346 +19672,291 @@
           <a:xfrm>
             <a:off x="4771604" y="4169643"/>
             <a:ext cx="2085975" cy="2133600"/>
-            <a:chOff x="4771604" y="4169643"/>
+            <a:chOff x="5484886" y="2780926"/>
             <a:chExt cx="2085975" cy="2133600"/>
           </a:xfrm>
         </p:grpSpPr>
-        <p:grpSp>
-          <p:nvGrpSpPr>
-            <p:cNvPr id="43" name="Gruppieren 42"/>
-            <p:cNvGrpSpPr/>
+        <p:pic>
+          <p:nvPicPr>
+            <p:cNvPr id="44" name="Picture 7"/>
+            <p:cNvPicPr>
+              <a:picLocks noChangeAspect="1" noChangeArrowheads="1"/>
+            </p:cNvPicPr>
             <p:nvPr/>
-          </p:nvGrpSpPr>
-          <p:grpSpPr>
-            <a:xfrm>
-              <a:off x="4771604" y="4169643"/>
-              <a:ext cx="2085975" cy="2133600"/>
-              <a:chOff x="5484886" y="2780926"/>
-              <a:chExt cx="2085975" cy="2133600"/>
-            </a:xfrm>
-          </p:grpSpPr>
-          <p:pic>
-            <p:nvPicPr>
-              <p:cNvPr id="44" name="Picture 7"/>
-              <p:cNvPicPr>
-                <a:picLocks noChangeAspect="1" noChangeArrowheads="1"/>
-              </p:cNvPicPr>
-              <p:nvPr/>
-            </p:nvPicPr>
-            <p:blipFill>
-              <a:blip r:embed="rId4" cstate="print">
-                <a:extLst>
-                  <a:ext uri="{BEBA8EAE-BF5A-486C-A8C5-ECC9F3942E4B}">
-                    <a14:imgProps xmlns:a14="http://schemas.microsoft.com/office/drawing/2010/main">
-                      <a14:imgLayer r:embed="rId5">
-                        <a14:imgEffect>
-                          <a14:backgroundRemoval t="10000" b="90000" l="10000" r="90000"/>
-                        </a14:imgEffect>
-                      </a14:imgLayer>
-                    </a14:imgProps>
-                  </a:ext>
-                  <a:ext uri="{28A0092B-C50C-407E-A947-70E740481C1C}">
-                    <a14:useLocalDpi xmlns:a14="http://schemas.microsoft.com/office/drawing/2010/main" val="0"/>
-                  </a:ext>
-                </a:extLst>
-              </a:blip>
-              <a:srcRect/>
-              <a:stretch>
-                <a:fillRect/>
-              </a:stretch>
-            </p:blipFill>
-            <p:spPr bwMode="auto">
-              <a:xfrm>
-                <a:off x="5484886" y="2780926"/>
-                <a:ext cx="2085975" cy="2133600"/>
-              </a:xfrm>
-              <a:prstGeom prst="rect">
-                <a:avLst/>
-              </a:prstGeom>
-              <a:noFill/>
-              <a:ln>
-                <a:noFill/>
-              </a:ln>
-              <a:effectLst/>
+          </p:nvPicPr>
+          <p:blipFill>
+            <a:blip r:embed="rId4" cstate="print">
               <a:extLst>
-                <a:ext uri="{909E8E84-426E-40DD-AFC4-6F175D3DCCD1}">
-                  <a14:hiddenFill xmlns:a14="http://schemas.microsoft.com/office/drawing/2010/main">
-                    <a:solidFill>
-                      <a:schemeClr val="accent1"/>
-                    </a:solidFill>
-                  </a14:hiddenFill>
+                <a:ext uri="{BEBA8EAE-BF5A-486C-A8C5-ECC9F3942E4B}">
+                  <a14:imgProps xmlns:a14="http://schemas.microsoft.com/office/drawing/2010/main" xmlns="">
+                    <a14:imgLayer r:embed="rId5">
+                      <a14:imgEffect>
+                        <a14:backgroundRemoval t="10000" b="90000" l="10000" r="90000"/>
+                      </a14:imgEffect>
+                    </a14:imgLayer>
+                  </a14:imgProps>
                 </a:ext>
-                <a:ext uri="{91240B29-F687-4F45-9708-019B960494DF}">
-                  <a14:hiddenLine xmlns:a14="http://schemas.microsoft.com/office/drawing/2010/main" w="9525">
-                    <a:solidFill>
-                      <a:schemeClr val="tx1"/>
-                    </a:solidFill>
-                    <a:miter lim="800000"/>
-                    <a:headEnd/>
-                    <a:tailEnd/>
-                  </a14:hiddenLine>
-                </a:ext>
-                <a:ext uri="{AF507438-7753-43E0-B8FC-AC1667EBCBE1}">
-                  <a14:hiddenEffects xmlns:a14="http://schemas.microsoft.com/office/drawing/2010/main">
-                    <a:effectLst>
-                      <a:outerShdw dist="35921" dir="2700000" algn="ctr" rotWithShape="0">
-                        <a:schemeClr val="bg2"/>
-                      </a:outerShdw>
-                    </a:effectLst>
-                  </a14:hiddenEffects>
+                <a:ext uri="{28A0092B-C50C-407E-A947-70E740481C1C}">
+                  <a14:useLocalDpi xmlns:a14="http://schemas.microsoft.com/office/drawing/2010/main" xmlns="" val="0"/>
                 </a:ext>
               </a:extLst>
-            </p:spPr>
-          </p:pic>
-          <p:sp>
-            <p:nvSpPr>
-              <p:cNvPr id="45" name="Ellipse 44"/>
-              <p:cNvSpPr/>
-              <p:nvPr/>
-            </p:nvSpPr>
-            <p:spPr>
-              <a:xfrm>
-                <a:off x="5588100" y="3098785"/>
-                <a:ext cx="234701" cy="218560"/>
-              </a:xfrm>
-              <a:prstGeom prst="ellipse">
-                <a:avLst/>
-              </a:prstGeom>
-              <a:noFill/>
-              <a:ln w="19050">
-                <a:solidFill>
-                  <a:srgbClr val="FF0000"/>
-                </a:solidFill>
-              </a:ln>
-            </p:spPr>
-            <p:style>
-              <a:lnRef idx="1">
-                <a:schemeClr val="accent2"/>
-              </a:lnRef>
-              <a:fillRef idx="3">
-                <a:schemeClr val="accent2"/>
-              </a:fillRef>
-              <a:effectRef idx="2">
-                <a:schemeClr val="accent2"/>
-              </a:effectRef>
-              <a:fontRef idx="minor">
-                <a:schemeClr val="lt1"/>
-              </a:fontRef>
-            </p:style>
-            <p:txBody>
-              <a:bodyPr rtlCol="0" anchor="ctr"/>
-              <a:lstStyle/>
-              <a:p>
-                <a:pPr algn="ctr"/>
-                <a:endParaRPr lang="en-US">
-                  <a:ln>
-                    <a:solidFill>
-                      <a:srgbClr val="FF0000"/>
-                    </a:solidFill>
-                  </a:ln>
-                  <a:solidFill>
-                    <a:srgbClr val="FF0000"/>
-                  </a:solidFill>
-                </a:endParaRPr>
-              </a:p>
-            </p:txBody>
-          </p:sp>
-          <p:sp>
-            <p:nvSpPr>
-              <p:cNvPr id="46" name="Ellipse 45"/>
-              <p:cNvSpPr/>
-              <p:nvPr/>
-            </p:nvSpPr>
-            <p:spPr>
-              <a:xfrm>
-                <a:off x="5705450" y="4291828"/>
-                <a:ext cx="234701" cy="218560"/>
-              </a:xfrm>
-              <a:prstGeom prst="ellipse">
-                <a:avLst/>
-              </a:prstGeom>
-              <a:noFill/>
-              <a:ln w="19050">
-                <a:solidFill>
-                  <a:srgbClr val="FF0000"/>
-                </a:solidFill>
-              </a:ln>
-            </p:spPr>
-            <p:style>
-              <a:lnRef idx="1">
-                <a:schemeClr val="accent2"/>
-              </a:lnRef>
-              <a:fillRef idx="3">
-                <a:schemeClr val="accent2"/>
-              </a:fillRef>
-              <a:effectRef idx="2">
-                <a:schemeClr val="accent2"/>
-              </a:effectRef>
-              <a:fontRef idx="minor">
-                <a:schemeClr val="lt1"/>
-              </a:fontRef>
-            </p:style>
-            <p:txBody>
-              <a:bodyPr rtlCol="0" anchor="ctr"/>
-              <a:lstStyle/>
-              <a:p>
-                <a:pPr algn="ctr"/>
-                <a:endParaRPr lang="en-US">
-                  <a:ln>
-                    <a:solidFill>
-                      <a:srgbClr val="FF0000"/>
-                    </a:solidFill>
-                  </a:ln>
-                  <a:solidFill>
-                    <a:srgbClr val="FF0000"/>
-                  </a:solidFill>
-                </a:endParaRPr>
-              </a:p>
-            </p:txBody>
-          </p:sp>
-          <p:sp>
-            <p:nvSpPr>
-              <p:cNvPr id="47" name="Ellipse 46"/>
-              <p:cNvSpPr/>
-              <p:nvPr/>
-            </p:nvSpPr>
-            <p:spPr>
-              <a:xfrm>
-                <a:off x="6732240" y="4243770"/>
-                <a:ext cx="234701" cy="218560"/>
-              </a:xfrm>
-              <a:prstGeom prst="ellipse">
-                <a:avLst/>
-              </a:prstGeom>
-              <a:noFill/>
-              <a:ln w="19050">
-                <a:solidFill>
-                  <a:srgbClr val="FF0000"/>
-                </a:solidFill>
-              </a:ln>
-            </p:spPr>
-            <p:style>
-              <a:lnRef idx="1">
-                <a:schemeClr val="accent2"/>
-              </a:lnRef>
-              <a:fillRef idx="3">
-                <a:schemeClr val="accent2"/>
-              </a:fillRef>
-              <a:effectRef idx="2">
-                <a:schemeClr val="accent2"/>
-              </a:effectRef>
-              <a:fontRef idx="minor">
-                <a:schemeClr val="lt1"/>
-              </a:fontRef>
-            </p:style>
-            <p:txBody>
-              <a:bodyPr rtlCol="0" anchor="ctr"/>
-              <a:lstStyle/>
-              <a:p>
-                <a:pPr algn="ctr"/>
-                <a:endParaRPr lang="en-US">
-                  <a:ln>
-                    <a:solidFill>
-                      <a:srgbClr val="FF0000"/>
-                    </a:solidFill>
-                  </a:ln>
-                  <a:solidFill>
-                    <a:srgbClr val="FF0000"/>
-                  </a:solidFill>
-                </a:endParaRPr>
-              </a:p>
-            </p:txBody>
-          </p:sp>
-          <p:sp>
-            <p:nvSpPr>
-              <p:cNvPr id="48" name="Ellipse 47"/>
-              <p:cNvSpPr/>
-              <p:nvPr/>
-            </p:nvSpPr>
-            <p:spPr>
-              <a:xfrm>
-                <a:off x="6732240" y="3076227"/>
-                <a:ext cx="234701" cy="218560"/>
-              </a:xfrm>
-              <a:prstGeom prst="ellipse">
-                <a:avLst/>
-              </a:prstGeom>
-              <a:noFill/>
-              <a:ln w="19050">
-                <a:solidFill>
-                  <a:srgbClr val="FF0000"/>
-                </a:solidFill>
-              </a:ln>
-            </p:spPr>
-            <p:style>
-              <a:lnRef idx="1">
-                <a:schemeClr val="accent2"/>
-              </a:lnRef>
-              <a:fillRef idx="3">
-                <a:schemeClr val="accent2"/>
-              </a:fillRef>
-              <a:effectRef idx="2">
-                <a:schemeClr val="accent2"/>
-              </a:effectRef>
-              <a:fontRef idx="minor">
-                <a:schemeClr val="lt1"/>
-              </a:fontRef>
-            </p:style>
-            <p:txBody>
-              <a:bodyPr rtlCol="0" anchor="ctr"/>
-              <a:lstStyle/>
-              <a:p>
-                <a:pPr algn="ctr"/>
-                <a:endParaRPr lang="en-US">
-                  <a:ln>
-                    <a:solidFill>
-                      <a:srgbClr val="FF0000"/>
-                    </a:solidFill>
-                  </a:ln>
-                  <a:solidFill>
-                    <a:srgbClr val="FF0000"/>
-                  </a:solidFill>
-                </a:endParaRPr>
-              </a:p>
-            </p:txBody>
-          </p:sp>
-        </p:grpSp>
-        <p:sp>
-          <p:nvSpPr>
-            <p:cNvPr id="27" name="Textfeld 26"/>
-            <p:cNvSpPr txBox="1"/>
-            <p:nvPr/>
-          </p:nvSpPr>
-          <p:spPr>
+            </a:blip>
+            <a:srcRect/>
+            <a:stretch>
+              <a:fillRect/>
+            </a:stretch>
+          </p:blipFill>
+          <p:spPr bwMode="auto">
             <a:xfrm>
-              <a:off x="5516638" y="4935486"/>
-              <a:ext cx="423514" cy="523220"/>
+              <a:off x="5484886" y="2780926"/>
+              <a:ext cx="2085975" cy="2133600"/>
             </a:xfrm>
             <a:prstGeom prst="rect">
               <a:avLst/>
             </a:prstGeom>
             <a:noFill/>
+            <a:ln>
+              <a:noFill/>
+            </a:ln>
+            <a:effectLst/>
+            <a:extLst>
+              <a:ext uri="{909E8E84-426E-40DD-AFC4-6F175D3DCCD1}">
+                <a14:hiddenFill xmlns:a14="http://schemas.microsoft.com/office/drawing/2010/main" xmlns="">
+                  <a:solidFill>
+                    <a:schemeClr val="accent1"/>
+                  </a:solidFill>
+                </a14:hiddenFill>
+              </a:ext>
+              <a:ext uri="{91240B29-F687-4F45-9708-019B960494DF}">
+                <a14:hiddenLine xmlns:a14="http://schemas.microsoft.com/office/drawing/2010/main" xmlns="" w="9525">
+                  <a:solidFill>
+                    <a:schemeClr val="tx1"/>
+                  </a:solidFill>
+                  <a:miter lim="800000"/>
+                  <a:headEnd/>
+                  <a:tailEnd/>
+                </a14:hiddenLine>
+              </a:ext>
+              <a:ext uri="{AF507438-7753-43E0-B8FC-AC1667EBCBE1}">
+                <a14:hiddenEffects xmlns:a14="http://schemas.microsoft.com/office/drawing/2010/main" xmlns="">
+                  <a:effectLst>
+                    <a:outerShdw dist="35921" dir="2700000" algn="ctr" rotWithShape="0">
+                      <a:schemeClr val="bg2"/>
+                    </a:outerShdw>
+                  </a:effectLst>
+                </a14:hiddenEffects>
+              </a:ext>
+            </a:extLst>
           </p:spPr>
+        </p:pic>
+        <p:sp>
+          <p:nvSpPr>
+            <p:cNvPr id="45" name="Ellipse 44"/>
+            <p:cNvSpPr/>
+            <p:nvPr/>
+          </p:nvSpPr>
+          <p:spPr>
+            <a:xfrm>
+              <a:off x="5588100" y="3098785"/>
+              <a:ext cx="234701" cy="218560"/>
+            </a:xfrm>
+            <a:prstGeom prst="ellipse">
+              <a:avLst/>
+            </a:prstGeom>
+            <a:noFill/>
+            <a:ln w="19050">
+              <a:solidFill>
+                <a:srgbClr val="FF0000"/>
+              </a:solidFill>
+            </a:ln>
+          </p:spPr>
+          <p:style>
+            <a:lnRef idx="1">
+              <a:schemeClr val="accent2"/>
+            </a:lnRef>
+            <a:fillRef idx="3">
+              <a:schemeClr val="accent2"/>
+            </a:fillRef>
+            <a:effectRef idx="2">
+              <a:schemeClr val="accent2"/>
+            </a:effectRef>
+            <a:fontRef idx="minor">
+              <a:schemeClr val="lt1"/>
+            </a:fontRef>
+          </p:style>
           <p:txBody>
-            <a:bodyPr wrap="none" rtlCol="0">
-              <a:spAutoFit/>
-            </a:bodyPr>
+            <a:bodyPr rtlCol="0" anchor="ctr"/>
             <a:lstStyle/>
             <a:p>
-              <a:r>
-                <a:rPr lang="de-CH" sz="2800" b="1" dirty="0" smtClean="0">
+              <a:pPr algn="ctr"/>
+              <a:endParaRPr lang="en-US">
+                <a:ln>
                   <a:solidFill>
-                    <a:schemeClr val="bg1"/>
+                    <a:srgbClr val="FF0000"/>
                   </a:solidFill>
-                  <a:latin typeface="Arial Black" pitchFamily="34" charset="0"/>
-                </a:rPr>
-                <a:t>1</a:t>
-              </a:r>
-              <a:endParaRPr lang="en-US" sz="2800" b="1" dirty="0">
-                <a:solidFill>
-                  <a:schemeClr val="bg1"/>
-                </a:solidFill>
-                <a:latin typeface="Arial Black" pitchFamily="34" charset="0"/>
+                </a:ln>
+                <a:solidFill>
+                  <a:srgbClr val="FF0000"/>
+                </a:solidFill>
+              </a:endParaRPr>
+            </a:p>
+          </p:txBody>
+        </p:sp>
+        <p:sp>
+          <p:nvSpPr>
+            <p:cNvPr id="46" name="Ellipse 45"/>
+            <p:cNvSpPr/>
+            <p:nvPr/>
+          </p:nvSpPr>
+          <p:spPr>
+            <a:xfrm>
+              <a:off x="5705450" y="4291828"/>
+              <a:ext cx="234701" cy="218560"/>
+            </a:xfrm>
+            <a:prstGeom prst="ellipse">
+              <a:avLst/>
+            </a:prstGeom>
+            <a:noFill/>
+            <a:ln w="19050">
+              <a:solidFill>
+                <a:srgbClr val="FF0000"/>
+              </a:solidFill>
+            </a:ln>
+          </p:spPr>
+          <p:style>
+            <a:lnRef idx="1">
+              <a:schemeClr val="accent2"/>
+            </a:lnRef>
+            <a:fillRef idx="3">
+              <a:schemeClr val="accent2"/>
+            </a:fillRef>
+            <a:effectRef idx="2">
+              <a:schemeClr val="accent2"/>
+            </a:effectRef>
+            <a:fontRef idx="minor">
+              <a:schemeClr val="lt1"/>
+            </a:fontRef>
+          </p:style>
+          <p:txBody>
+            <a:bodyPr rtlCol="0" anchor="ctr"/>
+            <a:lstStyle/>
+            <a:p>
+              <a:pPr algn="ctr"/>
+              <a:endParaRPr lang="en-US">
+                <a:ln>
+                  <a:solidFill>
+                    <a:srgbClr val="FF0000"/>
+                  </a:solidFill>
+                </a:ln>
+                <a:solidFill>
+                  <a:srgbClr val="FF0000"/>
+                </a:solidFill>
+              </a:endParaRPr>
+            </a:p>
+          </p:txBody>
+        </p:sp>
+        <p:sp>
+          <p:nvSpPr>
+            <p:cNvPr id="47" name="Ellipse 46"/>
+            <p:cNvSpPr/>
+            <p:nvPr/>
+          </p:nvSpPr>
+          <p:spPr>
+            <a:xfrm>
+              <a:off x="6732240" y="4243770"/>
+              <a:ext cx="234701" cy="218560"/>
+            </a:xfrm>
+            <a:prstGeom prst="ellipse">
+              <a:avLst/>
+            </a:prstGeom>
+            <a:noFill/>
+            <a:ln w="19050">
+              <a:solidFill>
+                <a:srgbClr val="FF0000"/>
+              </a:solidFill>
+            </a:ln>
+          </p:spPr>
+          <p:style>
+            <a:lnRef idx="1">
+              <a:schemeClr val="accent2"/>
+            </a:lnRef>
+            <a:fillRef idx="3">
+              <a:schemeClr val="accent2"/>
+            </a:fillRef>
+            <a:effectRef idx="2">
+              <a:schemeClr val="accent2"/>
+            </a:effectRef>
+            <a:fontRef idx="minor">
+              <a:schemeClr val="lt1"/>
+            </a:fontRef>
+          </p:style>
+          <p:txBody>
+            <a:bodyPr rtlCol="0" anchor="ctr"/>
+            <a:lstStyle/>
+            <a:p>
+              <a:pPr algn="ctr"/>
+              <a:endParaRPr lang="en-US">
+                <a:ln>
+                  <a:solidFill>
+                    <a:srgbClr val="FF0000"/>
+                  </a:solidFill>
+                </a:ln>
+                <a:solidFill>
+                  <a:srgbClr val="FF0000"/>
+                </a:solidFill>
+              </a:endParaRPr>
+            </a:p>
+          </p:txBody>
+        </p:sp>
+        <p:sp>
+          <p:nvSpPr>
+            <p:cNvPr id="48" name="Ellipse 47"/>
+            <p:cNvSpPr/>
+            <p:nvPr/>
+          </p:nvSpPr>
+          <p:spPr>
+            <a:xfrm>
+              <a:off x="6732240" y="3076227"/>
+              <a:ext cx="234701" cy="218560"/>
+            </a:xfrm>
+            <a:prstGeom prst="ellipse">
+              <a:avLst/>
+            </a:prstGeom>
+            <a:noFill/>
+            <a:ln w="19050">
+              <a:solidFill>
+                <a:srgbClr val="FF0000"/>
+              </a:solidFill>
+            </a:ln>
+          </p:spPr>
+          <p:style>
+            <a:lnRef idx="1">
+              <a:schemeClr val="accent2"/>
+            </a:lnRef>
+            <a:fillRef idx="3">
+              <a:schemeClr val="accent2"/>
+            </a:fillRef>
+            <a:effectRef idx="2">
+              <a:schemeClr val="accent2"/>
+            </a:effectRef>
+            <a:fontRef idx="minor">
+              <a:schemeClr val="lt1"/>
+            </a:fontRef>
+          </p:style>
+          <p:txBody>
+            <a:bodyPr rtlCol="0" anchor="ctr"/>
+            <a:lstStyle/>
+            <a:p>
+              <a:pPr algn="ctr"/>
+              <a:endParaRPr lang="en-US">
+                <a:ln>
+                  <a:solidFill>
+                    <a:srgbClr val="FF0000"/>
+                  </a:solidFill>
+                </a:ln>
+                <a:solidFill>
+                  <a:srgbClr val="FF0000"/>
+                </a:solidFill>
               </a:endParaRPr>
             </a:p>
           </p:txBody>
@@ -20016,354 +19964,299 @@
       </p:grpSp>
       <p:grpSp>
         <p:nvGrpSpPr>
-          <p:cNvPr id="31" name="Gruppieren 30"/>
+          <p:cNvPr id="50" name="Gruppieren 49"/>
           <p:cNvGrpSpPr/>
           <p:nvPr/>
         </p:nvGrpSpPr>
         <p:grpSpPr>
-          <a:xfrm>
-            <a:off x="6412836" y="4242919"/>
-            <a:ext cx="2133600" cy="2085975"/>
-            <a:chOff x="6412836" y="4242919"/>
-            <a:chExt cx="2133600" cy="2085975"/>
+          <a:xfrm rot="5400000">
+            <a:off x="6436648" y="4219107"/>
+            <a:ext cx="2085975" cy="2133600"/>
+            <a:chOff x="5484886" y="2780926"/>
+            <a:chExt cx="2085975" cy="2133600"/>
           </a:xfrm>
         </p:grpSpPr>
-        <p:grpSp>
-          <p:nvGrpSpPr>
-            <p:cNvPr id="50" name="Gruppieren 49"/>
-            <p:cNvGrpSpPr/>
+        <p:pic>
+          <p:nvPicPr>
+            <p:cNvPr id="51" name="Picture 7"/>
+            <p:cNvPicPr>
+              <a:picLocks noChangeAspect="1" noChangeArrowheads="1"/>
+            </p:cNvPicPr>
             <p:nvPr/>
-          </p:nvGrpSpPr>
-          <p:grpSpPr>
-            <a:xfrm rot="5400000">
-              <a:off x="6436648" y="4219107"/>
-              <a:ext cx="2085975" cy="2133600"/>
-              <a:chOff x="5484886" y="2780926"/>
-              <a:chExt cx="2085975" cy="2133600"/>
-            </a:xfrm>
-          </p:grpSpPr>
-          <p:pic>
-            <p:nvPicPr>
-              <p:cNvPr id="51" name="Picture 7"/>
-              <p:cNvPicPr>
-                <a:picLocks noChangeAspect="1" noChangeArrowheads="1"/>
-              </p:cNvPicPr>
-              <p:nvPr/>
-            </p:nvPicPr>
-            <p:blipFill>
-              <a:blip r:embed="rId4" cstate="print">
-                <a:extLst>
-                  <a:ext uri="{BEBA8EAE-BF5A-486C-A8C5-ECC9F3942E4B}">
-                    <a14:imgProps xmlns:a14="http://schemas.microsoft.com/office/drawing/2010/main">
-                      <a14:imgLayer r:embed="rId5">
-                        <a14:imgEffect>
-                          <a14:backgroundRemoval t="10000" b="90000" l="10000" r="90000"/>
-                        </a14:imgEffect>
-                      </a14:imgLayer>
-                    </a14:imgProps>
-                  </a:ext>
-                  <a:ext uri="{28A0092B-C50C-407E-A947-70E740481C1C}">
-                    <a14:useLocalDpi xmlns:a14="http://schemas.microsoft.com/office/drawing/2010/main" val="0"/>
-                  </a:ext>
-                </a:extLst>
-              </a:blip>
-              <a:srcRect/>
-              <a:stretch>
-                <a:fillRect/>
-              </a:stretch>
-            </p:blipFill>
-            <p:spPr bwMode="auto">
-              <a:xfrm>
-                <a:off x="5484886" y="2780926"/>
-                <a:ext cx="2085975" cy="2133600"/>
-              </a:xfrm>
-              <a:prstGeom prst="rect">
-                <a:avLst/>
-              </a:prstGeom>
-              <a:noFill/>
-              <a:ln>
-                <a:noFill/>
-              </a:ln>
-              <a:effectLst/>
+          </p:nvPicPr>
+          <p:blipFill>
+            <a:blip r:embed="rId4" cstate="print">
               <a:extLst>
-                <a:ext uri="{909E8E84-426E-40DD-AFC4-6F175D3DCCD1}">
-                  <a14:hiddenFill xmlns:a14="http://schemas.microsoft.com/office/drawing/2010/main">
-                    <a:solidFill>
-                      <a:schemeClr val="accent1"/>
-                    </a:solidFill>
-                  </a14:hiddenFill>
+                <a:ext uri="{BEBA8EAE-BF5A-486C-A8C5-ECC9F3942E4B}">
+                  <a14:imgProps xmlns:a14="http://schemas.microsoft.com/office/drawing/2010/main" xmlns="">
+                    <a14:imgLayer r:embed="rId5">
+                      <a14:imgEffect>
+                        <a14:backgroundRemoval t="10000" b="90000" l="10000" r="90000"/>
+                      </a14:imgEffect>
+                    </a14:imgLayer>
+                  </a14:imgProps>
                 </a:ext>
-                <a:ext uri="{91240B29-F687-4F45-9708-019B960494DF}">
-                  <a14:hiddenLine xmlns:a14="http://schemas.microsoft.com/office/drawing/2010/main" w="9525">
-                    <a:solidFill>
-                      <a:schemeClr val="tx1"/>
-                    </a:solidFill>
-                    <a:miter lim="800000"/>
-                    <a:headEnd/>
-                    <a:tailEnd/>
-                  </a14:hiddenLine>
-                </a:ext>
-                <a:ext uri="{AF507438-7753-43E0-B8FC-AC1667EBCBE1}">
-                  <a14:hiddenEffects xmlns:a14="http://schemas.microsoft.com/office/drawing/2010/main">
-                    <a:effectLst>
-                      <a:outerShdw dist="35921" dir="2700000" algn="ctr" rotWithShape="0">
-                        <a:schemeClr val="bg2"/>
-                      </a:outerShdw>
-                    </a:effectLst>
-                  </a14:hiddenEffects>
+                <a:ext uri="{28A0092B-C50C-407E-A947-70E740481C1C}">
+                  <a14:useLocalDpi xmlns:a14="http://schemas.microsoft.com/office/drawing/2010/main" xmlns="" val="0"/>
                 </a:ext>
               </a:extLst>
-            </p:spPr>
-          </p:pic>
-          <p:sp>
-            <p:nvSpPr>
-              <p:cNvPr id="52" name="Ellipse 51"/>
-              <p:cNvSpPr/>
-              <p:nvPr/>
-            </p:nvSpPr>
-            <p:spPr>
-              <a:xfrm>
-                <a:off x="5588100" y="3098785"/>
-                <a:ext cx="234701" cy="218560"/>
-              </a:xfrm>
-              <a:prstGeom prst="ellipse">
-                <a:avLst/>
-              </a:prstGeom>
-              <a:noFill/>
-              <a:ln w="19050">
-                <a:solidFill>
-                  <a:srgbClr val="FF0000"/>
-                </a:solidFill>
-              </a:ln>
-            </p:spPr>
-            <p:style>
-              <a:lnRef idx="1">
-                <a:schemeClr val="accent2"/>
-              </a:lnRef>
-              <a:fillRef idx="3">
-                <a:schemeClr val="accent2"/>
-              </a:fillRef>
-              <a:effectRef idx="2">
-                <a:schemeClr val="accent2"/>
-              </a:effectRef>
-              <a:fontRef idx="minor">
-                <a:schemeClr val="lt1"/>
-              </a:fontRef>
-            </p:style>
-            <p:txBody>
-              <a:bodyPr rtlCol="0" anchor="ctr"/>
-              <a:lstStyle/>
-              <a:p>
-                <a:pPr algn="ctr"/>
-                <a:endParaRPr lang="en-US">
-                  <a:ln>
-                    <a:solidFill>
-                      <a:srgbClr val="FF0000"/>
-                    </a:solidFill>
-                  </a:ln>
-                  <a:solidFill>
-                    <a:srgbClr val="FF0000"/>
-                  </a:solidFill>
-                </a:endParaRPr>
-              </a:p>
-            </p:txBody>
-          </p:sp>
-          <p:sp>
-            <p:nvSpPr>
-              <p:cNvPr id="53" name="Ellipse 52"/>
-              <p:cNvSpPr/>
-              <p:nvPr/>
-            </p:nvSpPr>
-            <p:spPr>
-              <a:xfrm>
-                <a:off x="5705450" y="4291828"/>
-                <a:ext cx="234701" cy="218560"/>
-              </a:xfrm>
-              <a:prstGeom prst="ellipse">
-                <a:avLst/>
-              </a:prstGeom>
-              <a:noFill/>
-              <a:ln w="19050">
-                <a:solidFill>
-                  <a:srgbClr val="FF0000"/>
-                </a:solidFill>
-              </a:ln>
-            </p:spPr>
-            <p:style>
-              <a:lnRef idx="1">
-                <a:schemeClr val="accent2"/>
-              </a:lnRef>
-              <a:fillRef idx="3">
-                <a:schemeClr val="accent2"/>
-              </a:fillRef>
-              <a:effectRef idx="2">
-                <a:schemeClr val="accent2"/>
-              </a:effectRef>
-              <a:fontRef idx="minor">
-                <a:schemeClr val="lt1"/>
-              </a:fontRef>
-            </p:style>
-            <p:txBody>
-              <a:bodyPr rtlCol="0" anchor="ctr"/>
-              <a:lstStyle/>
-              <a:p>
-                <a:pPr algn="ctr"/>
-                <a:endParaRPr lang="en-US">
-                  <a:ln>
-                    <a:solidFill>
-                      <a:srgbClr val="FF0000"/>
-                    </a:solidFill>
-                  </a:ln>
-                  <a:solidFill>
-                    <a:srgbClr val="FF0000"/>
-                  </a:solidFill>
-                </a:endParaRPr>
-              </a:p>
-            </p:txBody>
-          </p:sp>
-          <p:sp>
-            <p:nvSpPr>
-              <p:cNvPr id="54" name="Ellipse 53"/>
-              <p:cNvSpPr/>
-              <p:nvPr/>
-            </p:nvSpPr>
-            <p:spPr>
-              <a:xfrm>
-                <a:off x="6732240" y="4243770"/>
-                <a:ext cx="234701" cy="218560"/>
-              </a:xfrm>
-              <a:prstGeom prst="ellipse">
-                <a:avLst/>
-              </a:prstGeom>
-              <a:noFill/>
-              <a:ln w="19050">
-                <a:solidFill>
-                  <a:srgbClr val="FF0000"/>
-                </a:solidFill>
-              </a:ln>
-            </p:spPr>
-            <p:style>
-              <a:lnRef idx="1">
-                <a:schemeClr val="accent2"/>
-              </a:lnRef>
-              <a:fillRef idx="3">
-                <a:schemeClr val="accent2"/>
-              </a:fillRef>
-              <a:effectRef idx="2">
-                <a:schemeClr val="accent2"/>
-              </a:effectRef>
-              <a:fontRef idx="minor">
-                <a:schemeClr val="lt1"/>
-              </a:fontRef>
-            </p:style>
-            <p:txBody>
-              <a:bodyPr rtlCol="0" anchor="ctr"/>
-              <a:lstStyle/>
-              <a:p>
-                <a:pPr algn="ctr"/>
-                <a:endParaRPr lang="en-US">
-                  <a:ln>
-                    <a:solidFill>
-                      <a:srgbClr val="FF0000"/>
-                    </a:solidFill>
-                  </a:ln>
-                  <a:solidFill>
-                    <a:srgbClr val="FF0000"/>
-                  </a:solidFill>
-                </a:endParaRPr>
-              </a:p>
-            </p:txBody>
-          </p:sp>
-          <p:sp>
-            <p:nvSpPr>
-              <p:cNvPr id="55" name="Ellipse 54"/>
-              <p:cNvSpPr/>
-              <p:nvPr/>
-            </p:nvSpPr>
-            <p:spPr>
-              <a:xfrm>
-                <a:off x="6732240" y="3076227"/>
-                <a:ext cx="234701" cy="218560"/>
-              </a:xfrm>
-              <a:prstGeom prst="ellipse">
-                <a:avLst/>
-              </a:prstGeom>
-              <a:noFill/>
-              <a:ln w="19050">
-                <a:solidFill>
-                  <a:srgbClr val="FF0000"/>
-                </a:solidFill>
-              </a:ln>
-            </p:spPr>
-            <p:style>
-              <a:lnRef idx="1">
-                <a:schemeClr val="accent2"/>
-              </a:lnRef>
-              <a:fillRef idx="3">
-                <a:schemeClr val="accent2"/>
-              </a:fillRef>
-              <a:effectRef idx="2">
-                <a:schemeClr val="accent2"/>
-              </a:effectRef>
-              <a:fontRef idx="minor">
-                <a:schemeClr val="lt1"/>
-              </a:fontRef>
-            </p:style>
-            <p:txBody>
-              <a:bodyPr rtlCol="0" anchor="ctr"/>
-              <a:lstStyle/>
-              <a:p>
-                <a:pPr algn="ctr"/>
-                <a:endParaRPr lang="en-US">
-                  <a:ln>
-                    <a:solidFill>
-                      <a:srgbClr val="FF0000"/>
-                    </a:solidFill>
-                  </a:ln>
-                  <a:solidFill>
-                    <a:srgbClr val="FF0000"/>
-                  </a:solidFill>
-                </a:endParaRPr>
-              </a:p>
-            </p:txBody>
-          </p:sp>
-        </p:grpSp>
-        <p:sp>
-          <p:nvSpPr>
-            <p:cNvPr id="56" name="Textfeld 55"/>
-            <p:cNvSpPr txBox="1"/>
-            <p:nvPr/>
-          </p:nvSpPr>
-          <p:spPr>
+            </a:blip>
+            <a:srcRect/>
+            <a:stretch>
+              <a:fillRect/>
+            </a:stretch>
+          </p:blipFill>
+          <p:spPr bwMode="auto">
             <a:xfrm>
-              <a:off x="7380312" y="4928987"/>
-              <a:ext cx="423514" cy="523220"/>
+              <a:off x="5484886" y="2780926"/>
+              <a:ext cx="2085975" cy="2133600"/>
             </a:xfrm>
             <a:prstGeom prst="rect">
               <a:avLst/>
             </a:prstGeom>
             <a:noFill/>
+            <a:ln>
+              <a:noFill/>
+            </a:ln>
+            <a:effectLst/>
+            <a:extLst>
+              <a:ext uri="{909E8E84-426E-40DD-AFC4-6F175D3DCCD1}">
+                <a14:hiddenFill xmlns:a14="http://schemas.microsoft.com/office/drawing/2010/main" xmlns="">
+                  <a:solidFill>
+                    <a:schemeClr val="accent1"/>
+                  </a:solidFill>
+                </a14:hiddenFill>
+              </a:ext>
+              <a:ext uri="{91240B29-F687-4F45-9708-019B960494DF}">
+                <a14:hiddenLine xmlns:a14="http://schemas.microsoft.com/office/drawing/2010/main" xmlns="" w="9525">
+                  <a:solidFill>
+                    <a:schemeClr val="tx1"/>
+                  </a:solidFill>
+                  <a:miter lim="800000"/>
+                  <a:headEnd/>
+                  <a:tailEnd/>
+                </a14:hiddenLine>
+              </a:ext>
+              <a:ext uri="{AF507438-7753-43E0-B8FC-AC1667EBCBE1}">
+                <a14:hiddenEffects xmlns:a14="http://schemas.microsoft.com/office/drawing/2010/main" xmlns="">
+                  <a:effectLst>
+                    <a:outerShdw dist="35921" dir="2700000" algn="ctr" rotWithShape="0">
+                      <a:schemeClr val="bg2"/>
+                    </a:outerShdw>
+                  </a:effectLst>
+                </a14:hiddenEffects>
+              </a:ext>
+            </a:extLst>
           </p:spPr>
+        </p:pic>
+        <p:sp>
+          <p:nvSpPr>
+            <p:cNvPr id="52" name="Ellipse 51"/>
+            <p:cNvSpPr/>
+            <p:nvPr/>
+          </p:nvSpPr>
+          <p:spPr>
+            <a:xfrm>
+              <a:off x="5588100" y="3098785"/>
+              <a:ext cx="234701" cy="218560"/>
+            </a:xfrm>
+            <a:prstGeom prst="ellipse">
+              <a:avLst/>
+            </a:prstGeom>
+            <a:noFill/>
+            <a:ln w="19050">
+              <a:solidFill>
+                <a:srgbClr val="FF0000"/>
+              </a:solidFill>
+            </a:ln>
+          </p:spPr>
+          <p:style>
+            <a:lnRef idx="1">
+              <a:schemeClr val="accent2"/>
+            </a:lnRef>
+            <a:fillRef idx="3">
+              <a:schemeClr val="accent2"/>
+            </a:fillRef>
+            <a:effectRef idx="2">
+              <a:schemeClr val="accent2"/>
+            </a:effectRef>
+            <a:fontRef idx="minor">
+              <a:schemeClr val="lt1"/>
+            </a:fontRef>
+          </p:style>
           <p:txBody>
-            <a:bodyPr wrap="none" rtlCol="0">
-              <a:spAutoFit/>
-            </a:bodyPr>
+            <a:bodyPr rtlCol="0" anchor="ctr"/>
             <a:lstStyle/>
             <a:p>
-              <a:r>
-                <a:rPr lang="de-CH" sz="2800" b="1" dirty="0" smtClean="0">
+              <a:pPr algn="ctr"/>
+              <a:endParaRPr lang="en-US">
+                <a:ln>
                   <a:solidFill>
-                    <a:schemeClr val="bg1"/>
+                    <a:srgbClr val="FF0000"/>
                   </a:solidFill>
-                  <a:latin typeface="Arial Black" pitchFamily="34" charset="0"/>
-                </a:rPr>
-                <a:t>2</a:t>
-              </a:r>
-              <a:endParaRPr lang="en-US" sz="2800" b="1" dirty="0">
-                <a:solidFill>
-                  <a:schemeClr val="bg1"/>
-                </a:solidFill>
-                <a:latin typeface="Arial Black" pitchFamily="34" charset="0"/>
+                </a:ln>
+                <a:solidFill>
+                  <a:srgbClr val="FF0000"/>
+                </a:solidFill>
+              </a:endParaRPr>
+            </a:p>
+          </p:txBody>
+        </p:sp>
+        <p:sp>
+          <p:nvSpPr>
+            <p:cNvPr id="53" name="Ellipse 52"/>
+            <p:cNvSpPr/>
+            <p:nvPr/>
+          </p:nvSpPr>
+          <p:spPr>
+            <a:xfrm>
+              <a:off x="5705450" y="4291828"/>
+              <a:ext cx="234701" cy="218560"/>
+            </a:xfrm>
+            <a:prstGeom prst="ellipse">
+              <a:avLst/>
+            </a:prstGeom>
+            <a:noFill/>
+            <a:ln w="19050">
+              <a:solidFill>
+                <a:srgbClr val="FF0000"/>
+              </a:solidFill>
+            </a:ln>
+          </p:spPr>
+          <p:style>
+            <a:lnRef idx="1">
+              <a:schemeClr val="accent2"/>
+            </a:lnRef>
+            <a:fillRef idx="3">
+              <a:schemeClr val="accent2"/>
+            </a:fillRef>
+            <a:effectRef idx="2">
+              <a:schemeClr val="accent2"/>
+            </a:effectRef>
+            <a:fontRef idx="minor">
+              <a:schemeClr val="lt1"/>
+            </a:fontRef>
+          </p:style>
+          <p:txBody>
+            <a:bodyPr rtlCol="0" anchor="ctr"/>
+            <a:lstStyle/>
+            <a:p>
+              <a:pPr algn="ctr"/>
+              <a:endParaRPr lang="en-US">
+                <a:ln>
+                  <a:solidFill>
+                    <a:srgbClr val="FF0000"/>
+                  </a:solidFill>
+                </a:ln>
+                <a:solidFill>
+                  <a:srgbClr val="FF0000"/>
+                </a:solidFill>
+              </a:endParaRPr>
+            </a:p>
+          </p:txBody>
+        </p:sp>
+        <p:sp>
+          <p:nvSpPr>
+            <p:cNvPr id="54" name="Ellipse 53"/>
+            <p:cNvSpPr/>
+            <p:nvPr/>
+          </p:nvSpPr>
+          <p:spPr>
+            <a:xfrm>
+              <a:off x="6732240" y="4243770"/>
+              <a:ext cx="234701" cy="218560"/>
+            </a:xfrm>
+            <a:prstGeom prst="ellipse">
+              <a:avLst/>
+            </a:prstGeom>
+            <a:noFill/>
+            <a:ln w="19050">
+              <a:solidFill>
+                <a:srgbClr val="FF0000"/>
+              </a:solidFill>
+            </a:ln>
+          </p:spPr>
+          <p:style>
+            <a:lnRef idx="1">
+              <a:schemeClr val="accent2"/>
+            </a:lnRef>
+            <a:fillRef idx="3">
+              <a:schemeClr val="accent2"/>
+            </a:fillRef>
+            <a:effectRef idx="2">
+              <a:schemeClr val="accent2"/>
+            </a:effectRef>
+            <a:fontRef idx="minor">
+              <a:schemeClr val="lt1"/>
+            </a:fontRef>
+          </p:style>
+          <p:txBody>
+            <a:bodyPr rtlCol="0" anchor="ctr"/>
+            <a:lstStyle/>
+            <a:p>
+              <a:pPr algn="ctr"/>
+              <a:endParaRPr lang="en-US">
+                <a:ln>
+                  <a:solidFill>
+                    <a:srgbClr val="FF0000"/>
+                  </a:solidFill>
+                </a:ln>
+                <a:solidFill>
+                  <a:srgbClr val="FF0000"/>
+                </a:solidFill>
+              </a:endParaRPr>
+            </a:p>
+          </p:txBody>
+        </p:sp>
+        <p:sp>
+          <p:nvSpPr>
+            <p:cNvPr id="55" name="Ellipse 54"/>
+            <p:cNvSpPr/>
+            <p:nvPr/>
+          </p:nvSpPr>
+          <p:spPr>
+            <a:xfrm>
+              <a:off x="6732240" y="3076227"/>
+              <a:ext cx="234701" cy="218560"/>
+            </a:xfrm>
+            <a:prstGeom prst="ellipse">
+              <a:avLst/>
+            </a:prstGeom>
+            <a:noFill/>
+            <a:ln w="19050">
+              <a:solidFill>
+                <a:srgbClr val="FF0000"/>
+              </a:solidFill>
+            </a:ln>
+          </p:spPr>
+          <p:style>
+            <a:lnRef idx="1">
+              <a:schemeClr val="accent2"/>
+            </a:lnRef>
+            <a:fillRef idx="3">
+              <a:schemeClr val="accent2"/>
+            </a:fillRef>
+            <a:effectRef idx="2">
+              <a:schemeClr val="accent2"/>
+            </a:effectRef>
+            <a:fontRef idx="minor">
+              <a:schemeClr val="lt1"/>
+            </a:fontRef>
+          </p:style>
+          <p:txBody>
+            <a:bodyPr rtlCol="0" anchor="ctr"/>
+            <a:lstStyle/>
+            <a:p>
+              <a:pPr algn="ctr"/>
+              <a:endParaRPr lang="en-US">
+                <a:ln>
+                  <a:solidFill>
+                    <a:srgbClr val="FF0000"/>
+                  </a:solidFill>
+                </a:ln>
+                <a:solidFill>
+                  <a:srgbClr val="FF0000"/>
+                </a:solidFill>
               </a:endParaRPr>
             </a:p>
           </p:txBody>
@@ -21015,7 +20908,7 @@
     </p:spTree>
     <p:extLst>
       <p:ext uri="{BB962C8B-B14F-4D97-AF65-F5344CB8AC3E}">
-        <p14:creationId xmlns:p14="http://schemas.microsoft.com/office/powerpoint/2010/main" val="935031736"/>
+        <p14:creationId xmlns:p14="http://schemas.microsoft.com/office/powerpoint/2010/main" xmlns="" val="935031736"/>
       </p:ext>
     </p:extLst>
   </p:cSld>
@@ -21225,15 +21118,64 @@
                                   </p:childTnLst>
                                 </p:cTn>
                               </p:par>
+                            </p:childTnLst>
+                          </p:cTn>
+                        </p:par>
+                      </p:childTnLst>
+                    </p:cTn>
+                  </p:par>
+                  <p:par>
+                    <p:cTn id="19" fill="hold">
+                      <p:stCondLst>
+                        <p:cond delay="indefinite"/>
+                      </p:stCondLst>
+                      <p:childTnLst>
+                        <p:par>
+                          <p:cTn id="20" fill="hold">
+                            <p:stCondLst>
+                              <p:cond delay="0"/>
+                            </p:stCondLst>
+                            <p:childTnLst>
                               <p:par>
-                                <p:cTn id="19" presetID="1" presetClass="entr" presetSubtype="0" fill="hold" nodeType="withEffect">
+                                <p:cTn id="21" presetID="1" presetClass="entr" presetSubtype="0" fill="hold" grpId="0" nodeType="clickEffect">
                                   <p:stCondLst>
                                     <p:cond delay="0"/>
                                   </p:stCondLst>
                                   <p:childTnLst>
                                     <p:set>
                                       <p:cBhvr>
-                                        <p:cTn id="20" dur="1" fill="hold">
+                                        <p:cTn id="22" dur="1" fill="hold">
+                                          <p:stCondLst>
+                                            <p:cond delay="0"/>
+                                          </p:stCondLst>
+                                        </p:cTn>
+                                        <p:tgtEl>
+                                          <p:spTgt spid="3">
+                                            <p:txEl>
+                                              <p:pRg st="3" end="3"/>
+                                            </p:txEl>
+                                          </p:spTgt>
+                                        </p:tgtEl>
+                                        <p:attrNameLst>
+                                          <p:attrName>style.visibility</p:attrName>
+                                        </p:attrNameLst>
+                                      </p:cBhvr>
+                                      <p:to>
+                                        <p:strVal val="visible"/>
+                                      </p:to>
+                                    </p:set>
+                                  </p:childTnLst>
+                                </p:cTn>
+                              </p:par>
+                              <p:par>
+                                <p:cTn id="23" presetID="1" presetClass="entr" presetSubtype="0" fill="hold" nodeType="withEffect">
+                                  <p:stCondLst>
+                                    <p:cond delay="0"/>
+                                  </p:stCondLst>
+                                  <p:childTnLst>
+                                    <p:set>
+                                      <p:cBhvr>
+                                        <p:cTn id="24" dur="1" fill="hold">
                                           <p:stCondLst>
                                             <p:cond delay="0"/>
                                           </p:stCondLst>
@@ -21259,26 +21201,26 @@
                     </p:cTn>
                   </p:par>
                   <p:par>
-                    <p:cTn id="21" fill="hold">
+                    <p:cTn id="25" fill="hold">
                       <p:stCondLst>
                         <p:cond delay="indefinite"/>
                       </p:stCondLst>
                       <p:childTnLst>
                         <p:par>
-                          <p:cTn id="22" fill="hold">
+                          <p:cTn id="26" fill="hold">
                             <p:stCondLst>
                               <p:cond delay="0"/>
                             </p:stCondLst>
                             <p:childTnLst>
                               <p:par>
-                                <p:cTn id="23" presetID="1" presetClass="entr" presetSubtype="0" fill="hold" grpId="0" nodeType="clickEffect">
+                                <p:cTn id="27" presetID="1" presetClass="entr" presetSubtype="0" fill="hold" grpId="0" nodeType="clickEffect">
                                   <p:stCondLst>
                                     <p:cond delay="0"/>
                                   </p:stCondLst>
                                   <p:childTnLst>
                                     <p:set>
                                       <p:cBhvr>
-                                        <p:cTn id="24" dur="1" fill="hold">
+                                        <p:cTn id="28" dur="1" fill="hold">
                                           <p:stCondLst>
                                             <p:cond delay="0"/>
                                           </p:stCondLst>
@@ -21286,7 +21228,7 @@
                                         <p:tgtEl>
                                           <p:spTgt spid="3">
                                             <p:txEl>
-                                              <p:pRg st="3" end="3"/>
+                                              <p:pRg st="4" end="4"/>
                                             </p:txEl>
                                           </p:spTgt>
                                         </p:tgtEl>
@@ -21302,14 +21244,14 @@
                                 </p:cTn>
                               </p:par>
                               <p:par>
-                                <p:cTn id="25" presetID="1" presetClass="entr" presetSubtype="0" fill="hold" nodeType="withEffect">
+                                <p:cTn id="29" presetID="1" presetClass="entr" presetSubtype="0" fill="hold" nodeType="withEffect">
                                   <p:stCondLst>
                                     <p:cond delay="0"/>
                                   </p:stCondLst>
                                   <p:childTnLst>
                                     <p:set>
                                       <p:cBhvr>
-                                        <p:cTn id="26" dur="1" fill="hold">
+                                        <p:cTn id="30" dur="1" fill="hold">
                                           <p:stCondLst>
                                             <p:cond delay="0"/>
                                           </p:stCondLst>
@@ -21335,77 +21277,19 @@
                     </p:cTn>
                   </p:par>
                   <p:par>
-                    <p:cTn id="27" fill="hold">
+                    <p:cTn id="31" fill="hold">
                       <p:stCondLst>
                         <p:cond delay="indefinite"/>
                       </p:stCondLst>
                       <p:childTnLst>
                         <p:par>
-                          <p:cTn id="28" fill="hold">
+                          <p:cTn id="32" fill="hold">
                             <p:stCondLst>
                               <p:cond delay="0"/>
                             </p:stCondLst>
                             <p:childTnLst>
                               <p:par>
-                                <p:cTn id="29" presetID="1" presetClass="entr" presetSubtype="0" fill="hold" grpId="0" nodeType="clickEffect">
-                                  <p:stCondLst>
-                                    <p:cond delay="0"/>
-                                  </p:stCondLst>
-                                  <p:childTnLst>
-                                    <p:set>
-                                      <p:cBhvr>
-                                        <p:cTn id="30" dur="1" fill="hold">
-                                          <p:stCondLst>
-                                            <p:cond delay="0"/>
-                                          </p:stCondLst>
-                                        </p:cTn>
-                                        <p:tgtEl>
-                                          <p:spTgt spid="3">
-                                            <p:txEl>
-                                              <p:pRg st="4" end="4"/>
-                                            </p:txEl>
-                                          </p:spTgt>
-                                        </p:tgtEl>
-                                        <p:attrNameLst>
-                                          <p:attrName>style.visibility</p:attrName>
-                                        </p:attrNameLst>
-                                      </p:cBhvr>
-                                      <p:to>
-                                        <p:strVal val="visible"/>
-                                      </p:to>
-                                    </p:set>
-                                  </p:childTnLst>
-                                </p:cTn>
-                              </p:par>
-                              <p:par>
-                                <p:cTn id="31" presetID="1" presetClass="entr" presetSubtype="0" fill="hold" nodeType="withEffect">
-                                  <p:stCondLst>
-                                    <p:cond delay="0"/>
-                                  </p:stCondLst>
-                                  <p:childTnLst>
-                                    <p:set>
-                                      <p:cBhvr>
-                                        <p:cTn id="32" dur="1" fill="hold">
-                                          <p:stCondLst>
-                                            <p:cond delay="0"/>
-                                          </p:stCondLst>
-                                        </p:cTn>
-                                        <p:tgtEl>
-                                          <p:spTgt spid="32"/>
-                                        </p:tgtEl>
-                                        <p:attrNameLst>
-                                          <p:attrName>style.visibility</p:attrName>
-                                        </p:attrNameLst>
-                                      </p:cBhvr>
-                                      <p:to>
-                                        <p:strVal val="visible"/>
-                                      </p:to>
-                                    </p:set>
-                                  </p:childTnLst>
-                                </p:cTn>
-                              </p:par>
-                              <p:par>
-                                <p:cTn id="33" presetID="1" presetClass="entr" presetSubtype="0" fill="hold" nodeType="withEffect">
+                                <p:cTn id="33" presetID="1" presetClass="entr" presetSubtype="0" fill="hold" grpId="0" nodeType="clickEffect">
                                   <p:stCondLst>
                                     <p:cond delay="0"/>
                                   </p:stCondLst>
@@ -21418,7 +21302,11 @@
                                           </p:stCondLst>
                                         </p:cTn>
                                         <p:tgtEl>
-                                          <p:spTgt spid="31"/>
+                                          <p:spTgt spid="3">
+                                            <p:txEl>
+                                              <p:pRg st="5" end="5"/>
+                                            </p:txEl>
+                                          </p:spTgt>
                                         </p:tgtEl>
                                         <p:attrNameLst>
                                           <p:attrName>style.visibility</p:attrName>
@@ -21465,7 +21353,7 @@
                                         <p:tgtEl>
                                           <p:spTgt spid="3">
                                             <p:txEl>
-                                              <p:pRg st="5" end="5"/>
+                                              <p:pRg st="6" end="6"/>
                                             </p:txEl>
                                           </p:spTgt>
                                         </p:tgtEl>
@@ -21480,26 +21368,35 @@
                                   </p:childTnLst>
                                 </p:cTn>
                               </p:par>
-                            </p:childTnLst>
-                          </p:cTn>
-                        </p:par>
-                      </p:childTnLst>
-                    </p:cTn>
-                  </p:par>
-                  <p:par>
-                    <p:cTn id="39" fill="hold">
-                      <p:stCondLst>
-                        <p:cond delay="indefinite"/>
-                      </p:stCondLst>
-                      <p:childTnLst>
-                        <p:par>
-                          <p:cTn id="40" fill="hold">
-                            <p:stCondLst>
-                              <p:cond delay="0"/>
-                            </p:stCondLst>
-                            <p:childTnLst>
                               <p:par>
-                                <p:cTn id="41" presetID="1" presetClass="entr" presetSubtype="0" fill="hold" grpId="0" nodeType="clickEffect">
+                                <p:cTn id="39" presetID="1" presetClass="entr" presetSubtype="0" fill="hold" nodeType="withEffect">
+                                  <p:stCondLst>
+                                    <p:cond delay="0"/>
+                                  </p:stCondLst>
+                                  <p:childTnLst>
+                                    <p:set>
+                                      <p:cBhvr>
+                                        <p:cTn id="40" dur="1" fill="hold">
+                                          <p:stCondLst>
+                                            <p:cond delay="0"/>
+                                          </p:stCondLst>
+                                        </p:cTn>
+                                        <p:tgtEl>
+                                          <p:spTgt spid="43"/>
+                                        </p:tgtEl>
+                                        <p:attrNameLst>
+                                          <p:attrName>style.visibility</p:attrName>
+                                        </p:attrNameLst>
+                                      </p:cBhvr>
+                                      <p:to>
+                                        <p:strVal val="visible"/>
+                                      </p:to>
+                                    </p:set>
+                                  </p:childTnLst>
+                                </p:cTn>
+                              </p:par>
+                              <p:par>
+                                <p:cTn id="41" presetID="1" presetClass="entr" presetSubtype="0" fill="hold" nodeType="withEffect">
                                   <p:stCondLst>
                                     <p:cond delay="0"/>
                                   </p:stCondLst>
@@ -21512,11 +21409,7 @@
                                           </p:stCondLst>
                                         </p:cTn>
                                         <p:tgtEl>
-                                          <p:spTgt spid="3">
-                                            <p:txEl>
-                                              <p:pRg st="6" end="6"/>
-                                            </p:txEl>
-                                          </p:spTgt>
+                                          <p:spTgt spid="50"/>
                                         </p:tgtEl>
                                         <p:attrNameLst>
                                           <p:attrName>style.visibility</p:attrName>
@@ -21738,7 +21631,7 @@
     </p:spTree>
     <p:extLst>
       <p:ext uri="{BB962C8B-B14F-4D97-AF65-F5344CB8AC3E}">
-        <p14:creationId xmlns:p14="http://schemas.microsoft.com/office/powerpoint/2010/main" val="2756733679"/>
+        <p14:creationId xmlns:p14="http://schemas.microsoft.com/office/powerpoint/2010/main" xmlns="" val="2756733679"/>
       </p:ext>
     </p:extLst>
   </p:cSld>
@@ -21918,7 +21811,7 @@
     </p:spTree>
     <p:extLst>
       <p:ext uri="{BB962C8B-B14F-4D97-AF65-F5344CB8AC3E}">
-        <p14:creationId xmlns:p14="http://schemas.microsoft.com/office/powerpoint/2010/main" val="2756733679"/>
+        <p14:creationId xmlns:p14="http://schemas.microsoft.com/office/powerpoint/2010/main" xmlns="" val="2756733679"/>
       </p:ext>
     </p:extLst>
   </p:cSld>
@@ -22103,7 +21996,7 @@
     </p:spTree>
     <p:extLst>
       <p:ext uri="{BB962C8B-B14F-4D97-AF65-F5344CB8AC3E}">
-        <p14:creationId xmlns:p14="http://schemas.microsoft.com/office/powerpoint/2010/main" val="2756733679"/>
+        <p14:creationId xmlns:p14="http://schemas.microsoft.com/office/powerpoint/2010/main" xmlns="" val="2756733679"/>
       </p:ext>
     </p:extLst>
   </p:cSld>

</xml_diff>

<commit_message>
made bezier curves mor beautyful with arrows n' shit
</commit_message>
<xml_diff>
--- a/Doku/Puzzle.pptx
+++ b/Doku/Puzzle.pptx
@@ -215,7 +215,7 @@
             <a:fld id="{9CCF7261-FAE9-431D-A535-F0D32AAE8354}" type="datetimeFigureOut">
               <a:rPr lang="de-CH" smtClean="0"/>
               <a:pPr/>
-              <a:t>05.01.2013</a:t>
+              <a:t>07.01.2013</a:t>
             </a:fld>
             <a:endParaRPr lang="de-CH"/>
           </a:p>
@@ -546,7 +546,7 @@
             <a:fld id="{0B8AC65F-F2B9-4AE9-880A-F19E8D9538B7}" type="datetimeFigureOut">
               <a:rPr lang="de-CH" smtClean="0"/>
               <a:pPr/>
-              <a:t>05.01.2013</a:t>
+              <a:t>07.01.2013</a:t>
             </a:fld>
             <a:endParaRPr lang="de-CH"/>
           </a:p>
@@ -864,7 +864,7 @@
             <a:fld id="{0B8AC65F-F2B9-4AE9-880A-F19E8D9538B7}" type="datetimeFigureOut">
               <a:rPr lang="de-CH" smtClean="0"/>
               <a:pPr/>
-              <a:t>05.01.2013</a:t>
+              <a:t>07.01.2013</a:t>
             </a:fld>
             <a:endParaRPr lang="de-CH"/>
           </a:p>
@@ -1041,7 +1041,7 @@
             <a:fld id="{0B8AC65F-F2B9-4AE9-880A-F19E8D9538B7}" type="datetimeFigureOut">
               <a:rPr lang="de-CH" smtClean="0"/>
               <a:pPr/>
-              <a:t>05.01.2013</a:t>
+              <a:t>07.01.2013</a:t>
             </a:fld>
             <a:endParaRPr lang="de-CH"/>
           </a:p>
@@ -1161,7 +1161,7 @@
             <a:fld id="{0B8AC65F-F2B9-4AE9-880A-F19E8D9538B7}" type="datetimeFigureOut">
               <a:rPr lang="de-CH" smtClean="0"/>
               <a:pPr/>
-              <a:t>05.01.2013</a:t>
+              <a:t>07.01.2013</a:t>
             </a:fld>
             <a:endParaRPr lang="de-CH"/>
           </a:p>
@@ -1461,7 +1461,7 @@
             <a:fld id="{0B8AC65F-F2B9-4AE9-880A-F19E8D9538B7}" type="datetimeFigureOut">
               <a:rPr lang="de-CH" smtClean="0"/>
               <a:pPr/>
-              <a:t>05.01.2013</a:t>
+              <a:t>07.01.2013</a:t>
             </a:fld>
             <a:endParaRPr lang="de-CH"/>
           </a:p>
@@ -1756,7 +1756,7 @@
             <a:fld id="{0B8AC65F-F2B9-4AE9-880A-F19E8D9538B7}" type="datetimeFigureOut">
               <a:rPr lang="de-CH" smtClean="0"/>
               <a:pPr/>
-              <a:t>05.01.2013</a:t>
+              <a:t>07.01.2013</a:t>
             </a:fld>
             <a:endParaRPr lang="de-CH"/>
           </a:p>
@@ -2186,7 +2186,7 @@
             <a:fld id="{0B8AC65F-F2B9-4AE9-880A-F19E8D9538B7}" type="datetimeFigureOut">
               <a:rPr lang="de-CH" smtClean="0"/>
               <a:pPr/>
-              <a:t>05.01.2013</a:t>
+              <a:t>07.01.2013</a:t>
             </a:fld>
             <a:endParaRPr lang="de-CH"/>
           </a:p>
@@ -2306,7 +2306,7 @@
             <a:fld id="{0B8AC65F-F2B9-4AE9-880A-F19E8D9538B7}" type="datetimeFigureOut">
               <a:rPr lang="de-CH" smtClean="0"/>
               <a:pPr/>
-              <a:t>05.01.2013</a:t>
+              <a:t>07.01.2013</a:t>
             </a:fld>
             <a:endParaRPr lang="de-CH"/>
           </a:p>
@@ -2398,7 +2398,7 @@
             <a:fld id="{0B8AC65F-F2B9-4AE9-880A-F19E8D9538B7}" type="datetimeFigureOut">
               <a:rPr lang="de-CH" smtClean="0"/>
               <a:pPr/>
-              <a:t>05.01.2013</a:t>
+              <a:t>07.01.2013</a:t>
             </a:fld>
             <a:endParaRPr lang="de-CH"/>
           </a:p>
@@ -2650,7 +2650,7 @@
             <a:fld id="{0B8AC65F-F2B9-4AE9-880A-F19E8D9538B7}" type="datetimeFigureOut">
               <a:rPr lang="de-CH" smtClean="0"/>
               <a:pPr/>
-              <a:t>05.01.2013</a:t>
+              <a:t>07.01.2013</a:t>
             </a:fld>
             <a:endParaRPr lang="de-CH"/>
           </a:p>
@@ -3168,7 +3168,7 @@
             <a:fld id="{0B8AC65F-F2B9-4AE9-880A-F19E8D9538B7}" type="datetimeFigureOut">
               <a:rPr lang="de-CH" smtClean="0"/>
               <a:pPr/>
-              <a:t>05.01.2013</a:t>
+              <a:t>07.01.2013</a:t>
             </a:fld>
             <a:endParaRPr lang="de-CH"/>
           </a:p>
@@ -3400,7 +3400,7 @@
             <a:fld id="{0B8AC65F-F2B9-4AE9-880A-F19E8D9538B7}" type="datetimeFigureOut">
               <a:rPr lang="de-CH" smtClean="0"/>
               <a:pPr/>
-              <a:t>05.01.2013</a:t>
+              <a:t>07.01.2013</a:t>
             </a:fld>
             <a:endParaRPr lang="de-CH"/>
           </a:p>
@@ -13631,7 +13631,7 @@
       </p:par>
     </p:tnLst>
     <p:bldLst>
-      <p:bldP spid="3" grpId="0" build="p"/>
+      <p:bldP spid="3" grpId="0" uiExpand="1" build="p"/>
       <p:bldP spid="13" grpId="0" animBg="1"/>
     </p:bldLst>
   </p:timing>
@@ -13695,15 +13695,29 @@
           <a:p>
             <a:r>
               <a:rPr lang="de-CH" dirty="0" smtClean="0"/>
-              <a:t>Verschieden Features</a:t>
-            </a:r>
-          </a:p>
-          <a:p>
-            <a:r>
-              <a:rPr lang="de-CH" dirty="0" err="1" smtClean="0"/>
-              <a:t>matchShapes</a:t>
-            </a:r>
-            <a:endParaRPr lang="de-CH" dirty="0" smtClean="0"/>
+              <a:t>Verschieden Features:</a:t>
+            </a:r>
+          </a:p>
+          <a:p>
+            <a:pPr lvl="1"/>
+            <a:r>
+              <a:rPr lang="de-CH" dirty="0" smtClean="0"/>
+              <a:t>Gesamtlänge der Seitenwandkontur</a:t>
+            </a:r>
+          </a:p>
+          <a:p>
+            <a:pPr lvl="1"/>
+            <a:r>
+              <a:rPr lang="de-CH" dirty="0" smtClean="0"/>
+              <a:t>Höhe der Ausbuchtung</a:t>
+            </a:r>
+          </a:p>
+          <a:p>
+            <a:pPr lvl="1"/>
+            <a:r>
+              <a:rPr lang="de-CH" dirty="0" smtClean="0"/>
+              <a:t>Fläche der Ausbuchtung</a:t>
+            </a:r>
           </a:p>
           <a:p>
             <a:endParaRPr lang="de-CH" dirty="0" smtClean="0"/>
@@ -13721,8 +13735,8 @@
         </p:nvSpPr>
         <p:spPr>
           <a:xfrm>
-            <a:off x="201799" y="3212976"/>
-            <a:ext cx="8712968" cy="1296144"/>
+            <a:off x="251520" y="3861048"/>
+            <a:ext cx="8712968" cy="2592288"/>
           </a:xfrm>
           <a:prstGeom prst="roundRect">
             <a:avLst/>
@@ -13770,131 +13784,95 @@
               </a:tabLst>
             </a:pPr>
             <a:r>
-              <a:rPr lang="en-US" sz="1100" dirty="0" smtClean="0">
+              <a:rPr lang="de-CH" sz="1100" dirty="0" smtClean="0">
                 <a:solidFill>
                   <a:srgbClr val="008000"/>
                 </a:solidFill>
                 <a:latin typeface="Courier New" pitchFamily="49" charset="0"/>
-                <a:ea typeface="Times New Roman"/>
                 <a:cs typeface="Courier New" pitchFamily="49" charset="0"/>
               </a:rPr>
               <a:t>//</a:t>
             </a:r>
             <a:r>
-              <a:rPr lang="en-US" sz="1100" dirty="0" smtClean="0">
+              <a:rPr lang="de-CH" sz="1100" dirty="0" smtClean="0">
                 <a:solidFill>
                   <a:srgbClr val="C0C0C0"/>
                 </a:solidFill>
                 <a:latin typeface="Courier New" pitchFamily="49" charset="0"/>
-                <a:ea typeface="Times New Roman"/>
                 <a:cs typeface="Courier New" pitchFamily="49" charset="0"/>
               </a:rPr>
               <a:t> </a:t>
             </a:r>
             <a:r>
-              <a:rPr lang="en-US" sz="1100" dirty="0" err="1">
+              <a:rPr lang="de-CH" sz="1100" dirty="0" smtClean="0">
                 <a:solidFill>
                   <a:srgbClr val="008000"/>
                 </a:solidFill>
                 <a:latin typeface="Courier New" pitchFamily="49" charset="0"/>
-                <a:ea typeface="Times New Roman"/>
-                <a:cs typeface="Courier New" pitchFamily="49" charset="0"/>
-              </a:rPr>
-              <a:t>überprüfung</a:t>
-            </a:r>
-            <a:r>
-              <a:rPr lang="en-US" sz="1100" dirty="0">
+                <a:cs typeface="Courier New" pitchFamily="49" charset="0"/>
+              </a:rPr>
+              <a:t>Umfang</a:t>
+            </a:r>
+            <a:r>
+              <a:rPr lang="de-CH" sz="1100" dirty="0" smtClean="0">
                 <a:solidFill>
                   <a:srgbClr val="C0C0C0"/>
                 </a:solidFill>
                 <a:latin typeface="Courier New" pitchFamily="49" charset="0"/>
-                <a:ea typeface="Times New Roman"/>
                 <a:cs typeface="Courier New" pitchFamily="49" charset="0"/>
               </a:rPr>
               <a:t> </a:t>
             </a:r>
             <a:r>
-              <a:rPr lang="en-US" sz="1100" dirty="0">
+              <a:rPr lang="de-CH" sz="1100" dirty="0" smtClean="0">
                 <a:solidFill>
                   <a:srgbClr val="008000"/>
                 </a:solidFill>
                 <a:latin typeface="Courier New" pitchFamily="49" charset="0"/>
-                <a:ea typeface="Times New Roman"/>
-                <a:cs typeface="Courier New" pitchFamily="49" charset="0"/>
-              </a:rPr>
-              <a:t>der</a:t>
-            </a:r>
-            <a:r>
-              <a:rPr lang="en-US" sz="1100" dirty="0">
-                <a:solidFill>
-                  <a:srgbClr val="C0C0C0"/>
-                </a:solidFill>
-                <a:latin typeface="Courier New" pitchFamily="49" charset="0"/>
-                <a:ea typeface="Times New Roman"/>
-                <a:cs typeface="Courier New" pitchFamily="49" charset="0"/>
-              </a:rPr>
-              <a:t> </a:t>
-            </a:r>
-            <a:r>
-              <a:rPr lang="en-US" sz="1100" dirty="0" err="1">
+                <a:cs typeface="Courier New" pitchFamily="49" charset="0"/>
+              </a:rPr>
+              <a:t>(</a:t>
+            </a:r>
+            <a:r>
+              <a:rPr lang="de-CH" sz="1100" dirty="0" err="1" smtClean="0">
                 <a:solidFill>
                   <a:srgbClr val="008000"/>
                 </a:solidFill>
                 <a:latin typeface="Courier New" pitchFamily="49" charset="0"/>
-                <a:ea typeface="Times New Roman"/>
-                <a:cs typeface="Courier New" pitchFamily="49" charset="0"/>
-              </a:rPr>
-              <a:t>Ähnlichkeit</a:t>
-            </a:r>
-            <a:r>
-              <a:rPr lang="en-US" sz="1100" dirty="0">
-                <a:solidFill>
-                  <a:srgbClr val="C0C0C0"/>
-                </a:solidFill>
-                <a:latin typeface="Courier New" pitchFamily="49" charset="0"/>
-                <a:ea typeface="Times New Roman"/>
-                <a:cs typeface="Courier New" pitchFamily="49" charset="0"/>
-              </a:rPr>
-              <a:t> </a:t>
-            </a:r>
-            <a:r>
-              <a:rPr lang="en-US" sz="1100" dirty="0" err="1">
+                <a:cs typeface="Courier New" pitchFamily="49" charset="0"/>
+              </a:rPr>
+              <a:t>Ua</a:t>
+            </a:r>
+            <a:r>
+              <a:rPr lang="de-CH" sz="1100" dirty="0" smtClean="0">
                 <a:solidFill>
                   <a:srgbClr val="008000"/>
                 </a:solidFill>
                 <a:latin typeface="Courier New" pitchFamily="49" charset="0"/>
-                <a:ea typeface="Times New Roman"/>
-                <a:cs typeface="Courier New" pitchFamily="49" charset="0"/>
-              </a:rPr>
-              <a:t>mit</a:t>
-            </a:r>
-            <a:r>
-              <a:rPr lang="en-US" sz="1100" dirty="0">
-                <a:solidFill>
-                  <a:srgbClr val="C0C0C0"/>
-                </a:solidFill>
-                <a:latin typeface="Courier New" pitchFamily="49" charset="0"/>
-                <a:ea typeface="Times New Roman"/>
-                <a:cs typeface="Courier New" pitchFamily="49" charset="0"/>
-              </a:rPr>
-              <a:t> </a:t>
-            </a:r>
-            <a:r>
-              <a:rPr lang="en-US" sz="1100" dirty="0" err="1">
+                <a:cs typeface="Courier New" pitchFamily="49" charset="0"/>
+              </a:rPr>
+              <a:t>/|</a:t>
+            </a:r>
+            <a:r>
+              <a:rPr lang="de-CH" sz="1100" dirty="0" err="1" smtClean="0">
                 <a:solidFill>
                   <a:srgbClr val="008000"/>
                 </a:solidFill>
                 <a:latin typeface="Courier New" pitchFamily="49" charset="0"/>
-                <a:ea typeface="Times New Roman"/>
-                <a:cs typeface="Courier New" pitchFamily="49" charset="0"/>
-              </a:rPr>
-              <a:t>matchShapes</a:t>
-            </a:r>
-            <a:endParaRPr lang="en-US" sz="1100" dirty="0">
-              <a:latin typeface="Courier New" pitchFamily="49" charset="0"/>
-              <a:ea typeface="Calibri"/>
-              <a:cs typeface="Courier New" pitchFamily="49" charset="0"/>
-            </a:endParaRPr>
+                <a:cs typeface="Courier New" pitchFamily="49" charset="0"/>
+              </a:rPr>
+              <a:t>Ua-Ub</a:t>
+            </a:r>
+            <a:r>
+              <a:rPr lang="de-CH" sz="1100" dirty="0" smtClean="0">
+                <a:solidFill>
+                  <a:srgbClr val="008000"/>
+                </a:solidFill>
+                <a:latin typeface="Courier New" pitchFamily="49" charset="0"/>
+                <a:cs typeface="Courier New" pitchFamily="49" charset="0"/>
+              </a:rPr>
+              <a:t>|)</a:t>
+            </a:r>
           </a:p>
           <a:p>
             <a:pPr lvl="1">
@@ -13923,220 +13901,155 @@
             <a:r>
               <a:rPr lang="en-US" sz="1100" dirty="0" smtClean="0">
                 <a:solidFill>
+                  <a:srgbClr val="808000"/>
+                </a:solidFill>
+                <a:latin typeface="Courier New" pitchFamily="49" charset="0"/>
+                <a:cs typeface="Courier New" pitchFamily="49" charset="0"/>
+              </a:rPr>
+              <a:t>double</a:t>
+            </a:r>
+            <a:r>
+              <a:rPr lang="en-US" sz="1100" dirty="0" smtClean="0">
+                <a:solidFill>
+                  <a:srgbClr val="C0C0C0"/>
+                </a:solidFill>
+                <a:latin typeface="Courier New" pitchFamily="49" charset="0"/>
+                <a:cs typeface="Courier New" pitchFamily="49" charset="0"/>
+              </a:rPr>
+              <a:t> </a:t>
+            </a:r>
+            <a:r>
+              <a:rPr lang="en-US" sz="1100" dirty="0" err="1" smtClean="0">
+                <a:solidFill>
                   <a:srgbClr val="000000"/>
                 </a:solidFill>
                 <a:latin typeface="Courier New" pitchFamily="49" charset="0"/>
-                <a:ea typeface="Times New Roman"/>
-                <a:cs typeface="Courier New" pitchFamily="49" charset="0"/>
-              </a:rPr>
-              <a:t>results[</a:t>
+                <a:cs typeface="Courier New" pitchFamily="49" charset="0"/>
+              </a:rPr>
+              <a:t>length_basis</a:t>
+            </a:r>
+            <a:r>
+              <a:rPr lang="en-US" sz="1100" dirty="0" smtClean="0">
+                <a:solidFill>
+                  <a:srgbClr val="C0C0C0"/>
+                </a:solidFill>
+                <a:latin typeface="Courier New" pitchFamily="49" charset="0"/>
+                <a:cs typeface="Courier New" pitchFamily="49" charset="0"/>
+              </a:rPr>
+              <a:t> </a:t>
+            </a:r>
+            <a:r>
+              <a:rPr lang="en-US" sz="1100" dirty="0" smtClean="0">
+                <a:solidFill>
+                  <a:srgbClr val="000000"/>
+                </a:solidFill>
+                <a:latin typeface="Courier New" pitchFamily="49" charset="0"/>
+                <a:cs typeface="Courier New" pitchFamily="49" charset="0"/>
+              </a:rPr>
+              <a:t>=</a:t>
+            </a:r>
+            <a:r>
+              <a:rPr lang="en-US" sz="1100" dirty="0" smtClean="0">
+                <a:solidFill>
+                  <a:srgbClr val="C0C0C0"/>
+                </a:solidFill>
+                <a:latin typeface="Courier New" pitchFamily="49" charset="0"/>
+                <a:cs typeface="Courier New" pitchFamily="49" charset="0"/>
+              </a:rPr>
+              <a:t> </a:t>
             </a:r>
             <a:r>
               <a:rPr lang="en-US" sz="1100" dirty="0" err="1" smtClean="0">
                 <a:solidFill>
+                  <a:srgbClr val="800080"/>
+                </a:solidFill>
+                <a:latin typeface="Courier New" pitchFamily="49" charset="0"/>
+                <a:cs typeface="Courier New" pitchFamily="49" charset="0"/>
+              </a:rPr>
+              <a:t>cv</a:t>
+            </a:r>
+            <a:r>
+              <a:rPr lang="en-US" sz="1100" dirty="0" smtClean="0">
+                <a:solidFill>
                   <a:srgbClr val="000000"/>
                 </a:solidFill>
                 <a:latin typeface="Courier New" pitchFamily="49" charset="0"/>
-                <a:ea typeface="Times New Roman"/>
-                <a:cs typeface="Courier New" pitchFamily="49" charset="0"/>
-              </a:rPr>
-              <a:t>i</a:t>
-            </a:r>
-            <a:r>
-              <a:rPr lang="en-US" sz="1100" dirty="0">
+                <a:cs typeface="Courier New" pitchFamily="49" charset="0"/>
+              </a:rPr>
+              <a:t>::</a:t>
+            </a:r>
+            <a:r>
+              <a:rPr lang="en-US" sz="1100" dirty="0" err="1" smtClean="0">
+                <a:latin typeface="Courier New" pitchFamily="49" charset="0"/>
+                <a:cs typeface="Courier New" pitchFamily="49" charset="0"/>
+              </a:rPr>
+              <a:t>arcLength</a:t>
+            </a:r>
+            <a:r>
+              <a:rPr lang="en-US" sz="1100" dirty="0" smtClean="0">
                 <a:solidFill>
                   <a:srgbClr val="000000"/>
                 </a:solidFill>
                 <a:latin typeface="Courier New" pitchFamily="49" charset="0"/>
-                <a:ea typeface="Times New Roman"/>
-                <a:cs typeface="Courier New" pitchFamily="49" charset="0"/>
-              </a:rPr>
-              <a:t>].</a:t>
-            </a:r>
-            <a:r>
-              <a:rPr lang="en-US" sz="1100" dirty="0" err="1">
-                <a:latin typeface="Courier New" pitchFamily="49" charset="0"/>
-                <a:ea typeface="Times New Roman"/>
-                <a:cs typeface="Courier New" pitchFamily="49" charset="0"/>
-              </a:rPr>
-              <a:t>push_back</a:t>
-            </a:r>
-            <a:r>
-              <a:rPr lang="en-US" sz="1100" dirty="0">
+                <a:cs typeface="Courier New" pitchFamily="49" charset="0"/>
+              </a:rPr>
+              <a:t>(*</a:t>
+            </a:r>
+            <a:r>
+              <a:rPr lang="en-US" sz="1100" dirty="0" err="1" smtClean="0">
                 <a:solidFill>
                   <a:srgbClr val="000000"/>
                 </a:solidFill>
                 <a:latin typeface="Courier New" pitchFamily="49" charset="0"/>
-                <a:ea typeface="Times New Roman"/>
-                <a:cs typeface="Courier New" pitchFamily="49" charset="0"/>
-              </a:rPr>
-              <a:t>(</a:t>
-            </a:r>
-            <a:r>
-              <a:rPr lang="en-US" sz="1100" dirty="0">
-                <a:solidFill>
-                  <a:srgbClr val="000080"/>
-                </a:solidFill>
-                <a:latin typeface="Courier New" pitchFamily="49" charset="0"/>
-                <a:ea typeface="Times New Roman"/>
-                <a:cs typeface="Courier New" pitchFamily="49" charset="0"/>
-              </a:rPr>
-              <a:t>1</a:t>
-            </a:r>
-            <a:r>
-              <a:rPr lang="en-US" sz="1100" dirty="0">
+                <a:cs typeface="Courier New" pitchFamily="49" charset="0"/>
+              </a:rPr>
+              <a:t>basis_side</a:t>
+            </a:r>
+            <a:r>
+              <a:rPr lang="en-US" sz="1100" dirty="0" smtClean="0">
                 <a:solidFill>
                   <a:srgbClr val="000000"/>
                 </a:solidFill>
                 <a:latin typeface="Courier New" pitchFamily="49" charset="0"/>
-                <a:ea typeface="Times New Roman"/>
-                <a:cs typeface="Courier New" pitchFamily="49" charset="0"/>
-              </a:rPr>
-              <a:t>/</a:t>
-            </a:r>
-            <a:r>
-              <a:rPr lang="en-US" sz="1100" dirty="0">
-                <a:solidFill>
-                  <a:srgbClr val="800080"/>
-                </a:solidFill>
-                <a:latin typeface="Courier New" pitchFamily="49" charset="0"/>
-                <a:ea typeface="Times New Roman"/>
-                <a:cs typeface="Courier New" pitchFamily="49" charset="0"/>
-              </a:rPr>
-              <a:t>cv</a:t>
-            </a:r>
-            <a:r>
-              <a:rPr lang="en-US" sz="1100" dirty="0">
+                <a:cs typeface="Courier New" pitchFamily="49" charset="0"/>
+              </a:rPr>
+              <a:t>,</a:t>
+            </a:r>
+            <a:r>
+              <a:rPr lang="en-US" sz="1100" dirty="0" smtClean="0">
+                <a:solidFill>
+                  <a:srgbClr val="C0C0C0"/>
+                </a:solidFill>
+                <a:latin typeface="Courier New" pitchFamily="49" charset="0"/>
+                <a:cs typeface="Courier New" pitchFamily="49" charset="0"/>
+              </a:rPr>
+              <a:t> </a:t>
+            </a:r>
+            <a:r>
+              <a:rPr lang="en-US" sz="1100" dirty="0" smtClean="0">
+                <a:solidFill>
+                  <a:srgbClr val="808000"/>
+                </a:solidFill>
+                <a:latin typeface="Courier New" pitchFamily="49" charset="0"/>
+                <a:cs typeface="Courier New" pitchFamily="49" charset="0"/>
+              </a:rPr>
+              <a:t>false</a:t>
+            </a:r>
+            <a:r>
+              <a:rPr lang="en-US" sz="1100" dirty="0" smtClean="0">
                 <a:solidFill>
                   <a:srgbClr val="000000"/>
                 </a:solidFill>
                 <a:latin typeface="Courier New" pitchFamily="49" charset="0"/>
-                <a:ea typeface="Times New Roman"/>
-                <a:cs typeface="Courier New" pitchFamily="49" charset="0"/>
-              </a:rPr>
-              <a:t>::</a:t>
-            </a:r>
-            <a:r>
-              <a:rPr lang="en-US" sz="1100" dirty="0" err="1">
-                <a:latin typeface="Courier New" pitchFamily="49" charset="0"/>
-                <a:ea typeface="Times New Roman"/>
-                <a:cs typeface="Courier New" pitchFamily="49" charset="0"/>
-              </a:rPr>
-              <a:t>matchShapes</a:t>
-            </a:r>
-            <a:r>
-              <a:rPr lang="en-US" sz="1100" dirty="0">
-                <a:solidFill>
-                  <a:srgbClr val="000000"/>
-                </a:solidFill>
-                <a:latin typeface="Courier New" pitchFamily="49" charset="0"/>
-                <a:ea typeface="Times New Roman"/>
-                <a:cs typeface="Courier New" pitchFamily="49" charset="0"/>
-              </a:rPr>
-              <a:t>(</a:t>
-            </a:r>
-            <a:r>
-              <a:rPr lang="en-US" sz="1100" dirty="0">
-                <a:solidFill>
-                  <a:srgbClr val="800080"/>
-                </a:solidFill>
-                <a:latin typeface="Courier New" pitchFamily="49" charset="0"/>
-                <a:ea typeface="Times New Roman"/>
-                <a:cs typeface="Courier New" pitchFamily="49" charset="0"/>
-              </a:rPr>
-              <a:t>cv</a:t>
-            </a:r>
-            <a:r>
-              <a:rPr lang="en-US" sz="1100" dirty="0">
-                <a:solidFill>
-                  <a:srgbClr val="000000"/>
-                </a:solidFill>
-                <a:latin typeface="Courier New" pitchFamily="49" charset="0"/>
-                <a:ea typeface="Times New Roman"/>
-                <a:cs typeface="Courier New" pitchFamily="49" charset="0"/>
-              </a:rPr>
-              <a:t>::</a:t>
-            </a:r>
-            <a:r>
-              <a:rPr lang="en-US" sz="1100" dirty="0">
-                <a:solidFill>
-                  <a:srgbClr val="800080"/>
-                </a:solidFill>
-                <a:latin typeface="Courier New" pitchFamily="49" charset="0"/>
-                <a:ea typeface="Times New Roman"/>
-                <a:cs typeface="Courier New" pitchFamily="49" charset="0"/>
-              </a:rPr>
-              <a:t>Mat</a:t>
-            </a:r>
-            <a:r>
-              <a:rPr lang="en-US" sz="1100" dirty="0">
-                <a:solidFill>
-                  <a:srgbClr val="000000"/>
-                </a:solidFill>
-                <a:latin typeface="Courier New" pitchFamily="49" charset="0"/>
-                <a:ea typeface="Times New Roman"/>
-                <a:cs typeface="Courier New" pitchFamily="49" charset="0"/>
-              </a:rPr>
-              <a:t>(</a:t>
-            </a:r>
-            <a:r>
-              <a:rPr lang="en-US" sz="1100" dirty="0" err="1">
-                <a:solidFill>
-                  <a:srgbClr val="000000"/>
-                </a:solidFill>
-                <a:latin typeface="Courier New" pitchFamily="49" charset="0"/>
-                <a:ea typeface="Times New Roman"/>
-                <a:cs typeface="Courier New" pitchFamily="49" charset="0"/>
-              </a:rPr>
-              <a:t>sidesFiltered</a:t>
-            </a:r>
-            <a:r>
-              <a:rPr lang="en-US" sz="1100" dirty="0">
-                <a:solidFill>
-                  <a:srgbClr val="000000"/>
-                </a:solidFill>
-                <a:latin typeface="Courier New" pitchFamily="49" charset="0"/>
-                <a:ea typeface="Times New Roman"/>
-                <a:cs typeface="Courier New" pitchFamily="49" charset="0"/>
-              </a:rPr>
-              <a:t>[piece][</a:t>
-            </a:r>
-            <a:r>
-              <a:rPr lang="en-US" sz="1100" dirty="0" err="1">
-                <a:solidFill>
-                  <a:srgbClr val="000000"/>
-                </a:solidFill>
-                <a:latin typeface="Courier New" pitchFamily="49" charset="0"/>
-                <a:ea typeface="Times New Roman"/>
-                <a:cs typeface="Courier New" pitchFamily="49" charset="0"/>
-              </a:rPr>
-              <a:t>piece_side</a:t>
-            </a:r>
-            <a:r>
-              <a:rPr lang="en-US" sz="1100" dirty="0">
-                <a:solidFill>
-                  <a:srgbClr val="000000"/>
-                </a:solidFill>
-                <a:latin typeface="Courier New" pitchFamily="49" charset="0"/>
-                <a:ea typeface="Times New Roman"/>
-                <a:cs typeface="Courier New" pitchFamily="49" charset="0"/>
-              </a:rPr>
-              <a:t>]),</a:t>
-            </a:r>
-            <a:r>
-              <a:rPr lang="en-US" sz="1100" dirty="0">
-                <a:solidFill>
-                  <a:srgbClr val="C0C0C0"/>
-                </a:solidFill>
-                <a:latin typeface="Courier New" pitchFamily="49" charset="0"/>
-                <a:ea typeface="Times New Roman"/>
-                <a:cs typeface="Courier New" pitchFamily="49" charset="0"/>
-              </a:rPr>
-              <a:t> </a:t>
-            </a:r>
-            <a:endParaRPr lang="en-US" sz="1100" dirty="0">
+                <a:cs typeface="Courier New" pitchFamily="49" charset="0"/>
+              </a:rPr>
+              <a:t>); ...</a:t>
+            </a:r>
+            <a:endParaRPr lang="de-CH" sz="1100" dirty="0" smtClean="0">
+              <a:solidFill>
+                <a:srgbClr val="C0C0C0"/>
+              </a:solidFill>
               <a:latin typeface="Courier New" pitchFamily="49" charset="0"/>
-              <a:ea typeface="Calibri"/>
               <a:cs typeface="Courier New" pitchFamily="49" charset="0"/>
             </a:endParaRPr>
           </a:p>
@@ -14165,15 +14078,513 @@
               </a:tabLst>
             </a:pPr>
             <a:r>
+              <a:rPr lang="de-CH" sz="1100" dirty="0" smtClean="0">
+                <a:solidFill>
+                  <a:srgbClr val="808000"/>
+                </a:solidFill>
+                <a:latin typeface="Courier New" pitchFamily="49" charset="0"/>
+                <a:cs typeface="Courier New" pitchFamily="49" charset="0"/>
+              </a:rPr>
+              <a:t>double</a:t>
+            </a:r>
+            <a:r>
+              <a:rPr lang="de-CH" sz="1100" dirty="0" smtClean="0">
+                <a:solidFill>
+                  <a:srgbClr val="C0C0C0"/>
+                </a:solidFill>
+                <a:latin typeface="Courier New" pitchFamily="49" charset="0"/>
+                <a:cs typeface="Courier New" pitchFamily="49" charset="0"/>
+              </a:rPr>
+              <a:t> </a:t>
+            </a:r>
+            <a:r>
+              <a:rPr lang="de-CH" sz="1100" dirty="0" err="1" smtClean="0">
+                <a:solidFill>
+                  <a:srgbClr val="000000"/>
+                </a:solidFill>
+                <a:latin typeface="Courier New" pitchFamily="49" charset="0"/>
+                <a:cs typeface="Courier New" pitchFamily="49" charset="0"/>
+              </a:rPr>
+              <a:t>result_length</a:t>
+            </a:r>
+            <a:r>
+              <a:rPr lang="de-CH" sz="1100" dirty="0" smtClean="0">
+                <a:solidFill>
+                  <a:srgbClr val="C0C0C0"/>
+                </a:solidFill>
+                <a:latin typeface="Courier New" pitchFamily="49" charset="0"/>
+                <a:cs typeface="Courier New" pitchFamily="49" charset="0"/>
+              </a:rPr>
+              <a:t> </a:t>
+            </a:r>
+            <a:r>
+              <a:rPr lang="de-CH" sz="1100" dirty="0" smtClean="0">
+                <a:solidFill>
+                  <a:srgbClr val="000000"/>
+                </a:solidFill>
+                <a:latin typeface="Courier New" pitchFamily="49" charset="0"/>
+                <a:cs typeface="Courier New" pitchFamily="49" charset="0"/>
+              </a:rPr>
+              <a:t>=</a:t>
+            </a:r>
+            <a:r>
+              <a:rPr lang="de-CH" sz="1100" dirty="0" smtClean="0">
+                <a:solidFill>
+                  <a:srgbClr val="C0C0C0"/>
+                </a:solidFill>
+                <a:latin typeface="Courier New" pitchFamily="49" charset="0"/>
+                <a:cs typeface="Courier New" pitchFamily="49" charset="0"/>
+              </a:rPr>
+              <a:t> </a:t>
+            </a:r>
+            <a:r>
+              <a:rPr lang="de-CH" sz="1100" dirty="0" err="1" smtClean="0">
+                <a:solidFill>
+                  <a:srgbClr val="000000"/>
+                </a:solidFill>
+                <a:latin typeface="Courier New" pitchFamily="49" charset="0"/>
+                <a:cs typeface="Courier New" pitchFamily="49" charset="0"/>
+              </a:rPr>
+              <a:t>length_basis</a:t>
+            </a:r>
+            <a:r>
+              <a:rPr lang="de-CH" sz="1100" dirty="0" smtClean="0">
+                <a:solidFill>
+                  <a:srgbClr val="C0C0C0"/>
+                </a:solidFill>
+                <a:latin typeface="Courier New" pitchFamily="49" charset="0"/>
+                <a:cs typeface="Courier New" pitchFamily="49" charset="0"/>
+              </a:rPr>
+              <a:t> </a:t>
+            </a:r>
+            <a:r>
+              <a:rPr lang="de-CH" sz="1100" dirty="0" smtClean="0">
+                <a:solidFill>
+                  <a:srgbClr val="000000"/>
+                </a:solidFill>
+                <a:latin typeface="Courier New" pitchFamily="49" charset="0"/>
+                <a:cs typeface="Courier New" pitchFamily="49" charset="0"/>
+              </a:rPr>
+              <a:t>/</a:t>
+            </a:r>
+            <a:r>
+              <a:rPr lang="de-CH" sz="1100" dirty="0" smtClean="0">
+                <a:solidFill>
+                  <a:srgbClr val="C0C0C0"/>
+                </a:solidFill>
+                <a:latin typeface="Courier New" pitchFamily="49" charset="0"/>
+                <a:cs typeface="Courier New" pitchFamily="49" charset="0"/>
+              </a:rPr>
+              <a:t> </a:t>
+            </a:r>
+            <a:r>
+              <a:rPr lang="de-CH" sz="1100" dirty="0" err="1" smtClean="0">
+                <a:solidFill>
+                  <a:srgbClr val="800080"/>
+                </a:solidFill>
+                <a:latin typeface="Courier New" pitchFamily="49" charset="0"/>
+                <a:cs typeface="Courier New" pitchFamily="49" charset="0"/>
+              </a:rPr>
+              <a:t>std</a:t>
+            </a:r>
+            <a:r>
+              <a:rPr lang="de-CH" sz="1100" dirty="0" smtClean="0">
+                <a:solidFill>
+                  <a:srgbClr val="000000"/>
+                </a:solidFill>
+                <a:latin typeface="Courier New" pitchFamily="49" charset="0"/>
+                <a:cs typeface="Courier New" pitchFamily="49" charset="0"/>
+              </a:rPr>
+              <a:t>::</a:t>
+            </a:r>
+            <a:r>
+              <a:rPr lang="de-CH" sz="1100" dirty="0" err="1" smtClean="0">
+                <a:solidFill>
+                  <a:srgbClr val="C0C0C0"/>
+                </a:solidFill>
+                <a:latin typeface="Courier New" pitchFamily="49" charset="0"/>
+                <a:cs typeface="Courier New" pitchFamily="49" charset="0"/>
+              </a:rPr>
+              <a:t>fabs</a:t>
+            </a:r>
+            <a:r>
+              <a:rPr lang="de-CH" sz="1100" dirty="0" smtClean="0">
+                <a:solidFill>
+                  <a:srgbClr val="000000"/>
+                </a:solidFill>
+                <a:latin typeface="Courier New" pitchFamily="49" charset="0"/>
+                <a:cs typeface="Courier New" pitchFamily="49" charset="0"/>
+              </a:rPr>
+              <a:t>(</a:t>
+            </a:r>
+            <a:r>
+              <a:rPr lang="de-CH" sz="1100" dirty="0" err="1" smtClean="0">
+                <a:solidFill>
+                  <a:srgbClr val="000000"/>
+                </a:solidFill>
+                <a:latin typeface="Courier New" pitchFamily="49" charset="0"/>
+                <a:cs typeface="Courier New" pitchFamily="49" charset="0"/>
+              </a:rPr>
+              <a:t>length_basis</a:t>
+            </a:r>
+            <a:r>
+              <a:rPr lang="de-CH" sz="1100" dirty="0" smtClean="0">
+                <a:solidFill>
+                  <a:srgbClr val="C0C0C0"/>
+                </a:solidFill>
+                <a:latin typeface="Courier New" pitchFamily="49" charset="0"/>
+                <a:cs typeface="Courier New" pitchFamily="49" charset="0"/>
+              </a:rPr>
+              <a:t> </a:t>
+            </a:r>
+            <a:r>
+              <a:rPr lang="de-CH" sz="1100" dirty="0" smtClean="0">
+                <a:solidFill>
+                  <a:srgbClr val="000000"/>
+                </a:solidFill>
+                <a:latin typeface="Courier New" pitchFamily="49" charset="0"/>
+                <a:cs typeface="Courier New" pitchFamily="49" charset="0"/>
+              </a:rPr>
+              <a:t>-</a:t>
+            </a:r>
+            <a:r>
+              <a:rPr lang="de-CH" sz="1100" dirty="0" smtClean="0">
+                <a:solidFill>
+                  <a:srgbClr val="C0C0C0"/>
+                </a:solidFill>
+                <a:latin typeface="Courier New" pitchFamily="49" charset="0"/>
+                <a:cs typeface="Courier New" pitchFamily="49" charset="0"/>
+              </a:rPr>
+              <a:t> </a:t>
+            </a:r>
+            <a:r>
+              <a:rPr lang="de-CH" sz="1100" dirty="0" err="1" smtClean="0">
+                <a:solidFill>
+                  <a:srgbClr val="000000"/>
+                </a:solidFill>
+                <a:latin typeface="Courier New" pitchFamily="49" charset="0"/>
+                <a:cs typeface="Courier New" pitchFamily="49" charset="0"/>
+              </a:rPr>
+              <a:t>length_compare</a:t>
+            </a:r>
+            <a:r>
+              <a:rPr lang="de-CH" sz="1100" dirty="0" smtClean="0">
+                <a:solidFill>
+                  <a:srgbClr val="000000"/>
+                </a:solidFill>
+                <a:latin typeface="Courier New" pitchFamily="49" charset="0"/>
+                <a:cs typeface="Courier New" pitchFamily="49" charset="0"/>
+              </a:rPr>
+              <a:t>);</a:t>
+            </a:r>
+          </a:p>
+          <a:p>
+            <a:pPr lvl="1">
+              <a:lnSpc>
+                <a:spcPct val="115000"/>
+              </a:lnSpc>
+              <a:tabLst>
+                <a:tab pos="581660" algn="l"/>
+                <a:tab pos="1163320" algn="l"/>
+                <a:tab pos="1744980" algn="l"/>
+                <a:tab pos="2326640" algn="l"/>
+                <a:tab pos="2908300" algn="l"/>
+                <a:tab pos="3489960" algn="l"/>
+                <a:tab pos="4071620" algn="l"/>
+                <a:tab pos="4653280" algn="l"/>
+                <a:tab pos="5234940" algn="l"/>
+                <a:tab pos="5816600" algn="l"/>
+                <a:tab pos="6398260" algn="l"/>
+                <a:tab pos="6979920" algn="l"/>
+                <a:tab pos="7561580" algn="l"/>
+                <a:tab pos="8143240" algn="l"/>
+                <a:tab pos="8724900" algn="l"/>
+                <a:tab pos="9306560" algn="l"/>
+              </a:tabLst>
+            </a:pPr>
+            <a:endParaRPr lang="de-CH" sz="1100" dirty="0" smtClean="0">
+              <a:solidFill>
+                <a:srgbClr val="C0C0C0"/>
+              </a:solidFill>
+              <a:latin typeface="Courier New" pitchFamily="49" charset="0"/>
+              <a:cs typeface="Courier New" pitchFamily="49" charset="0"/>
+            </a:endParaRPr>
+          </a:p>
+          <a:p>
+            <a:pPr lvl="1">
+              <a:lnSpc>
+                <a:spcPct val="115000"/>
+              </a:lnSpc>
+              <a:tabLst>
+                <a:tab pos="581660" algn="l"/>
+                <a:tab pos="1163320" algn="l"/>
+                <a:tab pos="1744980" algn="l"/>
+                <a:tab pos="2326640" algn="l"/>
+                <a:tab pos="2908300" algn="l"/>
+                <a:tab pos="3489960" algn="l"/>
+                <a:tab pos="4071620" algn="l"/>
+                <a:tab pos="4653280" algn="l"/>
+                <a:tab pos="5234940" algn="l"/>
+                <a:tab pos="5816600" algn="l"/>
+                <a:tab pos="6398260" algn="l"/>
+                <a:tab pos="6979920" algn="l"/>
+                <a:tab pos="7561580" algn="l"/>
+                <a:tab pos="8143240" algn="l"/>
+                <a:tab pos="8724900" algn="l"/>
+                <a:tab pos="9306560" algn="l"/>
+              </a:tabLst>
+            </a:pPr>
+            <a:r>
+              <a:rPr lang="de-CH" sz="1100" dirty="0" smtClean="0">
+                <a:solidFill>
+                  <a:srgbClr val="008000"/>
+                </a:solidFill>
+                <a:latin typeface="Courier New" pitchFamily="49" charset="0"/>
+                <a:cs typeface="Courier New" pitchFamily="49" charset="0"/>
+              </a:rPr>
+              <a:t>//</a:t>
+            </a:r>
+            <a:r>
+              <a:rPr lang="de-CH" sz="1100" dirty="0" smtClean="0">
+                <a:solidFill>
+                  <a:srgbClr val="C0C0C0"/>
+                </a:solidFill>
+                <a:latin typeface="Courier New" pitchFamily="49" charset="0"/>
+                <a:cs typeface="Courier New" pitchFamily="49" charset="0"/>
+              </a:rPr>
+              <a:t> </a:t>
+            </a:r>
+            <a:r>
+              <a:rPr lang="de-CH" sz="1100" dirty="0" smtClean="0">
+                <a:solidFill>
+                  <a:srgbClr val="008000"/>
+                </a:solidFill>
+                <a:latin typeface="Courier New" pitchFamily="49" charset="0"/>
+                <a:cs typeface="Courier New" pitchFamily="49" charset="0"/>
+              </a:rPr>
+              <a:t>Tiefe</a:t>
+            </a:r>
+            <a:r>
+              <a:rPr lang="de-CH" sz="1100" dirty="0" smtClean="0">
+                <a:solidFill>
+                  <a:srgbClr val="C0C0C0"/>
+                </a:solidFill>
+                <a:latin typeface="Courier New" pitchFamily="49" charset="0"/>
+                <a:cs typeface="Courier New" pitchFamily="49" charset="0"/>
+              </a:rPr>
+              <a:t> </a:t>
+            </a:r>
+            <a:r>
+              <a:rPr lang="de-CH" sz="1100" dirty="0" smtClean="0">
+                <a:solidFill>
+                  <a:srgbClr val="008000"/>
+                </a:solidFill>
+                <a:latin typeface="Courier New" pitchFamily="49" charset="0"/>
+                <a:cs typeface="Courier New" pitchFamily="49" charset="0"/>
+              </a:rPr>
+              <a:t>der</a:t>
+            </a:r>
+            <a:r>
+              <a:rPr lang="de-CH" sz="1100" dirty="0" smtClean="0">
+                <a:solidFill>
+                  <a:srgbClr val="C0C0C0"/>
+                </a:solidFill>
+                <a:latin typeface="Courier New" pitchFamily="49" charset="0"/>
+                <a:cs typeface="Courier New" pitchFamily="49" charset="0"/>
+              </a:rPr>
+              <a:t> </a:t>
+            </a:r>
+            <a:r>
+              <a:rPr lang="de-CH" sz="1100" dirty="0" smtClean="0">
+                <a:solidFill>
+                  <a:srgbClr val="008000"/>
+                </a:solidFill>
+                <a:latin typeface="Courier New" pitchFamily="49" charset="0"/>
+                <a:cs typeface="Courier New" pitchFamily="49" charset="0"/>
+              </a:rPr>
+              <a:t>Ausbuchtung</a:t>
+            </a:r>
+            <a:r>
+              <a:rPr lang="de-CH" sz="1100" dirty="0" smtClean="0">
+                <a:solidFill>
+                  <a:srgbClr val="C0C0C0"/>
+                </a:solidFill>
+                <a:latin typeface="Courier New" pitchFamily="49" charset="0"/>
+                <a:cs typeface="Courier New" pitchFamily="49" charset="0"/>
+              </a:rPr>
+              <a:t> </a:t>
+            </a:r>
+            <a:r>
+              <a:rPr lang="de-CH" sz="1100" dirty="0" smtClean="0">
+                <a:solidFill>
+                  <a:srgbClr val="008000"/>
+                </a:solidFill>
+                <a:latin typeface="Courier New" pitchFamily="49" charset="0"/>
+                <a:cs typeface="Courier New" pitchFamily="49" charset="0"/>
+              </a:rPr>
+              <a:t>(</a:t>
+            </a:r>
+            <a:r>
+              <a:rPr lang="de-CH" sz="1100" dirty="0" err="1" smtClean="0">
+                <a:solidFill>
+                  <a:srgbClr val="008000"/>
+                </a:solidFill>
+                <a:latin typeface="Courier New" pitchFamily="49" charset="0"/>
+                <a:cs typeface="Courier New" pitchFamily="49" charset="0"/>
+              </a:rPr>
+              <a:t>Ta</a:t>
+            </a:r>
+            <a:r>
+              <a:rPr lang="de-CH" sz="1100" dirty="0" smtClean="0">
+                <a:solidFill>
+                  <a:srgbClr val="008000"/>
+                </a:solidFill>
+                <a:latin typeface="Courier New" pitchFamily="49" charset="0"/>
+                <a:cs typeface="Courier New" pitchFamily="49" charset="0"/>
+              </a:rPr>
+              <a:t>/|</a:t>
+            </a:r>
+            <a:r>
+              <a:rPr lang="de-CH" sz="1100" dirty="0" err="1" smtClean="0">
+                <a:solidFill>
+                  <a:srgbClr val="008000"/>
+                </a:solidFill>
+                <a:latin typeface="Courier New" pitchFamily="49" charset="0"/>
+                <a:cs typeface="Courier New" pitchFamily="49" charset="0"/>
+              </a:rPr>
+              <a:t>Ta</a:t>
+            </a:r>
+            <a:r>
+              <a:rPr lang="de-CH" sz="1100" dirty="0" smtClean="0">
+                <a:solidFill>
+                  <a:srgbClr val="008000"/>
+                </a:solidFill>
+                <a:latin typeface="Courier New" pitchFamily="49" charset="0"/>
+                <a:cs typeface="Courier New" pitchFamily="49" charset="0"/>
+              </a:rPr>
+              <a:t>-Tb|)</a:t>
+            </a:r>
+          </a:p>
+          <a:p>
+            <a:pPr lvl="1">
+              <a:lnSpc>
+                <a:spcPct val="115000"/>
+              </a:lnSpc>
+              <a:tabLst>
+                <a:tab pos="581660" algn="l"/>
+                <a:tab pos="1163320" algn="l"/>
+                <a:tab pos="1744980" algn="l"/>
+                <a:tab pos="2326640" algn="l"/>
+                <a:tab pos="2908300" algn="l"/>
+                <a:tab pos="3489960" algn="l"/>
+                <a:tab pos="4071620" algn="l"/>
+                <a:tab pos="4653280" algn="l"/>
+                <a:tab pos="5234940" algn="l"/>
+                <a:tab pos="5816600" algn="l"/>
+                <a:tab pos="6398260" algn="l"/>
+                <a:tab pos="6979920" algn="l"/>
+                <a:tab pos="7561580" algn="l"/>
+                <a:tab pos="8143240" algn="l"/>
+                <a:tab pos="8724900" algn="l"/>
+                <a:tab pos="9306560" algn="l"/>
+              </a:tabLst>
+            </a:pPr>
+            <a:r>
               <a:rPr lang="en-US" sz="1100" dirty="0" smtClean="0">
                 <a:solidFill>
+                  <a:srgbClr val="808000"/>
+                </a:solidFill>
+                <a:latin typeface="Courier New" pitchFamily="49" charset="0"/>
+                <a:cs typeface="Courier New" pitchFamily="49" charset="0"/>
+              </a:rPr>
+              <a:t>double</a:t>
+            </a:r>
+            <a:r>
+              <a:rPr lang="en-US" sz="1100" dirty="0" smtClean="0">
+                <a:solidFill>
+                  <a:srgbClr val="C0C0C0"/>
+                </a:solidFill>
+                <a:latin typeface="Courier New" pitchFamily="49" charset="0"/>
+                <a:cs typeface="Courier New" pitchFamily="49" charset="0"/>
+              </a:rPr>
+              <a:t> </a:t>
+            </a:r>
+            <a:r>
+              <a:rPr lang="en-US" sz="1100" dirty="0" err="1" smtClean="0">
+                <a:solidFill>
+                  <a:srgbClr val="000000"/>
+                </a:solidFill>
+                <a:latin typeface="Courier New" pitchFamily="49" charset="0"/>
+                <a:cs typeface="Courier New" pitchFamily="49" charset="0"/>
+              </a:rPr>
+              <a:t>arc_basis</a:t>
+            </a:r>
+            <a:r>
+              <a:rPr lang="en-US" sz="1100" dirty="0" smtClean="0">
+                <a:solidFill>
+                  <a:srgbClr val="C0C0C0"/>
+                </a:solidFill>
+                <a:latin typeface="Courier New" pitchFamily="49" charset="0"/>
+                <a:cs typeface="Courier New" pitchFamily="49" charset="0"/>
+              </a:rPr>
+              <a:t> </a:t>
+            </a:r>
+            <a:r>
+              <a:rPr lang="en-US" sz="1100" dirty="0" smtClean="0">
+                <a:solidFill>
+                  <a:srgbClr val="000000"/>
+                </a:solidFill>
+                <a:latin typeface="Courier New" pitchFamily="49" charset="0"/>
+                <a:cs typeface="Courier New" pitchFamily="49" charset="0"/>
+              </a:rPr>
+              <a:t>=</a:t>
+            </a:r>
+            <a:r>
+              <a:rPr lang="en-US" sz="1100" dirty="0" smtClean="0">
+                <a:solidFill>
+                  <a:srgbClr val="C0C0C0"/>
+                </a:solidFill>
+                <a:latin typeface="Courier New" pitchFamily="49" charset="0"/>
+                <a:cs typeface="Courier New" pitchFamily="49" charset="0"/>
+              </a:rPr>
+              <a:t> </a:t>
+            </a:r>
+            <a:r>
+              <a:rPr lang="en-US" sz="1100" dirty="0" smtClean="0">
+                <a:solidFill>
                   <a:srgbClr val="800080"/>
                 </a:solidFill>
                 <a:latin typeface="Courier New" pitchFamily="49" charset="0"/>
-                <a:ea typeface="Times New Roman"/>
-                <a:cs typeface="Courier New" pitchFamily="49" charset="0"/>
-              </a:rPr>
-              <a:t>                     </a:t>
+                <a:cs typeface="Courier New" pitchFamily="49" charset="0"/>
+              </a:rPr>
+              <a:t>std</a:t>
+            </a:r>
+            <a:r>
+              <a:rPr lang="en-US" sz="1100" dirty="0" smtClean="0">
+                <a:solidFill>
+                  <a:srgbClr val="000000"/>
+                </a:solidFill>
+                <a:latin typeface="Courier New" pitchFamily="49" charset="0"/>
+                <a:cs typeface="Courier New" pitchFamily="49" charset="0"/>
+              </a:rPr>
+              <a:t>::</a:t>
+            </a:r>
+            <a:r>
+              <a:rPr lang="en-US" sz="1100" dirty="0" smtClean="0">
+                <a:latin typeface="Courier New" pitchFamily="49" charset="0"/>
+                <a:cs typeface="Courier New" pitchFamily="49" charset="0"/>
+              </a:rPr>
+              <a:t>min</a:t>
+            </a:r>
+            <a:r>
+              <a:rPr lang="en-US" sz="1100" dirty="0" smtClean="0">
+                <a:solidFill>
+                  <a:srgbClr val="000000"/>
+                </a:solidFill>
+                <a:latin typeface="Courier New" pitchFamily="49" charset="0"/>
+                <a:cs typeface="Courier New" pitchFamily="49" charset="0"/>
+              </a:rPr>
+              <a:t>(</a:t>
             </a:r>
             <a:r>
               <a:rPr lang="en-US" sz="1100" dirty="0" err="1" smtClean="0">
@@ -14181,153 +14592,1011 @@
                   <a:srgbClr val="800080"/>
                 </a:solidFill>
                 <a:latin typeface="Courier New" pitchFamily="49" charset="0"/>
-                <a:ea typeface="Times New Roman"/>
                 <a:cs typeface="Courier New" pitchFamily="49" charset="0"/>
               </a:rPr>
               <a:t>cv</a:t>
             </a:r>
             <a:r>
-              <a:rPr lang="en-US" sz="1100" dirty="0">
+              <a:rPr lang="en-US" sz="1100" dirty="0" smtClean="0">
                 <a:solidFill>
                   <a:srgbClr val="000000"/>
                 </a:solidFill>
                 <a:latin typeface="Courier New" pitchFamily="49" charset="0"/>
-                <a:ea typeface="Times New Roman"/>
                 <a:cs typeface="Courier New" pitchFamily="49" charset="0"/>
               </a:rPr>
               <a:t>::</a:t>
             </a:r>
             <a:r>
-              <a:rPr lang="en-US" sz="1100" dirty="0">
+              <a:rPr lang="en-US" sz="1100" dirty="0" err="1" smtClean="0">
+                <a:latin typeface="Courier New" pitchFamily="49" charset="0"/>
+                <a:cs typeface="Courier New" pitchFamily="49" charset="0"/>
+              </a:rPr>
+              <a:t>minAreaRect</a:t>
+            </a:r>
+            <a:r>
+              <a:rPr lang="en-US" sz="1100" dirty="0" smtClean="0">
+                <a:solidFill>
+                  <a:srgbClr val="000000"/>
+                </a:solidFill>
+                <a:latin typeface="Courier New" pitchFamily="49" charset="0"/>
+                <a:cs typeface="Courier New" pitchFamily="49" charset="0"/>
+              </a:rPr>
+              <a:t>(*</a:t>
+            </a:r>
+            <a:r>
+              <a:rPr lang="en-US" sz="1100" dirty="0" err="1" smtClean="0">
+                <a:solidFill>
+                  <a:srgbClr val="000000"/>
+                </a:solidFill>
+                <a:latin typeface="Courier New" pitchFamily="49" charset="0"/>
+                <a:cs typeface="Courier New" pitchFamily="49" charset="0"/>
+              </a:rPr>
+              <a:t>basis_side</a:t>
+            </a:r>
+            <a:r>
+              <a:rPr lang="en-US" sz="1100" dirty="0" smtClean="0">
+                <a:solidFill>
+                  <a:srgbClr val="000000"/>
+                </a:solidFill>
+                <a:latin typeface="Courier New" pitchFamily="49" charset="0"/>
+                <a:cs typeface="Courier New" pitchFamily="49" charset="0"/>
+              </a:rPr>
+              <a:t>).</a:t>
+            </a:r>
+            <a:r>
+              <a:rPr lang="en-US" sz="1100" dirty="0" err="1" smtClean="0">
+                <a:solidFill>
+                  <a:srgbClr val="800000"/>
+                </a:solidFill>
+                <a:latin typeface="Courier New" pitchFamily="49" charset="0"/>
+                <a:cs typeface="Courier New" pitchFamily="49" charset="0"/>
+              </a:rPr>
+              <a:t>size</a:t>
+            </a:r>
+            <a:r>
+              <a:rPr lang="en-US" sz="1100" dirty="0" err="1" smtClean="0">
+                <a:solidFill>
+                  <a:srgbClr val="000000"/>
+                </a:solidFill>
+                <a:latin typeface="Courier New" pitchFamily="49" charset="0"/>
+                <a:cs typeface="Courier New" pitchFamily="49" charset="0"/>
+              </a:rPr>
+              <a:t>.</a:t>
+            </a:r>
+            <a:r>
+              <a:rPr lang="en-US" sz="1100" dirty="0" err="1" smtClean="0">
+                <a:solidFill>
+                  <a:srgbClr val="800000"/>
+                </a:solidFill>
+                <a:latin typeface="Courier New" pitchFamily="49" charset="0"/>
+                <a:cs typeface="Courier New" pitchFamily="49" charset="0"/>
+              </a:rPr>
+              <a:t>height</a:t>
+            </a:r>
+            <a:r>
+              <a:rPr lang="en-US" sz="1100" dirty="0" smtClean="0">
+                <a:solidFill>
+                  <a:srgbClr val="000000"/>
+                </a:solidFill>
+                <a:latin typeface="Courier New" pitchFamily="49" charset="0"/>
+                <a:cs typeface="Courier New" pitchFamily="49" charset="0"/>
+              </a:rPr>
+              <a:t>,</a:t>
+            </a:r>
+            <a:r>
+              <a:rPr lang="en-US" sz="1100" dirty="0" smtClean="0">
+                <a:solidFill>
+                  <a:srgbClr val="C0C0C0"/>
+                </a:solidFill>
+                <a:latin typeface="Courier New" pitchFamily="49" charset="0"/>
+                <a:cs typeface="Courier New" pitchFamily="49" charset="0"/>
+              </a:rPr>
+              <a:t> </a:t>
+            </a:r>
+          </a:p>
+          <a:p>
+            <a:pPr lvl="1">
+              <a:lnSpc>
+                <a:spcPct val="115000"/>
+              </a:lnSpc>
+              <a:tabLst>
+                <a:tab pos="581660" algn="l"/>
+                <a:tab pos="1163320" algn="l"/>
+                <a:tab pos="1744980" algn="l"/>
+                <a:tab pos="2326640" algn="l"/>
+                <a:tab pos="2908300" algn="l"/>
+                <a:tab pos="3489960" algn="l"/>
+                <a:tab pos="4071620" algn="l"/>
+                <a:tab pos="4653280" algn="l"/>
+                <a:tab pos="5234940" algn="l"/>
+                <a:tab pos="5816600" algn="l"/>
+                <a:tab pos="6398260" algn="l"/>
+                <a:tab pos="6979920" algn="l"/>
+                <a:tab pos="7561580" algn="l"/>
+                <a:tab pos="8143240" algn="l"/>
+                <a:tab pos="8724900" algn="l"/>
+                <a:tab pos="9306560" algn="l"/>
+              </a:tabLst>
+            </a:pPr>
+            <a:r>
+              <a:rPr lang="en-US" sz="1100" dirty="0" smtClean="0">
+                <a:solidFill>
+                  <a:srgbClr val="C0C0C0"/>
+                </a:solidFill>
+                <a:latin typeface="Courier New" pitchFamily="49" charset="0"/>
+                <a:cs typeface="Courier New" pitchFamily="49" charset="0"/>
+              </a:rPr>
+              <a:t>                            </a:t>
+            </a:r>
+            <a:r>
+              <a:rPr lang="en-US" sz="1100" dirty="0" err="1" smtClean="0">
                 <a:solidFill>
                   <a:srgbClr val="800080"/>
                 </a:solidFill>
                 <a:latin typeface="Courier New" pitchFamily="49" charset="0"/>
-                <a:ea typeface="Times New Roman"/>
-                <a:cs typeface="Courier New" pitchFamily="49" charset="0"/>
-              </a:rPr>
-              <a:t>Mat</a:t>
-            </a:r>
-            <a:r>
-              <a:rPr lang="en-US" sz="1100" dirty="0">
+                <a:cs typeface="Courier New" pitchFamily="49" charset="0"/>
+              </a:rPr>
+              <a:t>cv</a:t>
+            </a:r>
+            <a:r>
+              <a:rPr lang="en-US" sz="1100" dirty="0" smtClean="0">
                 <a:solidFill>
                   <a:srgbClr val="000000"/>
                 </a:solidFill>
                 <a:latin typeface="Courier New" pitchFamily="49" charset="0"/>
-                <a:ea typeface="Times New Roman"/>
+                <a:cs typeface="Courier New" pitchFamily="49" charset="0"/>
+              </a:rPr>
+              <a:t>::</a:t>
+            </a:r>
+            <a:r>
+              <a:rPr lang="en-US" sz="1100" dirty="0" err="1" smtClean="0">
+                <a:latin typeface="Courier New" pitchFamily="49" charset="0"/>
+                <a:cs typeface="Courier New" pitchFamily="49" charset="0"/>
+              </a:rPr>
+              <a:t>minAreaRect</a:t>
+            </a:r>
+            <a:r>
+              <a:rPr lang="en-US" sz="1100" dirty="0" smtClean="0">
+                <a:solidFill>
+                  <a:srgbClr val="000000"/>
+                </a:solidFill>
+                <a:latin typeface="Courier New" pitchFamily="49" charset="0"/>
+                <a:cs typeface="Courier New" pitchFamily="49" charset="0"/>
+              </a:rPr>
+              <a:t>(*</a:t>
+            </a:r>
+            <a:r>
+              <a:rPr lang="en-US" sz="1100" dirty="0" err="1" smtClean="0">
+                <a:solidFill>
+                  <a:srgbClr val="000000"/>
+                </a:solidFill>
+                <a:latin typeface="Courier New" pitchFamily="49" charset="0"/>
+                <a:cs typeface="Courier New" pitchFamily="49" charset="0"/>
+              </a:rPr>
+              <a:t>basis_side</a:t>
+            </a:r>
+            <a:r>
+              <a:rPr lang="en-US" sz="1100" dirty="0" smtClean="0">
+                <a:solidFill>
+                  <a:srgbClr val="000000"/>
+                </a:solidFill>
+                <a:latin typeface="Courier New" pitchFamily="49" charset="0"/>
+                <a:cs typeface="Courier New" pitchFamily="49" charset="0"/>
+              </a:rPr>
+              <a:t>).</a:t>
+            </a:r>
+            <a:r>
+              <a:rPr lang="en-US" sz="1100" dirty="0" err="1" smtClean="0">
+                <a:solidFill>
+                  <a:srgbClr val="800000"/>
+                </a:solidFill>
+                <a:latin typeface="Courier New" pitchFamily="49" charset="0"/>
+                <a:cs typeface="Courier New" pitchFamily="49" charset="0"/>
+              </a:rPr>
+              <a:t>size</a:t>
+            </a:r>
+            <a:r>
+              <a:rPr lang="en-US" sz="1100" dirty="0" err="1" smtClean="0">
+                <a:solidFill>
+                  <a:srgbClr val="000000"/>
+                </a:solidFill>
+                <a:latin typeface="Courier New" pitchFamily="49" charset="0"/>
+                <a:cs typeface="Courier New" pitchFamily="49" charset="0"/>
+              </a:rPr>
+              <a:t>.</a:t>
+            </a:r>
+            <a:r>
+              <a:rPr lang="en-US" sz="1100" dirty="0" err="1" smtClean="0">
+                <a:solidFill>
+                  <a:srgbClr val="800000"/>
+                </a:solidFill>
+                <a:latin typeface="Courier New" pitchFamily="49" charset="0"/>
+                <a:cs typeface="Courier New" pitchFamily="49" charset="0"/>
+              </a:rPr>
+              <a:t>width</a:t>
+            </a:r>
+            <a:r>
+              <a:rPr lang="en-US" sz="1100" dirty="0" smtClean="0">
+                <a:solidFill>
+                  <a:srgbClr val="000000"/>
+                </a:solidFill>
+                <a:latin typeface="Courier New" pitchFamily="49" charset="0"/>
+                <a:cs typeface="Courier New" pitchFamily="49" charset="0"/>
+              </a:rPr>
+              <a:t>); ...</a:t>
+            </a:r>
+            <a:endParaRPr lang="de-CH" sz="1100" dirty="0" smtClean="0">
+              <a:solidFill>
+                <a:srgbClr val="C0C0C0"/>
+              </a:solidFill>
+              <a:latin typeface="Courier New" pitchFamily="49" charset="0"/>
+              <a:cs typeface="Courier New" pitchFamily="49" charset="0"/>
+            </a:endParaRPr>
+          </a:p>
+          <a:p>
+            <a:pPr lvl="1">
+              <a:lnSpc>
+                <a:spcPct val="115000"/>
+              </a:lnSpc>
+              <a:tabLst>
+                <a:tab pos="581660" algn="l"/>
+                <a:tab pos="1163320" algn="l"/>
+                <a:tab pos="1744980" algn="l"/>
+                <a:tab pos="2326640" algn="l"/>
+                <a:tab pos="2908300" algn="l"/>
+                <a:tab pos="3489960" algn="l"/>
+                <a:tab pos="4071620" algn="l"/>
+                <a:tab pos="4653280" algn="l"/>
+                <a:tab pos="5234940" algn="l"/>
+                <a:tab pos="5816600" algn="l"/>
+                <a:tab pos="6398260" algn="l"/>
+                <a:tab pos="6979920" algn="l"/>
+                <a:tab pos="7561580" algn="l"/>
+                <a:tab pos="8143240" algn="l"/>
+                <a:tab pos="8724900" algn="l"/>
+                <a:tab pos="9306560" algn="l"/>
+              </a:tabLst>
+            </a:pPr>
+            <a:r>
+              <a:rPr lang="de-CH" sz="1100" dirty="0" smtClean="0">
+                <a:solidFill>
+                  <a:srgbClr val="808000"/>
+                </a:solidFill>
+                <a:latin typeface="Courier New" pitchFamily="49" charset="0"/>
+                <a:cs typeface="Courier New" pitchFamily="49" charset="0"/>
+              </a:rPr>
+              <a:t>double</a:t>
+            </a:r>
+            <a:r>
+              <a:rPr lang="de-CH" sz="1100" dirty="0" smtClean="0">
+                <a:solidFill>
+                  <a:srgbClr val="C0C0C0"/>
+                </a:solidFill>
+                <a:latin typeface="Courier New" pitchFamily="49" charset="0"/>
+                <a:cs typeface="Courier New" pitchFamily="49" charset="0"/>
+              </a:rPr>
+              <a:t> </a:t>
+            </a:r>
+            <a:r>
+              <a:rPr lang="de-CH" sz="1100" dirty="0" err="1" smtClean="0">
+                <a:solidFill>
+                  <a:srgbClr val="000000"/>
+                </a:solidFill>
+                <a:latin typeface="Courier New" pitchFamily="49" charset="0"/>
+                <a:cs typeface="Courier New" pitchFamily="49" charset="0"/>
+              </a:rPr>
+              <a:t>result_arc</a:t>
+            </a:r>
+            <a:r>
+              <a:rPr lang="de-CH" sz="1100" dirty="0" smtClean="0">
+                <a:solidFill>
+                  <a:srgbClr val="C0C0C0"/>
+                </a:solidFill>
+                <a:latin typeface="Courier New" pitchFamily="49" charset="0"/>
+                <a:cs typeface="Courier New" pitchFamily="49" charset="0"/>
+              </a:rPr>
+              <a:t> </a:t>
+            </a:r>
+            <a:r>
+              <a:rPr lang="de-CH" sz="1100" dirty="0" smtClean="0">
+                <a:solidFill>
+                  <a:srgbClr val="000000"/>
+                </a:solidFill>
+                <a:latin typeface="Courier New" pitchFamily="49" charset="0"/>
+                <a:cs typeface="Courier New" pitchFamily="49" charset="0"/>
+              </a:rPr>
+              <a:t>=</a:t>
+            </a:r>
+            <a:r>
+              <a:rPr lang="de-CH" sz="1100" dirty="0" smtClean="0">
+                <a:solidFill>
+                  <a:srgbClr val="C0C0C0"/>
+                </a:solidFill>
+                <a:latin typeface="Courier New" pitchFamily="49" charset="0"/>
+                <a:cs typeface="Courier New" pitchFamily="49" charset="0"/>
+              </a:rPr>
+              <a:t> </a:t>
+            </a:r>
+            <a:r>
+              <a:rPr lang="de-CH" sz="1100" dirty="0" err="1" smtClean="0">
+                <a:solidFill>
+                  <a:srgbClr val="000000"/>
+                </a:solidFill>
+                <a:latin typeface="Courier New" pitchFamily="49" charset="0"/>
+                <a:cs typeface="Courier New" pitchFamily="49" charset="0"/>
+              </a:rPr>
+              <a:t>arc_basis</a:t>
+            </a:r>
+            <a:r>
+              <a:rPr lang="de-CH" sz="1100" dirty="0" smtClean="0">
+                <a:solidFill>
+                  <a:srgbClr val="C0C0C0"/>
+                </a:solidFill>
+                <a:latin typeface="Courier New" pitchFamily="49" charset="0"/>
+                <a:cs typeface="Courier New" pitchFamily="49" charset="0"/>
+              </a:rPr>
+              <a:t> </a:t>
+            </a:r>
+            <a:r>
+              <a:rPr lang="de-CH" sz="1100" dirty="0" smtClean="0">
+                <a:solidFill>
+                  <a:srgbClr val="000000"/>
+                </a:solidFill>
+                <a:latin typeface="Courier New" pitchFamily="49" charset="0"/>
+                <a:cs typeface="Courier New" pitchFamily="49" charset="0"/>
+              </a:rPr>
+              <a:t>/</a:t>
+            </a:r>
+            <a:r>
+              <a:rPr lang="de-CH" sz="1100" dirty="0" smtClean="0">
+                <a:solidFill>
+                  <a:srgbClr val="C0C0C0"/>
+                </a:solidFill>
+                <a:latin typeface="Courier New" pitchFamily="49" charset="0"/>
+                <a:cs typeface="Courier New" pitchFamily="49" charset="0"/>
+              </a:rPr>
+              <a:t> </a:t>
+            </a:r>
+            <a:r>
+              <a:rPr lang="de-CH" sz="1100" dirty="0" err="1" smtClean="0">
+                <a:solidFill>
+                  <a:srgbClr val="800080"/>
+                </a:solidFill>
+                <a:latin typeface="Courier New" pitchFamily="49" charset="0"/>
+                <a:cs typeface="Courier New" pitchFamily="49" charset="0"/>
+              </a:rPr>
+              <a:t>std</a:t>
+            </a:r>
+            <a:r>
+              <a:rPr lang="de-CH" sz="1100" dirty="0" smtClean="0">
+                <a:solidFill>
+                  <a:srgbClr val="000000"/>
+                </a:solidFill>
+                <a:latin typeface="Courier New" pitchFamily="49" charset="0"/>
+                <a:cs typeface="Courier New" pitchFamily="49" charset="0"/>
+              </a:rPr>
+              <a:t>::</a:t>
+            </a:r>
+            <a:r>
+              <a:rPr lang="de-CH" sz="1100" dirty="0" err="1" smtClean="0">
+                <a:solidFill>
+                  <a:srgbClr val="C0C0C0"/>
+                </a:solidFill>
+                <a:latin typeface="Courier New" pitchFamily="49" charset="0"/>
+                <a:cs typeface="Courier New" pitchFamily="49" charset="0"/>
+              </a:rPr>
+              <a:t>fabs</a:t>
+            </a:r>
+            <a:r>
+              <a:rPr lang="de-CH" sz="1100" dirty="0" smtClean="0">
+                <a:solidFill>
+                  <a:srgbClr val="000000"/>
+                </a:solidFill>
+                <a:latin typeface="Courier New" pitchFamily="49" charset="0"/>
                 <a:cs typeface="Courier New" pitchFamily="49" charset="0"/>
               </a:rPr>
               <a:t>(</a:t>
             </a:r>
             <a:r>
-              <a:rPr lang="en-US" sz="1100" dirty="0" err="1">
+              <a:rPr lang="de-CH" sz="1100" dirty="0" err="1" smtClean="0">
                 <a:solidFill>
                   <a:srgbClr val="000000"/>
                 </a:solidFill>
                 <a:latin typeface="Courier New" pitchFamily="49" charset="0"/>
-                <a:ea typeface="Times New Roman"/>
-                <a:cs typeface="Courier New" pitchFamily="49" charset="0"/>
-              </a:rPr>
-              <a:t>sidesFiltered</a:t>
-            </a:r>
-            <a:r>
-              <a:rPr lang="en-US" sz="1100" dirty="0">
+                <a:cs typeface="Courier New" pitchFamily="49" charset="0"/>
+              </a:rPr>
+              <a:t>arc_basis</a:t>
+            </a:r>
+            <a:r>
+              <a:rPr lang="de-CH" sz="1100" dirty="0" smtClean="0">
+                <a:solidFill>
+                  <a:srgbClr val="C0C0C0"/>
+                </a:solidFill>
+                <a:latin typeface="Courier New" pitchFamily="49" charset="0"/>
+                <a:cs typeface="Courier New" pitchFamily="49" charset="0"/>
+              </a:rPr>
+              <a:t> </a:t>
+            </a:r>
+            <a:r>
+              <a:rPr lang="de-CH" sz="1100" dirty="0" smtClean="0">
                 <a:solidFill>
                   <a:srgbClr val="000000"/>
                 </a:solidFill>
                 <a:latin typeface="Courier New" pitchFamily="49" charset="0"/>
-                <a:ea typeface="Times New Roman"/>
-                <a:cs typeface="Courier New" pitchFamily="49" charset="0"/>
-              </a:rPr>
-              <a:t>[</a:t>
-            </a:r>
-            <a:r>
-              <a:rPr lang="en-US" sz="1100" dirty="0" err="1">
+                <a:cs typeface="Courier New" pitchFamily="49" charset="0"/>
+              </a:rPr>
+              <a:t>-</a:t>
+            </a:r>
+            <a:r>
+              <a:rPr lang="de-CH" sz="1100" dirty="0" smtClean="0">
+                <a:solidFill>
+                  <a:srgbClr val="C0C0C0"/>
+                </a:solidFill>
+                <a:latin typeface="Courier New" pitchFamily="49" charset="0"/>
+                <a:cs typeface="Courier New" pitchFamily="49" charset="0"/>
+              </a:rPr>
+              <a:t> </a:t>
+            </a:r>
+            <a:r>
+              <a:rPr lang="de-CH" sz="1100" dirty="0" err="1" smtClean="0">
                 <a:solidFill>
                   <a:srgbClr val="000000"/>
                 </a:solidFill>
                 <a:latin typeface="Courier New" pitchFamily="49" charset="0"/>
-                <a:ea typeface="Times New Roman"/>
-                <a:cs typeface="Courier New" pitchFamily="49" charset="0"/>
-              </a:rPr>
-              <a:t>i</a:t>
-            </a:r>
-            <a:r>
-              <a:rPr lang="en-US" sz="1100" dirty="0">
+                <a:cs typeface="Courier New" pitchFamily="49" charset="0"/>
+              </a:rPr>
+              <a:t>arc_compare</a:t>
+            </a:r>
+            <a:r>
+              <a:rPr lang="de-CH" sz="1100" dirty="0" smtClean="0">
                 <a:solidFill>
                   <a:srgbClr val="000000"/>
                 </a:solidFill>
                 <a:latin typeface="Courier New" pitchFamily="49" charset="0"/>
-                <a:ea typeface="Times New Roman"/>
-                <a:cs typeface="Courier New" pitchFamily="49" charset="0"/>
-              </a:rPr>
-              <a:t>][j]),</a:t>
-            </a:r>
-            <a:r>
-              <a:rPr lang="en-US" sz="1100" dirty="0">
+                <a:cs typeface="Courier New" pitchFamily="49" charset="0"/>
+              </a:rPr>
+              <a:t>);</a:t>
+            </a:r>
+          </a:p>
+          <a:p>
+            <a:pPr lvl="1">
+              <a:lnSpc>
+                <a:spcPct val="115000"/>
+              </a:lnSpc>
+              <a:tabLst>
+                <a:tab pos="581660" algn="l"/>
+                <a:tab pos="1163320" algn="l"/>
+                <a:tab pos="1744980" algn="l"/>
+                <a:tab pos="2326640" algn="l"/>
+                <a:tab pos="2908300" algn="l"/>
+                <a:tab pos="3489960" algn="l"/>
+                <a:tab pos="4071620" algn="l"/>
+                <a:tab pos="4653280" algn="l"/>
+                <a:tab pos="5234940" algn="l"/>
+                <a:tab pos="5816600" algn="l"/>
+                <a:tab pos="6398260" algn="l"/>
+                <a:tab pos="6979920" algn="l"/>
+                <a:tab pos="7561580" algn="l"/>
+                <a:tab pos="8143240" algn="l"/>
+                <a:tab pos="8724900" algn="l"/>
+                <a:tab pos="9306560" algn="l"/>
+              </a:tabLst>
+            </a:pPr>
+            <a:endParaRPr lang="de-CH" sz="1100" dirty="0" smtClean="0">
+              <a:solidFill>
+                <a:srgbClr val="C0C0C0"/>
+              </a:solidFill>
+              <a:latin typeface="Courier New" pitchFamily="49" charset="0"/>
+              <a:cs typeface="Courier New" pitchFamily="49" charset="0"/>
+            </a:endParaRPr>
+          </a:p>
+          <a:p>
+            <a:pPr lvl="1">
+              <a:lnSpc>
+                <a:spcPct val="115000"/>
+              </a:lnSpc>
+              <a:tabLst>
+                <a:tab pos="581660" algn="l"/>
+                <a:tab pos="1163320" algn="l"/>
+                <a:tab pos="1744980" algn="l"/>
+                <a:tab pos="2326640" algn="l"/>
+                <a:tab pos="2908300" algn="l"/>
+                <a:tab pos="3489960" algn="l"/>
+                <a:tab pos="4071620" algn="l"/>
+                <a:tab pos="4653280" algn="l"/>
+                <a:tab pos="5234940" algn="l"/>
+                <a:tab pos="5816600" algn="l"/>
+                <a:tab pos="6398260" algn="l"/>
+                <a:tab pos="6979920" algn="l"/>
+                <a:tab pos="7561580" algn="l"/>
+                <a:tab pos="8143240" algn="l"/>
+                <a:tab pos="8724900" algn="l"/>
+                <a:tab pos="9306560" algn="l"/>
+              </a:tabLst>
+            </a:pPr>
+            <a:r>
+              <a:rPr lang="de-CH" sz="1100" dirty="0" smtClean="0">
+                <a:solidFill>
+                  <a:srgbClr val="008000"/>
+                </a:solidFill>
+                <a:latin typeface="Courier New" pitchFamily="49" charset="0"/>
+                <a:cs typeface="Courier New" pitchFamily="49" charset="0"/>
+              </a:rPr>
+              <a:t>//</a:t>
+            </a:r>
+            <a:r>
+              <a:rPr lang="de-CH" sz="1100" dirty="0" smtClean="0">
                 <a:solidFill>
                   <a:srgbClr val="C0C0C0"/>
                 </a:solidFill>
                 <a:latin typeface="Courier New" pitchFamily="49" charset="0"/>
-                <a:ea typeface="Times New Roman"/>
                 <a:cs typeface="Courier New" pitchFamily="49" charset="0"/>
               </a:rPr>
               <a:t> </a:t>
             </a:r>
             <a:r>
-              <a:rPr lang="en-US" sz="1100" dirty="0">
+              <a:rPr lang="de-CH" sz="1100" dirty="0" smtClean="0">
+                <a:solidFill>
+                  <a:srgbClr val="008000"/>
+                </a:solidFill>
+                <a:latin typeface="Courier New" pitchFamily="49" charset="0"/>
+                <a:cs typeface="Courier New" pitchFamily="49" charset="0"/>
+              </a:rPr>
+              <a:t>Fläche</a:t>
+            </a:r>
+            <a:r>
+              <a:rPr lang="de-CH" sz="1100" dirty="0" smtClean="0">
+                <a:solidFill>
+                  <a:srgbClr val="C0C0C0"/>
+                </a:solidFill>
+                <a:latin typeface="Courier New" pitchFamily="49" charset="0"/>
+                <a:cs typeface="Courier New" pitchFamily="49" charset="0"/>
+              </a:rPr>
+              <a:t> </a:t>
+            </a:r>
+            <a:r>
+              <a:rPr lang="de-CH" sz="1100" dirty="0" smtClean="0">
+                <a:solidFill>
+                  <a:srgbClr val="008000"/>
+                </a:solidFill>
+                <a:latin typeface="Courier New" pitchFamily="49" charset="0"/>
+                <a:cs typeface="Courier New" pitchFamily="49" charset="0"/>
+              </a:rPr>
+              <a:t>der</a:t>
+            </a:r>
+            <a:r>
+              <a:rPr lang="de-CH" sz="1100" dirty="0" smtClean="0">
+                <a:solidFill>
+                  <a:srgbClr val="C0C0C0"/>
+                </a:solidFill>
+                <a:latin typeface="Courier New" pitchFamily="49" charset="0"/>
+                <a:cs typeface="Courier New" pitchFamily="49" charset="0"/>
+              </a:rPr>
+              <a:t> </a:t>
+            </a:r>
+            <a:r>
+              <a:rPr lang="de-CH" sz="1100" dirty="0" smtClean="0">
+                <a:solidFill>
+                  <a:srgbClr val="008000"/>
+                </a:solidFill>
+                <a:latin typeface="Courier New" pitchFamily="49" charset="0"/>
+                <a:cs typeface="Courier New" pitchFamily="49" charset="0"/>
+              </a:rPr>
+              <a:t>Ausbuchtung</a:t>
+            </a:r>
+            <a:r>
+              <a:rPr lang="de-CH" sz="1100" dirty="0" smtClean="0">
+                <a:solidFill>
+                  <a:srgbClr val="C0C0C0"/>
+                </a:solidFill>
+                <a:latin typeface="Courier New" pitchFamily="49" charset="0"/>
+                <a:cs typeface="Courier New" pitchFamily="49" charset="0"/>
+              </a:rPr>
+              <a:t> </a:t>
+            </a:r>
+            <a:r>
+              <a:rPr lang="de-CH" sz="1100" dirty="0" smtClean="0">
+                <a:solidFill>
+                  <a:srgbClr val="008000"/>
+                </a:solidFill>
+                <a:latin typeface="Courier New" pitchFamily="49" charset="0"/>
+                <a:cs typeface="Courier New" pitchFamily="49" charset="0"/>
+              </a:rPr>
+              <a:t>(Fa/|Fa-</a:t>
+            </a:r>
+            <a:r>
+              <a:rPr lang="de-CH" sz="1100" dirty="0" err="1" smtClean="0">
+                <a:solidFill>
+                  <a:srgbClr val="008000"/>
+                </a:solidFill>
+                <a:latin typeface="Courier New" pitchFamily="49" charset="0"/>
+                <a:cs typeface="Courier New" pitchFamily="49" charset="0"/>
+              </a:rPr>
+              <a:t>Fb</a:t>
+            </a:r>
+            <a:r>
+              <a:rPr lang="de-CH" sz="1100" dirty="0" smtClean="0">
+                <a:solidFill>
+                  <a:srgbClr val="008000"/>
+                </a:solidFill>
+                <a:latin typeface="Courier New" pitchFamily="49" charset="0"/>
+                <a:cs typeface="Courier New" pitchFamily="49" charset="0"/>
+              </a:rPr>
+              <a:t>|)</a:t>
+            </a:r>
+          </a:p>
+          <a:p>
+            <a:pPr lvl="1">
+              <a:lnSpc>
+                <a:spcPct val="115000"/>
+              </a:lnSpc>
+              <a:tabLst>
+                <a:tab pos="581660" algn="l"/>
+                <a:tab pos="1163320" algn="l"/>
+                <a:tab pos="1744980" algn="l"/>
+                <a:tab pos="2326640" algn="l"/>
+                <a:tab pos="2908300" algn="l"/>
+                <a:tab pos="3489960" algn="l"/>
+                <a:tab pos="4071620" algn="l"/>
+                <a:tab pos="4653280" algn="l"/>
+                <a:tab pos="5234940" algn="l"/>
+                <a:tab pos="5816600" algn="l"/>
+                <a:tab pos="6398260" algn="l"/>
+                <a:tab pos="6979920" algn="l"/>
+                <a:tab pos="7561580" algn="l"/>
+                <a:tab pos="8143240" algn="l"/>
+                <a:tab pos="8724900" algn="l"/>
+                <a:tab pos="9306560" algn="l"/>
+              </a:tabLst>
+            </a:pPr>
+            <a:r>
+              <a:rPr lang="en-US" sz="1100" dirty="0" smtClean="0">
+                <a:solidFill>
+                  <a:srgbClr val="808000"/>
+                </a:solidFill>
+                <a:latin typeface="Courier New" pitchFamily="49" charset="0"/>
+                <a:cs typeface="Courier New" pitchFamily="49" charset="0"/>
+              </a:rPr>
+              <a:t>double</a:t>
+            </a:r>
+            <a:r>
+              <a:rPr lang="en-US" sz="1100" dirty="0" smtClean="0">
+                <a:solidFill>
+                  <a:srgbClr val="C0C0C0"/>
+                </a:solidFill>
+                <a:latin typeface="Courier New" pitchFamily="49" charset="0"/>
+                <a:cs typeface="Courier New" pitchFamily="49" charset="0"/>
+              </a:rPr>
+              <a:t> </a:t>
+            </a:r>
+            <a:r>
+              <a:rPr lang="en-US" sz="1100" dirty="0" err="1" smtClean="0">
+                <a:solidFill>
+                  <a:srgbClr val="000000"/>
+                </a:solidFill>
+                <a:latin typeface="Courier New" pitchFamily="49" charset="0"/>
+                <a:cs typeface="Courier New" pitchFamily="49" charset="0"/>
+              </a:rPr>
+              <a:t>area_basis</a:t>
+            </a:r>
+            <a:r>
+              <a:rPr lang="en-US" sz="1100" dirty="0" smtClean="0">
+                <a:solidFill>
+                  <a:srgbClr val="C0C0C0"/>
+                </a:solidFill>
+                <a:latin typeface="Courier New" pitchFamily="49" charset="0"/>
+                <a:cs typeface="Courier New" pitchFamily="49" charset="0"/>
+              </a:rPr>
+              <a:t> </a:t>
+            </a:r>
+            <a:r>
+              <a:rPr lang="en-US" sz="1100" dirty="0" smtClean="0">
+                <a:solidFill>
+                  <a:srgbClr val="000000"/>
+                </a:solidFill>
+                <a:latin typeface="Courier New" pitchFamily="49" charset="0"/>
+                <a:cs typeface="Courier New" pitchFamily="49" charset="0"/>
+              </a:rPr>
+              <a:t>=</a:t>
+            </a:r>
+            <a:r>
+              <a:rPr lang="en-US" sz="1100" dirty="0" smtClean="0">
+                <a:solidFill>
+                  <a:srgbClr val="C0C0C0"/>
+                </a:solidFill>
+                <a:latin typeface="Courier New" pitchFamily="49" charset="0"/>
+                <a:cs typeface="Courier New" pitchFamily="49" charset="0"/>
+              </a:rPr>
+              <a:t> </a:t>
+            </a:r>
+            <a:r>
+              <a:rPr lang="en-US" sz="1100" dirty="0" err="1" smtClean="0">
                 <a:solidFill>
                   <a:srgbClr val="800080"/>
                 </a:solidFill>
                 <a:latin typeface="Courier New" pitchFamily="49" charset="0"/>
-                <a:ea typeface="Times New Roman"/>
-                <a:cs typeface="Courier New" pitchFamily="49" charset="0"/>
-              </a:rPr>
-              <a:t>CV_CONTOURS_MATCH_I3</a:t>
-            </a:r>
-            <a:r>
-              <a:rPr lang="en-US" sz="1100" dirty="0">
+                <a:cs typeface="Courier New" pitchFamily="49" charset="0"/>
+              </a:rPr>
+              <a:t>cv</a:t>
+            </a:r>
+            <a:r>
+              <a:rPr lang="en-US" sz="1100" dirty="0" smtClean="0">
                 <a:solidFill>
                   <a:srgbClr val="000000"/>
                 </a:solidFill>
                 <a:latin typeface="Courier New" pitchFamily="49" charset="0"/>
-                <a:ea typeface="Times New Roman"/>
-                <a:cs typeface="Courier New" pitchFamily="49" charset="0"/>
-              </a:rPr>
-              <a:t>,</a:t>
-            </a:r>
-            <a:r>
-              <a:rPr lang="en-US" sz="1100" dirty="0">
+                <a:cs typeface="Courier New" pitchFamily="49" charset="0"/>
+              </a:rPr>
+              <a:t>::</a:t>
+            </a:r>
+            <a:r>
+              <a:rPr lang="en-US" sz="1100" dirty="0" err="1" smtClean="0">
+                <a:latin typeface="Courier New" pitchFamily="49" charset="0"/>
+                <a:cs typeface="Courier New" pitchFamily="49" charset="0"/>
+              </a:rPr>
+              <a:t>contourArea</a:t>
+            </a:r>
+            <a:r>
+              <a:rPr lang="en-US" sz="1100" dirty="0" smtClean="0">
+                <a:solidFill>
+                  <a:srgbClr val="000000"/>
+                </a:solidFill>
+                <a:latin typeface="Courier New" pitchFamily="49" charset="0"/>
+                <a:cs typeface="Courier New" pitchFamily="49" charset="0"/>
+              </a:rPr>
+              <a:t>(*</a:t>
+            </a:r>
+            <a:r>
+              <a:rPr lang="en-US" sz="1100" dirty="0" err="1" smtClean="0">
+                <a:solidFill>
+                  <a:srgbClr val="000000"/>
+                </a:solidFill>
+                <a:latin typeface="Courier New" pitchFamily="49" charset="0"/>
+                <a:cs typeface="Courier New" pitchFamily="49" charset="0"/>
+              </a:rPr>
+              <a:t>basis_side</a:t>
+            </a:r>
+            <a:r>
+              <a:rPr lang="en-US" sz="1100" dirty="0" smtClean="0">
+                <a:solidFill>
+                  <a:srgbClr val="000000"/>
+                </a:solidFill>
+                <a:latin typeface="Courier New" pitchFamily="49" charset="0"/>
+                <a:cs typeface="Courier New" pitchFamily="49" charset="0"/>
+              </a:rPr>
+              <a:t>); ...</a:t>
+            </a:r>
+            <a:endParaRPr lang="de-CH" sz="1100" dirty="0" smtClean="0">
+              <a:solidFill>
+                <a:srgbClr val="C0C0C0"/>
+              </a:solidFill>
+              <a:latin typeface="Courier New" pitchFamily="49" charset="0"/>
+              <a:cs typeface="Courier New" pitchFamily="49" charset="0"/>
+            </a:endParaRPr>
+          </a:p>
+          <a:p>
+            <a:pPr lvl="1">
+              <a:lnSpc>
+                <a:spcPct val="115000"/>
+              </a:lnSpc>
+              <a:tabLst>
+                <a:tab pos="581660" algn="l"/>
+                <a:tab pos="1163320" algn="l"/>
+                <a:tab pos="1744980" algn="l"/>
+                <a:tab pos="2326640" algn="l"/>
+                <a:tab pos="2908300" algn="l"/>
+                <a:tab pos="3489960" algn="l"/>
+                <a:tab pos="4071620" algn="l"/>
+                <a:tab pos="4653280" algn="l"/>
+                <a:tab pos="5234940" algn="l"/>
+                <a:tab pos="5816600" algn="l"/>
+                <a:tab pos="6398260" algn="l"/>
+                <a:tab pos="6979920" algn="l"/>
+                <a:tab pos="7561580" algn="l"/>
+                <a:tab pos="8143240" algn="l"/>
+                <a:tab pos="8724900" algn="l"/>
+                <a:tab pos="9306560" algn="l"/>
+              </a:tabLst>
+            </a:pPr>
+            <a:r>
+              <a:rPr lang="de-CH" sz="1100" dirty="0" smtClean="0">
+                <a:solidFill>
+                  <a:srgbClr val="808000"/>
+                </a:solidFill>
+                <a:latin typeface="Courier New" pitchFamily="49" charset="0"/>
+                <a:cs typeface="Courier New" pitchFamily="49" charset="0"/>
+              </a:rPr>
+              <a:t>double</a:t>
+            </a:r>
+            <a:r>
+              <a:rPr lang="de-CH" sz="1100" dirty="0" smtClean="0">
                 <a:solidFill>
                   <a:srgbClr val="C0C0C0"/>
                 </a:solidFill>
                 <a:latin typeface="Courier New" pitchFamily="49" charset="0"/>
-                <a:ea typeface="Times New Roman"/>
                 <a:cs typeface="Courier New" pitchFamily="49" charset="0"/>
               </a:rPr>
               <a:t> </a:t>
             </a:r>
             <a:r>
-              <a:rPr lang="en-US" sz="1100" dirty="0">
-                <a:solidFill>
-                  <a:srgbClr val="000080"/>
-                </a:solidFill>
-                <a:latin typeface="Courier New" pitchFamily="49" charset="0"/>
-                <a:ea typeface="Times New Roman"/>
-                <a:cs typeface="Courier New" pitchFamily="49" charset="0"/>
-              </a:rPr>
-              <a:t>0</a:t>
-            </a:r>
-            <a:r>
-              <a:rPr lang="en-US" sz="1100" dirty="0">
+              <a:rPr lang="de-CH" sz="1100" dirty="0" err="1" smtClean="0">
                 <a:solidFill>
                   <a:srgbClr val="000000"/>
                 </a:solidFill>
                 <a:latin typeface="Courier New" pitchFamily="49" charset="0"/>
-                <a:ea typeface="Times New Roman"/>
-                <a:cs typeface="Courier New" pitchFamily="49" charset="0"/>
-              </a:rPr>
-              <a:t>));</a:t>
+                <a:cs typeface="Courier New" pitchFamily="49" charset="0"/>
+              </a:rPr>
+              <a:t>result_area</a:t>
+            </a:r>
+            <a:r>
+              <a:rPr lang="de-CH" sz="1100" dirty="0" smtClean="0">
+                <a:solidFill>
+                  <a:srgbClr val="C0C0C0"/>
+                </a:solidFill>
+                <a:latin typeface="Courier New" pitchFamily="49" charset="0"/>
+                <a:cs typeface="Courier New" pitchFamily="49" charset="0"/>
+              </a:rPr>
+              <a:t> </a:t>
+            </a:r>
+            <a:r>
+              <a:rPr lang="de-CH" sz="1100" dirty="0" smtClean="0">
+                <a:solidFill>
+                  <a:srgbClr val="000000"/>
+                </a:solidFill>
+                <a:latin typeface="Courier New" pitchFamily="49" charset="0"/>
+                <a:cs typeface="Courier New" pitchFamily="49" charset="0"/>
+              </a:rPr>
+              <a:t>=</a:t>
+            </a:r>
+            <a:r>
+              <a:rPr lang="de-CH" sz="1100" dirty="0" smtClean="0">
+                <a:solidFill>
+                  <a:srgbClr val="C0C0C0"/>
+                </a:solidFill>
+                <a:latin typeface="Courier New" pitchFamily="49" charset="0"/>
+                <a:cs typeface="Courier New" pitchFamily="49" charset="0"/>
+              </a:rPr>
+              <a:t> </a:t>
+            </a:r>
+            <a:r>
+              <a:rPr lang="de-CH" sz="1100" dirty="0" err="1" smtClean="0">
+                <a:solidFill>
+                  <a:srgbClr val="000000"/>
+                </a:solidFill>
+                <a:latin typeface="Courier New" pitchFamily="49" charset="0"/>
+                <a:cs typeface="Courier New" pitchFamily="49" charset="0"/>
+              </a:rPr>
+              <a:t>area_basis</a:t>
+            </a:r>
+            <a:r>
+              <a:rPr lang="de-CH" sz="1100" dirty="0" smtClean="0">
+                <a:solidFill>
+                  <a:srgbClr val="C0C0C0"/>
+                </a:solidFill>
+                <a:latin typeface="Courier New" pitchFamily="49" charset="0"/>
+                <a:cs typeface="Courier New" pitchFamily="49" charset="0"/>
+              </a:rPr>
+              <a:t> </a:t>
+            </a:r>
+            <a:r>
+              <a:rPr lang="de-CH" sz="1100" dirty="0" smtClean="0">
+                <a:solidFill>
+                  <a:srgbClr val="000000"/>
+                </a:solidFill>
+                <a:latin typeface="Courier New" pitchFamily="49" charset="0"/>
+                <a:cs typeface="Courier New" pitchFamily="49" charset="0"/>
+              </a:rPr>
+              <a:t>/</a:t>
+            </a:r>
+            <a:r>
+              <a:rPr lang="de-CH" sz="1100" dirty="0" smtClean="0">
+                <a:solidFill>
+                  <a:srgbClr val="C0C0C0"/>
+                </a:solidFill>
+                <a:latin typeface="Courier New" pitchFamily="49" charset="0"/>
+                <a:cs typeface="Courier New" pitchFamily="49" charset="0"/>
+              </a:rPr>
+              <a:t> </a:t>
+            </a:r>
+            <a:r>
+              <a:rPr lang="de-CH" sz="1100" dirty="0" err="1" smtClean="0">
+                <a:solidFill>
+                  <a:srgbClr val="800080"/>
+                </a:solidFill>
+                <a:latin typeface="Courier New" pitchFamily="49" charset="0"/>
+                <a:cs typeface="Courier New" pitchFamily="49" charset="0"/>
+              </a:rPr>
+              <a:t>std</a:t>
+            </a:r>
+            <a:r>
+              <a:rPr lang="de-CH" sz="1100" dirty="0" smtClean="0">
+                <a:solidFill>
+                  <a:srgbClr val="000000"/>
+                </a:solidFill>
+                <a:latin typeface="Courier New" pitchFamily="49" charset="0"/>
+                <a:cs typeface="Courier New" pitchFamily="49" charset="0"/>
+              </a:rPr>
+              <a:t>::</a:t>
+            </a:r>
+            <a:r>
+              <a:rPr lang="de-CH" sz="1100" dirty="0" err="1" smtClean="0">
+                <a:solidFill>
+                  <a:srgbClr val="C0C0C0"/>
+                </a:solidFill>
+                <a:latin typeface="Courier New" pitchFamily="49" charset="0"/>
+                <a:cs typeface="Courier New" pitchFamily="49" charset="0"/>
+              </a:rPr>
+              <a:t>fabs</a:t>
+            </a:r>
+            <a:r>
+              <a:rPr lang="de-CH" sz="1100" dirty="0" smtClean="0">
+                <a:solidFill>
+                  <a:srgbClr val="000000"/>
+                </a:solidFill>
+                <a:latin typeface="Courier New" pitchFamily="49" charset="0"/>
+                <a:cs typeface="Courier New" pitchFamily="49" charset="0"/>
+              </a:rPr>
+              <a:t>(</a:t>
+            </a:r>
+            <a:r>
+              <a:rPr lang="de-CH" sz="1100" dirty="0" err="1" smtClean="0">
+                <a:solidFill>
+                  <a:srgbClr val="000000"/>
+                </a:solidFill>
+                <a:latin typeface="Courier New" pitchFamily="49" charset="0"/>
+                <a:cs typeface="Courier New" pitchFamily="49" charset="0"/>
+              </a:rPr>
+              <a:t>area_basis</a:t>
+            </a:r>
+            <a:r>
+              <a:rPr lang="de-CH" sz="1100" dirty="0" smtClean="0">
+                <a:solidFill>
+                  <a:srgbClr val="C0C0C0"/>
+                </a:solidFill>
+                <a:latin typeface="Courier New" pitchFamily="49" charset="0"/>
+                <a:cs typeface="Courier New" pitchFamily="49" charset="0"/>
+              </a:rPr>
+              <a:t> </a:t>
+            </a:r>
+            <a:r>
+              <a:rPr lang="de-CH" sz="1100" dirty="0" smtClean="0">
+                <a:solidFill>
+                  <a:srgbClr val="000000"/>
+                </a:solidFill>
+                <a:latin typeface="Courier New" pitchFamily="49" charset="0"/>
+                <a:cs typeface="Courier New" pitchFamily="49" charset="0"/>
+              </a:rPr>
+              <a:t>-</a:t>
+            </a:r>
+            <a:r>
+              <a:rPr lang="de-CH" sz="1100" dirty="0" smtClean="0">
+                <a:solidFill>
+                  <a:srgbClr val="C0C0C0"/>
+                </a:solidFill>
+                <a:latin typeface="Courier New" pitchFamily="49" charset="0"/>
+                <a:cs typeface="Courier New" pitchFamily="49" charset="0"/>
+              </a:rPr>
+              <a:t> </a:t>
+            </a:r>
+            <a:r>
+              <a:rPr lang="de-CH" sz="1100" dirty="0" err="1" smtClean="0">
+                <a:solidFill>
+                  <a:srgbClr val="000000"/>
+                </a:solidFill>
+                <a:latin typeface="Courier New" pitchFamily="49" charset="0"/>
+                <a:cs typeface="Courier New" pitchFamily="49" charset="0"/>
+              </a:rPr>
+              <a:t>area_compare</a:t>
+            </a:r>
+            <a:r>
+              <a:rPr lang="de-CH" sz="1100" dirty="0" smtClean="0">
+                <a:solidFill>
+                  <a:srgbClr val="000000"/>
+                </a:solidFill>
+                <a:latin typeface="Courier New" pitchFamily="49" charset="0"/>
+                <a:cs typeface="Courier New" pitchFamily="49" charset="0"/>
+              </a:rPr>
+              <a:t>);</a:t>
             </a:r>
             <a:endParaRPr lang="en-US" sz="1100" dirty="0">
               <a:latin typeface="Courier New" pitchFamily="49" charset="0"/>
@@ -14337,6 +15606,32 @@
           </a:p>
         </p:txBody>
       </p:sp>
+      <p:pic>
+        <p:nvPicPr>
+          <p:cNvPr id="1026" name="Picture 2" descr="D:\Programming\C\Puzzle\Doku\features_invert.png"/>
+          <p:cNvPicPr>
+            <a:picLocks noChangeAspect="1" noChangeArrowheads="1"/>
+          </p:cNvPicPr>
+          <p:nvPr/>
+        </p:nvPicPr>
+        <p:blipFill>
+          <a:blip r:embed="rId2" cstate="print"/>
+          <a:srcRect/>
+          <a:stretch>
+            <a:fillRect/>
+          </a:stretch>
+        </p:blipFill>
+        <p:spPr bwMode="auto">
+          <a:xfrm>
+            <a:off x="4644008" y="1484784"/>
+            <a:ext cx="3590428" cy="2125534"/>
+          </a:xfrm>
+          <a:prstGeom prst="rect">
+            <a:avLst/>
+          </a:prstGeom>
+          <a:noFill/>
+        </p:spPr>
+      </p:pic>
     </p:spTree>
     <p:extLst>
       <p:ext uri="{BB962C8B-B14F-4D97-AF65-F5344CB8AC3E}">
@@ -14448,7 +15743,7 @@
                                 </p:cTn>
                               </p:par>
                               <p:par>
-                                <p:cTn id="11" presetID="1" presetClass="entr" presetSubtype="0" fill="hold" grpId="0" nodeType="withEffect">
+                                <p:cTn id="11" presetID="1" presetClass="entr" presetSubtype="0" fill="hold" nodeType="withEffect">
                                   <p:stCondLst>
                                     <p:cond delay="0"/>
                                   </p:stCondLst>
@@ -14456,6 +15751,131 @@
                                     <p:set>
                                       <p:cBhvr>
                                         <p:cTn id="12" dur="1" fill="hold">
+                                          <p:stCondLst>
+                                            <p:cond delay="0"/>
+                                          </p:stCondLst>
+                                        </p:cTn>
+                                        <p:tgtEl>
+                                          <p:spTgt spid="1026"/>
+                                        </p:tgtEl>
+                                        <p:attrNameLst>
+                                          <p:attrName>style.visibility</p:attrName>
+                                        </p:attrNameLst>
+                                      </p:cBhvr>
+                                      <p:to>
+                                        <p:strVal val="visible"/>
+                                      </p:to>
+                                    </p:set>
+                                  </p:childTnLst>
+                                </p:cTn>
+                              </p:par>
+                            </p:childTnLst>
+                          </p:cTn>
+                        </p:par>
+                      </p:childTnLst>
+                    </p:cTn>
+                  </p:par>
+                  <p:par>
+                    <p:cTn id="13" fill="hold">
+                      <p:stCondLst>
+                        <p:cond delay="indefinite"/>
+                      </p:stCondLst>
+                      <p:childTnLst>
+                        <p:par>
+                          <p:cTn id="14" fill="hold">
+                            <p:stCondLst>
+                              <p:cond delay="0"/>
+                            </p:stCondLst>
+                            <p:childTnLst>
+                              <p:par>
+                                <p:cTn id="15" presetID="1" presetClass="entr" presetSubtype="0" fill="hold" grpId="0" nodeType="clickEffect">
+                                  <p:stCondLst>
+                                    <p:cond delay="0"/>
+                                  </p:stCondLst>
+                                  <p:childTnLst>
+                                    <p:set>
+                                      <p:cBhvr>
+                                        <p:cTn id="16" dur="1" fill="hold">
+                                          <p:stCondLst>
+                                            <p:cond delay="0"/>
+                                          </p:stCondLst>
+                                        </p:cTn>
+                                        <p:tgtEl>
+                                          <p:spTgt spid="3">
+                                            <p:txEl>
+                                              <p:pRg st="2" end="2"/>
+                                            </p:txEl>
+                                          </p:spTgt>
+                                        </p:tgtEl>
+                                        <p:attrNameLst>
+                                          <p:attrName>style.visibility</p:attrName>
+                                        </p:attrNameLst>
+                                      </p:cBhvr>
+                                      <p:to>
+                                        <p:strVal val="visible"/>
+                                      </p:to>
+                                    </p:set>
+                                  </p:childTnLst>
+                                </p:cTn>
+                              </p:par>
+                            </p:childTnLst>
+                          </p:cTn>
+                        </p:par>
+                      </p:childTnLst>
+                    </p:cTn>
+                  </p:par>
+                  <p:par>
+                    <p:cTn id="17" fill="hold">
+                      <p:stCondLst>
+                        <p:cond delay="indefinite"/>
+                      </p:stCondLst>
+                      <p:childTnLst>
+                        <p:par>
+                          <p:cTn id="18" fill="hold">
+                            <p:stCondLst>
+                              <p:cond delay="0"/>
+                            </p:stCondLst>
+                            <p:childTnLst>
+                              <p:par>
+                                <p:cTn id="19" presetID="1" presetClass="entr" presetSubtype="0" fill="hold" grpId="0" nodeType="clickEffect">
+                                  <p:stCondLst>
+                                    <p:cond delay="0"/>
+                                  </p:stCondLst>
+                                  <p:childTnLst>
+                                    <p:set>
+                                      <p:cBhvr>
+                                        <p:cTn id="20" dur="1" fill="hold">
+                                          <p:stCondLst>
+                                            <p:cond delay="0"/>
+                                          </p:stCondLst>
+                                        </p:cTn>
+                                        <p:tgtEl>
+                                          <p:spTgt spid="3">
+                                            <p:txEl>
+                                              <p:pRg st="3" end="3"/>
+                                            </p:txEl>
+                                          </p:spTgt>
+                                        </p:tgtEl>
+                                        <p:attrNameLst>
+                                          <p:attrName>style.visibility</p:attrName>
+                                        </p:attrNameLst>
+                                      </p:cBhvr>
+                                      <p:to>
+                                        <p:strVal val="visible"/>
+                                      </p:to>
+                                    </p:set>
+                                  </p:childTnLst>
+                                </p:cTn>
+                              </p:par>
+                              <p:par>
+                                <p:cTn id="21" presetID="1" presetClass="entr" presetSubtype="0" fill="hold" grpId="0" nodeType="withEffect">
+                                  <p:stCondLst>
+                                    <p:cond delay="0"/>
+                                  </p:stCondLst>
+                                  <p:childTnLst>
+                                    <p:set>
+                                      <p:cBhvr>
+                                        <p:cTn id="22" dur="1" fill="hold">
                                           <p:stCondLst>
                                             <p:cond delay="0"/>
                                           </p:stCondLst>
@@ -14502,7 +15922,7 @@
       </p:par>
     </p:tnLst>
     <p:bldLst>
-      <p:bldP spid="3" grpId="0" build="p"/>
+      <p:bldP spid="3" grpId="0" uiExpand="1" build="p"/>
       <p:bldP spid="13" grpId="0" animBg="1"/>
     </p:bldLst>
   </p:timing>
@@ -15183,762 +16603,12 @@
           </a:p>
         </p:txBody>
       </p:sp>
-      <p:sp>
-        <p:nvSpPr>
-          <p:cNvPr id="13" name="Abgerundetes Rechteck 12"/>
-          <p:cNvSpPr/>
-          <p:nvPr/>
-        </p:nvSpPr>
-        <p:spPr>
-          <a:xfrm>
-            <a:off x="201799" y="3212976"/>
-            <a:ext cx="8712968" cy="1728191"/>
-          </a:xfrm>
-          <a:prstGeom prst="roundRect">
-            <a:avLst/>
-          </a:prstGeom>
-        </p:spPr>
-        <p:style>
-          <a:lnRef idx="1">
-            <a:schemeClr val="dk1"/>
-          </a:lnRef>
-          <a:fillRef idx="1002">
-            <a:schemeClr val="lt1"/>
-          </a:fillRef>
-          <a:effectRef idx="1">
-            <a:schemeClr val="dk1"/>
-          </a:effectRef>
-          <a:fontRef idx="minor">
-            <a:schemeClr val="dk1"/>
-          </a:fontRef>
-        </p:style>
-        <p:txBody>
-          <a:bodyPr rtlCol="0" anchor="ctr"/>
-          <a:lstStyle/>
-          <a:p>
-            <a:pPr>
-              <a:lnSpc>
-                <a:spcPct val="115000"/>
-              </a:lnSpc>
-              <a:tabLst>
-                <a:tab pos="581660" algn="l"/>
-                <a:tab pos="1163320" algn="l"/>
-                <a:tab pos="1744980" algn="l"/>
-                <a:tab pos="2326640" algn="l"/>
-                <a:tab pos="2908300" algn="l"/>
-                <a:tab pos="3489960" algn="l"/>
-                <a:tab pos="4071620" algn="l"/>
-                <a:tab pos="4653280" algn="l"/>
-                <a:tab pos="5234940" algn="l"/>
-                <a:tab pos="5816600" algn="l"/>
-                <a:tab pos="6398260" algn="l"/>
-                <a:tab pos="6979920" algn="l"/>
-                <a:tab pos="7561580" algn="l"/>
-                <a:tab pos="8143240" algn="l"/>
-                <a:tab pos="8724900" algn="l"/>
-                <a:tab pos="9306560" algn="l"/>
-              </a:tabLst>
-            </a:pPr>
-            <a:r>
-              <a:rPr lang="de-CH" sz="800" dirty="0">
-                <a:solidFill>
-                  <a:srgbClr val="008000"/>
-                </a:solidFill>
-                <a:latin typeface="Courier New"/>
-                <a:ea typeface="Times New Roman"/>
-                <a:cs typeface="Times New Roman"/>
-              </a:rPr>
-              <a:t> </a:t>
-            </a:r>
-            <a:r>
-              <a:rPr lang="de-CH" sz="800" dirty="0" smtClean="0">
-                <a:solidFill>
-                  <a:srgbClr val="008000"/>
-                </a:solidFill>
-                <a:latin typeface="Courier New"/>
-                <a:ea typeface="Times New Roman"/>
-                <a:cs typeface="Times New Roman"/>
-              </a:rPr>
-              <a:t>	  </a:t>
-            </a:r>
-            <a:r>
-              <a:rPr lang="de-CH" sz="1100" dirty="0" smtClean="0">
-                <a:solidFill>
-                  <a:srgbClr val="008000"/>
-                </a:solidFill>
-                <a:latin typeface="Courier New" pitchFamily="49" charset="0"/>
-                <a:ea typeface="Times New Roman"/>
-                <a:cs typeface="Courier New" pitchFamily="49" charset="0"/>
-              </a:rPr>
-              <a:t>// Zeichnen der Basis-Seitenwand</a:t>
-            </a:r>
-            <a:endParaRPr lang="en-US" sz="1100" dirty="0">
-              <a:latin typeface="Courier New" pitchFamily="49" charset="0"/>
-              <a:ea typeface="Calibri"/>
-              <a:cs typeface="Courier New" pitchFamily="49" charset="0"/>
-            </a:endParaRPr>
-          </a:p>
-          <a:p>
-            <a:pPr>
-              <a:lnSpc>
-                <a:spcPct val="115000"/>
-              </a:lnSpc>
-              <a:tabLst>
-                <a:tab pos="581660" algn="l"/>
-                <a:tab pos="1163320" algn="l"/>
-                <a:tab pos="1744980" algn="l"/>
-                <a:tab pos="2326640" algn="l"/>
-                <a:tab pos="2908300" algn="l"/>
-                <a:tab pos="3489960" algn="l"/>
-                <a:tab pos="4071620" algn="l"/>
-                <a:tab pos="4653280" algn="l"/>
-                <a:tab pos="5234940" algn="l"/>
-                <a:tab pos="5816600" algn="l"/>
-                <a:tab pos="6398260" algn="l"/>
-                <a:tab pos="6979920" algn="l"/>
-                <a:tab pos="7561580" algn="l"/>
-                <a:tab pos="8143240" algn="l"/>
-                <a:tab pos="8724900" algn="l"/>
-                <a:tab pos="9306560" algn="l"/>
-              </a:tabLst>
-            </a:pPr>
-            <a:r>
-              <a:rPr lang="de-CH" sz="1100" dirty="0">
-                <a:solidFill>
-                  <a:srgbClr val="C0C0C0"/>
-                </a:solidFill>
-                <a:latin typeface="Courier New" pitchFamily="49" charset="0"/>
-                <a:ea typeface="Times New Roman"/>
-                <a:cs typeface="Courier New" pitchFamily="49" charset="0"/>
-              </a:rPr>
-              <a:t>        </a:t>
-            </a:r>
-            <a:r>
-              <a:rPr lang="de-CH" sz="1100" dirty="0" err="1">
-                <a:solidFill>
-                  <a:srgbClr val="800080"/>
-                </a:solidFill>
-                <a:latin typeface="Courier New" pitchFamily="49" charset="0"/>
-                <a:ea typeface="Times New Roman"/>
-                <a:cs typeface="Courier New" pitchFamily="49" charset="0"/>
-              </a:rPr>
-              <a:t>std</a:t>
-            </a:r>
-            <a:r>
-              <a:rPr lang="de-CH" sz="1100" dirty="0">
-                <a:solidFill>
-                  <a:srgbClr val="000000"/>
-                </a:solidFill>
-                <a:latin typeface="Courier New" pitchFamily="49" charset="0"/>
-                <a:ea typeface="Times New Roman"/>
-                <a:cs typeface="Courier New" pitchFamily="49" charset="0"/>
-              </a:rPr>
-              <a:t>::</a:t>
-            </a:r>
-            <a:r>
-              <a:rPr lang="de-CH" sz="1100" dirty="0" err="1">
-                <a:solidFill>
-                  <a:srgbClr val="800080"/>
-                </a:solidFill>
-                <a:latin typeface="Courier New" pitchFamily="49" charset="0"/>
-                <a:ea typeface="Times New Roman"/>
-                <a:cs typeface="Courier New" pitchFamily="49" charset="0"/>
-              </a:rPr>
-              <a:t>vector</a:t>
-            </a:r>
-            <a:r>
-              <a:rPr lang="de-CH" sz="1100" dirty="0">
-                <a:solidFill>
-                  <a:srgbClr val="000000"/>
-                </a:solidFill>
-                <a:latin typeface="Courier New" pitchFamily="49" charset="0"/>
-                <a:ea typeface="Times New Roman"/>
-                <a:cs typeface="Courier New" pitchFamily="49" charset="0"/>
-              </a:rPr>
-              <a:t>&lt;</a:t>
-            </a:r>
-            <a:r>
-              <a:rPr lang="de-CH" sz="1100" dirty="0" err="1">
-                <a:solidFill>
-                  <a:srgbClr val="800080"/>
-                </a:solidFill>
-                <a:latin typeface="Courier New" pitchFamily="49" charset="0"/>
-                <a:ea typeface="Times New Roman"/>
-                <a:cs typeface="Courier New" pitchFamily="49" charset="0"/>
-              </a:rPr>
-              <a:t>std</a:t>
-            </a:r>
-            <a:r>
-              <a:rPr lang="de-CH" sz="1100" dirty="0">
-                <a:solidFill>
-                  <a:srgbClr val="000000"/>
-                </a:solidFill>
-                <a:latin typeface="Courier New" pitchFamily="49" charset="0"/>
-                <a:ea typeface="Times New Roman"/>
-                <a:cs typeface="Courier New" pitchFamily="49" charset="0"/>
-              </a:rPr>
-              <a:t>::</a:t>
-            </a:r>
-            <a:r>
-              <a:rPr lang="de-CH" sz="1100" dirty="0" err="1">
-                <a:solidFill>
-                  <a:srgbClr val="800080"/>
-                </a:solidFill>
-                <a:latin typeface="Courier New" pitchFamily="49" charset="0"/>
-                <a:ea typeface="Times New Roman"/>
-                <a:cs typeface="Courier New" pitchFamily="49" charset="0"/>
-              </a:rPr>
-              <a:t>vector</a:t>
-            </a:r>
-            <a:r>
-              <a:rPr lang="de-CH" sz="1100" dirty="0">
-                <a:solidFill>
-                  <a:srgbClr val="000000"/>
-                </a:solidFill>
-                <a:latin typeface="Courier New" pitchFamily="49" charset="0"/>
-                <a:ea typeface="Times New Roman"/>
-                <a:cs typeface="Courier New" pitchFamily="49" charset="0"/>
-              </a:rPr>
-              <a:t>&lt;</a:t>
-            </a:r>
-            <a:r>
-              <a:rPr lang="de-CH" sz="1100" dirty="0">
-                <a:solidFill>
-                  <a:srgbClr val="800080"/>
-                </a:solidFill>
-                <a:latin typeface="Courier New" pitchFamily="49" charset="0"/>
-                <a:ea typeface="Times New Roman"/>
-                <a:cs typeface="Courier New" pitchFamily="49" charset="0"/>
-              </a:rPr>
-              <a:t>cv</a:t>
-            </a:r>
-            <a:r>
-              <a:rPr lang="de-CH" sz="1100" dirty="0">
-                <a:solidFill>
-                  <a:srgbClr val="000000"/>
-                </a:solidFill>
-                <a:latin typeface="Courier New" pitchFamily="49" charset="0"/>
-                <a:ea typeface="Times New Roman"/>
-                <a:cs typeface="Courier New" pitchFamily="49" charset="0"/>
-              </a:rPr>
-              <a:t>::</a:t>
-            </a:r>
-            <a:r>
-              <a:rPr lang="de-CH" sz="1100" dirty="0">
-                <a:solidFill>
-                  <a:srgbClr val="800080"/>
-                </a:solidFill>
-                <a:latin typeface="Courier New" pitchFamily="49" charset="0"/>
-                <a:ea typeface="Times New Roman"/>
-                <a:cs typeface="Courier New" pitchFamily="49" charset="0"/>
-              </a:rPr>
-              <a:t>Point</a:t>
-            </a:r>
-            <a:r>
-              <a:rPr lang="de-CH" sz="1100" dirty="0">
-                <a:solidFill>
-                  <a:srgbClr val="000000"/>
-                </a:solidFill>
-                <a:latin typeface="Courier New" pitchFamily="49" charset="0"/>
-                <a:ea typeface="Times New Roman"/>
-                <a:cs typeface="Courier New" pitchFamily="49" charset="0"/>
-              </a:rPr>
-              <a:t>&gt;</a:t>
-            </a:r>
-            <a:r>
-              <a:rPr lang="de-CH" sz="1100" dirty="0">
-                <a:solidFill>
-                  <a:srgbClr val="C0C0C0"/>
-                </a:solidFill>
-                <a:latin typeface="Courier New" pitchFamily="49" charset="0"/>
-                <a:ea typeface="Times New Roman"/>
-                <a:cs typeface="Courier New" pitchFamily="49" charset="0"/>
-              </a:rPr>
-              <a:t> </a:t>
-            </a:r>
-            <a:r>
-              <a:rPr lang="de-CH" sz="1100" dirty="0">
-                <a:solidFill>
-                  <a:srgbClr val="000000"/>
-                </a:solidFill>
-                <a:latin typeface="Courier New" pitchFamily="49" charset="0"/>
-                <a:ea typeface="Times New Roman"/>
-                <a:cs typeface="Courier New" pitchFamily="49" charset="0"/>
-              </a:rPr>
-              <a:t>&gt;</a:t>
-            </a:r>
-            <a:r>
-              <a:rPr lang="de-CH" sz="1100" dirty="0">
-                <a:solidFill>
-                  <a:srgbClr val="C0C0C0"/>
-                </a:solidFill>
-                <a:latin typeface="Courier New" pitchFamily="49" charset="0"/>
-                <a:ea typeface="Times New Roman"/>
-                <a:cs typeface="Courier New" pitchFamily="49" charset="0"/>
-              </a:rPr>
-              <a:t> </a:t>
-            </a:r>
-            <a:r>
-              <a:rPr lang="de-CH" sz="1100" dirty="0" err="1">
-                <a:solidFill>
-                  <a:srgbClr val="000000"/>
-                </a:solidFill>
-                <a:latin typeface="Courier New" pitchFamily="49" charset="0"/>
-                <a:ea typeface="Times New Roman"/>
-                <a:cs typeface="Courier New" pitchFamily="49" charset="0"/>
-              </a:rPr>
-              <a:t>temp</a:t>
-            </a:r>
-            <a:r>
-              <a:rPr lang="de-CH" sz="1100" dirty="0">
-                <a:solidFill>
-                  <a:srgbClr val="000000"/>
-                </a:solidFill>
-                <a:latin typeface="Courier New" pitchFamily="49" charset="0"/>
-                <a:ea typeface="Times New Roman"/>
-                <a:cs typeface="Courier New" pitchFamily="49" charset="0"/>
-              </a:rPr>
-              <a:t>;</a:t>
-            </a:r>
-            <a:endParaRPr lang="en-US" sz="1100" dirty="0">
-              <a:latin typeface="Courier New" pitchFamily="49" charset="0"/>
-              <a:ea typeface="Calibri"/>
-              <a:cs typeface="Courier New" pitchFamily="49" charset="0"/>
-            </a:endParaRPr>
-          </a:p>
-          <a:p>
-            <a:pPr>
-              <a:lnSpc>
-                <a:spcPct val="115000"/>
-              </a:lnSpc>
-              <a:tabLst>
-                <a:tab pos="581660" algn="l"/>
-                <a:tab pos="1163320" algn="l"/>
-                <a:tab pos="1744980" algn="l"/>
-                <a:tab pos="2326640" algn="l"/>
-                <a:tab pos="2908300" algn="l"/>
-                <a:tab pos="3489960" algn="l"/>
-                <a:tab pos="4071620" algn="l"/>
-                <a:tab pos="4653280" algn="l"/>
-                <a:tab pos="5234940" algn="l"/>
-                <a:tab pos="5816600" algn="l"/>
-                <a:tab pos="6398260" algn="l"/>
-                <a:tab pos="6979920" algn="l"/>
-                <a:tab pos="7561580" algn="l"/>
-                <a:tab pos="8143240" algn="l"/>
-                <a:tab pos="8724900" algn="l"/>
-                <a:tab pos="9306560" algn="l"/>
-              </a:tabLst>
-            </a:pPr>
-            <a:r>
-              <a:rPr lang="de-CH" sz="1100" dirty="0">
-                <a:solidFill>
-                  <a:srgbClr val="C0C0C0"/>
-                </a:solidFill>
-                <a:latin typeface="Courier New" pitchFamily="49" charset="0"/>
-                <a:ea typeface="Times New Roman"/>
-                <a:cs typeface="Courier New" pitchFamily="49" charset="0"/>
-              </a:rPr>
-              <a:t>        </a:t>
-            </a:r>
-            <a:r>
-              <a:rPr lang="en-US" sz="1100" dirty="0">
-                <a:solidFill>
-                  <a:srgbClr val="000000"/>
-                </a:solidFill>
-                <a:latin typeface="Courier New" pitchFamily="49" charset="0"/>
-                <a:ea typeface="Times New Roman"/>
-                <a:cs typeface="Courier New" pitchFamily="49" charset="0"/>
-              </a:rPr>
-              <a:t>temp</a:t>
-            </a:r>
-            <a:r>
-              <a:rPr lang="en-US" sz="1100" dirty="0">
-                <a:solidFill>
-                  <a:srgbClr val="C0C0C0"/>
-                </a:solidFill>
-                <a:latin typeface="Courier New" pitchFamily="49" charset="0"/>
-                <a:ea typeface="Times New Roman"/>
-                <a:cs typeface="Courier New" pitchFamily="49" charset="0"/>
-              </a:rPr>
-              <a:t> </a:t>
-            </a:r>
-            <a:r>
-              <a:rPr lang="en-US" sz="1100" dirty="0">
-                <a:solidFill>
-                  <a:srgbClr val="000000"/>
-                </a:solidFill>
-                <a:latin typeface="Courier New" pitchFamily="49" charset="0"/>
-                <a:ea typeface="Times New Roman"/>
-                <a:cs typeface="Courier New" pitchFamily="49" charset="0"/>
-              </a:rPr>
-              <a:t>=</a:t>
-            </a:r>
-            <a:r>
-              <a:rPr lang="en-US" sz="1100" dirty="0">
-                <a:solidFill>
-                  <a:srgbClr val="C0C0C0"/>
-                </a:solidFill>
-                <a:latin typeface="Courier New" pitchFamily="49" charset="0"/>
-                <a:ea typeface="Times New Roman"/>
-                <a:cs typeface="Courier New" pitchFamily="49" charset="0"/>
-              </a:rPr>
-              <a:t> </a:t>
-            </a:r>
-            <a:r>
-              <a:rPr lang="en-US" sz="1100" dirty="0" err="1">
-                <a:solidFill>
-                  <a:srgbClr val="000000"/>
-                </a:solidFill>
-                <a:latin typeface="Courier New" pitchFamily="49" charset="0"/>
-                <a:ea typeface="Times New Roman"/>
-                <a:cs typeface="Courier New" pitchFamily="49" charset="0"/>
-              </a:rPr>
-              <a:t>sidesFiltered</a:t>
-            </a:r>
-            <a:r>
-              <a:rPr lang="en-US" sz="1100" dirty="0">
-                <a:solidFill>
-                  <a:srgbClr val="000000"/>
-                </a:solidFill>
-                <a:latin typeface="Courier New" pitchFamily="49" charset="0"/>
-                <a:ea typeface="Times New Roman"/>
-                <a:cs typeface="Courier New" pitchFamily="49" charset="0"/>
-              </a:rPr>
-              <a:t>[piece];</a:t>
-            </a:r>
-            <a:endParaRPr lang="en-US" sz="1100" dirty="0">
-              <a:latin typeface="Courier New" pitchFamily="49" charset="0"/>
-              <a:ea typeface="Calibri"/>
-              <a:cs typeface="Courier New" pitchFamily="49" charset="0"/>
-            </a:endParaRPr>
-          </a:p>
-          <a:p>
-            <a:pPr>
-              <a:lnSpc>
-                <a:spcPct val="115000"/>
-              </a:lnSpc>
-              <a:tabLst>
-                <a:tab pos="581660" algn="l"/>
-                <a:tab pos="1163320" algn="l"/>
-                <a:tab pos="1744980" algn="l"/>
-                <a:tab pos="2326640" algn="l"/>
-                <a:tab pos="2908300" algn="l"/>
-                <a:tab pos="3489960" algn="l"/>
-                <a:tab pos="4071620" algn="l"/>
-                <a:tab pos="4653280" algn="l"/>
-                <a:tab pos="5234940" algn="l"/>
-                <a:tab pos="5816600" algn="l"/>
-                <a:tab pos="6398260" algn="l"/>
-                <a:tab pos="6979920" algn="l"/>
-                <a:tab pos="7561580" algn="l"/>
-                <a:tab pos="8143240" algn="l"/>
-                <a:tab pos="8724900" algn="l"/>
-                <a:tab pos="9306560" algn="l"/>
-              </a:tabLst>
-            </a:pPr>
-            <a:r>
-              <a:rPr lang="en-US" sz="1100" dirty="0">
-                <a:solidFill>
-                  <a:srgbClr val="C0C0C0"/>
-                </a:solidFill>
-                <a:latin typeface="Courier New" pitchFamily="49" charset="0"/>
-                <a:ea typeface="Times New Roman"/>
-                <a:cs typeface="Courier New" pitchFamily="49" charset="0"/>
-              </a:rPr>
-              <a:t>        </a:t>
-            </a:r>
-            <a:r>
-              <a:rPr lang="en-US" sz="1100" dirty="0">
-                <a:solidFill>
-                  <a:srgbClr val="800080"/>
-                </a:solidFill>
-                <a:latin typeface="Courier New" pitchFamily="49" charset="0"/>
-                <a:ea typeface="Times New Roman"/>
-                <a:cs typeface="Courier New" pitchFamily="49" charset="0"/>
-              </a:rPr>
-              <a:t>cv</a:t>
-            </a:r>
-            <a:r>
-              <a:rPr lang="en-US" sz="1100" dirty="0">
-                <a:solidFill>
-                  <a:srgbClr val="000000"/>
-                </a:solidFill>
-                <a:latin typeface="Courier New" pitchFamily="49" charset="0"/>
-                <a:ea typeface="Times New Roman"/>
-                <a:cs typeface="Courier New" pitchFamily="49" charset="0"/>
-              </a:rPr>
-              <a:t>::</a:t>
-            </a:r>
-            <a:r>
-              <a:rPr lang="en-US" sz="1100" dirty="0" err="1">
-                <a:latin typeface="Courier New" pitchFamily="49" charset="0"/>
-                <a:ea typeface="Times New Roman"/>
-                <a:cs typeface="Courier New" pitchFamily="49" charset="0"/>
-              </a:rPr>
-              <a:t>drawContours</a:t>
-            </a:r>
-            <a:r>
-              <a:rPr lang="en-US" sz="1100" dirty="0">
-                <a:solidFill>
-                  <a:srgbClr val="000000"/>
-                </a:solidFill>
-                <a:latin typeface="Courier New" pitchFamily="49" charset="0"/>
-                <a:ea typeface="Times New Roman"/>
-                <a:cs typeface="Courier New" pitchFamily="49" charset="0"/>
-              </a:rPr>
-              <a:t>(</a:t>
-            </a:r>
-            <a:r>
-              <a:rPr lang="en-US" sz="1100" dirty="0" err="1">
-                <a:solidFill>
-                  <a:srgbClr val="000000"/>
-                </a:solidFill>
-                <a:latin typeface="Courier New" pitchFamily="49" charset="0"/>
-                <a:ea typeface="Times New Roman"/>
-                <a:cs typeface="Courier New" pitchFamily="49" charset="0"/>
-              </a:rPr>
-              <a:t>imgContSimilar</a:t>
-            </a:r>
-            <a:r>
-              <a:rPr lang="en-US" sz="1100" dirty="0">
-                <a:solidFill>
-                  <a:srgbClr val="000000"/>
-                </a:solidFill>
-                <a:latin typeface="Courier New" pitchFamily="49" charset="0"/>
-                <a:ea typeface="Times New Roman"/>
-                <a:cs typeface="Courier New" pitchFamily="49" charset="0"/>
-              </a:rPr>
-              <a:t>,</a:t>
-            </a:r>
-            <a:r>
-              <a:rPr lang="en-US" sz="1100" dirty="0">
-                <a:solidFill>
-                  <a:srgbClr val="C0C0C0"/>
-                </a:solidFill>
-                <a:latin typeface="Courier New" pitchFamily="49" charset="0"/>
-                <a:ea typeface="Times New Roman"/>
-                <a:cs typeface="Courier New" pitchFamily="49" charset="0"/>
-              </a:rPr>
-              <a:t> </a:t>
-            </a:r>
-            <a:r>
-              <a:rPr lang="en-US" sz="1100" dirty="0">
-                <a:solidFill>
-                  <a:srgbClr val="000000"/>
-                </a:solidFill>
-                <a:latin typeface="Courier New" pitchFamily="49" charset="0"/>
-                <a:ea typeface="Times New Roman"/>
-                <a:cs typeface="Courier New" pitchFamily="49" charset="0"/>
-              </a:rPr>
-              <a:t>temp,</a:t>
-            </a:r>
-            <a:r>
-              <a:rPr lang="en-US" sz="1100" dirty="0">
-                <a:solidFill>
-                  <a:srgbClr val="C0C0C0"/>
-                </a:solidFill>
-                <a:latin typeface="Courier New" pitchFamily="49" charset="0"/>
-                <a:ea typeface="Times New Roman"/>
-                <a:cs typeface="Courier New" pitchFamily="49" charset="0"/>
-              </a:rPr>
-              <a:t> </a:t>
-            </a:r>
-            <a:r>
-              <a:rPr lang="en-US" sz="1100" dirty="0" err="1">
-                <a:solidFill>
-                  <a:srgbClr val="000000"/>
-                </a:solidFill>
-                <a:latin typeface="Courier New" pitchFamily="49" charset="0"/>
-                <a:ea typeface="Times New Roman"/>
-                <a:cs typeface="Courier New" pitchFamily="49" charset="0"/>
-              </a:rPr>
-              <a:t>piece_side</a:t>
-            </a:r>
-            <a:r>
-              <a:rPr lang="en-US" sz="1100" dirty="0">
-                <a:solidFill>
-                  <a:srgbClr val="000000"/>
-                </a:solidFill>
-                <a:latin typeface="Courier New" pitchFamily="49" charset="0"/>
-                <a:ea typeface="Times New Roman"/>
-                <a:cs typeface="Courier New" pitchFamily="49" charset="0"/>
-              </a:rPr>
-              <a:t>,</a:t>
-            </a:r>
-            <a:r>
-              <a:rPr lang="en-US" sz="1100" dirty="0">
-                <a:solidFill>
-                  <a:srgbClr val="C0C0C0"/>
-                </a:solidFill>
-                <a:latin typeface="Courier New" pitchFamily="49" charset="0"/>
-                <a:ea typeface="Times New Roman"/>
-                <a:cs typeface="Courier New" pitchFamily="49" charset="0"/>
-              </a:rPr>
-              <a:t> </a:t>
-            </a:r>
-            <a:r>
-              <a:rPr lang="en-US" sz="1100" dirty="0">
-                <a:latin typeface="Courier New" pitchFamily="49" charset="0"/>
-                <a:ea typeface="Times New Roman"/>
-                <a:cs typeface="Courier New" pitchFamily="49" charset="0"/>
-              </a:rPr>
-              <a:t>CV_RGB</a:t>
-            </a:r>
-            <a:r>
-              <a:rPr lang="en-US" sz="1100" dirty="0">
-                <a:solidFill>
-                  <a:srgbClr val="000000"/>
-                </a:solidFill>
-                <a:latin typeface="Courier New" pitchFamily="49" charset="0"/>
-                <a:ea typeface="Times New Roman"/>
-                <a:cs typeface="Courier New" pitchFamily="49" charset="0"/>
-              </a:rPr>
-              <a:t>(</a:t>
-            </a:r>
-            <a:r>
-              <a:rPr lang="en-US" sz="1100" dirty="0">
-                <a:solidFill>
-                  <a:srgbClr val="000080"/>
-                </a:solidFill>
-                <a:latin typeface="Courier New" pitchFamily="49" charset="0"/>
-                <a:ea typeface="Times New Roman"/>
-                <a:cs typeface="Courier New" pitchFamily="49" charset="0"/>
-              </a:rPr>
-              <a:t>255</a:t>
-            </a:r>
-            <a:r>
-              <a:rPr lang="en-US" sz="1100" dirty="0">
-                <a:solidFill>
-                  <a:srgbClr val="000000"/>
-                </a:solidFill>
-                <a:latin typeface="Courier New" pitchFamily="49" charset="0"/>
-                <a:ea typeface="Times New Roman"/>
-                <a:cs typeface="Courier New" pitchFamily="49" charset="0"/>
-              </a:rPr>
-              <a:t>,</a:t>
-            </a:r>
-            <a:r>
-              <a:rPr lang="en-US" sz="1100" dirty="0">
-                <a:solidFill>
-                  <a:srgbClr val="000080"/>
-                </a:solidFill>
-                <a:latin typeface="Courier New" pitchFamily="49" charset="0"/>
-                <a:ea typeface="Times New Roman"/>
-                <a:cs typeface="Courier New" pitchFamily="49" charset="0"/>
-              </a:rPr>
-              <a:t>0</a:t>
-            </a:r>
-            <a:r>
-              <a:rPr lang="en-US" sz="1100" dirty="0">
-                <a:solidFill>
-                  <a:srgbClr val="000000"/>
-                </a:solidFill>
-                <a:latin typeface="Courier New" pitchFamily="49" charset="0"/>
-                <a:ea typeface="Times New Roman"/>
-                <a:cs typeface="Courier New" pitchFamily="49" charset="0"/>
-              </a:rPr>
-              <a:t>,</a:t>
-            </a:r>
-            <a:r>
-              <a:rPr lang="en-US" sz="1100" dirty="0">
-                <a:solidFill>
-                  <a:srgbClr val="000080"/>
-                </a:solidFill>
-                <a:latin typeface="Courier New" pitchFamily="49" charset="0"/>
-                <a:ea typeface="Times New Roman"/>
-                <a:cs typeface="Courier New" pitchFamily="49" charset="0"/>
-              </a:rPr>
-              <a:t>0</a:t>
-            </a:r>
-            <a:r>
-              <a:rPr lang="en-US" sz="1100" dirty="0">
-                <a:solidFill>
-                  <a:srgbClr val="000000"/>
-                </a:solidFill>
-                <a:latin typeface="Courier New" pitchFamily="49" charset="0"/>
-                <a:ea typeface="Times New Roman"/>
-                <a:cs typeface="Courier New" pitchFamily="49" charset="0"/>
-              </a:rPr>
-              <a:t>),</a:t>
-            </a:r>
-            <a:r>
-              <a:rPr lang="en-US" sz="1100" dirty="0">
-                <a:solidFill>
-                  <a:srgbClr val="C0C0C0"/>
-                </a:solidFill>
-                <a:latin typeface="Courier New" pitchFamily="49" charset="0"/>
-                <a:ea typeface="Times New Roman"/>
-                <a:cs typeface="Courier New" pitchFamily="49" charset="0"/>
-              </a:rPr>
-              <a:t> </a:t>
-            </a:r>
-            <a:r>
-              <a:rPr lang="en-US" sz="1100" dirty="0">
-                <a:solidFill>
-                  <a:srgbClr val="000080"/>
-                </a:solidFill>
-                <a:latin typeface="Courier New" pitchFamily="49" charset="0"/>
-                <a:ea typeface="Times New Roman"/>
-                <a:cs typeface="Courier New" pitchFamily="49" charset="0"/>
-              </a:rPr>
-              <a:t>10</a:t>
-            </a:r>
-            <a:r>
-              <a:rPr lang="en-US" sz="1100" dirty="0">
-                <a:solidFill>
-                  <a:srgbClr val="000000"/>
-                </a:solidFill>
-                <a:latin typeface="Courier New" pitchFamily="49" charset="0"/>
-                <a:ea typeface="Times New Roman"/>
-                <a:cs typeface="Courier New" pitchFamily="49" charset="0"/>
-              </a:rPr>
-              <a:t>,</a:t>
-            </a:r>
-            <a:r>
-              <a:rPr lang="en-US" sz="1100" dirty="0">
-                <a:solidFill>
-                  <a:srgbClr val="C0C0C0"/>
-                </a:solidFill>
-                <a:latin typeface="Courier New" pitchFamily="49" charset="0"/>
-                <a:ea typeface="Times New Roman"/>
-                <a:cs typeface="Courier New" pitchFamily="49" charset="0"/>
-              </a:rPr>
-              <a:t> </a:t>
-            </a:r>
-            <a:r>
-              <a:rPr lang="en-US" sz="1100" dirty="0">
-                <a:solidFill>
-                  <a:srgbClr val="000080"/>
-                </a:solidFill>
-                <a:latin typeface="Courier New" pitchFamily="49" charset="0"/>
-                <a:ea typeface="Times New Roman"/>
-                <a:cs typeface="Courier New" pitchFamily="49" charset="0"/>
-              </a:rPr>
-              <a:t>8</a:t>
-            </a:r>
-            <a:r>
-              <a:rPr lang="en-US" sz="1100" dirty="0">
-                <a:solidFill>
-                  <a:srgbClr val="000000"/>
-                </a:solidFill>
-                <a:latin typeface="Courier New" pitchFamily="49" charset="0"/>
-                <a:ea typeface="Times New Roman"/>
-                <a:cs typeface="Courier New" pitchFamily="49" charset="0"/>
-              </a:rPr>
-              <a:t>);</a:t>
-            </a:r>
-            <a:endParaRPr lang="en-US" sz="1100" dirty="0">
-              <a:latin typeface="Courier New" pitchFamily="49" charset="0"/>
-              <a:cs typeface="Courier New" pitchFamily="49" charset="0"/>
-            </a:endParaRPr>
-          </a:p>
-        </p:txBody>
-      </p:sp>
       <p:pic>
         <p:nvPicPr>
-          <p:cNvPr id="7" name="Bild 4" descr="D:\Programming\C\Puzzle\Doku\bezier1.png"/>
-          <p:cNvPicPr/>
+          <p:cNvPr id="1026" name="Picture 2" descr="D:\Programming\C\Puzzle\Doku\bezier2.png"/>
+          <p:cNvPicPr>
+            <a:picLocks noChangeAspect="1" noChangeArrowheads="1"/>
+          </p:cNvPicPr>
           <p:nvPr/>
         </p:nvPicPr>
         <p:blipFill>
@@ -15950,8 +16620,8 @@
         </p:blipFill>
         <p:spPr bwMode="auto">
           <a:xfrm>
-            <a:off x="1331640" y="2816463"/>
-            <a:ext cx="2275205" cy="3323590"/>
+            <a:off x="1043608" y="3068960"/>
+            <a:ext cx="2448272" cy="3414848"/>
           </a:xfrm>
           <a:prstGeom prst="roundRect">
             <a:avLst>
@@ -15986,8 +16656,10 @@
       </p:pic>
       <p:pic>
         <p:nvPicPr>
-          <p:cNvPr id="8" name="Bild 5" descr="D:\Programming\C\Puzzle\Doku\bezier2.png"/>
-          <p:cNvPicPr/>
+          <p:cNvPr id="1027" name="Picture 3" descr="D:\Programming\C\Puzzle\Doku\bezier1.png"/>
+          <p:cNvPicPr>
+            <a:picLocks noChangeAspect="1" noChangeArrowheads="1"/>
+          </p:cNvPicPr>
           <p:nvPr/>
         </p:nvPicPr>
         <p:blipFill>
@@ -15999,8 +16671,8 @@
         </p:blipFill>
         <p:spPr bwMode="auto">
           <a:xfrm>
-            <a:off x="3923928" y="2819003"/>
-            <a:ext cx="3478530" cy="3321050"/>
+            <a:off x="3923928" y="3068960"/>
+            <a:ext cx="4320480" cy="3404539"/>
           </a:xfrm>
           <a:prstGeom prst="roundRect">
             <a:avLst>
@@ -16094,33 +16766,6 @@
                                   </p:childTnLst>
                                 </p:cTn>
                               </p:par>
-                              <p:par>
-                                <p:cTn id="7" presetID="1" presetClass="entr" presetSubtype="0" fill="hold" grpId="0" nodeType="withEffect">
-                                  <p:stCondLst>
-                                    <p:cond delay="0"/>
-                                  </p:stCondLst>
-                                  <p:childTnLst>
-                                    <p:set>
-                                      <p:cBhvr>
-                                        <p:cTn id="8" dur="1" fill="hold">
-                                          <p:stCondLst>
-                                            <p:cond delay="0"/>
-                                          </p:stCondLst>
-                                        </p:cTn>
-                                        <p:tgtEl>
-                                          <p:spTgt spid="13"/>
-                                        </p:tgtEl>
-                                        <p:attrNameLst>
-                                          <p:attrName>style.visibility</p:attrName>
-                                        </p:attrNameLst>
-                                      </p:cBhvr>
-                                      <p:to>
-                                        <p:strVal val="visible"/>
-                                      </p:to>
-                                    </p:set>
-                                  </p:childTnLst>
-                                </p:cTn>
-                              </p:par>
                             </p:childTnLst>
                           </p:cTn>
                         </p:par>
@@ -16128,26 +16773,26 @@
                     </p:cTn>
                   </p:par>
                   <p:par>
-                    <p:cTn id="9" fill="hold">
+                    <p:cTn id="7" fill="hold">
                       <p:stCondLst>
                         <p:cond delay="indefinite"/>
                       </p:stCondLst>
                       <p:childTnLst>
                         <p:par>
-                          <p:cTn id="10" fill="hold">
+                          <p:cTn id="8" fill="hold">
                             <p:stCondLst>
                               <p:cond delay="0"/>
                             </p:stCondLst>
                             <p:childTnLst>
                               <p:par>
-                                <p:cTn id="11" presetID="1" presetClass="entr" presetSubtype="0" fill="hold" grpId="0" nodeType="clickEffect">
+                                <p:cTn id="9" presetID="1" presetClass="entr" presetSubtype="0" fill="hold" grpId="0" nodeType="clickEffect">
                                   <p:stCondLst>
                                     <p:cond delay="0"/>
                                   </p:stCondLst>
                                   <p:childTnLst>
                                     <p:set>
                                       <p:cBhvr>
-                                        <p:cTn id="12" dur="1" fill="hold">
+                                        <p:cTn id="10" dur="1" fill="hold">
                                           <p:stCondLst>
                                             <p:cond delay="0"/>
                                           </p:stCondLst>
@@ -16177,26 +16822,26 @@
                     </p:cTn>
                   </p:par>
                   <p:par>
-                    <p:cTn id="13" fill="hold">
+                    <p:cTn id="11" fill="hold">
                       <p:stCondLst>
                         <p:cond delay="indefinite"/>
                       </p:stCondLst>
                       <p:childTnLst>
                         <p:par>
-                          <p:cTn id="14" fill="hold">
+                          <p:cTn id="12" fill="hold">
                             <p:stCondLst>
                               <p:cond delay="0"/>
                             </p:stCondLst>
                             <p:childTnLst>
                               <p:par>
-                                <p:cTn id="15" presetID="1" presetClass="entr" presetSubtype="0" fill="hold" grpId="0" nodeType="clickEffect">
+                                <p:cTn id="13" presetID="1" presetClass="entr" presetSubtype="0" fill="hold" grpId="0" nodeType="clickEffect">
                                   <p:stCondLst>
                                     <p:cond delay="0"/>
                                   </p:stCondLst>
                                   <p:childTnLst>
                                     <p:set>
                                       <p:cBhvr>
-                                        <p:cTn id="16" dur="1" fill="hold">
+                                        <p:cTn id="14" dur="1" fill="hold">
                                           <p:stCondLst>
                                             <p:cond delay="0"/>
                                           </p:stCondLst>
@@ -16219,56 +16864,39 @@
                                   </p:childTnLst>
                                 </p:cTn>
                               </p:par>
+                            </p:childTnLst>
+                          </p:cTn>
+                        </p:par>
+                      </p:childTnLst>
+                    </p:cTn>
+                  </p:par>
+                  <p:par>
+                    <p:cTn id="15" fill="hold">
+                      <p:stCondLst>
+                        <p:cond delay="indefinite"/>
+                      </p:stCondLst>
+                      <p:childTnLst>
+                        <p:par>
+                          <p:cTn id="16" fill="hold">
+                            <p:stCondLst>
+                              <p:cond delay="0"/>
+                            </p:stCondLst>
+                            <p:childTnLst>
                               <p:par>
-                                <p:cTn id="17" presetID="10" presetClass="exit" presetSubtype="0" fill="hold" grpId="1" nodeType="withEffect">
-                                  <p:stCondLst>
-                                    <p:cond delay="0"/>
-                                  </p:stCondLst>
-                                  <p:childTnLst>
-                                    <p:animEffect transition="out" filter="fade">
-                                      <p:cBhvr>
-                                        <p:cTn id="18" dur="500"/>
-                                        <p:tgtEl>
-                                          <p:spTgt spid="13"/>
-                                        </p:tgtEl>
-                                      </p:cBhvr>
-                                    </p:animEffect>
-                                    <p:set>
-                                      <p:cBhvr>
-                                        <p:cTn id="19" dur="1" fill="hold">
-                                          <p:stCondLst>
-                                            <p:cond delay="499"/>
-                                          </p:stCondLst>
-                                        </p:cTn>
-                                        <p:tgtEl>
-                                          <p:spTgt spid="13"/>
-                                        </p:tgtEl>
-                                        <p:attrNameLst>
-                                          <p:attrName>style.visibility</p:attrName>
-                                        </p:attrNameLst>
-                                      </p:cBhvr>
-                                      <p:to>
-                                        <p:strVal val="hidden"/>
-                                      </p:to>
-                                    </p:set>
-                                  </p:childTnLst>
-                                </p:cTn>
-                              </p:par>
-                              <p:par>
-                                <p:cTn id="20" presetID="1" presetClass="entr" presetSubtype="0" fill="hold" nodeType="withEffect">
+                                <p:cTn id="17" presetID="1" presetClass="entr" presetSubtype="0" fill="hold" nodeType="clickEffect">
                                   <p:stCondLst>
                                     <p:cond delay="0"/>
                                   </p:stCondLst>
                                   <p:childTnLst>
                                     <p:set>
                                       <p:cBhvr>
-                                        <p:cTn id="21" dur="1" fill="hold">
+                                        <p:cTn id="18" dur="1" fill="hold">
                                           <p:stCondLst>
                                             <p:cond delay="0"/>
                                           </p:stCondLst>
                                         </p:cTn>
                                         <p:tgtEl>
-                                          <p:spTgt spid="8"/>
+                                          <p:spTgt spid="1027"/>
                                         </p:tgtEl>
                                         <p:attrNameLst>
                                           <p:attrName>style.visibility</p:attrName>
@@ -16282,20 +16910,20 @@
                                 </p:cTn>
                               </p:par>
                               <p:par>
-                                <p:cTn id="22" presetID="1" presetClass="entr" presetSubtype="0" fill="hold" nodeType="withEffect">
+                                <p:cTn id="19" presetID="1" presetClass="entr" presetSubtype="0" fill="hold" nodeType="withEffect">
                                   <p:stCondLst>
                                     <p:cond delay="0"/>
                                   </p:stCondLst>
                                   <p:childTnLst>
                                     <p:set>
                                       <p:cBhvr>
-                                        <p:cTn id="23" dur="1" fill="hold">
+                                        <p:cTn id="20" dur="1" fill="hold">
                                           <p:stCondLst>
                                             <p:cond delay="0"/>
                                           </p:stCondLst>
                                         </p:cTn>
                                         <p:tgtEl>
-                                          <p:spTgt spid="7"/>
+                                          <p:spTgt spid="1026"/>
                                         </p:tgtEl>
                                         <p:attrNameLst>
                                           <p:attrName>style.visibility</p:attrName>
@@ -16337,8 +16965,6 @@
     </p:tnLst>
     <p:bldLst>
       <p:bldP spid="3" grpId="0" uiExpand="1" build="p"/>
-      <p:bldP spid="13" grpId="0" uiExpand="1" animBg="1"/>
-      <p:bldP spid="13" grpId="1" uiExpand="1" animBg="1"/>
     </p:bldLst>
   </p:timing>
 </p:sld>
@@ -16408,12 +17034,6 @@
               <a:t>Binarisierung</a:t>
             </a:r>
             <a:endParaRPr lang="de-CH" dirty="0" smtClean="0"/>
-          </a:p>
-          <a:p>
-            <a:r>
-              <a:rPr lang="de-CH" dirty="0" smtClean="0"/>
-              <a:t>Eigene Features erstellen und anwenden</a:t>
-            </a:r>
           </a:p>
           <a:p>
             <a:r>
@@ -16758,55 +17378,6 @@
                                           <p:spTgt spid="3">
                                             <p:txEl>
                                               <p:pRg st="3" end="3"/>
-                                            </p:txEl>
-                                          </p:spTgt>
-                                        </p:tgtEl>
-                                        <p:attrNameLst>
-                                          <p:attrName>style.visibility</p:attrName>
-                                        </p:attrNameLst>
-                                      </p:cBhvr>
-                                      <p:to>
-                                        <p:strVal val="visible"/>
-                                      </p:to>
-                                    </p:set>
-                                  </p:childTnLst>
-                                </p:cTn>
-                              </p:par>
-                            </p:childTnLst>
-                          </p:cTn>
-                        </p:par>
-                      </p:childTnLst>
-                    </p:cTn>
-                  </p:par>
-                  <p:par>
-                    <p:cTn id="19" fill="hold">
-                      <p:stCondLst>
-                        <p:cond delay="indefinite"/>
-                      </p:stCondLst>
-                      <p:childTnLst>
-                        <p:par>
-                          <p:cTn id="20" fill="hold">
-                            <p:stCondLst>
-                              <p:cond delay="0"/>
-                            </p:stCondLst>
-                            <p:childTnLst>
-                              <p:par>
-                                <p:cTn id="21" presetID="1" presetClass="entr" presetSubtype="0" fill="hold" grpId="0" nodeType="clickEffect">
-                                  <p:stCondLst>
-                                    <p:cond delay="0"/>
-                                  </p:stCondLst>
-                                  <p:childTnLst>
-                                    <p:set>
-                                      <p:cBhvr>
-                                        <p:cTn id="22" dur="1" fill="hold">
-                                          <p:stCondLst>
-                                            <p:cond delay="0"/>
-                                          </p:stCondLst>
-                                        </p:cTn>
-                                        <p:tgtEl>
-                                          <p:spTgt spid="3">
-                                            <p:txEl>
-                                              <p:pRg st="4" end="4"/>
                                             </p:txEl>
                                           </p:spTgt>
                                         </p:tgtEl>
@@ -18802,11 +19373,7 @@
           <a:p>
             <a:r>
               <a:rPr lang="de-CH" dirty="0" smtClean="0"/>
-              <a:t>Linien </a:t>
-            </a:r>
-            <a:r>
-              <a:rPr lang="de-CH" dirty="0" smtClean="0"/>
-              <a:t>erkennen</a:t>
+              <a:t>Linien erkennen</a:t>
             </a:r>
           </a:p>
           <a:p>
@@ -18818,11 +19385,7 @@
           <a:p>
             <a:r>
               <a:rPr lang="de-CH" dirty="0" smtClean="0"/>
-              <a:t>Features </a:t>
-            </a:r>
-            <a:r>
-              <a:rPr lang="de-CH" dirty="0" smtClean="0"/>
-              <a:t>definieren</a:t>
+              <a:t>Features definieren</a:t>
             </a:r>
           </a:p>
           <a:p>

</xml_diff>